<commit_message>
first chunk of multi-d array
</commit_message>
<xml_diff>
--- a/files/communication_diagram.pptx
+++ b/files/communication_diagram.pptx
@@ -551,6 +551,90 @@
 </p:notes>
 </file>
 
+<file path=ppt/notesSlides/notesSlide2.xml><?xml version="1.0" encoding="utf-8"?>
+<p:notes xmlns:a="http://schemas.openxmlformats.org/drawingml/2006/main" xmlns:r="http://schemas.openxmlformats.org/officeDocument/2006/relationships" xmlns:p="http://schemas.openxmlformats.org/presentationml/2006/main">
+  <p:cSld>
+    <p:spTree>
+      <p:nvGrpSpPr>
+        <p:cNvPr id="1" name=""/>
+        <p:cNvGrpSpPr/>
+        <p:nvPr/>
+      </p:nvGrpSpPr>
+      <p:grpSpPr>
+        <a:xfrm>
+          <a:off x="0" y="0"/>
+          <a:ext cx="0" cy="0"/>
+          <a:chOff x="0" y="0"/>
+          <a:chExt cx="0" cy="0"/>
+        </a:xfrm>
+      </p:grpSpPr>
+      <p:sp>
+        <p:nvSpPr>
+          <p:cNvPr id="2" name="Slide Image Placeholder 1"/>
+          <p:cNvSpPr>
+            <a:spLocks noGrp="1" noRot="1" noChangeAspect="1"/>
+          </p:cNvSpPr>
+          <p:nvPr>
+            <p:ph type="sldImg"/>
+          </p:nvPr>
+        </p:nvSpPr>
+        <p:spPr/>
+      </p:sp>
+      <p:sp>
+        <p:nvSpPr>
+          <p:cNvPr id="3" name="Notes Placeholder 2"/>
+          <p:cNvSpPr>
+            <a:spLocks noGrp="1"/>
+          </p:cNvSpPr>
+          <p:nvPr>
+            <p:ph type="body" idx="1"/>
+          </p:nvPr>
+        </p:nvSpPr>
+        <p:spPr/>
+        <p:txBody>
+          <a:bodyPr/>
+          <a:lstStyle/>
+          <a:p>
+            <a:endParaRPr lang="en-US" dirty="0"/>
+          </a:p>
+        </p:txBody>
+      </p:sp>
+      <p:sp>
+        <p:nvSpPr>
+          <p:cNvPr id="4" name="Slide Number Placeholder 3"/>
+          <p:cNvSpPr>
+            <a:spLocks noGrp="1"/>
+          </p:cNvSpPr>
+          <p:nvPr>
+            <p:ph type="sldNum" sz="quarter" idx="5"/>
+          </p:nvPr>
+        </p:nvSpPr>
+        <p:spPr/>
+        <p:txBody>
+          <a:bodyPr/>
+          <a:lstStyle/>
+          <a:p>
+            <a:fld id="{DEBBBD2F-05DD-6243-8AB1-A4EFA551B609}" type="slidenum">
+              <a:rPr lang="en-US" smtClean="0"/>
+              <a:t>2</a:t>
+            </a:fld>
+            <a:endParaRPr lang="en-US"/>
+          </a:p>
+        </p:txBody>
+      </p:sp>
+    </p:spTree>
+    <p:extLst>
+      <p:ext uri="{BB962C8B-B14F-4D97-AF65-F5344CB8AC3E}">
+        <p14:creationId xmlns:p14="http://schemas.microsoft.com/office/powerpoint/2010/main" val="2115458267"/>
+      </p:ext>
+    </p:extLst>
+  </p:cSld>
+  <p:clrMapOvr>
+    <a:masterClrMapping/>
+  </p:clrMapOvr>
+</p:notes>
+</file>
+
 <file path=ppt/slideLayouts/slideLayout1.xml><?xml version="1.0" encoding="utf-8"?>
 <p:sldLayout xmlns:a="http://schemas.openxmlformats.org/drawingml/2006/main" xmlns:r="http://schemas.openxmlformats.org/officeDocument/2006/relationships" xmlns:p="http://schemas.openxmlformats.org/presentationml/2006/main" type="title" preserve="1">
   <p:cSld name="Title Slide">
@@ -4956,9 +5040,9 @@
           <a:prstGeom prst="straightConnector1">
             <a:avLst/>
           </a:prstGeom>
-          <a:ln>
-            <a:solidFill>
-              <a:srgbClr val="360084"/>
+          <a:ln w="22225">
+            <a:solidFill>
+              <a:schemeClr val="tx1"/>
             </a:solidFill>
             <a:headEnd type="triangle"/>
             <a:tailEnd type="triangle"/>
@@ -5001,9 +5085,9 @@
           <a:prstGeom prst="straightConnector1">
             <a:avLst/>
           </a:prstGeom>
-          <a:ln>
-            <a:solidFill>
-              <a:srgbClr val="360084"/>
+          <a:ln w="22225">
+            <a:solidFill>
+              <a:schemeClr val="tx1"/>
             </a:solidFill>
             <a:headEnd type="triangle"/>
             <a:tailEnd type="triangle"/>
@@ -5085,6 +5169,9 @@
             <a:avLst/>
           </a:prstGeom>
           <a:noFill/>
+          <a:ln>
+            <a:noFill/>
+          </a:ln>
         </p:spPr>
         <p:txBody>
           <a:bodyPr wrap="square" rtlCol="0">
@@ -5093,11 +5180,7 @@
           <a:lstStyle/>
           <a:p>
             <a:r>
-              <a:rPr lang="en-US" sz="1400" dirty="0">
-                <a:solidFill>
-                  <a:srgbClr val="360084"/>
-                </a:solidFill>
-              </a:rPr>
+              <a:rPr lang="en-US" sz="1400" dirty="0"/>
               <a:t>Block length = 4</a:t>
             </a:r>
           </a:p>
@@ -5124,6 +5207,9 @@
             <a:avLst/>
           </a:prstGeom>
           <a:noFill/>
+          <a:ln>
+            <a:noFill/>
+          </a:ln>
         </p:spPr>
         <p:txBody>
           <a:bodyPr wrap="square" rtlCol="0">
@@ -5133,11 +5219,7 @@
           <a:p>
             <a:pPr algn="ctr"/>
             <a:r>
-              <a:rPr lang="en-US" sz="1400" dirty="0">
-                <a:solidFill>
-                  <a:srgbClr val="360084"/>
-                </a:solidFill>
-              </a:rPr>
+              <a:rPr lang="en-US" sz="1400" dirty="0"/>
               <a:t>Count = 2</a:t>
             </a:r>
           </a:p>
@@ -6132,69 +6214,8 @@
           <p:nvPr/>
         </p:nvSpPr>
         <p:spPr>
-          <a:xfrm>
-            <a:off x="7067587" y="4009347"/>
-            <a:ext cx="322151" cy="272753"/>
-          </a:xfrm>
-          <a:prstGeom prst="rect">
-            <a:avLst/>
-          </a:prstGeom>
-          <a:solidFill>
-            <a:srgbClr val="FAFDF0"/>
-          </a:solidFill>
-          <a:ln>
-            <a:solidFill>
-              <a:srgbClr val="DDF08B"/>
-            </a:solidFill>
-          </a:ln>
-        </p:spPr>
-        <p:style>
-          <a:lnRef idx="2">
-            <a:schemeClr val="accent1">
-              <a:shade val="15000"/>
-            </a:schemeClr>
-          </a:lnRef>
-          <a:fillRef idx="1">
-            <a:schemeClr val="accent1"/>
-          </a:fillRef>
-          <a:effectRef idx="0">
-            <a:schemeClr val="accent1"/>
-          </a:effectRef>
-          <a:fontRef idx="minor">
-            <a:schemeClr val="lt1"/>
-          </a:fontRef>
-        </p:style>
-        <p:txBody>
-          <a:bodyPr rtlCol="0" anchor="ctr"/>
-          <a:lstStyle/>
-          <a:p>
-            <a:pPr algn="ctr"/>
-            <a:r>
-              <a:rPr lang="en-US" sz="1000" dirty="0">
-                <a:solidFill>
-                  <a:schemeClr val="tx1"/>
-                </a:solidFill>
-              </a:rPr>
-              <a:t>3</a:t>
-            </a:r>
-          </a:p>
-        </p:txBody>
-      </p:sp>
-      <p:sp>
-        <p:nvSpPr>
-          <p:cNvPr id="145" name="Rectangle 144">
-            <a:extLst>
-              <a:ext uri="{FF2B5EF4-FFF2-40B4-BE49-F238E27FC236}">
-                <a16:creationId xmlns:a16="http://schemas.microsoft.com/office/drawing/2014/main" id="{A4718426-0358-D872-EB0B-12599DE3070F}"/>
-              </a:ext>
-            </a:extLst>
-          </p:cNvPr>
-          <p:cNvSpPr/>
-          <p:nvPr/>
-        </p:nvSpPr>
-        <p:spPr>
-          <a:xfrm>
-            <a:off x="7711889" y="4009346"/>
+          <a:xfrm rot="10800000" flipH="1" flipV="1">
+            <a:off x="7067587" y="4827605"/>
             <a:ext cx="322151" cy="272753"/>
           </a:xfrm>
           <a:prstGeom prst="rect">
@@ -6240,19 +6261,19 @@
       </p:sp>
       <p:sp>
         <p:nvSpPr>
-          <p:cNvPr id="146" name="Rectangle 145">
-            <a:extLst>
-              <a:ext uri="{FF2B5EF4-FFF2-40B4-BE49-F238E27FC236}">
-                <a16:creationId xmlns:a16="http://schemas.microsoft.com/office/drawing/2014/main" id="{1BD51DC3-C569-BD4F-8CDE-40F5EE9B0E31}"/>
-              </a:ext>
-            </a:extLst>
-          </p:cNvPr>
-          <p:cNvSpPr/>
-          <p:nvPr/>
-        </p:nvSpPr>
-        <p:spPr>
-          <a:xfrm>
-            <a:off x="7067587" y="4827605"/>
+          <p:cNvPr id="145" name="Rectangle 144">
+            <a:extLst>
+              <a:ext uri="{FF2B5EF4-FFF2-40B4-BE49-F238E27FC236}">
+                <a16:creationId xmlns:a16="http://schemas.microsoft.com/office/drawing/2014/main" id="{A4718426-0358-D872-EB0B-12599DE3070F}"/>
+              </a:ext>
+            </a:extLst>
+          </p:cNvPr>
+          <p:cNvSpPr/>
+          <p:nvPr/>
+        </p:nvSpPr>
+        <p:spPr>
+          <a:xfrm rot="10800000" flipH="1">
+            <a:off x="7711889" y="4827606"/>
             <a:ext cx="322151" cy="272753"/>
           </a:xfrm>
           <a:prstGeom prst="rect">
@@ -6298,19 +6319,19 @@
       </p:sp>
       <p:sp>
         <p:nvSpPr>
-          <p:cNvPr id="147" name="Rectangle 146">
-            <a:extLst>
-              <a:ext uri="{FF2B5EF4-FFF2-40B4-BE49-F238E27FC236}">
-                <a16:creationId xmlns:a16="http://schemas.microsoft.com/office/drawing/2014/main" id="{C17E2E40-5CD3-6B2B-E8E9-E932AA327E4D}"/>
-              </a:ext>
-            </a:extLst>
-          </p:cNvPr>
-          <p:cNvSpPr/>
-          <p:nvPr/>
-        </p:nvSpPr>
-        <p:spPr>
-          <a:xfrm>
-            <a:off x="7711889" y="4827604"/>
+          <p:cNvPr id="146" name="Rectangle 145">
+            <a:extLst>
+              <a:ext uri="{FF2B5EF4-FFF2-40B4-BE49-F238E27FC236}">
+                <a16:creationId xmlns:a16="http://schemas.microsoft.com/office/drawing/2014/main" id="{1BD51DC3-C569-BD4F-8CDE-40F5EE9B0E31}"/>
+              </a:ext>
+            </a:extLst>
+          </p:cNvPr>
+          <p:cNvSpPr/>
+          <p:nvPr/>
+        </p:nvSpPr>
+        <p:spPr>
+          <a:xfrm rot="10800000" flipH="1">
+            <a:off x="7067587" y="4009347"/>
             <a:ext cx="322151" cy="272753"/>
           </a:xfrm>
           <a:prstGeom prst="rect">
@@ -6356,19 +6377,19 @@
       </p:sp>
       <p:sp>
         <p:nvSpPr>
-          <p:cNvPr id="148" name="Rectangle 147">
-            <a:extLst>
-              <a:ext uri="{FF2B5EF4-FFF2-40B4-BE49-F238E27FC236}">
-                <a16:creationId xmlns:a16="http://schemas.microsoft.com/office/drawing/2014/main" id="{9A396232-7249-149B-7F0E-027B063A240E}"/>
-              </a:ext>
-            </a:extLst>
-          </p:cNvPr>
-          <p:cNvSpPr/>
-          <p:nvPr/>
-        </p:nvSpPr>
-        <p:spPr>
-          <a:xfrm>
-            <a:off x="6745436" y="4009348"/>
+          <p:cNvPr id="147" name="Rectangle 146">
+            <a:extLst>
+              <a:ext uri="{FF2B5EF4-FFF2-40B4-BE49-F238E27FC236}">
+                <a16:creationId xmlns:a16="http://schemas.microsoft.com/office/drawing/2014/main" id="{C17E2E40-5CD3-6B2B-E8E9-E932AA327E4D}"/>
+              </a:ext>
+            </a:extLst>
+          </p:cNvPr>
+          <p:cNvSpPr/>
+          <p:nvPr/>
+        </p:nvSpPr>
+        <p:spPr>
+          <a:xfrm rot="10800000" flipH="1">
+            <a:off x="7711889" y="4009348"/>
             <a:ext cx="322151" cy="272753"/>
           </a:xfrm>
           <a:prstGeom prst="rect">
@@ -6414,19 +6435,19 @@
       </p:sp>
       <p:sp>
         <p:nvSpPr>
-          <p:cNvPr id="149" name="Rectangle 148">
-            <a:extLst>
-              <a:ext uri="{FF2B5EF4-FFF2-40B4-BE49-F238E27FC236}">
-                <a16:creationId xmlns:a16="http://schemas.microsoft.com/office/drawing/2014/main" id="{CB36B4E2-2621-E660-4D78-06E562CB868F}"/>
-              </a:ext>
-            </a:extLst>
-          </p:cNvPr>
-          <p:cNvSpPr/>
-          <p:nvPr/>
-        </p:nvSpPr>
-        <p:spPr>
-          <a:xfrm>
-            <a:off x="6745436" y="4827606"/>
+          <p:cNvPr id="148" name="Rectangle 147">
+            <a:extLst>
+              <a:ext uri="{FF2B5EF4-FFF2-40B4-BE49-F238E27FC236}">
+                <a16:creationId xmlns:a16="http://schemas.microsoft.com/office/drawing/2014/main" id="{9A396232-7249-149B-7F0E-027B063A240E}"/>
+              </a:ext>
+            </a:extLst>
+          </p:cNvPr>
+          <p:cNvSpPr/>
+          <p:nvPr/>
+        </p:nvSpPr>
+        <p:spPr>
+          <a:xfrm rot="10800000" flipH="1">
+            <a:off x="6745436" y="4827604"/>
             <a:ext cx="322151" cy="272753"/>
           </a:xfrm>
           <a:prstGeom prst="rect">
@@ -6472,19 +6493,19 @@
       </p:sp>
       <p:sp>
         <p:nvSpPr>
-          <p:cNvPr id="150" name="Rectangle 149">
-            <a:extLst>
-              <a:ext uri="{FF2B5EF4-FFF2-40B4-BE49-F238E27FC236}">
-                <a16:creationId xmlns:a16="http://schemas.microsoft.com/office/drawing/2014/main" id="{9F702086-A2BA-097B-1EAD-7FD2D139C0BB}"/>
-              </a:ext>
-            </a:extLst>
-          </p:cNvPr>
-          <p:cNvSpPr/>
-          <p:nvPr/>
-        </p:nvSpPr>
-        <p:spPr>
-          <a:xfrm>
-            <a:off x="7389738" y="4009346"/>
+          <p:cNvPr id="149" name="Rectangle 148">
+            <a:extLst>
+              <a:ext uri="{FF2B5EF4-FFF2-40B4-BE49-F238E27FC236}">
+                <a16:creationId xmlns:a16="http://schemas.microsoft.com/office/drawing/2014/main" id="{CB36B4E2-2621-E660-4D78-06E562CB868F}"/>
+              </a:ext>
+            </a:extLst>
+          </p:cNvPr>
+          <p:cNvSpPr/>
+          <p:nvPr/>
+        </p:nvSpPr>
+        <p:spPr>
+          <a:xfrm rot="10800000" flipH="1">
+            <a:off x="6745436" y="4009346"/>
             <a:ext cx="322151" cy="272753"/>
           </a:xfrm>
           <a:prstGeom prst="rect">
@@ -6530,80 +6551,19 @@
       </p:sp>
       <p:sp>
         <p:nvSpPr>
-          <p:cNvPr id="151" name="Rectangle 150">
-            <a:extLst>
-              <a:ext uri="{FF2B5EF4-FFF2-40B4-BE49-F238E27FC236}">
-                <a16:creationId xmlns:a16="http://schemas.microsoft.com/office/drawing/2014/main" id="{AFC5529E-F241-26F0-E6D1-6BA1B6BD0172}"/>
-              </a:ext>
-            </a:extLst>
-          </p:cNvPr>
-          <p:cNvSpPr/>
-          <p:nvPr/>
-        </p:nvSpPr>
-        <p:spPr>
-          <a:xfrm>
-            <a:off x="7389738" y="4827604"/>
-            <a:ext cx="322151" cy="272753"/>
-          </a:xfrm>
-          <a:prstGeom prst="rect">
-            <a:avLst/>
-          </a:prstGeom>
-          <a:solidFill>
-            <a:srgbClr val="FAFDF0"/>
-          </a:solidFill>
-          <a:ln>
-            <a:solidFill>
-              <a:srgbClr val="DDF08B"/>
-            </a:solidFill>
-          </a:ln>
-        </p:spPr>
-        <p:style>
-          <a:lnRef idx="2">
-            <a:schemeClr val="accent1">
-              <a:shade val="15000"/>
-            </a:schemeClr>
-          </a:lnRef>
-          <a:fillRef idx="1">
-            <a:schemeClr val="accent1"/>
-          </a:fillRef>
-          <a:effectRef idx="0">
-            <a:schemeClr val="accent1"/>
-          </a:effectRef>
-          <a:fontRef idx="minor">
-            <a:schemeClr val="lt1"/>
-          </a:fontRef>
-        </p:style>
-        <p:txBody>
-          <a:bodyPr rtlCol="0" anchor="ctr"/>
-          <a:lstStyle/>
-          <a:p>
-            <a:pPr algn="ctr"/>
-            <a:r>
-              <a:rPr lang="en-US" sz="1000" dirty="0">
-                <a:solidFill>
-                  <a:schemeClr val="tx1"/>
-                </a:solidFill>
-              </a:rPr>
-              <a:t>4</a:t>
-            </a:r>
-          </a:p>
-        </p:txBody>
-      </p:sp>
-      <p:sp>
-        <p:nvSpPr>
-          <p:cNvPr id="152" name="Rectangle 151">
-            <a:extLst>
-              <a:ext uri="{FF2B5EF4-FFF2-40B4-BE49-F238E27FC236}">
-                <a16:creationId xmlns:a16="http://schemas.microsoft.com/office/drawing/2014/main" id="{1D1C3B29-2EEE-2104-78E9-C077E2D337E1}"/>
-              </a:ext>
-            </a:extLst>
-          </p:cNvPr>
-          <p:cNvSpPr/>
-          <p:nvPr/>
-        </p:nvSpPr>
-        <p:spPr>
-          <a:xfrm>
-            <a:off x="7711889" y="4282099"/>
+          <p:cNvPr id="150" name="Rectangle 149">
+            <a:extLst>
+              <a:ext uri="{FF2B5EF4-FFF2-40B4-BE49-F238E27FC236}">
+                <a16:creationId xmlns:a16="http://schemas.microsoft.com/office/drawing/2014/main" id="{9F702086-A2BA-097B-1EAD-7FD2D139C0BB}"/>
+              </a:ext>
+            </a:extLst>
+          </p:cNvPr>
+          <p:cNvSpPr/>
+          <p:nvPr/>
+        </p:nvSpPr>
+        <p:spPr>
+          <a:xfrm rot="10800000" flipH="1">
+            <a:off x="7389738" y="4827606"/>
             <a:ext cx="322151" cy="272753"/>
           </a:xfrm>
           <a:prstGeom prst="rect">
@@ -6649,19 +6609,19 @@
       </p:sp>
       <p:sp>
         <p:nvSpPr>
-          <p:cNvPr id="153" name="Rectangle 152">
-            <a:extLst>
-              <a:ext uri="{FF2B5EF4-FFF2-40B4-BE49-F238E27FC236}">
-                <a16:creationId xmlns:a16="http://schemas.microsoft.com/office/drawing/2014/main" id="{DF9B1A7E-0BE4-1E2D-BBB2-85CF83AA9443}"/>
-              </a:ext>
-            </a:extLst>
-          </p:cNvPr>
-          <p:cNvSpPr/>
-          <p:nvPr/>
-        </p:nvSpPr>
-        <p:spPr>
-          <a:xfrm>
-            <a:off x="7711889" y="4554852"/>
+          <p:cNvPr id="151" name="Rectangle 150">
+            <a:extLst>
+              <a:ext uri="{FF2B5EF4-FFF2-40B4-BE49-F238E27FC236}">
+                <a16:creationId xmlns:a16="http://schemas.microsoft.com/office/drawing/2014/main" id="{AFC5529E-F241-26F0-E6D1-6BA1B6BD0172}"/>
+              </a:ext>
+            </a:extLst>
+          </p:cNvPr>
+          <p:cNvSpPr/>
+          <p:nvPr/>
+        </p:nvSpPr>
+        <p:spPr>
+          <a:xfrm rot="10800000" flipH="1" flipV="1">
+            <a:off x="7389738" y="4009348"/>
             <a:ext cx="322151" cy="272753"/>
           </a:xfrm>
           <a:prstGeom prst="rect">
@@ -6707,19 +6667,19 @@
       </p:sp>
       <p:sp>
         <p:nvSpPr>
-          <p:cNvPr id="154" name="Rectangle 153">
-            <a:extLst>
-              <a:ext uri="{FF2B5EF4-FFF2-40B4-BE49-F238E27FC236}">
-                <a16:creationId xmlns:a16="http://schemas.microsoft.com/office/drawing/2014/main" id="{9A15E09C-55D9-7765-1EAE-7AE4625A72A7}"/>
-              </a:ext>
-            </a:extLst>
-          </p:cNvPr>
-          <p:cNvSpPr/>
-          <p:nvPr/>
-        </p:nvSpPr>
-        <p:spPr>
-          <a:xfrm>
-            <a:off x="6745436" y="4282101"/>
+          <p:cNvPr id="152" name="Rectangle 151">
+            <a:extLst>
+              <a:ext uri="{FF2B5EF4-FFF2-40B4-BE49-F238E27FC236}">
+                <a16:creationId xmlns:a16="http://schemas.microsoft.com/office/drawing/2014/main" id="{1D1C3B29-2EEE-2104-78E9-C077E2D337E1}"/>
+              </a:ext>
+            </a:extLst>
+          </p:cNvPr>
+          <p:cNvSpPr/>
+          <p:nvPr/>
+        </p:nvSpPr>
+        <p:spPr>
+          <a:xfrm rot="10800000" flipH="1">
+            <a:off x="7711889" y="4554853"/>
             <a:ext cx="322151" cy="272753"/>
           </a:xfrm>
           <a:prstGeom prst="rect">
@@ -6765,6 +6725,128 @@
       </p:sp>
       <p:sp>
         <p:nvSpPr>
+          <p:cNvPr id="153" name="Rectangle 152">
+            <a:extLst>
+              <a:ext uri="{FF2B5EF4-FFF2-40B4-BE49-F238E27FC236}">
+                <a16:creationId xmlns:a16="http://schemas.microsoft.com/office/drawing/2014/main" id="{DF9B1A7E-0BE4-1E2D-BBB2-85CF83AA9443}"/>
+              </a:ext>
+            </a:extLst>
+          </p:cNvPr>
+          <p:cNvSpPr/>
+          <p:nvPr/>
+        </p:nvSpPr>
+        <p:spPr>
+          <a:xfrm rot="10800000" flipH="1" flipV="1">
+            <a:off x="7711889" y="4282100"/>
+            <a:ext cx="322151" cy="272753"/>
+          </a:xfrm>
+          <a:prstGeom prst="rect">
+            <a:avLst/>
+          </a:prstGeom>
+          <a:solidFill>
+            <a:srgbClr val="FAFDF0"/>
+          </a:solidFill>
+          <a:ln>
+            <a:solidFill>
+              <a:srgbClr val="DDF08B"/>
+            </a:solidFill>
+          </a:ln>
+        </p:spPr>
+        <p:style>
+          <a:lnRef idx="2">
+            <a:schemeClr val="accent1">
+              <a:shade val="15000"/>
+            </a:schemeClr>
+          </a:lnRef>
+          <a:fillRef idx="1">
+            <a:schemeClr val="accent1"/>
+          </a:fillRef>
+          <a:effectRef idx="0">
+            <a:schemeClr val="accent1"/>
+          </a:effectRef>
+          <a:fontRef idx="minor">
+            <a:schemeClr val="lt1"/>
+          </a:fontRef>
+        </p:style>
+        <p:txBody>
+          <a:bodyPr rtlCol="0" anchor="ctr"/>
+          <a:lstStyle/>
+          <a:p>
+            <a:pPr algn="ctr"/>
+            <a:r>
+              <a:rPr lang="en-US" sz="1000" dirty="0">
+                <a:solidFill>
+                  <a:schemeClr val="tx1"/>
+                </a:solidFill>
+              </a:rPr>
+              <a:t>3</a:t>
+            </a:r>
+          </a:p>
+        </p:txBody>
+      </p:sp>
+      <p:sp>
+        <p:nvSpPr>
+          <p:cNvPr id="154" name="Rectangle 153">
+            <a:extLst>
+              <a:ext uri="{FF2B5EF4-FFF2-40B4-BE49-F238E27FC236}">
+                <a16:creationId xmlns:a16="http://schemas.microsoft.com/office/drawing/2014/main" id="{9A15E09C-55D9-7765-1EAE-7AE4625A72A7}"/>
+              </a:ext>
+            </a:extLst>
+          </p:cNvPr>
+          <p:cNvSpPr/>
+          <p:nvPr/>
+        </p:nvSpPr>
+        <p:spPr>
+          <a:xfrm rot="10800000" flipH="1" flipV="1">
+            <a:off x="6745436" y="4554851"/>
+            <a:ext cx="322151" cy="272753"/>
+          </a:xfrm>
+          <a:prstGeom prst="rect">
+            <a:avLst/>
+          </a:prstGeom>
+          <a:solidFill>
+            <a:srgbClr val="FAFDF0"/>
+          </a:solidFill>
+          <a:ln>
+            <a:solidFill>
+              <a:srgbClr val="DDF08B"/>
+            </a:solidFill>
+          </a:ln>
+        </p:spPr>
+        <p:style>
+          <a:lnRef idx="2">
+            <a:schemeClr val="accent1">
+              <a:shade val="15000"/>
+            </a:schemeClr>
+          </a:lnRef>
+          <a:fillRef idx="1">
+            <a:schemeClr val="accent1"/>
+          </a:fillRef>
+          <a:effectRef idx="0">
+            <a:schemeClr val="accent1"/>
+          </a:effectRef>
+          <a:fontRef idx="minor">
+            <a:schemeClr val="lt1"/>
+          </a:fontRef>
+        </p:style>
+        <p:txBody>
+          <a:bodyPr rtlCol="0" anchor="ctr"/>
+          <a:lstStyle/>
+          <a:p>
+            <a:pPr algn="ctr"/>
+            <a:r>
+              <a:rPr lang="en-US" sz="1000" dirty="0">
+                <a:solidFill>
+                  <a:schemeClr val="tx1"/>
+                </a:solidFill>
+              </a:rPr>
+              <a:t>4</a:t>
+            </a:r>
+          </a:p>
+        </p:txBody>
+      </p:sp>
+      <p:sp>
+        <p:nvSpPr>
           <p:cNvPr id="155" name="Rectangle 154">
             <a:extLst>
               <a:ext uri="{FF2B5EF4-FFF2-40B4-BE49-F238E27FC236}">
@@ -6776,8 +6858,8 @@
           <p:nvPr/>
         </p:nvSpPr>
         <p:spPr>
-          <a:xfrm>
-            <a:off x="6745436" y="4554854"/>
+          <a:xfrm rot="10800000" flipH="1">
+            <a:off x="6745436" y="4282098"/>
             <a:ext cx="322151" cy="272753"/>
           </a:xfrm>
           <a:prstGeom prst="rect">
@@ -6834,69 +6916,8 @@
           <p:nvPr/>
         </p:nvSpPr>
         <p:spPr>
-          <a:xfrm>
-            <a:off x="7067587" y="4282100"/>
-            <a:ext cx="322151" cy="272753"/>
-          </a:xfrm>
-          <a:prstGeom prst="rect">
-            <a:avLst/>
-          </a:prstGeom>
-          <a:solidFill>
-            <a:srgbClr val="F2EFF6"/>
-          </a:solidFill>
-          <a:ln>
-            <a:solidFill>
-              <a:srgbClr val="360084"/>
-            </a:solidFill>
-          </a:ln>
-        </p:spPr>
-        <p:style>
-          <a:lnRef idx="2">
-            <a:schemeClr val="accent1">
-              <a:shade val="15000"/>
-            </a:schemeClr>
-          </a:lnRef>
-          <a:fillRef idx="1">
-            <a:schemeClr val="accent1"/>
-          </a:fillRef>
-          <a:effectRef idx="0">
-            <a:schemeClr val="accent1"/>
-          </a:effectRef>
-          <a:fontRef idx="minor">
-            <a:schemeClr val="lt1"/>
-          </a:fontRef>
-        </p:style>
-        <p:txBody>
-          <a:bodyPr rtlCol="0" anchor="ctr"/>
-          <a:lstStyle/>
-          <a:p>
-            <a:pPr algn="ctr"/>
-            <a:r>
-              <a:rPr lang="en-US" sz="1000" dirty="0">
-                <a:solidFill>
-                  <a:schemeClr val="tx1"/>
-                </a:solidFill>
-              </a:rPr>
-              <a:t>2</a:t>
-            </a:r>
-          </a:p>
-        </p:txBody>
-      </p:sp>
-      <p:sp>
-        <p:nvSpPr>
-          <p:cNvPr id="157" name="Rectangle 156">
-            <a:extLst>
-              <a:ext uri="{FF2B5EF4-FFF2-40B4-BE49-F238E27FC236}">
-                <a16:creationId xmlns:a16="http://schemas.microsoft.com/office/drawing/2014/main" id="{B9013BFB-509E-6B05-3AB6-1F39420632CD}"/>
-              </a:ext>
-            </a:extLst>
-          </p:cNvPr>
-          <p:cNvSpPr/>
-          <p:nvPr/>
-        </p:nvSpPr>
-        <p:spPr>
-          <a:xfrm>
-            <a:off x="7389738" y="4282099"/>
+          <a:xfrm rot="10800000" flipH="1" flipV="1">
+            <a:off x="7067587" y="4554852"/>
             <a:ext cx="322151" cy="272753"/>
           </a:xfrm>
           <a:prstGeom prst="rect">
@@ -6942,80 +6963,19 @@
       </p:sp>
       <p:sp>
         <p:nvSpPr>
-          <p:cNvPr id="158" name="Rectangle 157">
-            <a:extLst>
-              <a:ext uri="{FF2B5EF4-FFF2-40B4-BE49-F238E27FC236}">
-                <a16:creationId xmlns:a16="http://schemas.microsoft.com/office/drawing/2014/main" id="{C7A0ACB5-B69B-0381-C187-54520FF36F91}"/>
-              </a:ext>
-            </a:extLst>
-          </p:cNvPr>
-          <p:cNvSpPr/>
-          <p:nvPr/>
-        </p:nvSpPr>
-        <p:spPr>
-          <a:xfrm>
-            <a:off x="7067587" y="4554853"/>
-            <a:ext cx="322151" cy="272753"/>
-          </a:xfrm>
-          <a:prstGeom prst="rect">
-            <a:avLst/>
-          </a:prstGeom>
-          <a:solidFill>
-            <a:srgbClr val="F2EFF6"/>
-          </a:solidFill>
-          <a:ln>
-            <a:solidFill>
-              <a:srgbClr val="360084"/>
-            </a:solidFill>
-          </a:ln>
-        </p:spPr>
-        <p:style>
-          <a:lnRef idx="2">
-            <a:schemeClr val="accent1">
-              <a:shade val="15000"/>
-            </a:schemeClr>
-          </a:lnRef>
-          <a:fillRef idx="1">
-            <a:schemeClr val="accent1"/>
-          </a:fillRef>
-          <a:effectRef idx="0">
-            <a:schemeClr val="accent1"/>
-          </a:effectRef>
-          <a:fontRef idx="minor">
-            <a:schemeClr val="lt1"/>
-          </a:fontRef>
-        </p:style>
-        <p:txBody>
-          <a:bodyPr rtlCol="0" anchor="ctr"/>
-          <a:lstStyle/>
-          <a:p>
-            <a:pPr algn="ctr"/>
-            <a:r>
-              <a:rPr lang="en-US" sz="1000" dirty="0">
-                <a:solidFill>
-                  <a:schemeClr val="tx1"/>
-                </a:solidFill>
-              </a:rPr>
-              <a:t>1</a:t>
-            </a:r>
-          </a:p>
-        </p:txBody>
-      </p:sp>
-      <p:sp>
-        <p:nvSpPr>
-          <p:cNvPr id="159" name="Rectangle 158">
-            <a:extLst>
-              <a:ext uri="{FF2B5EF4-FFF2-40B4-BE49-F238E27FC236}">
-                <a16:creationId xmlns:a16="http://schemas.microsoft.com/office/drawing/2014/main" id="{E90D88F4-4C0A-9DB8-31EB-A4A797CA0C46}"/>
-              </a:ext>
-            </a:extLst>
-          </p:cNvPr>
-          <p:cNvSpPr/>
-          <p:nvPr/>
-        </p:nvSpPr>
-        <p:spPr>
-          <a:xfrm>
-            <a:off x="7389738" y="4554852"/>
+          <p:cNvPr id="157" name="Rectangle 156">
+            <a:extLst>
+              <a:ext uri="{FF2B5EF4-FFF2-40B4-BE49-F238E27FC236}">
+                <a16:creationId xmlns:a16="http://schemas.microsoft.com/office/drawing/2014/main" id="{B9013BFB-509E-6B05-3AB6-1F39420632CD}"/>
+              </a:ext>
+            </a:extLst>
+          </p:cNvPr>
+          <p:cNvSpPr/>
+          <p:nvPr/>
+        </p:nvSpPr>
+        <p:spPr>
+          <a:xfrm rot="10800000" flipH="1">
+            <a:off x="7389738" y="4554853"/>
             <a:ext cx="322151" cy="272753"/>
           </a:xfrm>
           <a:prstGeom prst="rect">
@@ -7059,6 +7019,128 @@
           </a:p>
         </p:txBody>
       </p:sp>
+      <p:sp>
+        <p:nvSpPr>
+          <p:cNvPr id="158" name="Rectangle 157">
+            <a:extLst>
+              <a:ext uri="{FF2B5EF4-FFF2-40B4-BE49-F238E27FC236}">
+                <a16:creationId xmlns:a16="http://schemas.microsoft.com/office/drawing/2014/main" id="{C7A0ACB5-B69B-0381-C187-54520FF36F91}"/>
+              </a:ext>
+            </a:extLst>
+          </p:cNvPr>
+          <p:cNvSpPr/>
+          <p:nvPr/>
+        </p:nvSpPr>
+        <p:spPr>
+          <a:xfrm rot="10800000" flipH="1" flipV="1">
+            <a:off x="7067587" y="4282099"/>
+            <a:ext cx="322151" cy="272753"/>
+          </a:xfrm>
+          <a:prstGeom prst="rect">
+            <a:avLst/>
+          </a:prstGeom>
+          <a:solidFill>
+            <a:srgbClr val="F2EFF6"/>
+          </a:solidFill>
+          <a:ln>
+            <a:solidFill>
+              <a:srgbClr val="360084"/>
+            </a:solidFill>
+          </a:ln>
+        </p:spPr>
+        <p:style>
+          <a:lnRef idx="2">
+            <a:schemeClr val="accent1">
+              <a:shade val="15000"/>
+            </a:schemeClr>
+          </a:lnRef>
+          <a:fillRef idx="1">
+            <a:schemeClr val="accent1"/>
+          </a:fillRef>
+          <a:effectRef idx="0">
+            <a:schemeClr val="accent1"/>
+          </a:effectRef>
+          <a:fontRef idx="minor">
+            <a:schemeClr val="lt1"/>
+          </a:fontRef>
+        </p:style>
+        <p:txBody>
+          <a:bodyPr rtlCol="0" anchor="ctr"/>
+          <a:lstStyle/>
+          <a:p>
+            <a:pPr algn="ctr"/>
+            <a:r>
+              <a:rPr lang="en-US" sz="1000" dirty="0">
+                <a:solidFill>
+                  <a:schemeClr val="tx1"/>
+                </a:solidFill>
+              </a:rPr>
+              <a:t>1</a:t>
+            </a:r>
+          </a:p>
+        </p:txBody>
+      </p:sp>
+      <p:sp>
+        <p:nvSpPr>
+          <p:cNvPr id="159" name="Rectangle 158">
+            <a:extLst>
+              <a:ext uri="{FF2B5EF4-FFF2-40B4-BE49-F238E27FC236}">
+                <a16:creationId xmlns:a16="http://schemas.microsoft.com/office/drawing/2014/main" id="{E90D88F4-4C0A-9DB8-31EB-A4A797CA0C46}"/>
+              </a:ext>
+            </a:extLst>
+          </p:cNvPr>
+          <p:cNvSpPr/>
+          <p:nvPr/>
+        </p:nvSpPr>
+        <p:spPr>
+          <a:xfrm rot="10800000" flipH="1" flipV="1">
+            <a:off x="7389738" y="4282100"/>
+            <a:ext cx="322151" cy="272753"/>
+          </a:xfrm>
+          <a:prstGeom prst="rect">
+            <a:avLst/>
+          </a:prstGeom>
+          <a:solidFill>
+            <a:srgbClr val="F2EFF6"/>
+          </a:solidFill>
+          <a:ln>
+            <a:solidFill>
+              <a:srgbClr val="360084"/>
+            </a:solidFill>
+          </a:ln>
+        </p:spPr>
+        <p:style>
+          <a:lnRef idx="2">
+            <a:schemeClr val="accent1">
+              <a:shade val="15000"/>
+            </a:schemeClr>
+          </a:lnRef>
+          <a:fillRef idx="1">
+            <a:schemeClr val="accent1"/>
+          </a:fillRef>
+          <a:effectRef idx="0">
+            <a:schemeClr val="accent1"/>
+          </a:effectRef>
+          <a:fontRef idx="minor">
+            <a:schemeClr val="lt1"/>
+          </a:fontRef>
+        </p:style>
+        <p:txBody>
+          <a:bodyPr rtlCol="0" anchor="ctr"/>
+          <a:lstStyle/>
+          <a:p>
+            <a:pPr algn="ctr"/>
+            <a:r>
+              <a:rPr lang="en-US" sz="1000" dirty="0">
+                <a:solidFill>
+                  <a:schemeClr val="tx1"/>
+                </a:solidFill>
+              </a:rPr>
+              <a:t>2</a:t>
+            </a:r>
+          </a:p>
+        </p:txBody>
+      </p:sp>
       <p:cxnSp>
         <p:nvCxnSpPr>
           <p:cNvPr id="161" name="Straight Arrow Connector 160">
@@ -7074,9 +7156,9 @@
           <p:nvPr/>
         </p:nvCxnSpPr>
         <p:spPr>
-          <a:xfrm flipV="1">
-            <a:off x="7711889" y="4827604"/>
-            <a:ext cx="0" cy="272752"/>
+          <a:xfrm>
+            <a:off x="6744969" y="4827602"/>
+            <a:ext cx="322617" cy="0"/>
           </a:xfrm>
           <a:prstGeom prst="straightConnector1">
             <a:avLst/>
@@ -7118,9 +7200,9 @@
           <p:nvPr/>
         </p:nvCxnSpPr>
         <p:spPr>
-          <a:xfrm flipV="1">
-            <a:off x="7389738" y="4009346"/>
-            <a:ext cx="0" cy="818258"/>
+          <a:xfrm>
+            <a:off x="7067586" y="4554851"/>
+            <a:ext cx="965783" cy="0"/>
           </a:xfrm>
           <a:prstGeom prst="straightConnector1">
             <a:avLst/>
@@ -7129,7 +7211,7 @@
             <a:solidFill>
               <a:srgbClr val="360084"/>
             </a:solidFill>
-            <a:tailEnd type="triangle"/>
+            <a:tailEnd type="none"/>
           </a:ln>
         </p:spPr>
         <p:style>
@@ -7168,6 +7250,9 @@
             <a:avLst/>
           </a:prstGeom>
           <a:noFill/>
+          <a:ln>
+            <a:noFill/>
+          </a:ln>
         </p:spPr>
         <p:txBody>
           <a:bodyPr wrap="square" rtlCol="0">
@@ -7177,18 +7262,10 @@
           <a:p>
             <a:pPr algn="ctr"/>
             <a:r>
-              <a:rPr lang="en-US" sz="1400">
-                <a:solidFill>
-                  <a:srgbClr val="360084"/>
-                </a:solidFill>
-              </a:rPr>
+              <a:rPr lang="en-US" sz="1400"/>
               <a:t>Stride = 8</a:t>
             </a:r>
-            <a:endParaRPr lang="en-US" sz="1400" dirty="0">
-              <a:solidFill>
-                <a:srgbClr val="360084"/>
-              </a:solidFill>
-            </a:endParaRPr>
+            <a:endParaRPr lang="en-US" sz="1400" dirty="0"/>
           </a:p>
         </p:txBody>
       </p:sp>
@@ -7248,7 +7325,7 @@
                   <a:schemeClr val="tx1"/>
                 </a:solidFill>
               </a:rPr>
-              <a:t>0,0</a:t>
+              <a:t>1</a:t>
             </a:r>
           </a:p>
         </p:txBody>
@@ -7309,7 +7386,7 @@
                   <a:schemeClr val="tx1"/>
                 </a:solidFill>
               </a:rPr>
-              <a:t>1,0</a:t>
+              <a:t>2</a:t>
             </a:r>
           </a:p>
         </p:txBody>
@@ -7370,7 +7447,7 @@
                   <a:schemeClr val="tx1"/>
                 </a:solidFill>
               </a:rPr>
-              <a:t>2,0</a:t>
+              <a:t>3</a:t>
             </a:r>
           </a:p>
         </p:txBody>
@@ -7431,7 +7508,7 @@
                   <a:schemeClr val="tx1"/>
                 </a:solidFill>
               </a:rPr>
-              <a:t>0,3</a:t>
+              <a:t>13</a:t>
             </a:r>
           </a:p>
         </p:txBody>
@@ -7492,7 +7569,7 @@
                   <a:schemeClr val="tx1"/>
                 </a:solidFill>
               </a:rPr>
-              <a:t>3,3</a:t>
+              <a:t>16</a:t>
             </a:r>
           </a:p>
         </p:txBody>
@@ -7553,7 +7630,7 @@
                   <a:schemeClr val="tx1"/>
                 </a:solidFill>
               </a:rPr>
-              <a:t>1,2</a:t>
+              <a:t>10</a:t>
             </a:r>
           </a:p>
         </p:txBody>
@@ -7614,7 +7691,7 @@
                   <a:schemeClr val="tx1"/>
                 </a:solidFill>
               </a:rPr>
-              <a:t>2,2</a:t>
+              <a:t>11</a:t>
             </a:r>
           </a:p>
         </p:txBody>
@@ -7675,7 +7752,7 @@
                   <a:schemeClr val="tx1"/>
                 </a:solidFill>
               </a:rPr>
-              <a:t>1,3</a:t>
+              <a:t>14</a:t>
             </a:r>
           </a:p>
         </p:txBody>
@@ -7736,7 +7813,7 @@
                   <a:schemeClr val="tx1"/>
                 </a:solidFill>
               </a:rPr>
-              <a:t>2,3</a:t>
+              <a:t>15</a:t>
             </a:r>
           </a:p>
         </p:txBody>
@@ -7797,7 +7874,7 @@
                   <a:schemeClr val="tx1"/>
                 </a:solidFill>
               </a:rPr>
-              <a:t>3,2</a:t>
+              <a:t>12</a:t>
             </a:r>
           </a:p>
         </p:txBody>
@@ -7858,7 +7935,7 @@
                   <a:schemeClr val="tx1"/>
                 </a:solidFill>
               </a:rPr>
-              <a:t>0,1</a:t>
+              <a:t>5</a:t>
             </a:r>
           </a:p>
         </p:txBody>
@@ -7919,7 +7996,7 @@
                   <a:schemeClr val="tx1"/>
                 </a:solidFill>
               </a:rPr>
-              <a:t>3,1</a:t>
+              <a:t>8</a:t>
             </a:r>
           </a:p>
         </p:txBody>
@@ -7980,7 +8057,7 @@
                   <a:schemeClr val="tx1"/>
                 </a:solidFill>
               </a:rPr>
-              <a:t>1,1</a:t>
+              <a:t>6</a:t>
             </a:r>
           </a:p>
         </p:txBody>
@@ -8041,7 +8118,7 @@
                   <a:schemeClr val="tx1"/>
                 </a:solidFill>
               </a:rPr>
-              <a:t>2,1</a:t>
+              <a:t>7</a:t>
             </a:r>
           </a:p>
         </p:txBody>
@@ -8102,7 +8179,7 @@
                   <a:schemeClr val="tx1"/>
                 </a:solidFill>
               </a:rPr>
-              <a:t>3,0</a:t>
+              <a:t>4</a:t>
             </a:r>
           </a:p>
         </p:txBody>
@@ -8163,7 +8240,7 @@
                   <a:schemeClr val="tx1"/>
                 </a:solidFill>
               </a:rPr>
-              <a:t>0,2</a:t>
+              <a:t>9</a:t>
             </a:r>
           </a:p>
         </p:txBody>
@@ -12460,67 +12537,6 @@
       </p:sp>
       <p:sp>
         <p:nvSpPr>
-          <p:cNvPr id="551" name="Rectangle 550">
-            <a:extLst>
-              <a:ext uri="{FF2B5EF4-FFF2-40B4-BE49-F238E27FC236}">
-                <a16:creationId xmlns:a16="http://schemas.microsoft.com/office/drawing/2014/main" id="{17EDEAED-9AD8-DA6C-071F-95B5F2F120B8}"/>
-              </a:ext>
-            </a:extLst>
-          </p:cNvPr>
-          <p:cNvSpPr/>
-          <p:nvPr/>
-        </p:nvSpPr>
-        <p:spPr>
-          <a:xfrm>
-            <a:off x="3820406" y="2657724"/>
-            <a:ext cx="322151" cy="272753"/>
-          </a:xfrm>
-          <a:prstGeom prst="rect">
-            <a:avLst/>
-          </a:prstGeom>
-          <a:solidFill>
-            <a:srgbClr val="FDF8EE"/>
-          </a:solidFill>
-          <a:ln>
-            <a:solidFill>
-              <a:srgbClr val="EFC57B"/>
-            </a:solidFill>
-          </a:ln>
-        </p:spPr>
-        <p:style>
-          <a:lnRef idx="2">
-            <a:schemeClr val="accent1">
-              <a:shade val="15000"/>
-            </a:schemeClr>
-          </a:lnRef>
-          <a:fillRef idx="1">
-            <a:schemeClr val="accent1"/>
-          </a:fillRef>
-          <a:effectRef idx="0">
-            <a:schemeClr val="accent1"/>
-          </a:effectRef>
-          <a:fontRef idx="minor">
-            <a:schemeClr val="lt1"/>
-          </a:fontRef>
-        </p:style>
-        <p:txBody>
-          <a:bodyPr rtlCol="0" anchor="ctr"/>
-          <a:lstStyle/>
-          <a:p>
-            <a:pPr algn="ctr"/>
-            <a:r>
-              <a:rPr lang="en-US" sz="800" dirty="0">
-                <a:solidFill>
-                  <a:schemeClr val="tx1"/>
-                </a:solidFill>
-              </a:rPr>
-              <a:t>12</a:t>
-            </a:r>
-          </a:p>
-        </p:txBody>
-      </p:sp>
-      <p:sp>
-        <p:nvSpPr>
           <p:cNvPr id="552" name="Rectangle 551">
             <a:extLst>
               <a:ext uri="{FF2B5EF4-FFF2-40B4-BE49-F238E27FC236}">
@@ -16256,6 +16272,67 @@
                 </a:solidFill>
               </a:rPr>
               <a:t>1,0</a:t>
+            </a:r>
+          </a:p>
+        </p:txBody>
+      </p:sp>
+      <p:sp>
+        <p:nvSpPr>
+          <p:cNvPr id="551" name="Rectangle 550">
+            <a:extLst>
+              <a:ext uri="{FF2B5EF4-FFF2-40B4-BE49-F238E27FC236}">
+                <a16:creationId xmlns:a16="http://schemas.microsoft.com/office/drawing/2014/main" id="{17EDEAED-9AD8-DA6C-071F-95B5F2F120B8}"/>
+              </a:ext>
+            </a:extLst>
+          </p:cNvPr>
+          <p:cNvSpPr/>
+          <p:nvPr/>
+        </p:nvSpPr>
+        <p:spPr>
+          <a:xfrm>
+            <a:off x="3820406" y="2657724"/>
+            <a:ext cx="322151" cy="272753"/>
+          </a:xfrm>
+          <a:prstGeom prst="rect">
+            <a:avLst/>
+          </a:prstGeom>
+          <a:solidFill>
+            <a:srgbClr val="FDF8EE"/>
+          </a:solidFill>
+          <a:ln>
+            <a:solidFill>
+              <a:srgbClr val="EFC57B"/>
+            </a:solidFill>
+          </a:ln>
+        </p:spPr>
+        <p:style>
+          <a:lnRef idx="2">
+            <a:schemeClr val="accent1">
+              <a:shade val="15000"/>
+            </a:schemeClr>
+          </a:lnRef>
+          <a:fillRef idx="1">
+            <a:schemeClr val="accent1"/>
+          </a:fillRef>
+          <a:effectRef idx="0">
+            <a:schemeClr val="accent1"/>
+          </a:effectRef>
+          <a:fontRef idx="minor">
+            <a:schemeClr val="lt1"/>
+          </a:fontRef>
+        </p:style>
+        <p:txBody>
+          <a:bodyPr rtlCol="0" anchor="ctr"/>
+          <a:lstStyle/>
+          <a:p>
+            <a:pPr algn="ctr"/>
+            <a:r>
+              <a:rPr lang="en-US" sz="800" dirty="0">
+                <a:solidFill>
+                  <a:schemeClr val="tx1"/>
+                </a:solidFill>
+              </a:rPr>
+              <a:t>12</a:t>
             </a:r>
           </a:p>
         </p:txBody>

</xml_diff>

<commit_message>
end of week checkpoint
</commit_message>
<xml_diff>
--- a/files/communication_diagram.pptx
+++ b/files/communication_diagram.pptx
@@ -5,12 +5,13 @@
     <p:sldMasterId id="2147483648" r:id="rId1"/>
   </p:sldMasterIdLst>
   <p:notesMasterIdLst>
-    <p:notesMasterId r:id="rId5"/>
+    <p:notesMasterId r:id="rId6"/>
   </p:notesMasterIdLst>
   <p:sldIdLst>
     <p:sldId id="256" r:id="rId2"/>
     <p:sldId id="257" r:id="rId3"/>
     <p:sldId id="258" r:id="rId4"/>
+    <p:sldId id="259" r:id="rId5"/>
   </p:sldIdLst>
   <p:sldSz cx="12192000" cy="6858000"/>
   <p:notesSz cx="6858000" cy="9144000"/>
@@ -19011,6 +19012,52 @@
           <a:chExt cx="0" cy="0"/>
         </a:xfrm>
       </p:grpSpPr>
+      <p:cxnSp>
+        <p:nvCxnSpPr>
+          <p:cNvPr id="28" name="Straight Arrow Connector 27">
+            <a:extLst>
+              <a:ext uri="{FF2B5EF4-FFF2-40B4-BE49-F238E27FC236}">
+                <a16:creationId xmlns:a16="http://schemas.microsoft.com/office/drawing/2014/main" id="{15D781B3-8766-D4E6-6E29-CD2478AFE6A7}"/>
+              </a:ext>
+            </a:extLst>
+          </p:cNvPr>
+          <p:cNvCxnSpPr>
+            <a:cxnSpLocks/>
+            <a:stCxn id="24" idx="3"/>
+            <a:endCxn id="18" idx="1"/>
+          </p:cNvCxnSpPr>
+          <p:nvPr/>
+        </p:nvCxnSpPr>
+        <p:spPr>
+          <a:xfrm>
+            <a:off x="7264477" y="1389050"/>
+            <a:ext cx="534740" cy="33"/>
+          </a:xfrm>
+          <a:prstGeom prst="straightConnector1">
+            <a:avLst/>
+          </a:prstGeom>
+          <a:ln w="19050">
+            <a:solidFill>
+              <a:srgbClr val="82E995"/>
+            </a:solidFill>
+            <a:tailEnd type="triangle"/>
+          </a:ln>
+        </p:spPr>
+        <p:style>
+          <a:lnRef idx="1">
+            <a:schemeClr val="accent1"/>
+          </a:lnRef>
+          <a:fillRef idx="0">
+            <a:schemeClr val="accent1"/>
+          </a:fillRef>
+          <a:effectRef idx="0">
+            <a:schemeClr val="accent1"/>
+          </a:effectRef>
+          <a:fontRef idx="minor">
+            <a:schemeClr val="tx1"/>
+          </a:fontRef>
+        </p:style>
+      </p:cxnSp>
       <p:sp>
         <p:nvSpPr>
           <p:cNvPr id="163" name="Rectangle 162">
@@ -19083,7 +19130,7 @@
         </p:nvSpPr>
         <p:spPr>
           <a:xfrm>
-            <a:off x="2730831" y="1301033"/>
+            <a:off x="2730831" y="1294053"/>
             <a:ext cx="745014" cy="272753"/>
           </a:xfrm>
           <a:prstGeom prst="rect">
@@ -19144,7 +19191,7 @@
         </p:nvSpPr>
         <p:spPr>
           <a:xfrm>
-            <a:off x="2730831" y="1574387"/>
+            <a:off x="2730831" y="1567407"/>
             <a:ext cx="745014" cy="272753"/>
           </a:xfrm>
           <a:prstGeom prst="rect">
@@ -19205,7 +19252,7 @@
         </p:nvSpPr>
         <p:spPr>
           <a:xfrm>
-            <a:off x="2730831" y="1841751"/>
+            <a:off x="2730831" y="1834771"/>
             <a:ext cx="745014" cy="272753"/>
           </a:xfrm>
           <a:prstGeom prst="rect">
@@ -19266,7 +19313,7 @@
         </p:nvSpPr>
         <p:spPr>
           <a:xfrm>
-            <a:off x="2730831" y="2114504"/>
+            <a:off x="2730831" y="2107524"/>
             <a:ext cx="745014" cy="272753"/>
           </a:xfrm>
           <a:prstGeom prst="rect">
@@ -19327,7 +19374,7 @@
         </p:nvSpPr>
         <p:spPr>
           <a:xfrm>
-            <a:off x="2730831" y="2381868"/>
+            <a:off x="2730831" y="2374888"/>
             <a:ext cx="745014" cy="272753"/>
           </a:xfrm>
           <a:prstGeom prst="rect">
@@ -19774,13 +19821,16 @@
               </a:ext>
             </a:extLst>
           </p:cNvPr>
-          <p:cNvCxnSpPr/>
+          <p:cNvCxnSpPr>
+            <a:cxnSpLocks/>
+            <a:endCxn id="180" idx="1"/>
+          </p:cNvCxnSpPr>
           <p:nvPr/>
         </p:nvCxnSpPr>
         <p:spPr>
           <a:xfrm flipV="1">
-            <a:off x="2002280" y="468756"/>
-            <a:ext cx="728551" cy="820662"/>
+            <a:off x="2002280" y="332380"/>
+            <a:ext cx="728551" cy="957038"/>
           </a:xfrm>
           <a:prstGeom prst="straightConnector1">
             <a:avLst/>
@@ -19816,13 +19866,16 @@
               </a:ext>
             </a:extLst>
           </p:cNvPr>
-          <p:cNvCxnSpPr/>
+          <p:cNvCxnSpPr>
+            <a:cxnSpLocks/>
+            <a:endCxn id="162" idx="1"/>
+          </p:cNvCxnSpPr>
           <p:nvPr/>
         </p:nvCxnSpPr>
         <p:spPr>
           <a:xfrm flipV="1">
-            <a:off x="2002280" y="1015704"/>
-            <a:ext cx="728551" cy="546466"/>
+            <a:off x="2002280" y="879328"/>
+            <a:ext cx="728551" cy="682842"/>
           </a:xfrm>
           <a:prstGeom prst="straightConnector1">
             <a:avLst/>
@@ -19860,13 +19913,14 @@
           </p:cNvPr>
           <p:cNvCxnSpPr>
             <a:cxnSpLocks/>
+            <a:endCxn id="173" idx="1"/>
           </p:cNvCxnSpPr>
           <p:nvPr/>
         </p:nvCxnSpPr>
         <p:spPr>
           <a:xfrm>
             <a:off x="2002280" y="1848086"/>
-            <a:ext cx="728551" cy="261153"/>
+            <a:ext cx="728551" cy="123062"/>
           </a:xfrm>
           <a:prstGeom prst="straightConnector1">
             <a:avLst/>
@@ -20624,56 +20678,1832 @@
           </a:fontRef>
         </p:style>
       </p:cxnSp>
-      <p:cxnSp>
-        <p:nvCxnSpPr>
-          <p:cNvPr id="28" name="Straight Arrow Connector 27">
-            <a:extLst>
-              <a:ext uri="{FF2B5EF4-FFF2-40B4-BE49-F238E27FC236}">
-                <a16:creationId xmlns:a16="http://schemas.microsoft.com/office/drawing/2014/main" id="{15D781B3-8766-D4E6-6E29-CD2478AFE6A7}"/>
-              </a:ext>
-            </a:extLst>
-          </p:cNvPr>
-          <p:cNvCxnSpPr>
-            <a:cxnSpLocks/>
-            <a:stCxn id="24" idx="3"/>
-            <a:endCxn id="18" idx="1"/>
-          </p:cNvCxnSpPr>
-          <p:nvPr/>
-        </p:nvCxnSpPr>
-        <p:spPr>
-          <a:xfrm>
-            <a:off x="7264477" y="1389050"/>
-            <a:ext cx="534740" cy="33"/>
-          </a:xfrm>
-          <a:prstGeom prst="straightConnector1">
-            <a:avLst/>
-          </a:prstGeom>
-          <a:ln w="19050">
-            <a:solidFill>
-              <a:srgbClr val="82E995"/>
-            </a:solidFill>
-            <a:tailEnd type="triangle"/>
-          </a:ln>
-        </p:spPr>
-        <p:style>
-          <a:lnRef idx="1">
-            <a:schemeClr val="accent1"/>
-          </a:lnRef>
-          <a:fillRef idx="0">
-            <a:schemeClr val="accent1"/>
-          </a:fillRef>
-          <a:effectRef idx="0">
-            <a:schemeClr val="accent1"/>
-          </a:effectRef>
-          <a:fontRef idx="minor">
-            <a:schemeClr val="tx1"/>
-          </a:fontRef>
-        </p:style>
-      </p:cxnSp>
     </p:spTree>
     <p:extLst>
       <p:ext uri="{BB962C8B-B14F-4D97-AF65-F5344CB8AC3E}">
         <p14:creationId xmlns:p14="http://schemas.microsoft.com/office/powerpoint/2010/main" val="2451603949"/>
+      </p:ext>
+    </p:extLst>
+  </p:cSld>
+  <p:clrMapOvr>
+    <a:masterClrMapping/>
+  </p:clrMapOvr>
+</p:sld>
+</file>
+
+<file path=ppt/slides/slide4.xml><?xml version="1.0" encoding="utf-8"?>
+<p:sld xmlns:a="http://schemas.openxmlformats.org/drawingml/2006/main" xmlns:r="http://schemas.openxmlformats.org/officeDocument/2006/relationships" xmlns:p="http://schemas.openxmlformats.org/presentationml/2006/main">
+  <p:cSld>
+    <p:spTree>
+      <p:nvGrpSpPr>
+        <p:cNvPr id="1" name=""/>
+        <p:cNvGrpSpPr/>
+        <p:nvPr/>
+      </p:nvGrpSpPr>
+      <p:grpSpPr>
+        <a:xfrm>
+          <a:off x="0" y="0"/>
+          <a:ext cx="0" cy="0"/>
+          <a:chOff x="0" y="0"/>
+          <a:chExt cx="0" cy="0"/>
+        </a:xfrm>
+      </p:grpSpPr>
+      <p:sp>
+        <p:nvSpPr>
+          <p:cNvPr id="20" name="Rectangle 19">
+            <a:extLst>
+              <a:ext uri="{FF2B5EF4-FFF2-40B4-BE49-F238E27FC236}">
+                <a16:creationId xmlns:a16="http://schemas.microsoft.com/office/drawing/2014/main" id="{97BDB14A-C8FB-EF6A-A654-05C4A650A5A7}"/>
+              </a:ext>
+            </a:extLst>
+          </p:cNvPr>
+          <p:cNvSpPr/>
+          <p:nvPr/>
+        </p:nvSpPr>
+        <p:spPr>
+          <a:xfrm>
+            <a:off x="1867112" y="253613"/>
+            <a:ext cx="322151" cy="272753"/>
+          </a:xfrm>
+          <a:prstGeom prst="rect">
+            <a:avLst/>
+          </a:prstGeom>
+          <a:solidFill>
+            <a:srgbClr val="F2EFF6"/>
+          </a:solidFill>
+          <a:ln>
+            <a:solidFill>
+              <a:srgbClr val="360084"/>
+            </a:solidFill>
+          </a:ln>
+        </p:spPr>
+        <p:style>
+          <a:lnRef idx="2">
+            <a:schemeClr val="accent1">
+              <a:shade val="15000"/>
+            </a:schemeClr>
+          </a:lnRef>
+          <a:fillRef idx="1">
+            <a:schemeClr val="accent1"/>
+          </a:fillRef>
+          <a:effectRef idx="0">
+            <a:schemeClr val="accent1"/>
+          </a:effectRef>
+          <a:fontRef idx="minor">
+            <a:schemeClr val="lt1"/>
+          </a:fontRef>
+        </p:style>
+        <p:txBody>
+          <a:bodyPr rtlCol="0" anchor="ctr"/>
+          <a:lstStyle/>
+          <a:p>
+            <a:pPr algn="ctr"/>
+            <a:endParaRPr lang="en-US" sz="800" dirty="0">
+              <a:solidFill>
+                <a:schemeClr val="tx1"/>
+              </a:solidFill>
+            </a:endParaRPr>
+          </a:p>
+        </p:txBody>
+      </p:sp>
+      <p:sp>
+        <p:nvSpPr>
+          <p:cNvPr id="21" name="Rectangle 20">
+            <a:extLst>
+              <a:ext uri="{FF2B5EF4-FFF2-40B4-BE49-F238E27FC236}">
+                <a16:creationId xmlns:a16="http://schemas.microsoft.com/office/drawing/2014/main" id="{5507BB2A-B3C9-45B1-BBDD-FDCE1754D73A}"/>
+              </a:ext>
+            </a:extLst>
+          </p:cNvPr>
+          <p:cNvSpPr/>
+          <p:nvPr/>
+        </p:nvSpPr>
+        <p:spPr>
+          <a:xfrm>
+            <a:off x="2189263" y="253612"/>
+            <a:ext cx="322151" cy="272753"/>
+          </a:xfrm>
+          <a:prstGeom prst="rect">
+            <a:avLst/>
+          </a:prstGeom>
+          <a:solidFill>
+            <a:srgbClr val="F2EFF6"/>
+          </a:solidFill>
+          <a:ln>
+            <a:solidFill>
+              <a:srgbClr val="360084"/>
+            </a:solidFill>
+          </a:ln>
+        </p:spPr>
+        <p:style>
+          <a:lnRef idx="2">
+            <a:schemeClr val="accent1">
+              <a:shade val="15000"/>
+            </a:schemeClr>
+          </a:lnRef>
+          <a:fillRef idx="1">
+            <a:schemeClr val="accent1"/>
+          </a:fillRef>
+          <a:effectRef idx="0">
+            <a:schemeClr val="accent1"/>
+          </a:effectRef>
+          <a:fontRef idx="minor">
+            <a:schemeClr val="lt1"/>
+          </a:fontRef>
+        </p:style>
+        <p:txBody>
+          <a:bodyPr rtlCol="0" anchor="ctr"/>
+          <a:lstStyle/>
+          <a:p>
+            <a:pPr algn="ctr"/>
+            <a:endParaRPr lang="en-US" sz="800" dirty="0">
+              <a:solidFill>
+                <a:schemeClr val="tx1"/>
+              </a:solidFill>
+            </a:endParaRPr>
+          </a:p>
+        </p:txBody>
+      </p:sp>
+      <p:sp>
+        <p:nvSpPr>
+          <p:cNvPr id="22" name="Rectangle 21">
+            <a:extLst>
+              <a:ext uri="{FF2B5EF4-FFF2-40B4-BE49-F238E27FC236}">
+                <a16:creationId xmlns:a16="http://schemas.microsoft.com/office/drawing/2014/main" id="{92A1B641-6BD3-908F-C36B-91F22CB5B6E9}"/>
+              </a:ext>
+            </a:extLst>
+          </p:cNvPr>
+          <p:cNvSpPr/>
+          <p:nvPr/>
+        </p:nvSpPr>
+        <p:spPr>
+          <a:xfrm>
+            <a:off x="2511414" y="253611"/>
+            <a:ext cx="322151" cy="272753"/>
+          </a:xfrm>
+          <a:prstGeom prst="rect">
+            <a:avLst/>
+          </a:prstGeom>
+          <a:solidFill>
+            <a:srgbClr val="F2EFF6"/>
+          </a:solidFill>
+          <a:ln>
+            <a:solidFill>
+              <a:srgbClr val="360084"/>
+            </a:solidFill>
+          </a:ln>
+        </p:spPr>
+        <p:style>
+          <a:lnRef idx="2">
+            <a:schemeClr val="accent1">
+              <a:shade val="15000"/>
+            </a:schemeClr>
+          </a:lnRef>
+          <a:fillRef idx="1">
+            <a:schemeClr val="accent1"/>
+          </a:fillRef>
+          <a:effectRef idx="0">
+            <a:schemeClr val="accent1"/>
+          </a:effectRef>
+          <a:fontRef idx="minor">
+            <a:schemeClr val="lt1"/>
+          </a:fontRef>
+        </p:style>
+        <p:txBody>
+          <a:bodyPr rtlCol="0" anchor="ctr"/>
+          <a:lstStyle/>
+          <a:p>
+            <a:pPr algn="ctr"/>
+            <a:endParaRPr lang="en-US" sz="800" dirty="0">
+              <a:solidFill>
+                <a:schemeClr val="tx1"/>
+              </a:solidFill>
+            </a:endParaRPr>
+          </a:p>
+        </p:txBody>
+      </p:sp>
+      <p:sp>
+        <p:nvSpPr>
+          <p:cNvPr id="23" name="Rectangle 22">
+            <a:extLst>
+              <a:ext uri="{FF2B5EF4-FFF2-40B4-BE49-F238E27FC236}">
+                <a16:creationId xmlns:a16="http://schemas.microsoft.com/office/drawing/2014/main" id="{8CAD7EA1-2665-3694-3031-33454E3821DA}"/>
+              </a:ext>
+            </a:extLst>
+          </p:cNvPr>
+          <p:cNvSpPr/>
+          <p:nvPr/>
+        </p:nvSpPr>
+        <p:spPr>
+          <a:xfrm>
+            <a:off x="5732920" y="253605"/>
+            <a:ext cx="322151" cy="272753"/>
+          </a:xfrm>
+          <a:prstGeom prst="rect">
+            <a:avLst/>
+          </a:prstGeom>
+          <a:solidFill>
+            <a:srgbClr val="FAFDF0"/>
+          </a:solidFill>
+          <a:ln>
+            <a:solidFill>
+              <a:srgbClr val="DDF08B"/>
+            </a:solidFill>
+          </a:ln>
+        </p:spPr>
+        <p:style>
+          <a:lnRef idx="2">
+            <a:schemeClr val="accent1">
+              <a:shade val="15000"/>
+            </a:schemeClr>
+          </a:lnRef>
+          <a:fillRef idx="1">
+            <a:schemeClr val="accent1"/>
+          </a:fillRef>
+          <a:effectRef idx="0">
+            <a:schemeClr val="accent1"/>
+          </a:effectRef>
+          <a:fontRef idx="minor">
+            <a:schemeClr val="lt1"/>
+          </a:fontRef>
+        </p:style>
+        <p:txBody>
+          <a:bodyPr rtlCol="0" anchor="ctr"/>
+          <a:lstStyle/>
+          <a:p>
+            <a:pPr algn="ctr"/>
+            <a:endParaRPr lang="en-US" sz="800" dirty="0">
+              <a:solidFill>
+                <a:schemeClr val="tx1"/>
+              </a:solidFill>
+            </a:endParaRPr>
+          </a:p>
+        </p:txBody>
+      </p:sp>
+      <p:sp>
+        <p:nvSpPr>
+          <p:cNvPr id="24" name="Rectangle 23">
+            <a:extLst>
+              <a:ext uri="{FF2B5EF4-FFF2-40B4-BE49-F238E27FC236}">
+                <a16:creationId xmlns:a16="http://schemas.microsoft.com/office/drawing/2014/main" id="{1AE8C708-30F2-C7FD-7833-3E0A4A89DA7C}"/>
+              </a:ext>
+            </a:extLst>
+          </p:cNvPr>
+          <p:cNvSpPr/>
+          <p:nvPr/>
+        </p:nvSpPr>
+        <p:spPr>
+          <a:xfrm>
+            <a:off x="6699375" y="253605"/>
+            <a:ext cx="322151" cy="272753"/>
+          </a:xfrm>
+          <a:prstGeom prst="rect">
+            <a:avLst/>
+          </a:prstGeom>
+          <a:solidFill>
+            <a:srgbClr val="FAFDF0"/>
+          </a:solidFill>
+          <a:ln>
+            <a:solidFill>
+              <a:srgbClr val="DDF08B"/>
+            </a:solidFill>
+          </a:ln>
+        </p:spPr>
+        <p:style>
+          <a:lnRef idx="2">
+            <a:schemeClr val="accent1">
+              <a:shade val="15000"/>
+            </a:schemeClr>
+          </a:lnRef>
+          <a:fillRef idx="1">
+            <a:schemeClr val="accent1"/>
+          </a:fillRef>
+          <a:effectRef idx="0">
+            <a:schemeClr val="accent1"/>
+          </a:effectRef>
+          <a:fontRef idx="minor">
+            <a:schemeClr val="lt1"/>
+          </a:fontRef>
+        </p:style>
+        <p:txBody>
+          <a:bodyPr rtlCol="0" anchor="ctr"/>
+          <a:lstStyle/>
+          <a:p>
+            <a:pPr algn="ctr"/>
+            <a:endParaRPr lang="en-US" sz="800" dirty="0">
+              <a:solidFill>
+                <a:schemeClr val="tx1"/>
+              </a:solidFill>
+            </a:endParaRPr>
+          </a:p>
+        </p:txBody>
+      </p:sp>
+      <p:sp>
+        <p:nvSpPr>
+          <p:cNvPr id="25" name="Rectangle 24">
+            <a:extLst>
+              <a:ext uri="{FF2B5EF4-FFF2-40B4-BE49-F238E27FC236}">
+                <a16:creationId xmlns:a16="http://schemas.microsoft.com/office/drawing/2014/main" id="{B0BA7E38-442F-9767-1AD7-774A17E47ED6}"/>
+              </a:ext>
+            </a:extLst>
+          </p:cNvPr>
+          <p:cNvSpPr/>
+          <p:nvPr/>
+        </p:nvSpPr>
+        <p:spPr>
+          <a:xfrm>
+            <a:off x="4766470" y="253608"/>
+            <a:ext cx="322151" cy="272753"/>
+          </a:xfrm>
+          <a:prstGeom prst="rect">
+            <a:avLst/>
+          </a:prstGeom>
+          <a:solidFill>
+            <a:srgbClr val="FDF8EE"/>
+          </a:solidFill>
+          <a:ln>
+            <a:solidFill>
+              <a:srgbClr val="EFC57B"/>
+            </a:solidFill>
+          </a:ln>
+        </p:spPr>
+        <p:style>
+          <a:lnRef idx="2">
+            <a:schemeClr val="accent1">
+              <a:shade val="15000"/>
+            </a:schemeClr>
+          </a:lnRef>
+          <a:fillRef idx="1">
+            <a:schemeClr val="accent1"/>
+          </a:fillRef>
+          <a:effectRef idx="0">
+            <a:schemeClr val="accent1"/>
+          </a:effectRef>
+          <a:fontRef idx="minor">
+            <a:schemeClr val="lt1"/>
+          </a:fontRef>
+        </p:style>
+        <p:txBody>
+          <a:bodyPr rtlCol="0" anchor="ctr"/>
+          <a:lstStyle/>
+          <a:p>
+            <a:pPr algn="ctr"/>
+            <a:endParaRPr lang="en-US" sz="800" dirty="0">
+              <a:solidFill>
+                <a:schemeClr val="tx1"/>
+              </a:solidFill>
+            </a:endParaRPr>
+          </a:p>
+        </p:txBody>
+      </p:sp>
+      <p:sp>
+        <p:nvSpPr>
+          <p:cNvPr id="26" name="Rectangle 25">
+            <a:extLst>
+              <a:ext uri="{FF2B5EF4-FFF2-40B4-BE49-F238E27FC236}">
+                <a16:creationId xmlns:a16="http://schemas.microsoft.com/office/drawing/2014/main" id="{42CE0387-79B8-1F0C-9A65-3B47CAE784FB}"/>
+              </a:ext>
+            </a:extLst>
+          </p:cNvPr>
+          <p:cNvSpPr/>
+          <p:nvPr/>
+        </p:nvSpPr>
+        <p:spPr>
+          <a:xfrm>
+            <a:off x="5088621" y="253607"/>
+            <a:ext cx="322151" cy="272753"/>
+          </a:xfrm>
+          <a:prstGeom prst="rect">
+            <a:avLst/>
+          </a:prstGeom>
+          <a:solidFill>
+            <a:srgbClr val="FDF8EE"/>
+          </a:solidFill>
+          <a:ln>
+            <a:solidFill>
+              <a:srgbClr val="EFC57B"/>
+            </a:solidFill>
+          </a:ln>
+        </p:spPr>
+        <p:style>
+          <a:lnRef idx="2">
+            <a:schemeClr val="accent1">
+              <a:shade val="15000"/>
+            </a:schemeClr>
+          </a:lnRef>
+          <a:fillRef idx="1">
+            <a:schemeClr val="accent1"/>
+          </a:fillRef>
+          <a:effectRef idx="0">
+            <a:schemeClr val="accent1"/>
+          </a:effectRef>
+          <a:fontRef idx="minor">
+            <a:schemeClr val="lt1"/>
+          </a:fontRef>
+        </p:style>
+        <p:txBody>
+          <a:bodyPr rtlCol="0" anchor="ctr"/>
+          <a:lstStyle/>
+          <a:p>
+            <a:pPr algn="ctr"/>
+            <a:endParaRPr lang="en-US" sz="800" dirty="0">
+              <a:solidFill>
+                <a:schemeClr val="tx1"/>
+              </a:solidFill>
+            </a:endParaRPr>
+          </a:p>
+        </p:txBody>
+      </p:sp>
+      <p:sp>
+        <p:nvSpPr>
+          <p:cNvPr id="27" name="Rectangle 26">
+            <a:extLst>
+              <a:ext uri="{FF2B5EF4-FFF2-40B4-BE49-F238E27FC236}">
+                <a16:creationId xmlns:a16="http://schemas.microsoft.com/office/drawing/2014/main" id="{89A93FD3-EDBB-6CBD-D89B-44FF4A1210A0}"/>
+              </a:ext>
+            </a:extLst>
+          </p:cNvPr>
+          <p:cNvSpPr/>
+          <p:nvPr/>
+        </p:nvSpPr>
+        <p:spPr>
+          <a:xfrm>
+            <a:off x="6055073" y="253606"/>
+            <a:ext cx="322151" cy="272753"/>
+          </a:xfrm>
+          <a:prstGeom prst="rect">
+            <a:avLst/>
+          </a:prstGeom>
+          <a:solidFill>
+            <a:srgbClr val="FAFDF0"/>
+          </a:solidFill>
+          <a:ln>
+            <a:solidFill>
+              <a:srgbClr val="DDF08B"/>
+            </a:solidFill>
+          </a:ln>
+        </p:spPr>
+        <p:style>
+          <a:lnRef idx="2">
+            <a:schemeClr val="accent1">
+              <a:shade val="15000"/>
+            </a:schemeClr>
+          </a:lnRef>
+          <a:fillRef idx="1">
+            <a:schemeClr val="accent1"/>
+          </a:fillRef>
+          <a:effectRef idx="0">
+            <a:schemeClr val="accent1"/>
+          </a:effectRef>
+          <a:fontRef idx="minor">
+            <a:schemeClr val="lt1"/>
+          </a:fontRef>
+        </p:style>
+        <p:txBody>
+          <a:bodyPr rtlCol="0" anchor="ctr"/>
+          <a:lstStyle/>
+          <a:p>
+            <a:pPr algn="ctr"/>
+            <a:endParaRPr lang="en-US" sz="800" dirty="0">
+              <a:solidFill>
+                <a:schemeClr val="tx1"/>
+              </a:solidFill>
+            </a:endParaRPr>
+          </a:p>
+        </p:txBody>
+      </p:sp>
+      <p:sp>
+        <p:nvSpPr>
+          <p:cNvPr id="28" name="Rectangle 27">
+            <a:extLst>
+              <a:ext uri="{FF2B5EF4-FFF2-40B4-BE49-F238E27FC236}">
+                <a16:creationId xmlns:a16="http://schemas.microsoft.com/office/drawing/2014/main" id="{BF16CA68-23F7-34E7-8B4E-3670216FE344}"/>
+              </a:ext>
+            </a:extLst>
+          </p:cNvPr>
+          <p:cNvSpPr/>
+          <p:nvPr/>
+        </p:nvSpPr>
+        <p:spPr>
+          <a:xfrm>
+            <a:off x="6377224" y="253605"/>
+            <a:ext cx="322151" cy="272753"/>
+          </a:xfrm>
+          <a:prstGeom prst="rect">
+            <a:avLst/>
+          </a:prstGeom>
+          <a:solidFill>
+            <a:srgbClr val="FAFDF0"/>
+          </a:solidFill>
+          <a:ln>
+            <a:solidFill>
+              <a:srgbClr val="DDF08B"/>
+            </a:solidFill>
+          </a:ln>
+        </p:spPr>
+        <p:style>
+          <a:lnRef idx="2">
+            <a:schemeClr val="accent1">
+              <a:shade val="15000"/>
+            </a:schemeClr>
+          </a:lnRef>
+          <a:fillRef idx="1">
+            <a:schemeClr val="accent1"/>
+          </a:fillRef>
+          <a:effectRef idx="0">
+            <a:schemeClr val="accent1"/>
+          </a:effectRef>
+          <a:fontRef idx="minor">
+            <a:schemeClr val="lt1"/>
+          </a:fontRef>
+        </p:style>
+        <p:txBody>
+          <a:bodyPr rtlCol="0" anchor="ctr"/>
+          <a:lstStyle/>
+          <a:p>
+            <a:pPr algn="ctr"/>
+            <a:endParaRPr lang="en-US" sz="800" dirty="0">
+              <a:solidFill>
+                <a:schemeClr val="tx1"/>
+              </a:solidFill>
+            </a:endParaRPr>
+          </a:p>
+        </p:txBody>
+      </p:sp>
+      <p:sp>
+        <p:nvSpPr>
+          <p:cNvPr id="29" name="Rectangle 28">
+            <a:extLst>
+              <a:ext uri="{FF2B5EF4-FFF2-40B4-BE49-F238E27FC236}">
+                <a16:creationId xmlns:a16="http://schemas.microsoft.com/office/drawing/2014/main" id="{96887129-7E8A-6E9C-7F30-91896F3E9C05}"/>
+              </a:ext>
+            </a:extLst>
+          </p:cNvPr>
+          <p:cNvSpPr/>
+          <p:nvPr/>
+        </p:nvSpPr>
+        <p:spPr>
+          <a:xfrm>
+            <a:off x="5410772" y="253607"/>
+            <a:ext cx="322151" cy="272753"/>
+          </a:xfrm>
+          <a:prstGeom prst="rect">
+            <a:avLst/>
+          </a:prstGeom>
+          <a:solidFill>
+            <a:srgbClr val="FDF8EE"/>
+          </a:solidFill>
+          <a:ln>
+            <a:solidFill>
+              <a:srgbClr val="EFC57B"/>
+            </a:solidFill>
+          </a:ln>
+        </p:spPr>
+        <p:style>
+          <a:lnRef idx="2">
+            <a:schemeClr val="accent1">
+              <a:shade val="15000"/>
+            </a:schemeClr>
+          </a:lnRef>
+          <a:fillRef idx="1">
+            <a:schemeClr val="accent1"/>
+          </a:fillRef>
+          <a:effectRef idx="0">
+            <a:schemeClr val="accent1"/>
+          </a:effectRef>
+          <a:fontRef idx="minor">
+            <a:schemeClr val="lt1"/>
+          </a:fontRef>
+        </p:style>
+        <p:txBody>
+          <a:bodyPr rtlCol="0" anchor="ctr"/>
+          <a:lstStyle/>
+          <a:p>
+            <a:pPr algn="ctr"/>
+            <a:endParaRPr lang="en-US" sz="800" dirty="0">
+              <a:solidFill>
+                <a:schemeClr val="tx1"/>
+              </a:solidFill>
+            </a:endParaRPr>
+          </a:p>
+        </p:txBody>
+      </p:sp>
+      <p:sp>
+        <p:nvSpPr>
+          <p:cNvPr id="30" name="Rectangle 29">
+            <a:extLst>
+              <a:ext uri="{FF2B5EF4-FFF2-40B4-BE49-F238E27FC236}">
+                <a16:creationId xmlns:a16="http://schemas.microsoft.com/office/drawing/2014/main" id="{DE6AD10A-44D6-DD6E-644B-017460711E87}"/>
+              </a:ext>
+            </a:extLst>
+          </p:cNvPr>
+          <p:cNvSpPr/>
+          <p:nvPr/>
+        </p:nvSpPr>
+        <p:spPr>
+          <a:xfrm>
+            <a:off x="3155716" y="253611"/>
+            <a:ext cx="322151" cy="272753"/>
+          </a:xfrm>
+          <a:prstGeom prst="rect">
+            <a:avLst/>
+          </a:prstGeom>
+          <a:solidFill>
+            <a:srgbClr val="FAFDF0"/>
+          </a:solidFill>
+          <a:ln>
+            <a:solidFill>
+              <a:srgbClr val="DDF08B"/>
+            </a:solidFill>
+          </a:ln>
+        </p:spPr>
+        <p:style>
+          <a:lnRef idx="2">
+            <a:schemeClr val="accent1">
+              <a:shade val="15000"/>
+            </a:schemeClr>
+          </a:lnRef>
+          <a:fillRef idx="1">
+            <a:schemeClr val="accent1"/>
+          </a:fillRef>
+          <a:effectRef idx="0">
+            <a:schemeClr val="accent1"/>
+          </a:effectRef>
+          <a:fontRef idx="minor">
+            <a:schemeClr val="lt1"/>
+          </a:fontRef>
+        </p:style>
+        <p:txBody>
+          <a:bodyPr rtlCol="0" anchor="ctr"/>
+          <a:lstStyle/>
+          <a:p>
+            <a:pPr algn="ctr"/>
+            <a:endParaRPr lang="en-US" sz="800" dirty="0">
+              <a:solidFill>
+                <a:schemeClr val="tx1"/>
+              </a:solidFill>
+            </a:endParaRPr>
+          </a:p>
+        </p:txBody>
+      </p:sp>
+      <p:sp>
+        <p:nvSpPr>
+          <p:cNvPr id="31" name="Rectangle 30">
+            <a:extLst>
+              <a:ext uri="{FF2B5EF4-FFF2-40B4-BE49-F238E27FC236}">
+                <a16:creationId xmlns:a16="http://schemas.microsoft.com/office/drawing/2014/main" id="{6EF843CE-F97A-96C6-531A-57F857868D16}"/>
+              </a:ext>
+            </a:extLst>
+          </p:cNvPr>
+          <p:cNvSpPr/>
+          <p:nvPr/>
+        </p:nvSpPr>
+        <p:spPr>
+          <a:xfrm>
+            <a:off x="4122169" y="253609"/>
+            <a:ext cx="322151" cy="272753"/>
+          </a:xfrm>
+          <a:prstGeom prst="rect">
+            <a:avLst/>
+          </a:prstGeom>
+          <a:solidFill>
+            <a:srgbClr val="FAFDF0"/>
+          </a:solidFill>
+          <a:ln>
+            <a:solidFill>
+              <a:srgbClr val="DDF08B"/>
+            </a:solidFill>
+          </a:ln>
+        </p:spPr>
+        <p:style>
+          <a:lnRef idx="2">
+            <a:schemeClr val="accent1">
+              <a:shade val="15000"/>
+            </a:schemeClr>
+          </a:lnRef>
+          <a:fillRef idx="1">
+            <a:schemeClr val="accent1"/>
+          </a:fillRef>
+          <a:effectRef idx="0">
+            <a:schemeClr val="accent1"/>
+          </a:effectRef>
+          <a:fontRef idx="minor">
+            <a:schemeClr val="lt1"/>
+          </a:fontRef>
+        </p:style>
+        <p:txBody>
+          <a:bodyPr rtlCol="0" anchor="ctr"/>
+          <a:lstStyle/>
+          <a:p>
+            <a:pPr algn="ctr"/>
+            <a:endParaRPr lang="en-US" sz="800" dirty="0">
+              <a:solidFill>
+                <a:schemeClr val="tx1"/>
+              </a:solidFill>
+            </a:endParaRPr>
+          </a:p>
+        </p:txBody>
+      </p:sp>
+      <p:sp>
+        <p:nvSpPr>
+          <p:cNvPr id="32" name="Rectangle 31">
+            <a:extLst>
+              <a:ext uri="{FF2B5EF4-FFF2-40B4-BE49-F238E27FC236}">
+                <a16:creationId xmlns:a16="http://schemas.microsoft.com/office/drawing/2014/main" id="{C927F461-7AFB-7E17-067B-ABC29034FA29}"/>
+              </a:ext>
+            </a:extLst>
+          </p:cNvPr>
+          <p:cNvSpPr/>
+          <p:nvPr/>
+        </p:nvSpPr>
+        <p:spPr>
+          <a:xfrm>
+            <a:off x="3477867" y="253610"/>
+            <a:ext cx="322151" cy="272753"/>
+          </a:xfrm>
+          <a:prstGeom prst="rect">
+            <a:avLst/>
+          </a:prstGeom>
+          <a:solidFill>
+            <a:srgbClr val="FAFDF0"/>
+          </a:solidFill>
+          <a:ln>
+            <a:solidFill>
+              <a:srgbClr val="DDF08B"/>
+            </a:solidFill>
+          </a:ln>
+        </p:spPr>
+        <p:style>
+          <a:lnRef idx="2">
+            <a:schemeClr val="accent1">
+              <a:shade val="15000"/>
+            </a:schemeClr>
+          </a:lnRef>
+          <a:fillRef idx="1">
+            <a:schemeClr val="accent1"/>
+          </a:fillRef>
+          <a:effectRef idx="0">
+            <a:schemeClr val="accent1"/>
+          </a:effectRef>
+          <a:fontRef idx="minor">
+            <a:schemeClr val="lt1"/>
+          </a:fontRef>
+        </p:style>
+        <p:txBody>
+          <a:bodyPr rtlCol="0" anchor="ctr"/>
+          <a:lstStyle/>
+          <a:p>
+            <a:pPr algn="ctr"/>
+            <a:endParaRPr lang="en-US" sz="800" dirty="0">
+              <a:solidFill>
+                <a:schemeClr val="tx1"/>
+              </a:solidFill>
+            </a:endParaRPr>
+          </a:p>
+        </p:txBody>
+      </p:sp>
+      <p:sp>
+        <p:nvSpPr>
+          <p:cNvPr id="33" name="Rectangle 32">
+            <a:extLst>
+              <a:ext uri="{FF2B5EF4-FFF2-40B4-BE49-F238E27FC236}">
+                <a16:creationId xmlns:a16="http://schemas.microsoft.com/office/drawing/2014/main" id="{463B9CE4-01E5-F66E-FCC5-C6E411EFDE1D}"/>
+              </a:ext>
+            </a:extLst>
+          </p:cNvPr>
+          <p:cNvSpPr/>
+          <p:nvPr/>
+        </p:nvSpPr>
+        <p:spPr>
+          <a:xfrm>
+            <a:off x="3800018" y="253609"/>
+            <a:ext cx="322151" cy="272753"/>
+          </a:xfrm>
+          <a:prstGeom prst="rect">
+            <a:avLst/>
+          </a:prstGeom>
+          <a:solidFill>
+            <a:srgbClr val="FAFDF0"/>
+          </a:solidFill>
+          <a:ln>
+            <a:solidFill>
+              <a:srgbClr val="DDF08B"/>
+            </a:solidFill>
+          </a:ln>
+        </p:spPr>
+        <p:style>
+          <a:lnRef idx="2">
+            <a:schemeClr val="accent1">
+              <a:shade val="15000"/>
+            </a:schemeClr>
+          </a:lnRef>
+          <a:fillRef idx="1">
+            <a:schemeClr val="accent1"/>
+          </a:fillRef>
+          <a:effectRef idx="0">
+            <a:schemeClr val="accent1"/>
+          </a:effectRef>
+          <a:fontRef idx="minor">
+            <a:schemeClr val="lt1"/>
+          </a:fontRef>
+        </p:style>
+        <p:txBody>
+          <a:bodyPr rtlCol="0" anchor="ctr"/>
+          <a:lstStyle/>
+          <a:p>
+            <a:pPr algn="ctr"/>
+            <a:endParaRPr lang="en-US" sz="800" dirty="0">
+              <a:solidFill>
+                <a:schemeClr val="tx1"/>
+              </a:solidFill>
+            </a:endParaRPr>
+          </a:p>
+        </p:txBody>
+      </p:sp>
+      <p:sp>
+        <p:nvSpPr>
+          <p:cNvPr id="34" name="Rectangle 33">
+            <a:extLst>
+              <a:ext uri="{FF2B5EF4-FFF2-40B4-BE49-F238E27FC236}">
+                <a16:creationId xmlns:a16="http://schemas.microsoft.com/office/drawing/2014/main" id="{076E9E92-B3E9-67DB-F97B-5D3E4350E2C5}"/>
+              </a:ext>
+            </a:extLst>
+          </p:cNvPr>
+          <p:cNvSpPr/>
+          <p:nvPr/>
+        </p:nvSpPr>
+        <p:spPr>
+          <a:xfrm>
+            <a:off x="2833565" y="253611"/>
+            <a:ext cx="322151" cy="272753"/>
+          </a:xfrm>
+          <a:prstGeom prst="rect">
+            <a:avLst/>
+          </a:prstGeom>
+          <a:solidFill>
+            <a:srgbClr val="F2EFF6"/>
+          </a:solidFill>
+          <a:ln>
+            <a:solidFill>
+              <a:srgbClr val="360084"/>
+            </a:solidFill>
+          </a:ln>
+        </p:spPr>
+        <p:style>
+          <a:lnRef idx="2">
+            <a:schemeClr val="accent1">
+              <a:shade val="15000"/>
+            </a:schemeClr>
+          </a:lnRef>
+          <a:fillRef idx="1">
+            <a:schemeClr val="accent1"/>
+          </a:fillRef>
+          <a:effectRef idx="0">
+            <a:schemeClr val="accent1"/>
+          </a:effectRef>
+          <a:fontRef idx="minor">
+            <a:schemeClr val="lt1"/>
+          </a:fontRef>
+        </p:style>
+        <p:txBody>
+          <a:bodyPr rtlCol="0" anchor="ctr"/>
+          <a:lstStyle/>
+          <a:p>
+            <a:pPr algn="ctr"/>
+            <a:endParaRPr lang="en-US" sz="800" dirty="0">
+              <a:solidFill>
+                <a:schemeClr val="tx1"/>
+              </a:solidFill>
+            </a:endParaRPr>
+          </a:p>
+        </p:txBody>
+      </p:sp>
+      <p:sp>
+        <p:nvSpPr>
+          <p:cNvPr id="35" name="Rectangle 34">
+            <a:extLst>
+              <a:ext uri="{FF2B5EF4-FFF2-40B4-BE49-F238E27FC236}">
+                <a16:creationId xmlns:a16="http://schemas.microsoft.com/office/drawing/2014/main" id="{5264B164-BCCE-D1D2-5711-AFBDFBA0323E}"/>
+              </a:ext>
+            </a:extLst>
+          </p:cNvPr>
+          <p:cNvSpPr/>
+          <p:nvPr/>
+        </p:nvSpPr>
+        <p:spPr>
+          <a:xfrm>
+            <a:off x="4444319" y="253609"/>
+            <a:ext cx="322151" cy="272753"/>
+          </a:xfrm>
+          <a:prstGeom prst="rect">
+            <a:avLst/>
+          </a:prstGeom>
+          <a:solidFill>
+            <a:srgbClr val="FDF8EE"/>
+          </a:solidFill>
+          <a:ln>
+            <a:solidFill>
+              <a:srgbClr val="EFC57B"/>
+            </a:solidFill>
+          </a:ln>
+        </p:spPr>
+        <p:style>
+          <a:lnRef idx="2">
+            <a:schemeClr val="accent1">
+              <a:shade val="15000"/>
+            </a:schemeClr>
+          </a:lnRef>
+          <a:fillRef idx="1">
+            <a:schemeClr val="accent1"/>
+          </a:fillRef>
+          <a:effectRef idx="0">
+            <a:schemeClr val="accent1"/>
+          </a:effectRef>
+          <a:fontRef idx="minor">
+            <a:schemeClr val="lt1"/>
+          </a:fontRef>
+        </p:style>
+        <p:txBody>
+          <a:bodyPr rtlCol="0" anchor="ctr"/>
+          <a:lstStyle/>
+          <a:p>
+            <a:pPr algn="ctr"/>
+            <a:endParaRPr lang="en-US" sz="800" dirty="0">
+              <a:solidFill>
+                <a:schemeClr val="tx1"/>
+              </a:solidFill>
+            </a:endParaRPr>
+          </a:p>
+        </p:txBody>
+      </p:sp>
+      <p:sp>
+        <p:nvSpPr>
+          <p:cNvPr id="36" name="Rectangle 35">
+            <a:extLst>
+              <a:ext uri="{FF2B5EF4-FFF2-40B4-BE49-F238E27FC236}">
+                <a16:creationId xmlns:a16="http://schemas.microsoft.com/office/drawing/2014/main" id="{5CE6A78A-C55E-5FD0-A432-FA7067E4421F}"/>
+              </a:ext>
+            </a:extLst>
+          </p:cNvPr>
+          <p:cNvSpPr/>
+          <p:nvPr/>
+        </p:nvSpPr>
+        <p:spPr>
+          <a:xfrm>
+            <a:off x="1867112" y="1111009"/>
+            <a:ext cx="322151" cy="272753"/>
+          </a:xfrm>
+          <a:prstGeom prst="rect">
+            <a:avLst/>
+          </a:prstGeom>
+          <a:solidFill>
+            <a:srgbClr val="F2EFF6"/>
+          </a:solidFill>
+          <a:ln>
+            <a:solidFill>
+              <a:srgbClr val="360084"/>
+            </a:solidFill>
+          </a:ln>
+        </p:spPr>
+        <p:style>
+          <a:lnRef idx="2">
+            <a:schemeClr val="accent1">
+              <a:shade val="15000"/>
+            </a:schemeClr>
+          </a:lnRef>
+          <a:fillRef idx="1">
+            <a:schemeClr val="accent1"/>
+          </a:fillRef>
+          <a:effectRef idx="0">
+            <a:schemeClr val="accent1"/>
+          </a:effectRef>
+          <a:fontRef idx="minor">
+            <a:schemeClr val="lt1"/>
+          </a:fontRef>
+        </p:style>
+        <p:txBody>
+          <a:bodyPr rtlCol="0" anchor="ctr"/>
+          <a:lstStyle/>
+          <a:p>
+            <a:pPr algn="ctr"/>
+            <a:endParaRPr lang="en-US" sz="800" dirty="0">
+              <a:solidFill>
+                <a:schemeClr val="tx1"/>
+              </a:solidFill>
+            </a:endParaRPr>
+          </a:p>
+        </p:txBody>
+      </p:sp>
+      <p:sp>
+        <p:nvSpPr>
+          <p:cNvPr id="37" name="Rectangle 36">
+            <a:extLst>
+              <a:ext uri="{FF2B5EF4-FFF2-40B4-BE49-F238E27FC236}">
+                <a16:creationId xmlns:a16="http://schemas.microsoft.com/office/drawing/2014/main" id="{82891F91-6D93-9AC5-FBF4-78BEE02508BF}"/>
+              </a:ext>
+            </a:extLst>
+          </p:cNvPr>
+          <p:cNvSpPr/>
+          <p:nvPr/>
+        </p:nvSpPr>
+        <p:spPr>
+          <a:xfrm>
+            <a:off x="2189263" y="1111008"/>
+            <a:ext cx="322151" cy="272753"/>
+          </a:xfrm>
+          <a:prstGeom prst="rect">
+            <a:avLst/>
+          </a:prstGeom>
+          <a:solidFill>
+            <a:srgbClr val="F2EFF6"/>
+          </a:solidFill>
+          <a:ln>
+            <a:solidFill>
+              <a:srgbClr val="360084"/>
+            </a:solidFill>
+          </a:ln>
+        </p:spPr>
+        <p:style>
+          <a:lnRef idx="2">
+            <a:schemeClr val="accent1">
+              <a:shade val="15000"/>
+            </a:schemeClr>
+          </a:lnRef>
+          <a:fillRef idx="1">
+            <a:schemeClr val="accent1"/>
+          </a:fillRef>
+          <a:effectRef idx="0">
+            <a:schemeClr val="accent1"/>
+          </a:effectRef>
+          <a:fontRef idx="minor">
+            <a:schemeClr val="lt1"/>
+          </a:fontRef>
+        </p:style>
+        <p:txBody>
+          <a:bodyPr rtlCol="0" anchor="ctr"/>
+          <a:lstStyle/>
+          <a:p>
+            <a:pPr algn="ctr"/>
+            <a:endParaRPr lang="en-US" sz="800" dirty="0">
+              <a:solidFill>
+                <a:schemeClr val="tx1"/>
+              </a:solidFill>
+            </a:endParaRPr>
+          </a:p>
+        </p:txBody>
+      </p:sp>
+      <p:sp>
+        <p:nvSpPr>
+          <p:cNvPr id="38" name="Rectangle 37">
+            <a:extLst>
+              <a:ext uri="{FF2B5EF4-FFF2-40B4-BE49-F238E27FC236}">
+                <a16:creationId xmlns:a16="http://schemas.microsoft.com/office/drawing/2014/main" id="{47FA9643-D368-F783-EB9C-C34059D88D83}"/>
+              </a:ext>
+            </a:extLst>
+          </p:cNvPr>
+          <p:cNvSpPr/>
+          <p:nvPr/>
+        </p:nvSpPr>
+        <p:spPr>
+          <a:xfrm>
+            <a:off x="2511414" y="1111007"/>
+            <a:ext cx="322151" cy="272753"/>
+          </a:xfrm>
+          <a:prstGeom prst="rect">
+            <a:avLst/>
+          </a:prstGeom>
+          <a:solidFill>
+            <a:srgbClr val="F2EFF6"/>
+          </a:solidFill>
+          <a:ln>
+            <a:solidFill>
+              <a:srgbClr val="360084"/>
+            </a:solidFill>
+          </a:ln>
+        </p:spPr>
+        <p:style>
+          <a:lnRef idx="2">
+            <a:schemeClr val="accent1">
+              <a:shade val="15000"/>
+            </a:schemeClr>
+          </a:lnRef>
+          <a:fillRef idx="1">
+            <a:schemeClr val="accent1"/>
+          </a:fillRef>
+          <a:effectRef idx="0">
+            <a:schemeClr val="accent1"/>
+          </a:effectRef>
+          <a:fontRef idx="minor">
+            <a:schemeClr val="lt1"/>
+          </a:fontRef>
+        </p:style>
+        <p:txBody>
+          <a:bodyPr rtlCol="0" anchor="ctr"/>
+          <a:lstStyle/>
+          <a:p>
+            <a:pPr algn="ctr"/>
+            <a:endParaRPr lang="en-US" sz="800" dirty="0">
+              <a:solidFill>
+                <a:schemeClr val="tx1"/>
+              </a:solidFill>
+            </a:endParaRPr>
+          </a:p>
+        </p:txBody>
+      </p:sp>
+      <p:sp>
+        <p:nvSpPr>
+          <p:cNvPr id="40" name="Rectangle 39">
+            <a:extLst>
+              <a:ext uri="{FF2B5EF4-FFF2-40B4-BE49-F238E27FC236}">
+                <a16:creationId xmlns:a16="http://schemas.microsoft.com/office/drawing/2014/main" id="{44533F58-4FE4-1602-0066-4FCA111177CD}"/>
+              </a:ext>
+            </a:extLst>
+          </p:cNvPr>
+          <p:cNvSpPr/>
+          <p:nvPr/>
+        </p:nvSpPr>
+        <p:spPr>
+          <a:xfrm>
+            <a:off x="4122169" y="1111005"/>
+            <a:ext cx="322151" cy="272753"/>
+          </a:xfrm>
+          <a:prstGeom prst="rect">
+            <a:avLst/>
+          </a:prstGeom>
+          <a:solidFill>
+            <a:srgbClr val="FDF8EE"/>
+          </a:solidFill>
+          <a:ln>
+            <a:solidFill>
+              <a:srgbClr val="EFC57B"/>
+            </a:solidFill>
+          </a:ln>
+        </p:spPr>
+        <p:style>
+          <a:lnRef idx="2">
+            <a:schemeClr val="accent1">
+              <a:shade val="15000"/>
+            </a:schemeClr>
+          </a:lnRef>
+          <a:fillRef idx="1">
+            <a:schemeClr val="accent1"/>
+          </a:fillRef>
+          <a:effectRef idx="0">
+            <a:schemeClr val="accent1"/>
+          </a:effectRef>
+          <a:fontRef idx="minor">
+            <a:schemeClr val="lt1"/>
+          </a:fontRef>
+        </p:style>
+        <p:txBody>
+          <a:bodyPr rtlCol="0" anchor="ctr"/>
+          <a:lstStyle/>
+          <a:p>
+            <a:pPr algn="ctr"/>
+            <a:endParaRPr lang="en-US" sz="800" dirty="0">
+              <a:solidFill>
+                <a:schemeClr val="tx1"/>
+              </a:solidFill>
+            </a:endParaRPr>
+          </a:p>
+        </p:txBody>
+      </p:sp>
+      <p:sp>
+        <p:nvSpPr>
+          <p:cNvPr id="41" name="Rectangle 40">
+            <a:extLst>
+              <a:ext uri="{FF2B5EF4-FFF2-40B4-BE49-F238E27FC236}">
+                <a16:creationId xmlns:a16="http://schemas.microsoft.com/office/drawing/2014/main" id="{37DF5E3A-6341-2497-2EE3-B4B92A55FED8}"/>
+              </a:ext>
+            </a:extLst>
+          </p:cNvPr>
+          <p:cNvSpPr/>
+          <p:nvPr/>
+        </p:nvSpPr>
+        <p:spPr>
+          <a:xfrm>
+            <a:off x="3477867" y="1111006"/>
+            <a:ext cx="322151" cy="272753"/>
+          </a:xfrm>
+          <a:prstGeom prst="rect">
+            <a:avLst/>
+          </a:prstGeom>
+          <a:solidFill>
+            <a:srgbClr val="FDF8EE"/>
+          </a:solidFill>
+          <a:ln>
+            <a:solidFill>
+              <a:srgbClr val="EFC57B"/>
+            </a:solidFill>
+          </a:ln>
+        </p:spPr>
+        <p:style>
+          <a:lnRef idx="2">
+            <a:schemeClr val="accent1">
+              <a:shade val="15000"/>
+            </a:schemeClr>
+          </a:lnRef>
+          <a:fillRef idx="1">
+            <a:schemeClr val="accent1"/>
+          </a:fillRef>
+          <a:effectRef idx="0">
+            <a:schemeClr val="accent1"/>
+          </a:effectRef>
+          <a:fontRef idx="minor">
+            <a:schemeClr val="lt1"/>
+          </a:fontRef>
+        </p:style>
+        <p:txBody>
+          <a:bodyPr rtlCol="0" anchor="ctr"/>
+          <a:lstStyle/>
+          <a:p>
+            <a:pPr algn="ctr"/>
+            <a:endParaRPr lang="en-US" sz="800" dirty="0">
+              <a:solidFill>
+                <a:schemeClr val="tx1"/>
+              </a:solidFill>
+            </a:endParaRPr>
+          </a:p>
+        </p:txBody>
+      </p:sp>
+      <p:sp>
+        <p:nvSpPr>
+          <p:cNvPr id="42" name="Rectangle 41">
+            <a:extLst>
+              <a:ext uri="{FF2B5EF4-FFF2-40B4-BE49-F238E27FC236}">
+                <a16:creationId xmlns:a16="http://schemas.microsoft.com/office/drawing/2014/main" id="{F615455A-A222-9EFA-EF1A-BF0B308A1D2B}"/>
+              </a:ext>
+            </a:extLst>
+          </p:cNvPr>
+          <p:cNvSpPr/>
+          <p:nvPr/>
+        </p:nvSpPr>
+        <p:spPr>
+          <a:xfrm>
+            <a:off x="3800018" y="1111005"/>
+            <a:ext cx="322151" cy="272753"/>
+          </a:xfrm>
+          <a:prstGeom prst="rect">
+            <a:avLst/>
+          </a:prstGeom>
+          <a:solidFill>
+            <a:srgbClr val="FDF8EE"/>
+          </a:solidFill>
+          <a:ln>
+            <a:solidFill>
+              <a:srgbClr val="EFC57B"/>
+            </a:solidFill>
+          </a:ln>
+        </p:spPr>
+        <p:style>
+          <a:lnRef idx="2">
+            <a:schemeClr val="accent1">
+              <a:shade val="15000"/>
+            </a:schemeClr>
+          </a:lnRef>
+          <a:fillRef idx="1">
+            <a:schemeClr val="accent1"/>
+          </a:fillRef>
+          <a:effectRef idx="0">
+            <a:schemeClr val="accent1"/>
+          </a:effectRef>
+          <a:fontRef idx="minor">
+            <a:schemeClr val="lt1"/>
+          </a:fontRef>
+        </p:style>
+        <p:txBody>
+          <a:bodyPr rtlCol="0" anchor="ctr"/>
+          <a:lstStyle/>
+          <a:p>
+            <a:pPr algn="ctr"/>
+            <a:endParaRPr lang="en-US" sz="800" dirty="0">
+              <a:solidFill>
+                <a:schemeClr val="tx1"/>
+              </a:solidFill>
+            </a:endParaRPr>
+          </a:p>
+        </p:txBody>
+      </p:sp>
+      <p:sp>
+        <p:nvSpPr>
+          <p:cNvPr id="43" name="Rectangle 42">
+            <a:extLst>
+              <a:ext uri="{FF2B5EF4-FFF2-40B4-BE49-F238E27FC236}">
+                <a16:creationId xmlns:a16="http://schemas.microsoft.com/office/drawing/2014/main" id="{5A790D2E-1FEC-5D7B-939F-3C0656685A11}"/>
+              </a:ext>
+            </a:extLst>
+          </p:cNvPr>
+          <p:cNvSpPr/>
+          <p:nvPr/>
+        </p:nvSpPr>
+        <p:spPr>
+          <a:xfrm>
+            <a:off x="2833565" y="1111007"/>
+            <a:ext cx="322151" cy="272753"/>
+          </a:xfrm>
+          <a:prstGeom prst="rect">
+            <a:avLst/>
+          </a:prstGeom>
+          <a:solidFill>
+            <a:srgbClr val="F2EFF6"/>
+          </a:solidFill>
+          <a:ln>
+            <a:solidFill>
+              <a:srgbClr val="360084"/>
+            </a:solidFill>
+          </a:ln>
+        </p:spPr>
+        <p:style>
+          <a:lnRef idx="2">
+            <a:schemeClr val="accent1">
+              <a:shade val="15000"/>
+            </a:schemeClr>
+          </a:lnRef>
+          <a:fillRef idx="1">
+            <a:schemeClr val="accent1"/>
+          </a:fillRef>
+          <a:effectRef idx="0">
+            <a:schemeClr val="accent1"/>
+          </a:effectRef>
+          <a:fontRef idx="minor">
+            <a:schemeClr val="lt1"/>
+          </a:fontRef>
+        </p:style>
+        <p:txBody>
+          <a:bodyPr rtlCol="0" anchor="ctr"/>
+          <a:lstStyle/>
+          <a:p>
+            <a:pPr algn="ctr"/>
+            <a:endParaRPr lang="en-US" sz="800" dirty="0">
+              <a:solidFill>
+                <a:schemeClr val="tx1"/>
+              </a:solidFill>
+            </a:endParaRPr>
+          </a:p>
+        </p:txBody>
+      </p:sp>
+      <p:sp>
+        <p:nvSpPr>
+          <p:cNvPr id="45" name="Rectangle 44">
+            <a:extLst>
+              <a:ext uri="{FF2B5EF4-FFF2-40B4-BE49-F238E27FC236}">
+                <a16:creationId xmlns:a16="http://schemas.microsoft.com/office/drawing/2014/main" id="{1E846ADE-ED93-27CE-0ED1-22E443B49A45}"/>
+              </a:ext>
+            </a:extLst>
+          </p:cNvPr>
+          <p:cNvSpPr/>
+          <p:nvPr/>
+        </p:nvSpPr>
+        <p:spPr>
+          <a:xfrm>
+            <a:off x="4444320" y="1111005"/>
+            <a:ext cx="322151" cy="272753"/>
+          </a:xfrm>
+          <a:prstGeom prst="rect">
+            <a:avLst/>
+          </a:prstGeom>
+          <a:solidFill>
+            <a:srgbClr val="FDF8EE"/>
+          </a:solidFill>
+          <a:ln>
+            <a:solidFill>
+              <a:srgbClr val="EFC57B"/>
+            </a:solidFill>
+          </a:ln>
+        </p:spPr>
+        <p:style>
+          <a:lnRef idx="2">
+            <a:schemeClr val="accent1">
+              <a:shade val="15000"/>
+            </a:schemeClr>
+          </a:lnRef>
+          <a:fillRef idx="1">
+            <a:schemeClr val="accent1"/>
+          </a:fillRef>
+          <a:effectRef idx="0">
+            <a:schemeClr val="accent1"/>
+          </a:effectRef>
+          <a:fontRef idx="minor">
+            <a:schemeClr val="lt1"/>
+          </a:fontRef>
+        </p:style>
+        <p:txBody>
+          <a:bodyPr rtlCol="0" anchor="ctr"/>
+          <a:lstStyle/>
+          <a:p>
+            <a:pPr algn="ctr"/>
+            <a:endParaRPr lang="en-US" sz="800" dirty="0">
+              <a:solidFill>
+                <a:schemeClr val="tx1"/>
+              </a:solidFill>
+            </a:endParaRPr>
+          </a:p>
+        </p:txBody>
+      </p:sp>
+      <p:sp>
+        <p:nvSpPr>
+          <p:cNvPr id="39" name="Rectangle 38">
+            <a:extLst>
+              <a:ext uri="{FF2B5EF4-FFF2-40B4-BE49-F238E27FC236}">
+                <a16:creationId xmlns:a16="http://schemas.microsoft.com/office/drawing/2014/main" id="{A111B3C1-D11C-EDDB-D6F6-0AF39CE8531F}"/>
+              </a:ext>
+            </a:extLst>
+          </p:cNvPr>
+          <p:cNvSpPr/>
+          <p:nvPr/>
+        </p:nvSpPr>
+        <p:spPr>
+          <a:xfrm>
+            <a:off x="3155716" y="1111007"/>
+            <a:ext cx="322151" cy="272753"/>
+          </a:xfrm>
+          <a:prstGeom prst="rect">
+            <a:avLst/>
+          </a:prstGeom>
+          <a:pattFill prst="wdUpDiag">
+            <a:fgClr>
+              <a:srgbClr val="360084"/>
+            </a:fgClr>
+            <a:bgClr>
+              <a:schemeClr val="bg1"/>
+            </a:bgClr>
+          </a:pattFill>
+          <a:ln>
+            <a:solidFill>
+              <a:srgbClr val="360084"/>
+            </a:solidFill>
+          </a:ln>
+        </p:spPr>
+        <p:style>
+          <a:lnRef idx="2">
+            <a:schemeClr val="accent1">
+              <a:shade val="15000"/>
+            </a:schemeClr>
+          </a:lnRef>
+          <a:fillRef idx="1">
+            <a:schemeClr val="accent1"/>
+          </a:fillRef>
+          <a:effectRef idx="0">
+            <a:schemeClr val="accent1"/>
+          </a:effectRef>
+          <a:fontRef idx="minor">
+            <a:schemeClr val="lt1"/>
+          </a:fontRef>
+        </p:style>
+        <p:txBody>
+          <a:bodyPr rtlCol="0" anchor="ctr"/>
+          <a:lstStyle/>
+          <a:p>
+            <a:pPr algn="ctr"/>
+            <a:endParaRPr lang="en-US" sz="800" dirty="0">
+              <a:solidFill>
+                <a:schemeClr val="tx1"/>
+              </a:solidFill>
+            </a:endParaRPr>
+          </a:p>
+        </p:txBody>
+      </p:sp>
+      <p:cxnSp>
+        <p:nvCxnSpPr>
+          <p:cNvPr id="47" name="Straight Arrow Connector 46">
+            <a:extLst>
+              <a:ext uri="{FF2B5EF4-FFF2-40B4-BE49-F238E27FC236}">
+                <a16:creationId xmlns:a16="http://schemas.microsoft.com/office/drawing/2014/main" id="{E009DCF6-720B-ADEC-C76E-7F57144EAFD6}"/>
+              </a:ext>
+            </a:extLst>
+          </p:cNvPr>
+          <p:cNvCxnSpPr/>
+          <p:nvPr/>
+        </p:nvCxnSpPr>
+        <p:spPr>
+          <a:xfrm>
+            <a:off x="2511414" y="526358"/>
+            <a:ext cx="0" cy="584647"/>
+          </a:xfrm>
+          <a:prstGeom prst="straightConnector1">
+            <a:avLst/>
+          </a:prstGeom>
+          <a:ln w="12700">
+            <a:solidFill>
+              <a:srgbClr val="360084"/>
+            </a:solidFill>
+            <a:tailEnd type="triangle"/>
+          </a:ln>
+        </p:spPr>
+        <p:style>
+          <a:lnRef idx="1">
+            <a:schemeClr val="accent1"/>
+          </a:lnRef>
+          <a:fillRef idx="0">
+            <a:schemeClr val="accent1"/>
+          </a:fillRef>
+          <a:effectRef idx="0">
+            <a:schemeClr val="accent1"/>
+          </a:effectRef>
+          <a:fontRef idx="minor">
+            <a:schemeClr val="tx1"/>
+          </a:fontRef>
+        </p:style>
+      </p:cxnSp>
+      <p:cxnSp>
+        <p:nvCxnSpPr>
+          <p:cNvPr id="48" name="Straight Arrow Connector 47">
+            <a:extLst>
+              <a:ext uri="{FF2B5EF4-FFF2-40B4-BE49-F238E27FC236}">
+                <a16:creationId xmlns:a16="http://schemas.microsoft.com/office/drawing/2014/main" id="{F493AC74-8D8B-60B2-1E78-3C008281F9B2}"/>
+              </a:ext>
+            </a:extLst>
+          </p:cNvPr>
+          <p:cNvCxnSpPr>
+            <a:cxnSpLocks/>
+          </p:cNvCxnSpPr>
+          <p:nvPr/>
+        </p:nvCxnSpPr>
+        <p:spPr>
+          <a:xfrm flipH="1">
+            <a:off x="4122169" y="526358"/>
+            <a:ext cx="966452" cy="584647"/>
+          </a:xfrm>
+          <a:prstGeom prst="straightConnector1">
+            <a:avLst/>
+          </a:prstGeom>
+          <a:ln w="12700">
+            <a:solidFill>
+              <a:srgbClr val="EFC57B"/>
+            </a:solidFill>
+            <a:tailEnd type="triangle"/>
+          </a:ln>
+        </p:spPr>
+        <p:style>
+          <a:lnRef idx="1">
+            <a:schemeClr val="accent1"/>
+          </a:lnRef>
+          <a:fillRef idx="0">
+            <a:schemeClr val="accent1"/>
+          </a:fillRef>
+          <a:effectRef idx="0">
+            <a:schemeClr val="accent1"/>
+          </a:effectRef>
+          <a:fontRef idx="minor">
+            <a:schemeClr val="tx1"/>
+          </a:fontRef>
+        </p:style>
+      </p:cxnSp>
+      <p:sp>
+        <p:nvSpPr>
+          <p:cNvPr id="50" name="TextBox 49">
+            <a:extLst>
+              <a:ext uri="{FF2B5EF4-FFF2-40B4-BE49-F238E27FC236}">
+                <a16:creationId xmlns:a16="http://schemas.microsoft.com/office/drawing/2014/main" id="{C49D1F21-689E-69D7-ACBD-AC6A28BA1024}"/>
+              </a:ext>
+            </a:extLst>
+          </p:cNvPr>
+          <p:cNvSpPr txBox="1"/>
+          <p:nvPr/>
+        </p:nvSpPr>
+        <p:spPr>
+          <a:xfrm>
+            <a:off x="576903" y="1106759"/>
+            <a:ext cx="1180323" cy="307777"/>
+          </a:xfrm>
+          <a:prstGeom prst="rect">
+            <a:avLst/>
+          </a:prstGeom>
+          <a:noFill/>
+        </p:spPr>
+        <p:txBody>
+          <a:bodyPr wrap="none" rtlCol="0">
+            <a:spAutoFit/>
+          </a:bodyPr>
+          <a:lstStyle/>
+          <a:p>
+            <a:pPr algn="r"/>
+            <a:r>
+              <a:rPr lang="en-US" sz="1400" dirty="0"/>
+              <a:t>Packed buffer</a:t>
+            </a:r>
+          </a:p>
+        </p:txBody>
+      </p:sp>
+      <p:sp>
+        <p:nvSpPr>
+          <p:cNvPr id="51" name="TextBox 50">
+            <a:extLst>
+              <a:ext uri="{FF2B5EF4-FFF2-40B4-BE49-F238E27FC236}">
+                <a16:creationId xmlns:a16="http://schemas.microsoft.com/office/drawing/2014/main" id="{51BB6E5C-1742-8EC0-4CD9-294FD782CCEE}"/>
+              </a:ext>
+            </a:extLst>
+          </p:cNvPr>
+          <p:cNvSpPr txBox="1"/>
+          <p:nvPr/>
+        </p:nvSpPr>
+        <p:spPr>
+          <a:xfrm>
+            <a:off x="576902" y="249359"/>
+            <a:ext cx="1180324" cy="307777"/>
+          </a:xfrm>
+          <a:prstGeom prst="rect">
+            <a:avLst/>
+          </a:prstGeom>
+          <a:noFill/>
+        </p:spPr>
+        <p:txBody>
+          <a:bodyPr wrap="square" rtlCol="0">
+            <a:spAutoFit/>
+          </a:bodyPr>
+          <a:lstStyle/>
+          <a:p>
+            <a:pPr algn="r"/>
+            <a:r>
+              <a:rPr lang="en-US" sz="1400" dirty="0"/>
+              <a:t>Array</a:t>
+            </a:r>
+          </a:p>
+        </p:txBody>
+      </p:sp>
+      <p:sp>
+        <p:nvSpPr>
+          <p:cNvPr id="52" name="Rectangle 51">
+            <a:extLst>
+              <a:ext uri="{FF2B5EF4-FFF2-40B4-BE49-F238E27FC236}">
+                <a16:creationId xmlns:a16="http://schemas.microsoft.com/office/drawing/2014/main" id="{D25E4042-2CCB-9195-F7CF-9321235B7426}"/>
+              </a:ext>
+            </a:extLst>
+          </p:cNvPr>
+          <p:cNvSpPr/>
+          <p:nvPr/>
+        </p:nvSpPr>
+        <p:spPr>
+          <a:xfrm>
+            <a:off x="5088619" y="1111001"/>
+            <a:ext cx="322151" cy="272753"/>
+          </a:xfrm>
+          <a:prstGeom prst="rect">
+            <a:avLst/>
+          </a:prstGeom>
+          <a:solidFill>
+            <a:srgbClr val="FAFDF0"/>
+          </a:solidFill>
+          <a:ln>
+            <a:solidFill>
+              <a:srgbClr val="DDF08B"/>
+            </a:solidFill>
+          </a:ln>
+        </p:spPr>
+        <p:style>
+          <a:lnRef idx="2">
+            <a:schemeClr val="accent1">
+              <a:shade val="15000"/>
+            </a:schemeClr>
+          </a:lnRef>
+          <a:fillRef idx="1">
+            <a:schemeClr val="accent1"/>
+          </a:fillRef>
+          <a:effectRef idx="0">
+            <a:schemeClr val="accent1"/>
+          </a:effectRef>
+          <a:fontRef idx="minor">
+            <a:schemeClr val="lt1"/>
+          </a:fontRef>
+        </p:style>
+        <p:txBody>
+          <a:bodyPr rtlCol="0" anchor="ctr"/>
+          <a:lstStyle/>
+          <a:p>
+            <a:pPr algn="ctr"/>
+            <a:endParaRPr lang="en-US" sz="800" dirty="0">
+              <a:solidFill>
+                <a:schemeClr val="tx1"/>
+              </a:solidFill>
+            </a:endParaRPr>
+          </a:p>
+        </p:txBody>
+      </p:sp>
+      <p:sp>
+        <p:nvSpPr>
+          <p:cNvPr id="53" name="Rectangle 52">
+            <a:extLst>
+              <a:ext uri="{FF2B5EF4-FFF2-40B4-BE49-F238E27FC236}">
+                <a16:creationId xmlns:a16="http://schemas.microsoft.com/office/drawing/2014/main" id="{D0D106E4-744C-C0CD-1CC0-EA4B8FB6A168}"/>
+              </a:ext>
+            </a:extLst>
+          </p:cNvPr>
+          <p:cNvSpPr/>
+          <p:nvPr/>
+        </p:nvSpPr>
+        <p:spPr>
+          <a:xfrm>
+            <a:off x="5410772" y="1111002"/>
+            <a:ext cx="322151" cy="272753"/>
+          </a:xfrm>
+          <a:prstGeom prst="rect">
+            <a:avLst/>
+          </a:prstGeom>
+          <a:solidFill>
+            <a:srgbClr val="FAFDF0"/>
+          </a:solidFill>
+          <a:ln>
+            <a:solidFill>
+              <a:srgbClr val="DDF08B"/>
+            </a:solidFill>
+          </a:ln>
+        </p:spPr>
+        <p:style>
+          <a:lnRef idx="2">
+            <a:schemeClr val="accent1">
+              <a:shade val="15000"/>
+            </a:schemeClr>
+          </a:lnRef>
+          <a:fillRef idx="1">
+            <a:schemeClr val="accent1"/>
+          </a:fillRef>
+          <a:effectRef idx="0">
+            <a:schemeClr val="accent1"/>
+          </a:effectRef>
+          <a:fontRef idx="minor">
+            <a:schemeClr val="lt1"/>
+          </a:fontRef>
+        </p:style>
+        <p:txBody>
+          <a:bodyPr rtlCol="0" anchor="ctr"/>
+          <a:lstStyle/>
+          <a:p>
+            <a:pPr algn="ctr"/>
+            <a:endParaRPr lang="en-US" sz="800" dirty="0">
+              <a:solidFill>
+                <a:schemeClr val="tx1"/>
+              </a:solidFill>
+            </a:endParaRPr>
+          </a:p>
+        </p:txBody>
+      </p:sp>
+      <p:sp>
+        <p:nvSpPr>
+          <p:cNvPr id="44" name="Rectangle 43">
+            <a:extLst>
+              <a:ext uri="{FF2B5EF4-FFF2-40B4-BE49-F238E27FC236}">
+                <a16:creationId xmlns:a16="http://schemas.microsoft.com/office/drawing/2014/main" id="{A6FAAB99-493F-1924-7F30-BAA03308AF34}"/>
+              </a:ext>
+            </a:extLst>
+          </p:cNvPr>
+          <p:cNvSpPr/>
+          <p:nvPr/>
+        </p:nvSpPr>
+        <p:spPr>
+          <a:xfrm>
+            <a:off x="4766471" y="1111005"/>
+            <a:ext cx="322151" cy="272753"/>
+          </a:xfrm>
+          <a:prstGeom prst="rect">
+            <a:avLst/>
+          </a:prstGeom>
+          <a:pattFill prst="wdUpDiag">
+            <a:fgClr>
+              <a:srgbClr val="EFC57B"/>
+            </a:fgClr>
+            <a:bgClr>
+              <a:schemeClr val="bg1"/>
+            </a:bgClr>
+          </a:pattFill>
+          <a:ln>
+            <a:solidFill>
+              <a:srgbClr val="EFC57B"/>
+            </a:solidFill>
+          </a:ln>
+        </p:spPr>
+        <p:style>
+          <a:lnRef idx="2">
+            <a:schemeClr val="accent1">
+              <a:shade val="15000"/>
+            </a:schemeClr>
+          </a:lnRef>
+          <a:fillRef idx="1">
+            <a:schemeClr val="accent1"/>
+          </a:fillRef>
+          <a:effectRef idx="0">
+            <a:schemeClr val="accent1"/>
+          </a:effectRef>
+          <a:fontRef idx="minor">
+            <a:schemeClr val="lt1"/>
+          </a:fontRef>
+        </p:style>
+        <p:txBody>
+          <a:bodyPr rtlCol="0" anchor="ctr"/>
+          <a:lstStyle/>
+          <a:p>
+            <a:pPr algn="ctr"/>
+            <a:endParaRPr lang="en-US" sz="800" dirty="0">
+              <a:solidFill>
+                <a:schemeClr val="tx1"/>
+              </a:solidFill>
+            </a:endParaRPr>
+          </a:p>
+        </p:txBody>
+      </p:sp>
+    </p:spTree>
+    <p:extLst>
+      <p:ext uri="{BB962C8B-B14F-4D97-AF65-F5344CB8AC3E}">
+        <p14:creationId xmlns:p14="http://schemas.microsoft.com/office/powerpoint/2010/main" val="2905784832"/>
       </p:ext>
     </p:extLst>
   </p:cSld>

</xml_diff>

<commit_message>
1st draft of stucts + proof reading
</commit_message>
<xml_diff>
--- a/files/communication_diagram.pptx
+++ b/files/communication_diagram.pptx
@@ -200,7 +200,7 @@
           <a:p>
             <a:fld id="{1DA394A1-87FE-BC40-B428-C4F79D5812EE}" type="datetimeFigureOut">
               <a:rPr lang="en-US" smtClean="0"/>
-              <a:t>5/19/23</a:t>
+              <a:t>5/22/23</a:t>
             </a:fld>
             <a:endParaRPr lang="en-US"/>
           </a:p>
@@ -785,7 +785,7 @@
           <a:p>
             <a:fld id="{5BD1349E-D158-4E40-990A-05F7F3787A3C}" type="datetimeFigureOut">
               <a:rPr lang="en-US" smtClean="0"/>
-              <a:t>5/19/23</a:t>
+              <a:t>5/22/23</a:t>
             </a:fld>
             <a:endParaRPr lang="en-US"/>
           </a:p>
@@ -985,7 +985,7 @@
           <a:p>
             <a:fld id="{5BD1349E-D158-4E40-990A-05F7F3787A3C}" type="datetimeFigureOut">
               <a:rPr lang="en-US" smtClean="0"/>
-              <a:t>5/19/23</a:t>
+              <a:t>5/22/23</a:t>
             </a:fld>
             <a:endParaRPr lang="en-US"/>
           </a:p>
@@ -1195,7 +1195,7 @@
           <a:p>
             <a:fld id="{5BD1349E-D158-4E40-990A-05F7F3787A3C}" type="datetimeFigureOut">
               <a:rPr lang="en-US" smtClean="0"/>
-              <a:t>5/19/23</a:t>
+              <a:t>5/22/23</a:t>
             </a:fld>
             <a:endParaRPr lang="en-US"/>
           </a:p>
@@ -1395,7 +1395,7 @@
           <a:p>
             <a:fld id="{5BD1349E-D158-4E40-990A-05F7F3787A3C}" type="datetimeFigureOut">
               <a:rPr lang="en-US" smtClean="0"/>
-              <a:t>5/19/23</a:t>
+              <a:t>5/22/23</a:t>
             </a:fld>
             <a:endParaRPr lang="en-US"/>
           </a:p>
@@ -1671,7 +1671,7 @@
           <a:p>
             <a:fld id="{5BD1349E-D158-4E40-990A-05F7F3787A3C}" type="datetimeFigureOut">
               <a:rPr lang="en-US" smtClean="0"/>
-              <a:t>5/19/23</a:t>
+              <a:t>5/22/23</a:t>
             </a:fld>
             <a:endParaRPr lang="en-US"/>
           </a:p>
@@ -1939,7 +1939,7 @@
           <a:p>
             <a:fld id="{5BD1349E-D158-4E40-990A-05F7F3787A3C}" type="datetimeFigureOut">
               <a:rPr lang="en-US" smtClean="0"/>
-              <a:t>5/19/23</a:t>
+              <a:t>5/22/23</a:t>
             </a:fld>
             <a:endParaRPr lang="en-US"/>
           </a:p>
@@ -2354,7 +2354,7 @@
           <a:p>
             <a:fld id="{5BD1349E-D158-4E40-990A-05F7F3787A3C}" type="datetimeFigureOut">
               <a:rPr lang="en-US" smtClean="0"/>
-              <a:t>5/19/23</a:t>
+              <a:t>5/22/23</a:t>
             </a:fld>
             <a:endParaRPr lang="en-US"/>
           </a:p>
@@ -2496,7 +2496,7 @@
           <a:p>
             <a:fld id="{5BD1349E-D158-4E40-990A-05F7F3787A3C}" type="datetimeFigureOut">
               <a:rPr lang="en-US" smtClean="0"/>
-              <a:t>5/19/23</a:t>
+              <a:t>5/22/23</a:t>
             </a:fld>
             <a:endParaRPr lang="en-US"/>
           </a:p>
@@ -2609,7 +2609,7 @@
           <a:p>
             <a:fld id="{5BD1349E-D158-4E40-990A-05F7F3787A3C}" type="datetimeFigureOut">
               <a:rPr lang="en-US" smtClean="0"/>
-              <a:t>5/19/23</a:t>
+              <a:t>5/22/23</a:t>
             </a:fld>
             <a:endParaRPr lang="en-US"/>
           </a:p>
@@ -2922,7 +2922,7 @@
           <a:p>
             <a:fld id="{5BD1349E-D158-4E40-990A-05F7F3787A3C}" type="datetimeFigureOut">
               <a:rPr lang="en-US" smtClean="0"/>
-              <a:t>5/19/23</a:t>
+              <a:t>5/22/23</a:t>
             </a:fld>
             <a:endParaRPr lang="en-US"/>
           </a:p>
@@ -3211,7 +3211,7 @@
           <a:p>
             <a:fld id="{5BD1349E-D158-4E40-990A-05F7F3787A3C}" type="datetimeFigureOut">
               <a:rPr lang="en-US" smtClean="0"/>
-              <a:t>5/19/23</a:t>
+              <a:t>5/22/23</a:t>
             </a:fld>
             <a:endParaRPr lang="en-US"/>
           </a:p>
@@ -3454,7 +3454,7 @@
           <a:p>
             <a:fld id="{5BD1349E-D158-4E40-990A-05F7F3787A3C}" type="datetimeFigureOut">
               <a:rPr lang="en-US" smtClean="0"/>
-              <a:t>5/19/23</a:t>
+              <a:t>5/22/23</a:t>
             </a:fld>
             <a:endParaRPr lang="en-US"/>
           </a:p>
@@ -19024,14 +19024,14 @@
           <p:cNvCxnSpPr>
             <a:cxnSpLocks/>
             <a:stCxn id="24" idx="3"/>
-            <a:endCxn id="18" idx="1"/>
+            <a:endCxn id="17" idx="1"/>
           </p:cNvCxnSpPr>
           <p:nvPr/>
         </p:nvCxnSpPr>
         <p:spPr>
           <a:xfrm>
-            <a:off x="7264477" y="1389050"/>
-            <a:ext cx="534740" cy="33"/>
+            <a:off x="8151744" y="1256074"/>
+            <a:ext cx="513508" cy="601"/>
           </a:xfrm>
           <a:prstGeom prst="straightConnector1">
             <a:avLst/>
@@ -19072,7 +19072,7 @@
         </p:nvSpPr>
         <p:spPr>
           <a:xfrm>
-            <a:off x="2730831" y="1016665"/>
+            <a:off x="2781735" y="1113347"/>
             <a:ext cx="745014" cy="272753"/>
           </a:xfrm>
           <a:prstGeom prst="rect">
@@ -19130,7 +19130,7 @@
         </p:nvSpPr>
         <p:spPr>
           <a:xfrm>
-            <a:off x="2730831" y="1294053"/>
+            <a:off x="2781735" y="1929546"/>
             <a:ext cx="745014" cy="272753"/>
           </a:xfrm>
           <a:prstGeom prst="rect">
@@ -19191,7 +19191,7 @@
         </p:nvSpPr>
         <p:spPr>
           <a:xfrm>
-            <a:off x="2730831" y="1567407"/>
+            <a:off x="2781735" y="2202900"/>
             <a:ext cx="745014" cy="272753"/>
           </a:xfrm>
           <a:prstGeom prst="rect">
@@ -19252,7 +19252,7 @@
         </p:nvSpPr>
         <p:spPr>
           <a:xfrm>
-            <a:off x="2730831" y="1834771"/>
+            <a:off x="2781735" y="2470264"/>
             <a:ext cx="745014" cy="272753"/>
           </a:xfrm>
           <a:prstGeom prst="rect">
@@ -19313,7 +19313,7 @@
         </p:nvSpPr>
         <p:spPr>
           <a:xfrm>
-            <a:off x="2730831" y="2107524"/>
+            <a:off x="2781735" y="2743017"/>
             <a:ext cx="745014" cy="272753"/>
           </a:xfrm>
           <a:prstGeom prst="rect">
@@ -19374,7 +19374,7 @@
         </p:nvSpPr>
         <p:spPr>
           <a:xfrm>
-            <a:off x="2730831" y="2374888"/>
+            <a:off x="2781735" y="3010381"/>
             <a:ext cx="745014" cy="272753"/>
           </a:xfrm>
           <a:prstGeom prst="rect">
@@ -19435,7 +19435,7 @@
         </p:nvSpPr>
         <p:spPr>
           <a:xfrm>
-            <a:off x="2730831" y="469717"/>
+            <a:off x="2781735" y="846944"/>
             <a:ext cx="745014" cy="272753"/>
           </a:xfrm>
           <a:prstGeom prst="rect">
@@ -19493,7 +19493,7 @@
         </p:nvSpPr>
         <p:spPr>
           <a:xfrm>
-            <a:off x="238679" y="195462"/>
+            <a:off x="289583" y="572689"/>
             <a:ext cx="1838183" cy="2733417"/>
           </a:xfrm>
           <a:prstGeom prst="rect">
@@ -19692,67 +19692,6 @@
       </p:sp>
       <p:sp>
         <p:nvSpPr>
-          <p:cNvPr id="162" name="Rectangle 161">
-            <a:extLst>
-              <a:ext uri="{FF2B5EF4-FFF2-40B4-BE49-F238E27FC236}">
-                <a16:creationId xmlns:a16="http://schemas.microsoft.com/office/drawing/2014/main" id="{9CB46FAE-109A-2965-2352-390E8D3B94DC}"/>
-              </a:ext>
-            </a:extLst>
-          </p:cNvPr>
-          <p:cNvSpPr/>
-          <p:nvPr/>
-        </p:nvSpPr>
-        <p:spPr>
-          <a:xfrm>
-            <a:off x="2730831" y="742951"/>
-            <a:ext cx="745014" cy="272753"/>
-          </a:xfrm>
-          <a:prstGeom prst="rect">
-            <a:avLst/>
-          </a:prstGeom>
-          <a:solidFill>
-            <a:srgbClr val="FDF8EE"/>
-          </a:solidFill>
-          <a:ln>
-            <a:solidFill>
-              <a:srgbClr val="EFC57B"/>
-            </a:solidFill>
-          </a:ln>
-        </p:spPr>
-        <p:style>
-          <a:lnRef idx="2">
-            <a:schemeClr val="accent1">
-              <a:shade val="15000"/>
-            </a:schemeClr>
-          </a:lnRef>
-          <a:fillRef idx="1">
-            <a:schemeClr val="accent1"/>
-          </a:fillRef>
-          <a:effectRef idx="0">
-            <a:schemeClr val="accent1"/>
-          </a:effectRef>
-          <a:fontRef idx="minor">
-            <a:schemeClr val="lt1"/>
-          </a:fontRef>
-        </p:style>
-        <p:txBody>
-          <a:bodyPr rtlCol="0" anchor="ctr"/>
-          <a:lstStyle/>
-          <a:p>
-            <a:pPr algn="ctr"/>
-            <a:r>
-              <a:rPr lang="en-US" sz="800" dirty="0">
-                <a:solidFill>
-                  <a:schemeClr val="tx1"/>
-                </a:solidFill>
-              </a:rPr>
-              <a:t>value</a:t>
-            </a:r>
-          </a:p>
-        </p:txBody>
-      </p:sp>
-      <p:sp>
-        <p:nvSpPr>
           <p:cNvPr id="180" name="Rectangle 179">
             <a:extLst>
               <a:ext uri="{FF2B5EF4-FFF2-40B4-BE49-F238E27FC236}">
@@ -19765,7 +19704,7 @@
         </p:nvSpPr>
         <p:spPr>
           <a:xfrm>
-            <a:off x="2730831" y="196003"/>
+            <a:off x="2781735" y="573230"/>
             <a:ext cx="745014" cy="272753"/>
           </a:xfrm>
           <a:prstGeom prst="rect">
@@ -19829,7 +19768,7 @@
         </p:nvCxnSpPr>
         <p:spPr>
           <a:xfrm flipV="1">
-            <a:off x="2002280" y="332380"/>
+            <a:off x="2053184" y="709607"/>
             <a:ext cx="728551" cy="957038"/>
           </a:xfrm>
           <a:prstGeom prst="straightConnector1">
@@ -19874,8 +19813,8 @@
         </p:nvCxnSpPr>
         <p:spPr>
           <a:xfrm flipV="1">
-            <a:off x="2002280" y="879328"/>
-            <a:ext cx="728551" cy="682842"/>
+            <a:off x="2053184" y="1522476"/>
+            <a:ext cx="728551" cy="425449"/>
           </a:xfrm>
           <a:prstGeom prst="straightConnector1">
             <a:avLst/>
@@ -19919,8 +19858,8 @@
         </p:nvCxnSpPr>
         <p:spPr>
           <a:xfrm>
-            <a:off x="2002280" y="1848086"/>
-            <a:ext cx="728551" cy="123062"/>
+            <a:off x="2090475" y="2218618"/>
+            <a:ext cx="691260" cy="388023"/>
           </a:xfrm>
           <a:prstGeom prst="straightConnector1">
             <a:avLst/>
@@ -19961,7 +19900,7 @@
         </p:nvSpPr>
         <p:spPr>
           <a:xfrm>
-            <a:off x="7799217" y="711988"/>
+            <a:off x="8665252" y="846944"/>
             <a:ext cx="745014" cy="272753"/>
           </a:xfrm>
           <a:prstGeom prst="rect">
@@ -20022,7 +19961,7 @@
         </p:nvSpPr>
         <p:spPr>
           <a:xfrm>
-            <a:off x="7799217" y="985342"/>
+            <a:off x="8665252" y="1120298"/>
             <a:ext cx="745014" cy="272753"/>
           </a:xfrm>
           <a:prstGeom prst="rect">
@@ -20083,7 +20022,7 @@
         </p:nvSpPr>
         <p:spPr>
           <a:xfrm>
-            <a:off x="7799217" y="1252706"/>
+            <a:off x="8665252" y="1387662"/>
             <a:ext cx="745014" cy="272753"/>
           </a:xfrm>
           <a:prstGeom prst="rect">
@@ -20132,128 +20071,6 @@
       </p:sp>
       <p:sp>
         <p:nvSpPr>
-          <p:cNvPr id="19" name="Rectangle 18">
-            <a:extLst>
-              <a:ext uri="{FF2B5EF4-FFF2-40B4-BE49-F238E27FC236}">
-                <a16:creationId xmlns:a16="http://schemas.microsoft.com/office/drawing/2014/main" id="{7A04AFA7-31A2-B0E4-3D25-B53EBC790A01}"/>
-              </a:ext>
-            </a:extLst>
-          </p:cNvPr>
-          <p:cNvSpPr/>
-          <p:nvPr/>
-        </p:nvSpPr>
-        <p:spPr>
-          <a:xfrm>
-            <a:off x="7799217" y="1525459"/>
-            <a:ext cx="745014" cy="272753"/>
-          </a:xfrm>
-          <a:prstGeom prst="rect">
-            <a:avLst/>
-          </a:prstGeom>
-          <a:solidFill>
-            <a:srgbClr val="F0FDF2"/>
-          </a:solidFill>
-          <a:ln>
-            <a:solidFill>
-              <a:srgbClr val="82E995"/>
-            </a:solidFill>
-          </a:ln>
-        </p:spPr>
-        <p:style>
-          <a:lnRef idx="2">
-            <a:schemeClr val="accent1">
-              <a:shade val="15000"/>
-            </a:schemeClr>
-          </a:lnRef>
-          <a:fillRef idx="1">
-            <a:schemeClr val="accent1"/>
-          </a:fillRef>
-          <a:effectRef idx="0">
-            <a:schemeClr val="accent1"/>
-          </a:effectRef>
-          <a:fontRef idx="minor">
-            <a:schemeClr val="lt1"/>
-          </a:fontRef>
-        </p:style>
-        <p:txBody>
-          <a:bodyPr rtlCol="0" anchor="ctr"/>
-          <a:lstStyle/>
-          <a:p>
-            <a:pPr algn="ctr"/>
-            <a:r>
-              <a:rPr lang="en-US" sz="800" dirty="0">
-                <a:solidFill>
-                  <a:schemeClr val="tx1"/>
-                </a:solidFill>
-              </a:rPr>
-              <a:t>position[3]</a:t>
-            </a:r>
-          </a:p>
-        </p:txBody>
-      </p:sp>
-      <p:sp>
-        <p:nvSpPr>
-          <p:cNvPr id="20" name="Rectangle 19">
-            <a:extLst>
-              <a:ext uri="{FF2B5EF4-FFF2-40B4-BE49-F238E27FC236}">
-                <a16:creationId xmlns:a16="http://schemas.microsoft.com/office/drawing/2014/main" id="{63EBBC81-8262-65C1-5418-7ED4106FF530}"/>
-              </a:ext>
-            </a:extLst>
-          </p:cNvPr>
-          <p:cNvSpPr/>
-          <p:nvPr/>
-        </p:nvSpPr>
-        <p:spPr>
-          <a:xfrm>
-            <a:off x="7799217" y="1792823"/>
-            <a:ext cx="745014" cy="272753"/>
-          </a:xfrm>
-          <a:prstGeom prst="rect">
-            <a:avLst/>
-          </a:prstGeom>
-          <a:solidFill>
-            <a:srgbClr val="F0FDF2"/>
-          </a:solidFill>
-          <a:ln>
-            <a:solidFill>
-              <a:srgbClr val="82E995"/>
-            </a:solidFill>
-          </a:ln>
-        </p:spPr>
-        <p:style>
-          <a:lnRef idx="2">
-            <a:schemeClr val="accent1">
-              <a:shade val="15000"/>
-            </a:schemeClr>
-          </a:lnRef>
-          <a:fillRef idx="1">
-            <a:schemeClr val="accent1"/>
-          </a:fillRef>
-          <a:effectRef idx="0">
-            <a:schemeClr val="accent1"/>
-          </a:effectRef>
-          <a:fontRef idx="minor">
-            <a:schemeClr val="lt1"/>
-          </a:fontRef>
-        </p:style>
-        <p:txBody>
-          <a:bodyPr rtlCol="0" anchor="ctr"/>
-          <a:lstStyle/>
-          <a:p>
-            <a:pPr algn="ctr"/>
-            <a:r>
-              <a:rPr lang="en-US" sz="800" dirty="0">
-                <a:solidFill>
-                  <a:schemeClr val="tx1"/>
-                </a:solidFill>
-              </a:rPr>
-              <a:t>position[4]</a:t>
-            </a:r>
-          </a:p>
-        </p:txBody>
-      </p:sp>
-      <p:sp>
-        <p:nvSpPr>
           <p:cNvPr id="21" name="Rectangle 20">
             <a:extLst>
               <a:ext uri="{FF2B5EF4-FFF2-40B4-BE49-F238E27FC236}">
@@ -20266,7 +20083,7 @@
         </p:nvSpPr>
         <p:spPr>
           <a:xfrm>
-            <a:off x="6519463" y="1526387"/>
+            <a:off x="7406730" y="1393411"/>
             <a:ext cx="745014" cy="272753"/>
           </a:xfrm>
           <a:prstGeom prst="rect">
@@ -20324,7 +20141,7 @@
         </p:nvSpPr>
         <p:spPr>
           <a:xfrm>
-            <a:off x="4097047" y="1012304"/>
+            <a:off x="4984314" y="879328"/>
             <a:ext cx="2054492" cy="1225937"/>
           </a:xfrm>
           <a:prstGeom prst="rect">
@@ -20481,7 +20298,7 @@
         </p:nvSpPr>
         <p:spPr>
           <a:xfrm>
-            <a:off x="6519463" y="1799621"/>
+            <a:off x="7406730" y="1666645"/>
             <a:ext cx="745014" cy="272753"/>
           </a:xfrm>
           <a:prstGeom prst="rect">
@@ -20518,13 +20335,18 @@
           <a:p>
             <a:pPr algn="ctr"/>
             <a:r>
-              <a:rPr lang="en-US" sz="800" dirty="0">
-                <a:solidFill>
-                  <a:schemeClr val="tx1"/>
-                </a:solidFill>
-              </a:rPr>
-              <a:t>5</a:t>
-            </a:r>
+              <a:rPr lang="en-US" sz="800" dirty="0" err="1">
+                <a:solidFill>
+                  <a:schemeClr val="tx1"/>
+                </a:solidFill>
+              </a:rPr>
+              <a:t>num_cells</a:t>
+            </a:r>
+            <a:endParaRPr lang="en-US" sz="800" dirty="0">
+              <a:solidFill>
+                <a:schemeClr val="tx1"/>
+              </a:solidFill>
+            </a:endParaRPr>
           </a:p>
         </p:txBody>
       </p:sp>
@@ -20542,7 +20364,7 @@
         </p:nvSpPr>
         <p:spPr>
           <a:xfrm>
-            <a:off x="6519463" y="1252673"/>
+            <a:off x="7406730" y="1119697"/>
             <a:ext cx="745014" cy="272753"/>
           </a:xfrm>
           <a:prstGeom prst="rect">
@@ -20605,7 +20427,7 @@
         </p:nvCxnSpPr>
         <p:spPr>
           <a:xfrm flipV="1">
-            <a:off x="6096000" y="1389050"/>
+            <a:off x="6983267" y="1256074"/>
             <a:ext cx="423463" cy="106667"/>
           </a:xfrm>
           <a:prstGeom prst="straightConnector1">
@@ -20650,7 +20472,7 @@
         </p:nvCxnSpPr>
         <p:spPr>
           <a:xfrm>
-            <a:off x="6096000" y="1823301"/>
+            <a:off x="6983267" y="1690325"/>
             <a:ext cx="423463" cy="112697"/>
           </a:xfrm>
           <a:prstGeom prst="straightConnector1">
@@ -20678,6 +20500,125 @@
           </a:fontRef>
         </p:style>
       </p:cxnSp>
+      <p:sp>
+        <p:nvSpPr>
+          <p:cNvPr id="7" name="Rectangle 6">
+            <a:extLst>
+              <a:ext uri="{FF2B5EF4-FFF2-40B4-BE49-F238E27FC236}">
+                <a16:creationId xmlns:a16="http://schemas.microsoft.com/office/drawing/2014/main" id="{868112EA-37A7-4581-AFD9-E6D749F1EE06}"/>
+              </a:ext>
+            </a:extLst>
+          </p:cNvPr>
+          <p:cNvSpPr/>
+          <p:nvPr/>
+        </p:nvSpPr>
+        <p:spPr>
+          <a:xfrm>
+            <a:off x="2782660" y="1656793"/>
+            <a:ext cx="745014" cy="272753"/>
+          </a:xfrm>
+          <a:prstGeom prst="rect">
+            <a:avLst/>
+          </a:prstGeom>
+          <a:solidFill>
+            <a:srgbClr val="FAFDF0"/>
+          </a:solidFill>
+          <a:ln>
+            <a:solidFill>
+              <a:srgbClr val="DDF08B"/>
+            </a:solidFill>
+          </a:ln>
+        </p:spPr>
+        <p:style>
+          <a:lnRef idx="2">
+            <a:schemeClr val="accent1">
+              <a:shade val="15000"/>
+            </a:schemeClr>
+          </a:lnRef>
+          <a:fillRef idx="1">
+            <a:schemeClr val="accent1"/>
+          </a:fillRef>
+          <a:effectRef idx="0">
+            <a:schemeClr val="accent1"/>
+          </a:effectRef>
+          <a:fontRef idx="minor">
+            <a:schemeClr val="lt1"/>
+          </a:fontRef>
+        </p:style>
+        <p:txBody>
+          <a:bodyPr rtlCol="0" anchor="ctr"/>
+          <a:lstStyle/>
+          <a:p>
+            <a:pPr algn="ctr"/>
+            <a:endParaRPr lang="en-US" sz="800" dirty="0">
+              <a:solidFill>
+                <a:schemeClr val="tx1"/>
+              </a:solidFill>
+            </a:endParaRPr>
+          </a:p>
+        </p:txBody>
+      </p:sp>
+      <p:sp>
+        <p:nvSpPr>
+          <p:cNvPr id="162" name="Rectangle 161">
+            <a:extLst>
+              <a:ext uri="{FF2B5EF4-FFF2-40B4-BE49-F238E27FC236}">
+                <a16:creationId xmlns:a16="http://schemas.microsoft.com/office/drawing/2014/main" id="{9CB46FAE-109A-2965-2352-390E8D3B94DC}"/>
+              </a:ext>
+            </a:extLst>
+          </p:cNvPr>
+          <p:cNvSpPr/>
+          <p:nvPr/>
+        </p:nvSpPr>
+        <p:spPr>
+          <a:xfrm>
+            <a:off x="2781735" y="1386099"/>
+            <a:ext cx="745014" cy="272753"/>
+          </a:xfrm>
+          <a:prstGeom prst="rect">
+            <a:avLst/>
+          </a:prstGeom>
+          <a:solidFill>
+            <a:srgbClr val="FDF8EE"/>
+          </a:solidFill>
+          <a:ln>
+            <a:solidFill>
+              <a:srgbClr val="EFC57B"/>
+            </a:solidFill>
+          </a:ln>
+        </p:spPr>
+        <p:style>
+          <a:lnRef idx="2">
+            <a:schemeClr val="accent1">
+              <a:shade val="15000"/>
+            </a:schemeClr>
+          </a:lnRef>
+          <a:fillRef idx="1">
+            <a:schemeClr val="accent1"/>
+          </a:fillRef>
+          <a:effectRef idx="0">
+            <a:schemeClr val="accent1"/>
+          </a:effectRef>
+          <a:fontRef idx="minor">
+            <a:schemeClr val="lt1"/>
+          </a:fontRef>
+        </p:style>
+        <p:txBody>
+          <a:bodyPr rtlCol="0" anchor="ctr"/>
+          <a:lstStyle/>
+          <a:p>
+            <a:pPr algn="ctr"/>
+            <a:r>
+              <a:rPr lang="en-US" sz="800" dirty="0">
+                <a:solidFill>
+                  <a:schemeClr val="tx1"/>
+                </a:solidFill>
+              </a:rPr>
+              <a:t>value</a:t>
+            </a:r>
+          </a:p>
+        </p:txBody>
+      </p:sp>
     </p:spTree>
     <p:extLst>
       <p:ext uri="{BB962C8B-B14F-4D97-AF65-F5344CB8AC3E}">

</xml_diff>

<commit_message>
first draft of finished episode
</commit_message>
<xml_diff>
--- a/files/communication_diagram.pptx
+++ b/files/communication_diagram.pptx
@@ -21557,7 +21557,7 @@
         </p:nvSpPr>
         <p:spPr>
           <a:xfrm>
-            <a:off x="2994640" y="684615"/>
+            <a:off x="2508316" y="659294"/>
             <a:ext cx="322151" cy="272753"/>
           </a:xfrm>
           <a:prstGeom prst="rect">
@@ -21618,7 +21618,7 @@
         </p:nvSpPr>
         <p:spPr>
           <a:xfrm>
-            <a:off x="3316791" y="684614"/>
+            <a:off x="2830467" y="659293"/>
             <a:ext cx="322151" cy="272753"/>
           </a:xfrm>
           <a:prstGeom prst="rect">
@@ -21679,7 +21679,7 @@
         </p:nvSpPr>
         <p:spPr>
           <a:xfrm>
-            <a:off x="5571846" y="684787"/>
+            <a:off x="4436571" y="659293"/>
             <a:ext cx="322151" cy="272753"/>
           </a:xfrm>
           <a:prstGeom prst="rect">
@@ -21740,7 +21740,7 @@
         </p:nvSpPr>
         <p:spPr>
           <a:xfrm>
-            <a:off x="5249695" y="684787"/>
+            <a:off x="4114420" y="659293"/>
             <a:ext cx="322151" cy="272753"/>
           </a:xfrm>
           <a:prstGeom prst="rect">
@@ -21789,67 +21789,6 @@
       </p:sp>
       <p:sp>
         <p:nvSpPr>
-          <p:cNvPr id="43" name="Rectangle 42">
-            <a:extLst>
-              <a:ext uri="{FF2B5EF4-FFF2-40B4-BE49-F238E27FC236}">
-                <a16:creationId xmlns:a16="http://schemas.microsoft.com/office/drawing/2014/main" id="{5A790D2E-1FEC-5D7B-939F-3C0656685A11}"/>
-              </a:ext>
-            </a:extLst>
-          </p:cNvPr>
-          <p:cNvSpPr/>
-          <p:nvPr/>
-        </p:nvSpPr>
-        <p:spPr>
-          <a:xfrm>
-            <a:off x="3638942" y="684614"/>
-            <a:ext cx="322151" cy="272753"/>
-          </a:xfrm>
-          <a:prstGeom prst="rect">
-            <a:avLst/>
-          </a:prstGeom>
-          <a:solidFill>
-            <a:srgbClr val="F2EFF6"/>
-          </a:solidFill>
-          <a:ln>
-            <a:solidFill>
-              <a:srgbClr val="360084"/>
-            </a:solidFill>
-          </a:ln>
-        </p:spPr>
-        <p:style>
-          <a:lnRef idx="2">
-            <a:schemeClr val="accent1">
-              <a:shade val="15000"/>
-            </a:schemeClr>
-          </a:lnRef>
-          <a:fillRef idx="1">
-            <a:schemeClr val="accent1"/>
-          </a:fillRef>
-          <a:effectRef idx="0">
-            <a:schemeClr val="accent1"/>
-          </a:effectRef>
-          <a:fontRef idx="minor">
-            <a:schemeClr val="lt1"/>
-          </a:fontRef>
-        </p:style>
-        <p:txBody>
-          <a:bodyPr rtlCol="0" anchor="ctr"/>
-          <a:lstStyle/>
-          <a:p>
-            <a:pPr algn="ctr"/>
-            <a:r>
-              <a:rPr lang="en-US" sz="700" dirty="0">
-                <a:solidFill>
-                  <a:schemeClr val="tx1"/>
-                </a:solidFill>
-              </a:rPr>
-              <a:t>x[3]</a:t>
-            </a:r>
-          </a:p>
-        </p:txBody>
-      </p:sp>
-      <p:sp>
-        <p:nvSpPr>
           <p:cNvPr id="45" name="Rectangle 44">
             <a:extLst>
               <a:ext uri="{FF2B5EF4-FFF2-40B4-BE49-F238E27FC236}">
@@ -21862,7 +21801,7 @@
         </p:nvSpPr>
         <p:spPr>
           <a:xfrm>
-            <a:off x="5893997" y="684787"/>
+            <a:off x="4758722" y="659293"/>
             <a:ext cx="322151" cy="272753"/>
           </a:xfrm>
           <a:prstGeom prst="rect">
@@ -21983,32 +21922,88 @@
       </p:sp>
       <p:sp>
         <p:nvSpPr>
-          <p:cNvPr id="44" name="Rectangle 43">
-            <a:extLst>
-              <a:ext uri="{FF2B5EF4-FFF2-40B4-BE49-F238E27FC236}">
-                <a16:creationId xmlns:a16="http://schemas.microsoft.com/office/drawing/2014/main" id="{A6FAAB99-493F-1924-7F30-BAA03308AF34}"/>
-              </a:ext>
-            </a:extLst>
-          </p:cNvPr>
-          <p:cNvSpPr/>
-          <p:nvPr/>
-        </p:nvSpPr>
-        <p:spPr>
-          <a:xfrm>
-            <a:off x="6538299" y="684784"/>
-            <a:ext cx="322151" cy="272753"/>
-          </a:xfrm>
-          <a:prstGeom prst="rect">
-            <a:avLst/>
-          </a:prstGeom>
-          <a:pattFill prst="wdUpDiag">
-            <a:fgClr>
+          <p:cNvPr id="3" name="Rectangle 2">
+            <a:extLst>
+              <a:ext uri="{FF2B5EF4-FFF2-40B4-BE49-F238E27FC236}">
+                <a16:creationId xmlns:a16="http://schemas.microsoft.com/office/drawing/2014/main" id="{8839767C-8CA2-5290-BB52-8EC3C544EBB0}"/>
+              </a:ext>
+            </a:extLst>
+          </p:cNvPr>
+          <p:cNvSpPr/>
+          <p:nvPr/>
+        </p:nvSpPr>
+        <p:spPr>
+          <a:xfrm>
+            <a:off x="5732922" y="253605"/>
+            <a:ext cx="322151" cy="272753"/>
+          </a:xfrm>
+          <a:prstGeom prst="rect">
+            <a:avLst/>
+          </a:prstGeom>
+          <a:solidFill>
+            <a:srgbClr val="FDF8EE"/>
+          </a:solidFill>
+          <a:ln>
+            <a:solidFill>
               <a:srgbClr val="EFC57B"/>
-            </a:fgClr>
-            <a:bgClr>
-              <a:schemeClr val="bg1"/>
-            </a:bgClr>
-          </a:pattFill>
+            </a:solidFill>
+          </a:ln>
+        </p:spPr>
+        <p:style>
+          <a:lnRef idx="2">
+            <a:schemeClr val="accent1">
+              <a:shade val="15000"/>
+            </a:schemeClr>
+          </a:lnRef>
+          <a:fillRef idx="1">
+            <a:schemeClr val="accent1"/>
+          </a:fillRef>
+          <a:effectRef idx="0">
+            <a:schemeClr val="accent1"/>
+          </a:effectRef>
+          <a:fontRef idx="minor">
+            <a:schemeClr val="lt1"/>
+          </a:fontRef>
+        </p:style>
+        <p:txBody>
+          <a:bodyPr rtlCol="0" anchor="ctr"/>
+          <a:lstStyle/>
+          <a:p>
+            <a:pPr algn="ctr"/>
+            <a:r>
+              <a:rPr lang="en-US" sz="700" dirty="0">
+                <a:solidFill>
+                  <a:schemeClr val="tx1"/>
+                </a:solidFill>
+              </a:rPr>
+              <a:t>y[4]</a:t>
+            </a:r>
+          </a:p>
+        </p:txBody>
+      </p:sp>
+      <p:sp>
+        <p:nvSpPr>
+          <p:cNvPr id="4" name="Rectangle 3">
+            <a:extLst>
+              <a:ext uri="{FF2B5EF4-FFF2-40B4-BE49-F238E27FC236}">
+                <a16:creationId xmlns:a16="http://schemas.microsoft.com/office/drawing/2014/main" id="{81B38D1C-6656-57F1-658E-72A38B9964C4}"/>
+              </a:ext>
+            </a:extLst>
+          </p:cNvPr>
+          <p:cNvSpPr/>
+          <p:nvPr/>
+        </p:nvSpPr>
+        <p:spPr>
+          <a:xfrm>
+            <a:off x="5080873" y="659291"/>
+            <a:ext cx="322151" cy="272753"/>
+          </a:xfrm>
+          <a:prstGeom prst="rect">
+            <a:avLst/>
+          </a:prstGeom>
+          <a:solidFill>
+            <a:srgbClr val="FDF8EE"/>
+          </a:solidFill>
           <a:ln>
             <a:solidFill>
               <a:srgbClr val="EFC57B"/>
@@ -22036,29 +22031,215 @@
           <a:lstStyle/>
           <a:p>
             <a:pPr algn="ctr"/>
-            <a:endParaRPr lang="en-US" sz="800" dirty="0">
-              <a:solidFill>
-                <a:schemeClr val="tx1"/>
-              </a:solidFill>
-            </a:endParaRPr>
-          </a:p>
-        </p:txBody>
-      </p:sp>
-      <p:sp>
-        <p:nvSpPr>
-          <p:cNvPr id="3" name="Rectangle 2">
-            <a:extLst>
-              <a:ext uri="{FF2B5EF4-FFF2-40B4-BE49-F238E27FC236}">
-                <a16:creationId xmlns:a16="http://schemas.microsoft.com/office/drawing/2014/main" id="{8839767C-8CA2-5290-BB52-8EC3C544EBB0}"/>
-              </a:ext>
-            </a:extLst>
-          </p:cNvPr>
-          <p:cNvSpPr/>
-          <p:nvPr/>
-        </p:nvSpPr>
-        <p:spPr>
-          <a:xfrm>
-            <a:off x="5732922" y="253605"/>
+            <a:r>
+              <a:rPr lang="en-US" sz="700" dirty="0">
+                <a:solidFill>
+                  <a:schemeClr val="tx1"/>
+                </a:solidFill>
+              </a:rPr>
+              <a:t>y[4]</a:t>
+            </a:r>
+          </a:p>
+        </p:txBody>
+      </p:sp>
+      <p:sp>
+        <p:nvSpPr>
+          <p:cNvPr id="5" name="Rectangle 4">
+            <a:extLst>
+              <a:ext uri="{FF2B5EF4-FFF2-40B4-BE49-F238E27FC236}">
+                <a16:creationId xmlns:a16="http://schemas.microsoft.com/office/drawing/2014/main" id="{513E6787-8715-BA6B-1D5B-EFE1C0626FCA}"/>
+              </a:ext>
+            </a:extLst>
+          </p:cNvPr>
+          <p:cNvSpPr/>
+          <p:nvPr/>
+        </p:nvSpPr>
+        <p:spPr>
+          <a:xfrm>
+            <a:off x="1867112" y="659295"/>
+            <a:ext cx="322151" cy="272753"/>
+          </a:xfrm>
+          <a:prstGeom prst="rect">
+            <a:avLst/>
+          </a:prstGeom>
+          <a:solidFill>
+            <a:srgbClr val="F0FDF2"/>
+          </a:solidFill>
+          <a:ln>
+            <a:solidFill>
+              <a:srgbClr val="82E995"/>
+            </a:solidFill>
+          </a:ln>
+        </p:spPr>
+        <p:style>
+          <a:lnRef idx="2">
+            <a:schemeClr val="accent1">
+              <a:shade val="15000"/>
+            </a:schemeClr>
+          </a:lnRef>
+          <a:fillRef idx="1">
+            <a:schemeClr val="accent1"/>
+          </a:fillRef>
+          <a:effectRef idx="0">
+            <a:schemeClr val="accent1"/>
+          </a:effectRef>
+          <a:fontRef idx="minor">
+            <a:schemeClr val="lt1"/>
+          </a:fontRef>
+        </p:style>
+        <p:txBody>
+          <a:bodyPr rtlCol="0" anchor="ctr"/>
+          <a:lstStyle/>
+          <a:p>
+            <a:pPr algn="ctr"/>
+            <a:r>
+              <a:rPr lang="en-US" sz="700" dirty="0">
+                <a:solidFill>
+                  <a:schemeClr val="tx1"/>
+                </a:solidFill>
+              </a:rPr>
+              <a:t>4</a:t>
+            </a:r>
+          </a:p>
+        </p:txBody>
+      </p:sp>
+      <p:sp>
+        <p:nvSpPr>
+          <p:cNvPr id="7" name="Rectangle 6">
+            <a:extLst>
+              <a:ext uri="{FF2B5EF4-FFF2-40B4-BE49-F238E27FC236}">
+                <a16:creationId xmlns:a16="http://schemas.microsoft.com/office/drawing/2014/main" id="{6197113B-9DAA-FC1A-D9F0-357FCC8B6D74}"/>
+              </a:ext>
+            </a:extLst>
+          </p:cNvPr>
+          <p:cNvSpPr/>
+          <p:nvPr/>
+        </p:nvSpPr>
+        <p:spPr>
+          <a:xfrm>
+            <a:off x="3470118" y="659293"/>
+            <a:ext cx="322151" cy="272753"/>
+          </a:xfrm>
+          <a:prstGeom prst="rect">
+            <a:avLst/>
+          </a:prstGeom>
+          <a:solidFill>
+            <a:srgbClr val="F0FDF2"/>
+          </a:solidFill>
+          <a:ln>
+            <a:solidFill>
+              <a:srgbClr val="82E995"/>
+            </a:solidFill>
+          </a:ln>
+        </p:spPr>
+        <p:style>
+          <a:lnRef idx="2">
+            <a:schemeClr val="accent1">
+              <a:shade val="15000"/>
+            </a:schemeClr>
+          </a:lnRef>
+          <a:fillRef idx="1">
+            <a:schemeClr val="accent1"/>
+          </a:fillRef>
+          <a:effectRef idx="0">
+            <a:schemeClr val="accent1"/>
+          </a:effectRef>
+          <a:fontRef idx="minor">
+            <a:schemeClr val="lt1"/>
+          </a:fontRef>
+        </p:style>
+        <p:txBody>
+          <a:bodyPr rtlCol="0" anchor="ctr"/>
+          <a:lstStyle/>
+          <a:p>
+            <a:pPr algn="ctr"/>
+            <a:r>
+              <a:rPr lang="en-US" sz="700" dirty="0">
+                <a:solidFill>
+                  <a:schemeClr val="tx1"/>
+                </a:solidFill>
+              </a:rPr>
+              <a:t>5</a:t>
+            </a:r>
+          </a:p>
+        </p:txBody>
+      </p:sp>
+      <p:sp>
+        <p:nvSpPr>
+          <p:cNvPr id="36" name="Rectangle 35">
+            <a:extLst>
+              <a:ext uri="{FF2B5EF4-FFF2-40B4-BE49-F238E27FC236}">
+                <a16:creationId xmlns:a16="http://schemas.microsoft.com/office/drawing/2014/main" id="{5CE6A78A-C55E-5FD0-A432-FA7067E4421F}"/>
+              </a:ext>
+            </a:extLst>
+          </p:cNvPr>
+          <p:cNvSpPr/>
+          <p:nvPr/>
+        </p:nvSpPr>
+        <p:spPr>
+          <a:xfrm>
+            <a:off x="2186165" y="659295"/>
+            <a:ext cx="322151" cy="272753"/>
+          </a:xfrm>
+          <a:prstGeom prst="rect">
+            <a:avLst/>
+          </a:prstGeom>
+          <a:solidFill>
+            <a:srgbClr val="F2EFF6"/>
+          </a:solidFill>
+          <a:ln>
+            <a:solidFill>
+              <a:srgbClr val="360084"/>
+            </a:solidFill>
+          </a:ln>
+        </p:spPr>
+        <p:style>
+          <a:lnRef idx="2">
+            <a:schemeClr val="accent1">
+              <a:shade val="15000"/>
+            </a:schemeClr>
+          </a:lnRef>
+          <a:fillRef idx="1">
+            <a:schemeClr val="accent1"/>
+          </a:fillRef>
+          <a:effectRef idx="0">
+            <a:schemeClr val="accent1"/>
+          </a:effectRef>
+          <a:fontRef idx="minor">
+            <a:schemeClr val="lt1"/>
+          </a:fontRef>
+        </p:style>
+        <p:txBody>
+          <a:bodyPr rtlCol="0" anchor="ctr"/>
+          <a:lstStyle/>
+          <a:p>
+            <a:pPr algn="ctr"/>
+            <a:r>
+              <a:rPr lang="en-US" sz="700" dirty="0">
+                <a:solidFill>
+                  <a:schemeClr val="tx1"/>
+                </a:solidFill>
+              </a:rPr>
+              <a:t>x[0]</a:t>
+            </a:r>
+          </a:p>
+        </p:txBody>
+      </p:sp>
+      <p:sp>
+        <p:nvSpPr>
+          <p:cNvPr id="41" name="Rectangle 40">
+            <a:extLst>
+              <a:ext uri="{FF2B5EF4-FFF2-40B4-BE49-F238E27FC236}">
+                <a16:creationId xmlns:a16="http://schemas.microsoft.com/office/drawing/2014/main" id="{37DF5E3A-6341-2497-2EE3-B4B92A55FED8}"/>
+              </a:ext>
+            </a:extLst>
+          </p:cNvPr>
+          <p:cNvSpPr/>
+          <p:nvPr/>
+        </p:nvSpPr>
+        <p:spPr>
+          <a:xfrm>
+            <a:off x="3792269" y="659294"/>
             <a:ext cx="322151" cy="272753"/>
           </a:xfrm>
           <a:prstGeom prst="rect">
@@ -22100,37 +22281,37 @@
                   <a:schemeClr val="tx1"/>
                 </a:solidFill>
               </a:rPr>
-              <a:t>y[4]</a:t>
-            </a:r>
-          </a:p>
-        </p:txBody>
-      </p:sp>
-      <p:sp>
-        <p:nvSpPr>
-          <p:cNvPr id="4" name="Rectangle 3">
-            <a:extLst>
-              <a:ext uri="{FF2B5EF4-FFF2-40B4-BE49-F238E27FC236}">
-                <a16:creationId xmlns:a16="http://schemas.microsoft.com/office/drawing/2014/main" id="{81B38D1C-6656-57F1-658E-72A38B9964C4}"/>
-              </a:ext>
-            </a:extLst>
-          </p:cNvPr>
-          <p:cNvSpPr/>
-          <p:nvPr/>
-        </p:nvSpPr>
-        <p:spPr>
-          <a:xfrm>
-            <a:off x="6216148" y="684699"/>
-            <a:ext cx="322151" cy="272753"/>
-          </a:xfrm>
-          <a:prstGeom prst="rect">
-            <a:avLst/>
-          </a:prstGeom>
-          <a:solidFill>
-            <a:srgbClr val="FDF8EE"/>
-          </a:solidFill>
-          <a:ln>
-            <a:solidFill>
-              <a:srgbClr val="EFC57B"/>
+              <a:t>y[0]</a:t>
+            </a:r>
+          </a:p>
+        </p:txBody>
+      </p:sp>
+      <p:sp>
+        <p:nvSpPr>
+          <p:cNvPr id="43" name="Rectangle 42">
+            <a:extLst>
+              <a:ext uri="{FF2B5EF4-FFF2-40B4-BE49-F238E27FC236}">
+                <a16:creationId xmlns:a16="http://schemas.microsoft.com/office/drawing/2014/main" id="{5A790D2E-1FEC-5D7B-939F-3C0656685A11}"/>
+              </a:ext>
+            </a:extLst>
+          </p:cNvPr>
+          <p:cNvSpPr/>
+          <p:nvPr/>
+        </p:nvSpPr>
+        <p:spPr>
+          <a:xfrm>
+            <a:off x="3152618" y="659293"/>
+            <a:ext cx="322151" cy="272753"/>
+          </a:xfrm>
+          <a:prstGeom prst="rect">
+            <a:avLst/>
+          </a:prstGeom>
+          <a:solidFill>
+            <a:srgbClr val="F2EFF6"/>
+          </a:solidFill>
+          <a:ln>
+            <a:solidFill>
+              <a:srgbClr val="360084"/>
             </a:solidFill>
           </a:ln>
         </p:spPr>
@@ -22161,441 +22342,8 @@
                   <a:schemeClr val="tx1"/>
                 </a:solidFill>
               </a:rPr>
-              <a:t>y[4]</a:t>
-            </a:r>
-          </a:p>
-        </p:txBody>
-      </p:sp>
-      <p:sp>
-        <p:nvSpPr>
-          <p:cNvPr id="5" name="Rectangle 4">
-            <a:extLst>
-              <a:ext uri="{FF2B5EF4-FFF2-40B4-BE49-F238E27FC236}">
-                <a16:creationId xmlns:a16="http://schemas.microsoft.com/office/drawing/2014/main" id="{513E6787-8715-BA6B-1D5B-EFE1C0626FCA}"/>
-              </a:ext>
-            </a:extLst>
-          </p:cNvPr>
-          <p:cNvSpPr/>
-          <p:nvPr/>
-        </p:nvSpPr>
-        <p:spPr>
-          <a:xfrm>
-            <a:off x="2035936" y="684614"/>
-            <a:ext cx="322151" cy="272753"/>
-          </a:xfrm>
-          <a:prstGeom prst="rect">
-            <a:avLst/>
-          </a:prstGeom>
-          <a:solidFill>
-            <a:srgbClr val="F0FDF2"/>
-          </a:solidFill>
-          <a:ln>
-            <a:solidFill>
-              <a:srgbClr val="82E995"/>
-            </a:solidFill>
-          </a:ln>
-        </p:spPr>
-        <p:style>
-          <a:lnRef idx="2">
-            <a:schemeClr val="accent1">
-              <a:shade val="15000"/>
-            </a:schemeClr>
-          </a:lnRef>
-          <a:fillRef idx="1">
-            <a:schemeClr val="accent1"/>
-          </a:fillRef>
-          <a:effectRef idx="0">
-            <a:schemeClr val="accent1"/>
-          </a:effectRef>
-          <a:fontRef idx="minor">
-            <a:schemeClr val="lt1"/>
-          </a:fontRef>
-        </p:style>
-        <p:txBody>
-          <a:bodyPr rtlCol="0" anchor="ctr"/>
-          <a:lstStyle/>
-          <a:p>
-            <a:pPr algn="ctr"/>
-            <a:r>
-              <a:rPr lang="en-US" sz="700" dirty="0">
-                <a:solidFill>
-                  <a:schemeClr val="tx1"/>
-                </a:solidFill>
-              </a:rPr>
-              <a:t>4</a:t>
-            </a:r>
-          </a:p>
-        </p:txBody>
-      </p:sp>
-      <p:sp>
-        <p:nvSpPr>
-          <p:cNvPr id="7" name="Rectangle 6">
-            <a:extLst>
-              <a:ext uri="{FF2B5EF4-FFF2-40B4-BE49-F238E27FC236}">
-                <a16:creationId xmlns:a16="http://schemas.microsoft.com/office/drawing/2014/main" id="{6197113B-9DAA-FC1A-D9F0-357FCC8B6D74}"/>
-              </a:ext>
-            </a:extLst>
-          </p:cNvPr>
-          <p:cNvSpPr/>
-          <p:nvPr/>
-        </p:nvSpPr>
-        <p:spPr>
-          <a:xfrm>
-            <a:off x="4283242" y="684614"/>
-            <a:ext cx="322151" cy="272753"/>
-          </a:xfrm>
-          <a:prstGeom prst="rect">
-            <a:avLst/>
-          </a:prstGeom>
-          <a:solidFill>
-            <a:srgbClr val="F0FDF2"/>
-          </a:solidFill>
-          <a:ln>
-            <a:solidFill>
-              <a:srgbClr val="82E995"/>
-            </a:solidFill>
-          </a:ln>
-        </p:spPr>
-        <p:style>
-          <a:lnRef idx="2">
-            <a:schemeClr val="accent1">
-              <a:shade val="15000"/>
-            </a:schemeClr>
-          </a:lnRef>
-          <a:fillRef idx="1">
-            <a:schemeClr val="accent1"/>
-          </a:fillRef>
-          <a:effectRef idx="0">
-            <a:schemeClr val="accent1"/>
-          </a:effectRef>
-          <a:fontRef idx="minor">
-            <a:schemeClr val="lt1"/>
-          </a:fontRef>
-        </p:style>
-        <p:txBody>
-          <a:bodyPr rtlCol="0" anchor="ctr"/>
-          <a:lstStyle/>
-          <a:p>
-            <a:pPr algn="ctr"/>
-            <a:r>
-              <a:rPr lang="en-US" sz="700" dirty="0">
-                <a:solidFill>
-                  <a:schemeClr val="tx1"/>
-                </a:solidFill>
-              </a:rPr>
-              <a:t>5</a:t>
-            </a:r>
-          </a:p>
-        </p:txBody>
-      </p:sp>
-      <p:sp>
-        <p:nvSpPr>
-          <p:cNvPr id="8" name="Rectangle 7">
-            <a:extLst>
-              <a:ext uri="{FF2B5EF4-FFF2-40B4-BE49-F238E27FC236}">
-                <a16:creationId xmlns:a16="http://schemas.microsoft.com/office/drawing/2014/main" id="{BFD82EA9-0329-418E-268E-9985FDB0D4A5}"/>
-              </a:ext>
-            </a:extLst>
-          </p:cNvPr>
-          <p:cNvSpPr/>
-          <p:nvPr/>
-        </p:nvSpPr>
-        <p:spPr>
-          <a:xfrm>
-            <a:off x="2350338" y="684614"/>
-            <a:ext cx="322151" cy="272753"/>
-          </a:xfrm>
-          <a:prstGeom prst="rect">
-            <a:avLst/>
-          </a:prstGeom>
-          <a:pattFill prst="wdUpDiag">
-            <a:fgClr>
-              <a:srgbClr val="82E995"/>
-            </a:fgClr>
-            <a:bgClr>
-              <a:schemeClr val="bg1"/>
-            </a:bgClr>
-          </a:pattFill>
-          <a:ln>
-            <a:solidFill>
-              <a:srgbClr val="82E995"/>
-            </a:solidFill>
-          </a:ln>
-        </p:spPr>
-        <p:style>
-          <a:lnRef idx="2">
-            <a:schemeClr val="accent1">
-              <a:shade val="15000"/>
-            </a:schemeClr>
-          </a:lnRef>
-          <a:fillRef idx="1">
-            <a:schemeClr val="accent1"/>
-          </a:fillRef>
-          <a:effectRef idx="0">
-            <a:schemeClr val="accent1"/>
-          </a:effectRef>
-          <a:fontRef idx="minor">
-            <a:schemeClr val="lt1"/>
-          </a:fontRef>
-        </p:style>
-        <p:txBody>
-          <a:bodyPr rtlCol="0" anchor="ctr"/>
-          <a:lstStyle/>
-          <a:p>
-            <a:pPr algn="ctr"/>
-            <a:endParaRPr lang="en-US" sz="800" dirty="0">
-              <a:solidFill>
-                <a:schemeClr val="tx1"/>
-              </a:solidFill>
-            </a:endParaRPr>
-          </a:p>
-        </p:txBody>
-      </p:sp>
-      <p:sp>
-        <p:nvSpPr>
-          <p:cNvPr id="9" name="Rectangle 8">
-            <a:extLst>
-              <a:ext uri="{FF2B5EF4-FFF2-40B4-BE49-F238E27FC236}">
-                <a16:creationId xmlns:a16="http://schemas.microsoft.com/office/drawing/2014/main" id="{7316CBFA-73A2-AC0C-F84F-8C9ABAAC1230}"/>
-              </a:ext>
-            </a:extLst>
-          </p:cNvPr>
-          <p:cNvSpPr/>
-          <p:nvPr/>
-        </p:nvSpPr>
-        <p:spPr>
-          <a:xfrm>
-            <a:off x="4605393" y="684614"/>
-            <a:ext cx="322151" cy="272753"/>
-          </a:xfrm>
-          <a:prstGeom prst="rect">
-            <a:avLst/>
-          </a:prstGeom>
-          <a:pattFill prst="wdUpDiag">
-            <a:fgClr>
-              <a:srgbClr val="82E995"/>
-            </a:fgClr>
-            <a:bgClr>
-              <a:schemeClr val="bg1"/>
-            </a:bgClr>
-          </a:pattFill>
-          <a:ln>
-            <a:solidFill>
-              <a:srgbClr val="82E995"/>
-            </a:solidFill>
-          </a:ln>
-        </p:spPr>
-        <p:style>
-          <a:lnRef idx="2">
-            <a:schemeClr val="accent1">
-              <a:shade val="15000"/>
-            </a:schemeClr>
-          </a:lnRef>
-          <a:fillRef idx="1">
-            <a:schemeClr val="accent1"/>
-          </a:fillRef>
-          <a:effectRef idx="0">
-            <a:schemeClr val="accent1"/>
-          </a:effectRef>
-          <a:fontRef idx="minor">
-            <a:schemeClr val="lt1"/>
-          </a:fontRef>
-        </p:style>
-        <p:txBody>
-          <a:bodyPr rtlCol="0" anchor="ctr"/>
-          <a:lstStyle/>
-          <a:p>
-            <a:pPr algn="ctr"/>
-            <a:endParaRPr lang="en-US" sz="800" dirty="0">
-              <a:solidFill>
-                <a:schemeClr val="tx1"/>
-              </a:solidFill>
-            </a:endParaRPr>
-          </a:p>
-        </p:txBody>
-      </p:sp>
-      <p:sp>
-        <p:nvSpPr>
-          <p:cNvPr id="36" name="Rectangle 35">
-            <a:extLst>
-              <a:ext uri="{FF2B5EF4-FFF2-40B4-BE49-F238E27FC236}">
-                <a16:creationId xmlns:a16="http://schemas.microsoft.com/office/drawing/2014/main" id="{5CE6A78A-C55E-5FD0-A432-FA7067E4421F}"/>
-              </a:ext>
-            </a:extLst>
-          </p:cNvPr>
-          <p:cNvSpPr/>
-          <p:nvPr/>
-        </p:nvSpPr>
-        <p:spPr>
-          <a:xfrm>
-            <a:off x="2672489" y="684616"/>
-            <a:ext cx="322151" cy="272753"/>
-          </a:xfrm>
-          <a:prstGeom prst="rect">
-            <a:avLst/>
-          </a:prstGeom>
-          <a:solidFill>
-            <a:srgbClr val="F2EFF6"/>
-          </a:solidFill>
-          <a:ln>
-            <a:solidFill>
-              <a:srgbClr val="360084"/>
-            </a:solidFill>
-          </a:ln>
-        </p:spPr>
-        <p:style>
-          <a:lnRef idx="2">
-            <a:schemeClr val="accent1">
-              <a:shade val="15000"/>
-            </a:schemeClr>
-          </a:lnRef>
-          <a:fillRef idx="1">
-            <a:schemeClr val="accent1"/>
-          </a:fillRef>
-          <a:effectRef idx="0">
-            <a:schemeClr val="accent1"/>
-          </a:effectRef>
-          <a:fontRef idx="minor">
-            <a:schemeClr val="lt1"/>
-          </a:fontRef>
-        </p:style>
-        <p:txBody>
-          <a:bodyPr rtlCol="0" anchor="ctr"/>
-          <a:lstStyle/>
-          <a:p>
-            <a:pPr algn="ctr"/>
-            <a:r>
-              <a:rPr lang="en-US" sz="700" dirty="0">
-                <a:solidFill>
-                  <a:schemeClr val="tx1"/>
-                </a:solidFill>
-              </a:rPr>
-              <a:t>x[0]</a:t>
-            </a:r>
-          </a:p>
-        </p:txBody>
-      </p:sp>
-      <p:sp>
-        <p:nvSpPr>
-          <p:cNvPr id="41" name="Rectangle 40">
-            <a:extLst>
-              <a:ext uri="{FF2B5EF4-FFF2-40B4-BE49-F238E27FC236}">
-                <a16:creationId xmlns:a16="http://schemas.microsoft.com/office/drawing/2014/main" id="{37DF5E3A-6341-2497-2EE3-B4B92A55FED8}"/>
-              </a:ext>
-            </a:extLst>
-          </p:cNvPr>
-          <p:cNvSpPr/>
-          <p:nvPr/>
-        </p:nvSpPr>
-        <p:spPr>
-          <a:xfrm>
-            <a:off x="4927544" y="684788"/>
-            <a:ext cx="322151" cy="272753"/>
-          </a:xfrm>
-          <a:prstGeom prst="rect">
-            <a:avLst/>
-          </a:prstGeom>
-          <a:solidFill>
-            <a:srgbClr val="FDF8EE"/>
-          </a:solidFill>
-          <a:ln>
-            <a:solidFill>
-              <a:srgbClr val="EFC57B"/>
-            </a:solidFill>
-          </a:ln>
-        </p:spPr>
-        <p:style>
-          <a:lnRef idx="2">
-            <a:schemeClr val="accent1">
-              <a:shade val="15000"/>
-            </a:schemeClr>
-          </a:lnRef>
-          <a:fillRef idx="1">
-            <a:schemeClr val="accent1"/>
-          </a:fillRef>
-          <a:effectRef idx="0">
-            <a:schemeClr val="accent1"/>
-          </a:effectRef>
-          <a:fontRef idx="minor">
-            <a:schemeClr val="lt1"/>
-          </a:fontRef>
-        </p:style>
-        <p:txBody>
-          <a:bodyPr rtlCol="0" anchor="ctr"/>
-          <a:lstStyle/>
-          <a:p>
-            <a:pPr algn="ctr"/>
-            <a:r>
-              <a:rPr lang="en-US" sz="700" dirty="0">
-                <a:solidFill>
-                  <a:schemeClr val="tx1"/>
-                </a:solidFill>
-              </a:rPr>
-              <a:t>y[0]</a:t>
-            </a:r>
-          </a:p>
-        </p:txBody>
-      </p:sp>
-      <p:sp>
-        <p:nvSpPr>
-          <p:cNvPr id="39" name="Rectangle 38">
-            <a:extLst>
-              <a:ext uri="{FF2B5EF4-FFF2-40B4-BE49-F238E27FC236}">
-                <a16:creationId xmlns:a16="http://schemas.microsoft.com/office/drawing/2014/main" id="{A111B3C1-D11C-EDDB-D6F6-0AF39CE8531F}"/>
-              </a:ext>
-            </a:extLst>
-          </p:cNvPr>
-          <p:cNvSpPr/>
-          <p:nvPr/>
-        </p:nvSpPr>
-        <p:spPr>
-          <a:xfrm>
-            <a:off x="3961093" y="684614"/>
-            <a:ext cx="322151" cy="272753"/>
-          </a:xfrm>
-          <a:prstGeom prst="rect">
-            <a:avLst/>
-          </a:prstGeom>
-          <a:pattFill prst="wdUpDiag">
-            <a:fgClr>
-              <a:srgbClr val="360084"/>
-            </a:fgClr>
-            <a:bgClr>
-              <a:schemeClr val="bg1"/>
-            </a:bgClr>
-          </a:pattFill>
-          <a:ln>
-            <a:solidFill>
-              <a:srgbClr val="360084"/>
-            </a:solidFill>
-          </a:ln>
-        </p:spPr>
-        <p:style>
-          <a:lnRef idx="2">
-            <a:schemeClr val="accent1">
-              <a:shade val="15000"/>
-            </a:schemeClr>
-          </a:lnRef>
-          <a:fillRef idx="1">
-            <a:schemeClr val="accent1"/>
-          </a:fillRef>
-          <a:effectRef idx="0">
-            <a:schemeClr val="accent1"/>
-          </a:effectRef>
-          <a:fontRef idx="minor">
-            <a:schemeClr val="lt1"/>
-          </a:fontRef>
-        </p:style>
-        <p:txBody>
-          <a:bodyPr rtlCol="0" anchor="ctr"/>
-          <a:lstStyle/>
-          <a:p>
-            <a:pPr algn="ctr"/>
-            <a:endParaRPr lang="en-US" sz="800" dirty="0">
-              <a:solidFill>
-                <a:schemeClr val="tx1"/>
-              </a:solidFill>
-            </a:endParaRPr>
+              <a:t>x[3]</a:t>
+            </a:r>
           </a:p>
         </p:txBody>
       </p:sp>

</xml_diff>

<commit_message>
Deploying to gh-pages from @ Southampton-RSG-Training/dirac-intro-to-mpi@e150e6199c1a514d14162a1c8805559cf89bdd9e 🚀
</commit_message>
<xml_diff>
--- a/files/communication_diagram.pptx
+++ b/files/communication_diagram.pptx
@@ -200,7 +200,7 @@
           <a:p>
             <a:fld id="{1DA394A1-87FE-BC40-B428-C4F79D5812EE}" type="datetimeFigureOut">
               <a:rPr lang="en-US" smtClean="0"/>
-              <a:t>5/19/23</a:t>
+              <a:t>5/30/23</a:t>
             </a:fld>
             <a:endParaRPr lang="en-US"/>
           </a:p>
@@ -785,7 +785,7 @@
           <a:p>
             <a:fld id="{5BD1349E-D158-4E40-990A-05F7F3787A3C}" type="datetimeFigureOut">
               <a:rPr lang="en-US" smtClean="0"/>
-              <a:t>5/19/23</a:t>
+              <a:t>5/30/23</a:t>
             </a:fld>
             <a:endParaRPr lang="en-US"/>
           </a:p>
@@ -985,7 +985,7 @@
           <a:p>
             <a:fld id="{5BD1349E-D158-4E40-990A-05F7F3787A3C}" type="datetimeFigureOut">
               <a:rPr lang="en-US" smtClean="0"/>
-              <a:t>5/19/23</a:t>
+              <a:t>5/30/23</a:t>
             </a:fld>
             <a:endParaRPr lang="en-US"/>
           </a:p>
@@ -1195,7 +1195,7 @@
           <a:p>
             <a:fld id="{5BD1349E-D158-4E40-990A-05F7F3787A3C}" type="datetimeFigureOut">
               <a:rPr lang="en-US" smtClean="0"/>
-              <a:t>5/19/23</a:t>
+              <a:t>5/30/23</a:t>
             </a:fld>
             <a:endParaRPr lang="en-US"/>
           </a:p>
@@ -1395,7 +1395,7 @@
           <a:p>
             <a:fld id="{5BD1349E-D158-4E40-990A-05F7F3787A3C}" type="datetimeFigureOut">
               <a:rPr lang="en-US" smtClean="0"/>
-              <a:t>5/19/23</a:t>
+              <a:t>5/30/23</a:t>
             </a:fld>
             <a:endParaRPr lang="en-US"/>
           </a:p>
@@ -1671,7 +1671,7 @@
           <a:p>
             <a:fld id="{5BD1349E-D158-4E40-990A-05F7F3787A3C}" type="datetimeFigureOut">
               <a:rPr lang="en-US" smtClean="0"/>
-              <a:t>5/19/23</a:t>
+              <a:t>5/30/23</a:t>
             </a:fld>
             <a:endParaRPr lang="en-US"/>
           </a:p>
@@ -1939,7 +1939,7 @@
           <a:p>
             <a:fld id="{5BD1349E-D158-4E40-990A-05F7F3787A3C}" type="datetimeFigureOut">
               <a:rPr lang="en-US" smtClean="0"/>
-              <a:t>5/19/23</a:t>
+              <a:t>5/30/23</a:t>
             </a:fld>
             <a:endParaRPr lang="en-US"/>
           </a:p>
@@ -2354,7 +2354,7 @@
           <a:p>
             <a:fld id="{5BD1349E-D158-4E40-990A-05F7F3787A3C}" type="datetimeFigureOut">
               <a:rPr lang="en-US" smtClean="0"/>
-              <a:t>5/19/23</a:t>
+              <a:t>5/30/23</a:t>
             </a:fld>
             <a:endParaRPr lang="en-US"/>
           </a:p>
@@ -2496,7 +2496,7 @@
           <a:p>
             <a:fld id="{5BD1349E-D158-4E40-990A-05F7F3787A3C}" type="datetimeFigureOut">
               <a:rPr lang="en-US" smtClean="0"/>
-              <a:t>5/19/23</a:t>
+              <a:t>5/30/23</a:t>
             </a:fld>
             <a:endParaRPr lang="en-US"/>
           </a:p>
@@ -2609,7 +2609,7 @@
           <a:p>
             <a:fld id="{5BD1349E-D158-4E40-990A-05F7F3787A3C}" type="datetimeFigureOut">
               <a:rPr lang="en-US" smtClean="0"/>
-              <a:t>5/19/23</a:t>
+              <a:t>5/30/23</a:t>
             </a:fld>
             <a:endParaRPr lang="en-US"/>
           </a:p>
@@ -2922,7 +2922,7 @@
           <a:p>
             <a:fld id="{5BD1349E-D158-4E40-990A-05F7F3787A3C}" type="datetimeFigureOut">
               <a:rPr lang="en-US" smtClean="0"/>
-              <a:t>5/19/23</a:t>
+              <a:t>5/30/23</a:t>
             </a:fld>
             <a:endParaRPr lang="en-US"/>
           </a:p>
@@ -3211,7 +3211,7 @@
           <a:p>
             <a:fld id="{5BD1349E-D158-4E40-990A-05F7F3787A3C}" type="datetimeFigureOut">
               <a:rPr lang="en-US" smtClean="0"/>
-              <a:t>5/19/23</a:t>
+              <a:t>5/30/23</a:t>
             </a:fld>
             <a:endParaRPr lang="en-US"/>
           </a:p>
@@ -3454,7 +3454,7 @@
           <a:p>
             <a:fld id="{5BD1349E-D158-4E40-990A-05F7F3787A3C}" type="datetimeFigureOut">
               <a:rPr lang="en-US" smtClean="0"/>
-              <a:t>5/19/23</a:t>
+              <a:t>5/30/23</a:t>
             </a:fld>
             <a:endParaRPr lang="en-US"/>
           </a:p>
@@ -19024,14 +19024,14 @@
           <p:cNvCxnSpPr>
             <a:cxnSpLocks/>
             <a:stCxn id="24" idx="3"/>
-            <a:endCxn id="18" idx="1"/>
+            <a:endCxn id="17" idx="1"/>
           </p:cNvCxnSpPr>
           <p:nvPr/>
         </p:nvCxnSpPr>
         <p:spPr>
           <a:xfrm>
-            <a:off x="7264477" y="1389050"/>
-            <a:ext cx="534740" cy="33"/>
+            <a:off x="8151744" y="1256074"/>
+            <a:ext cx="513508" cy="601"/>
           </a:xfrm>
           <a:prstGeom prst="straightConnector1">
             <a:avLst/>
@@ -19072,7 +19072,7 @@
         </p:nvSpPr>
         <p:spPr>
           <a:xfrm>
-            <a:off x="2730831" y="1016665"/>
+            <a:off x="2781735" y="1113347"/>
             <a:ext cx="745014" cy="272753"/>
           </a:xfrm>
           <a:prstGeom prst="rect">
@@ -19130,7 +19130,7 @@
         </p:nvSpPr>
         <p:spPr>
           <a:xfrm>
-            <a:off x="2730831" y="1294053"/>
+            <a:off x="2781735" y="1929546"/>
             <a:ext cx="745014" cy="272753"/>
           </a:xfrm>
           <a:prstGeom prst="rect">
@@ -19191,7 +19191,7 @@
         </p:nvSpPr>
         <p:spPr>
           <a:xfrm>
-            <a:off x="2730831" y="1567407"/>
+            <a:off x="2781735" y="2202900"/>
             <a:ext cx="745014" cy="272753"/>
           </a:xfrm>
           <a:prstGeom prst="rect">
@@ -19252,7 +19252,7 @@
         </p:nvSpPr>
         <p:spPr>
           <a:xfrm>
-            <a:off x="2730831" y="1834771"/>
+            <a:off x="2781735" y="2470264"/>
             <a:ext cx="745014" cy="272753"/>
           </a:xfrm>
           <a:prstGeom prst="rect">
@@ -19313,7 +19313,7 @@
         </p:nvSpPr>
         <p:spPr>
           <a:xfrm>
-            <a:off x="2730831" y="2107524"/>
+            <a:off x="2781735" y="2743017"/>
             <a:ext cx="745014" cy="272753"/>
           </a:xfrm>
           <a:prstGeom prst="rect">
@@ -19374,7 +19374,7 @@
         </p:nvSpPr>
         <p:spPr>
           <a:xfrm>
-            <a:off x="2730831" y="2374888"/>
+            <a:off x="2781735" y="3010381"/>
             <a:ext cx="745014" cy="272753"/>
           </a:xfrm>
           <a:prstGeom prst="rect">
@@ -19435,7 +19435,7 @@
         </p:nvSpPr>
         <p:spPr>
           <a:xfrm>
-            <a:off x="2730831" y="469717"/>
+            <a:off x="2781735" y="846944"/>
             <a:ext cx="745014" cy="272753"/>
           </a:xfrm>
           <a:prstGeom prst="rect">
@@ -19493,7 +19493,7 @@
         </p:nvSpPr>
         <p:spPr>
           <a:xfrm>
-            <a:off x="238679" y="195462"/>
+            <a:off x="289583" y="572689"/>
             <a:ext cx="1838183" cy="2733417"/>
           </a:xfrm>
           <a:prstGeom prst="rect">
@@ -19692,67 +19692,6 @@
       </p:sp>
       <p:sp>
         <p:nvSpPr>
-          <p:cNvPr id="162" name="Rectangle 161">
-            <a:extLst>
-              <a:ext uri="{FF2B5EF4-FFF2-40B4-BE49-F238E27FC236}">
-                <a16:creationId xmlns:a16="http://schemas.microsoft.com/office/drawing/2014/main" id="{9CB46FAE-109A-2965-2352-390E8D3B94DC}"/>
-              </a:ext>
-            </a:extLst>
-          </p:cNvPr>
-          <p:cNvSpPr/>
-          <p:nvPr/>
-        </p:nvSpPr>
-        <p:spPr>
-          <a:xfrm>
-            <a:off x="2730831" y="742951"/>
-            <a:ext cx="745014" cy="272753"/>
-          </a:xfrm>
-          <a:prstGeom prst="rect">
-            <a:avLst/>
-          </a:prstGeom>
-          <a:solidFill>
-            <a:srgbClr val="FDF8EE"/>
-          </a:solidFill>
-          <a:ln>
-            <a:solidFill>
-              <a:srgbClr val="EFC57B"/>
-            </a:solidFill>
-          </a:ln>
-        </p:spPr>
-        <p:style>
-          <a:lnRef idx="2">
-            <a:schemeClr val="accent1">
-              <a:shade val="15000"/>
-            </a:schemeClr>
-          </a:lnRef>
-          <a:fillRef idx="1">
-            <a:schemeClr val="accent1"/>
-          </a:fillRef>
-          <a:effectRef idx="0">
-            <a:schemeClr val="accent1"/>
-          </a:effectRef>
-          <a:fontRef idx="minor">
-            <a:schemeClr val="lt1"/>
-          </a:fontRef>
-        </p:style>
-        <p:txBody>
-          <a:bodyPr rtlCol="0" anchor="ctr"/>
-          <a:lstStyle/>
-          <a:p>
-            <a:pPr algn="ctr"/>
-            <a:r>
-              <a:rPr lang="en-US" sz="800" dirty="0">
-                <a:solidFill>
-                  <a:schemeClr val="tx1"/>
-                </a:solidFill>
-              </a:rPr>
-              <a:t>value</a:t>
-            </a:r>
-          </a:p>
-        </p:txBody>
-      </p:sp>
-      <p:sp>
-        <p:nvSpPr>
           <p:cNvPr id="180" name="Rectangle 179">
             <a:extLst>
               <a:ext uri="{FF2B5EF4-FFF2-40B4-BE49-F238E27FC236}">
@@ -19765,7 +19704,7 @@
         </p:nvSpPr>
         <p:spPr>
           <a:xfrm>
-            <a:off x="2730831" y="196003"/>
+            <a:off x="2781735" y="573230"/>
             <a:ext cx="745014" cy="272753"/>
           </a:xfrm>
           <a:prstGeom prst="rect">
@@ -19829,7 +19768,7 @@
         </p:nvCxnSpPr>
         <p:spPr>
           <a:xfrm flipV="1">
-            <a:off x="2002280" y="332380"/>
+            <a:off x="2053184" y="709607"/>
             <a:ext cx="728551" cy="957038"/>
           </a:xfrm>
           <a:prstGeom prst="straightConnector1">
@@ -19874,8 +19813,8 @@
         </p:nvCxnSpPr>
         <p:spPr>
           <a:xfrm flipV="1">
-            <a:off x="2002280" y="879328"/>
-            <a:ext cx="728551" cy="682842"/>
+            <a:off x="2053184" y="1522476"/>
+            <a:ext cx="728551" cy="425449"/>
           </a:xfrm>
           <a:prstGeom prst="straightConnector1">
             <a:avLst/>
@@ -19919,8 +19858,8 @@
         </p:nvCxnSpPr>
         <p:spPr>
           <a:xfrm>
-            <a:off x="2002280" y="1848086"/>
-            <a:ext cx="728551" cy="123062"/>
+            <a:off x="2090475" y="2218618"/>
+            <a:ext cx="691260" cy="388023"/>
           </a:xfrm>
           <a:prstGeom prst="straightConnector1">
             <a:avLst/>
@@ -19961,7 +19900,7 @@
         </p:nvSpPr>
         <p:spPr>
           <a:xfrm>
-            <a:off x="7799217" y="711988"/>
+            <a:off x="8665252" y="846944"/>
             <a:ext cx="745014" cy="272753"/>
           </a:xfrm>
           <a:prstGeom prst="rect">
@@ -20022,7 +19961,7 @@
         </p:nvSpPr>
         <p:spPr>
           <a:xfrm>
-            <a:off x="7799217" y="985342"/>
+            <a:off x="8665252" y="1120298"/>
             <a:ext cx="745014" cy="272753"/>
           </a:xfrm>
           <a:prstGeom prst="rect">
@@ -20083,7 +20022,7 @@
         </p:nvSpPr>
         <p:spPr>
           <a:xfrm>
-            <a:off x="7799217" y="1252706"/>
+            <a:off x="8665252" y="1387662"/>
             <a:ext cx="745014" cy="272753"/>
           </a:xfrm>
           <a:prstGeom prst="rect">
@@ -20132,128 +20071,6 @@
       </p:sp>
       <p:sp>
         <p:nvSpPr>
-          <p:cNvPr id="19" name="Rectangle 18">
-            <a:extLst>
-              <a:ext uri="{FF2B5EF4-FFF2-40B4-BE49-F238E27FC236}">
-                <a16:creationId xmlns:a16="http://schemas.microsoft.com/office/drawing/2014/main" id="{7A04AFA7-31A2-B0E4-3D25-B53EBC790A01}"/>
-              </a:ext>
-            </a:extLst>
-          </p:cNvPr>
-          <p:cNvSpPr/>
-          <p:nvPr/>
-        </p:nvSpPr>
-        <p:spPr>
-          <a:xfrm>
-            <a:off x="7799217" y="1525459"/>
-            <a:ext cx="745014" cy="272753"/>
-          </a:xfrm>
-          <a:prstGeom prst="rect">
-            <a:avLst/>
-          </a:prstGeom>
-          <a:solidFill>
-            <a:srgbClr val="F0FDF2"/>
-          </a:solidFill>
-          <a:ln>
-            <a:solidFill>
-              <a:srgbClr val="82E995"/>
-            </a:solidFill>
-          </a:ln>
-        </p:spPr>
-        <p:style>
-          <a:lnRef idx="2">
-            <a:schemeClr val="accent1">
-              <a:shade val="15000"/>
-            </a:schemeClr>
-          </a:lnRef>
-          <a:fillRef idx="1">
-            <a:schemeClr val="accent1"/>
-          </a:fillRef>
-          <a:effectRef idx="0">
-            <a:schemeClr val="accent1"/>
-          </a:effectRef>
-          <a:fontRef idx="minor">
-            <a:schemeClr val="lt1"/>
-          </a:fontRef>
-        </p:style>
-        <p:txBody>
-          <a:bodyPr rtlCol="0" anchor="ctr"/>
-          <a:lstStyle/>
-          <a:p>
-            <a:pPr algn="ctr"/>
-            <a:r>
-              <a:rPr lang="en-US" sz="800" dirty="0">
-                <a:solidFill>
-                  <a:schemeClr val="tx1"/>
-                </a:solidFill>
-              </a:rPr>
-              <a:t>position[3]</a:t>
-            </a:r>
-          </a:p>
-        </p:txBody>
-      </p:sp>
-      <p:sp>
-        <p:nvSpPr>
-          <p:cNvPr id="20" name="Rectangle 19">
-            <a:extLst>
-              <a:ext uri="{FF2B5EF4-FFF2-40B4-BE49-F238E27FC236}">
-                <a16:creationId xmlns:a16="http://schemas.microsoft.com/office/drawing/2014/main" id="{63EBBC81-8262-65C1-5418-7ED4106FF530}"/>
-              </a:ext>
-            </a:extLst>
-          </p:cNvPr>
-          <p:cNvSpPr/>
-          <p:nvPr/>
-        </p:nvSpPr>
-        <p:spPr>
-          <a:xfrm>
-            <a:off x="7799217" y="1792823"/>
-            <a:ext cx="745014" cy="272753"/>
-          </a:xfrm>
-          <a:prstGeom prst="rect">
-            <a:avLst/>
-          </a:prstGeom>
-          <a:solidFill>
-            <a:srgbClr val="F0FDF2"/>
-          </a:solidFill>
-          <a:ln>
-            <a:solidFill>
-              <a:srgbClr val="82E995"/>
-            </a:solidFill>
-          </a:ln>
-        </p:spPr>
-        <p:style>
-          <a:lnRef idx="2">
-            <a:schemeClr val="accent1">
-              <a:shade val="15000"/>
-            </a:schemeClr>
-          </a:lnRef>
-          <a:fillRef idx="1">
-            <a:schemeClr val="accent1"/>
-          </a:fillRef>
-          <a:effectRef idx="0">
-            <a:schemeClr val="accent1"/>
-          </a:effectRef>
-          <a:fontRef idx="minor">
-            <a:schemeClr val="lt1"/>
-          </a:fontRef>
-        </p:style>
-        <p:txBody>
-          <a:bodyPr rtlCol="0" anchor="ctr"/>
-          <a:lstStyle/>
-          <a:p>
-            <a:pPr algn="ctr"/>
-            <a:r>
-              <a:rPr lang="en-US" sz="800" dirty="0">
-                <a:solidFill>
-                  <a:schemeClr val="tx1"/>
-                </a:solidFill>
-              </a:rPr>
-              <a:t>position[4]</a:t>
-            </a:r>
-          </a:p>
-        </p:txBody>
-      </p:sp>
-      <p:sp>
-        <p:nvSpPr>
           <p:cNvPr id="21" name="Rectangle 20">
             <a:extLst>
               <a:ext uri="{FF2B5EF4-FFF2-40B4-BE49-F238E27FC236}">
@@ -20266,7 +20083,7 @@
         </p:nvSpPr>
         <p:spPr>
           <a:xfrm>
-            <a:off x="6519463" y="1526387"/>
+            <a:off x="7406730" y="1393411"/>
             <a:ext cx="745014" cy="272753"/>
           </a:xfrm>
           <a:prstGeom prst="rect">
@@ -20324,7 +20141,7 @@
         </p:nvSpPr>
         <p:spPr>
           <a:xfrm>
-            <a:off x="4097047" y="1012304"/>
+            <a:off x="4984314" y="879328"/>
             <a:ext cx="2054492" cy="1225937"/>
           </a:xfrm>
           <a:prstGeom prst="rect">
@@ -20481,7 +20298,7 @@
         </p:nvSpPr>
         <p:spPr>
           <a:xfrm>
-            <a:off x="6519463" y="1799621"/>
+            <a:off x="7406730" y="1666645"/>
             <a:ext cx="745014" cy="272753"/>
           </a:xfrm>
           <a:prstGeom prst="rect">
@@ -20518,13 +20335,18 @@
           <a:p>
             <a:pPr algn="ctr"/>
             <a:r>
-              <a:rPr lang="en-US" sz="800" dirty="0">
-                <a:solidFill>
-                  <a:schemeClr val="tx1"/>
-                </a:solidFill>
-              </a:rPr>
-              <a:t>5</a:t>
-            </a:r>
+              <a:rPr lang="en-US" sz="800" dirty="0" err="1">
+                <a:solidFill>
+                  <a:schemeClr val="tx1"/>
+                </a:solidFill>
+              </a:rPr>
+              <a:t>num_cells</a:t>
+            </a:r>
+            <a:endParaRPr lang="en-US" sz="800" dirty="0">
+              <a:solidFill>
+                <a:schemeClr val="tx1"/>
+              </a:solidFill>
+            </a:endParaRPr>
           </a:p>
         </p:txBody>
       </p:sp>
@@ -20542,7 +20364,7 @@
         </p:nvSpPr>
         <p:spPr>
           <a:xfrm>
-            <a:off x="6519463" y="1252673"/>
+            <a:off x="7406730" y="1119697"/>
             <a:ext cx="745014" cy="272753"/>
           </a:xfrm>
           <a:prstGeom prst="rect">
@@ -20605,7 +20427,7 @@
         </p:nvCxnSpPr>
         <p:spPr>
           <a:xfrm flipV="1">
-            <a:off x="6096000" y="1389050"/>
+            <a:off x="6983267" y="1256074"/>
             <a:ext cx="423463" cy="106667"/>
           </a:xfrm>
           <a:prstGeom prst="straightConnector1">
@@ -20650,7 +20472,7 @@
         </p:nvCxnSpPr>
         <p:spPr>
           <a:xfrm>
-            <a:off x="6096000" y="1823301"/>
+            <a:off x="6983267" y="1690325"/>
             <a:ext cx="423463" cy="112697"/>
           </a:xfrm>
           <a:prstGeom prst="straightConnector1">
@@ -20678,6 +20500,125 @@
           </a:fontRef>
         </p:style>
       </p:cxnSp>
+      <p:sp>
+        <p:nvSpPr>
+          <p:cNvPr id="7" name="Rectangle 6">
+            <a:extLst>
+              <a:ext uri="{FF2B5EF4-FFF2-40B4-BE49-F238E27FC236}">
+                <a16:creationId xmlns:a16="http://schemas.microsoft.com/office/drawing/2014/main" id="{868112EA-37A7-4581-AFD9-E6D749F1EE06}"/>
+              </a:ext>
+            </a:extLst>
+          </p:cNvPr>
+          <p:cNvSpPr/>
+          <p:nvPr/>
+        </p:nvSpPr>
+        <p:spPr>
+          <a:xfrm>
+            <a:off x="2782660" y="1656793"/>
+            <a:ext cx="745014" cy="272753"/>
+          </a:xfrm>
+          <a:prstGeom prst="rect">
+            <a:avLst/>
+          </a:prstGeom>
+          <a:solidFill>
+            <a:srgbClr val="FAFDF0"/>
+          </a:solidFill>
+          <a:ln>
+            <a:solidFill>
+              <a:srgbClr val="DDF08B"/>
+            </a:solidFill>
+          </a:ln>
+        </p:spPr>
+        <p:style>
+          <a:lnRef idx="2">
+            <a:schemeClr val="accent1">
+              <a:shade val="15000"/>
+            </a:schemeClr>
+          </a:lnRef>
+          <a:fillRef idx="1">
+            <a:schemeClr val="accent1"/>
+          </a:fillRef>
+          <a:effectRef idx="0">
+            <a:schemeClr val="accent1"/>
+          </a:effectRef>
+          <a:fontRef idx="minor">
+            <a:schemeClr val="lt1"/>
+          </a:fontRef>
+        </p:style>
+        <p:txBody>
+          <a:bodyPr rtlCol="0" anchor="ctr"/>
+          <a:lstStyle/>
+          <a:p>
+            <a:pPr algn="ctr"/>
+            <a:endParaRPr lang="en-US" sz="800" dirty="0">
+              <a:solidFill>
+                <a:schemeClr val="tx1"/>
+              </a:solidFill>
+            </a:endParaRPr>
+          </a:p>
+        </p:txBody>
+      </p:sp>
+      <p:sp>
+        <p:nvSpPr>
+          <p:cNvPr id="162" name="Rectangle 161">
+            <a:extLst>
+              <a:ext uri="{FF2B5EF4-FFF2-40B4-BE49-F238E27FC236}">
+                <a16:creationId xmlns:a16="http://schemas.microsoft.com/office/drawing/2014/main" id="{9CB46FAE-109A-2965-2352-390E8D3B94DC}"/>
+              </a:ext>
+            </a:extLst>
+          </p:cNvPr>
+          <p:cNvSpPr/>
+          <p:nvPr/>
+        </p:nvSpPr>
+        <p:spPr>
+          <a:xfrm>
+            <a:off x="2781735" y="1386099"/>
+            <a:ext cx="745014" cy="272753"/>
+          </a:xfrm>
+          <a:prstGeom prst="rect">
+            <a:avLst/>
+          </a:prstGeom>
+          <a:solidFill>
+            <a:srgbClr val="FDF8EE"/>
+          </a:solidFill>
+          <a:ln>
+            <a:solidFill>
+              <a:srgbClr val="EFC57B"/>
+            </a:solidFill>
+          </a:ln>
+        </p:spPr>
+        <p:style>
+          <a:lnRef idx="2">
+            <a:schemeClr val="accent1">
+              <a:shade val="15000"/>
+            </a:schemeClr>
+          </a:lnRef>
+          <a:fillRef idx="1">
+            <a:schemeClr val="accent1"/>
+          </a:fillRef>
+          <a:effectRef idx="0">
+            <a:schemeClr val="accent1"/>
+          </a:effectRef>
+          <a:fontRef idx="minor">
+            <a:schemeClr val="lt1"/>
+          </a:fontRef>
+        </p:style>
+        <p:txBody>
+          <a:bodyPr rtlCol="0" anchor="ctr"/>
+          <a:lstStyle/>
+          <a:p>
+            <a:pPr algn="ctr"/>
+            <a:r>
+              <a:rPr lang="en-US" sz="800" dirty="0">
+                <a:solidFill>
+                  <a:schemeClr val="tx1"/>
+                </a:solidFill>
+              </a:rPr>
+              <a:t>value</a:t>
+            </a:r>
+          </a:p>
+        </p:txBody>
+      </p:sp>
     </p:spTree>
     <p:extLst>
       <p:ext uri="{BB962C8B-B14F-4D97-AF65-F5344CB8AC3E}">
@@ -20758,6 +20699,189 @@
           <a:lstStyle/>
           <a:p>
             <a:pPr algn="ctr"/>
+            <a:r>
+              <a:rPr lang="en-US" sz="700" dirty="0">
+                <a:solidFill>
+                  <a:schemeClr val="tx1"/>
+                </a:solidFill>
+              </a:rPr>
+              <a:t>x[0]</a:t>
+            </a:r>
+          </a:p>
+        </p:txBody>
+      </p:sp>
+      <p:sp>
+        <p:nvSpPr>
+          <p:cNvPr id="21" name="Rectangle 20">
+            <a:extLst>
+              <a:ext uri="{FF2B5EF4-FFF2-40B4-BE49-F238E27FC236}">
+                <a16:creationId xmlns:a16="http://schemas.microsoft.com/office/drawing/2014/main" id="{5507BB2A-B3C9-45B1-BBDD-FDCE1754D73A}"/>
+              </a:ext>
+            </a:extLst>
+          </p:cNvPr>
+          <p:cNvSpPr/>
+          <p:nvPr/>
+        </p:nvSpPr>
+        <p:spPr>
+          <a:xfrm>
+            <a:off x="2189263" y="253612"/>
+            <a:ext cx="322151" cy="272753"/>
+          </a:xfrm>
+          <a:prstGeom prst="rect">
+            <a:avLst/>
+          </a:prstGeom>
+          <a:solidFill>
+            <a:srgbClr val="F2EFF6"/>
+          </a:solidFill>
+          <a:ln>
+            <a:solidFill>
+              <a:srgbClr val="360084"/>
+            </a:solidFill>
+          </a:ln>
+        </p:spPr>
+        <p:style>
+          <a:lnRef idx="2">
+            <a:schemeClr val="accent1">
+              <a:shade val="15000"/>
+            </a:schemeClr>
+          </a:lnRef>
+          <a:fillRef idx="1">
+            <a:schemeClr val="accent1"/>
+          </a:fillRef>
+          <a:effectRef idx="0">
+            <a:schemeClr val="accent1"/>
+          </a:effectRef>
+          <a:fontRef idx="minor">
+            <a:schemeClr val="lt1"/>
+          </a:fontRef>
+        </p:style>
+        <p:txBody>
+          <a:bodyPr rtlCol="0" anchor="ctr"/>
+          <a:lstStyle/>
+          <a:p>
+            <a:pPr algn="ctr"/>
+            <a:r>
+              <a:rPr lang="en-US" sz="700" dirty="0">
+                <a:solidFill>
+                  <a:schemeClr val="tx1"/>
+                </a:solidFill>
+              </a:rPr>
+              <a:t>x[1]</a:t>
+            </a:r>
+          </a:p>
+        </p:txBody>
+      </p:sp>
+      <p:sp>
+        <p:nvSpPr>
+          <p:cNvPr id="22" name="Rectangle 21">
+            <a:extLst>
+              <a:ext uri="{FF2B5EF4-FFF2-40B4-BE49-F238E27FC236}">
+                <a16:creationId xmlns:a16="http://schemas.microsoft.com/office/drawing/2014/main" id="{92A1B641-6BD3-908F-C36B-91F22CB5B6E9}"/>
+              </a:ext>
+            </a:extLst>
+          </p:cNvPr>
+          <p:cNvSpPr/>
+          <p:nvPr/>
+        </p:nvSpPr>
+        <p:spPr>
+          <a:xfrm>
+            <a:off x="2511414" y="253611"/>
+            <a:ext cx="322151" cy="272753"/>
+          </a:xfrm>
+          <a:prstGeom prst="rect">
+            <a:avLst/>
+          </a:prstGeom>
+          <a:solidFill>
+            <a:srgbClr val="F2EFF6"/>
+          </a:solidFill>
+          <a:ln>
+            <a:solidFill>
+              <a:srgbClr val="360084"/>
+            </a:solidFill>
+          </a:ln>
+        </p:spPr>
+        <p:style>
+          <a:lnRef idx="2">
+            <a:schemeClr val="accent1">
+              <a:shade val="15000"/>
+            </a:schemeClr>
+          </a:lnRef>
+          <a:fillRef idx="1">
+            <a:schemeClr val="accent1"/>
+          </a:fillRef>
+          <a:effectRef idx="0">
+            <a:schemeClr val="accent1"/>
+          </a:effectRef>
+          <a:fontRef idx="minor">
+            <a:schemeClr val="lt1"/>
+          </a:fontRef>
+        </p:style>
+        <p:txBody>
+          <a:bodyPr rtlCol="0" anchor="ctr"/>
+          <a:lstStyle/>
+          <a:p>
+            <a:pPr algn="ctr"/>
+            <a:r>
+              <a:rPr lang="en-US" sz="700" dirty="0">
+                <a:solidFill>
+                  <a:schemeClr val="tx1"/>
+                </a:solidFill>
+              </a:rPr>
+              <a:t>x[2]</a:t>
+            </a:r>
+          </a:p>
+        </p:txBody>
+      </p:sp>
+      <p:sp>
+        <p:nvSpPr>
+          <p:cNvPr id="24" name="Rectangle 23">
+            <a:extLst>
+              <a:ext uri="{FF2B5EF4-FFF2-40B4-BE49-F238E27FC236}">
+                <a16:creationId xmlns:a16="http://schemas.microsoft.com/office/drawing/2014/main" id="{1AE8C708-30F2-C7FD-7833-3E0A4A89DA7C}"/>
+              </a:ext>
+            </a:extLst>
+          </p:cNvPr>
+          <p:cNvSpPr/>
+          <p:nvPr/>
+        </p:nvSpPr>
+        <p:spPr>
+          <a:xfrm>
+            <a:off x="6699375" y="253605"/>
+            <a:ext cx="322151" cy="272753"/>
+          </a:xfrm>
+          <a:prstGeom prst="rect">
+            <a:avLst/>
+          </a:prstGeom>
+          <a:solidFill>
+            <a:srgbClr val="FAFDF0"/>
+          </a:solidFill>
+          <a:ln>
+            <a:solidFill>
+              <a:srgbClr val="DDF08B"/>
+            </a:solidFill>
+          </a:ln>
+        </p:spPr>
+        <p:style>
+          <a:lnRef idx="2">
+            <a:schemeClr val="accent1">
+              <a:shade val="15000"/>
+            </a:schemeClr>
+          </a:lnRef>
+          <a:fillRef idx="1">
+            <a:schemeClr val="accent1"/>
+          </a:fillRef>
+          <a:effectRef idx="0">
+            <a:schemeClr val="accent1"/>
+          </a:effectRef>
+          <a:fontRef idx="minor">
+            <a:schemeClr val="lt1"/>
+          </a:fontRef>
+        </p:style>
+        <p:txBody>
+          <a:bodyPr rtlCol="0" anchor="ctr"/>
+          <a:lstStyle/>
+          <a:p>
+            <a:pPr algn="ctr"/>
             <a:endParaRPr lang="en-US" sz="800" dirty="0">
               <a:solidFill>
                 <a:schemeClr val="tx1"/>
@@ -20768,30 +20892,152 @@
       </p:sp>
       <p:sp>
         <p:nvSpPr>
-          <p:cNvPr id="21" name="Rectangle 20">
-            <a:extLst>
-              <a:ext uri="{FF2B5EF4-FFF2-40B4-BE49-F238E27FC236}">
-                <a16:creationId xmlns:a16="http://schemas.microsoft.com/office/drawing/2014/main" id="{5507BB2A-B3C9-45B1-BBDD-FDCE1754D73A}"/>
-              </a:ext>
-            </a:extLst>
-          </p:cNvPr>
-          <p:cNvSpPr/>
-          <p:nvPr/>
-        </p:nvSpPr>
-        <p:spPr>
-          <a:xfrm>
-            <a:off x="2189263" y="253612"/>
-            <a:ext cx="322151" cy="272753"/>
-          </a:xfrm>
-          <a:prstGeom prst="rect">
-            <a:avLst/>
-          </a:prstGeom>
-          <a:solidFill>
-            <a:srgbClr val="F2EFF6"/>
-          </a:solidFill>
-          <a:ln>
-            <a:solidFill>
-              <a:srgbClr val="360084"/>
+          <p:cNvPr id="25" name="Rectangle 24">
+            <a:extLst>
+              <a:ext uri="{FF2B5EF4-FFF2-40B4-BE49-F238E27FC236}">
+                <a16:creationId xmlns:a16="http://schemas.microsoft.com/office/drawing/2014/main" id="{B0BA7E38-442F-9767-1AD7-774A17E47ED6}"/>
+              </a:ext>
+            </a:extLst>
+          </p:cNvPr>
+          <p:cNvSpPr/>
+          <p:nvPr/>
+        </p:nvSpPr>
+        <p:spPr>
+          <a:xfrm>
+            <a:off x="4766470" y="253608"/>
+            <a:ext cx="322151" cy="272753"/>
+          </a:xfrm>
+          <a:prstGeom prst="rect">
+            <a:avLst/>
+          </a:prstGeom>
+          <a:solidFill>
+            <a:srgbClr val="FDF8EE"/>
+          </a:solidFill>
+          <a:ln>
+            <a:solidFill>
+              <a:srgbClr val="EFC57B"/>
+            </a:solidFill>
+          </a:ln>
+        </p:spPr>
+        <p:style>
+          <a:lnRef idx="2">
+            <a:schemeClr val="accent1">
+              <a:shade val="15000"/>
+            </a:schemeClr>
+          </a:lnRef>
+          <a:fillRef idx="1">
+            <a:schemeClr val="accent1"/>
+          </a:fillRef>
+          <a:effectRef idx="0">
+            <a:schemeClr val="accent1"/>
+          </a:effectRef>
+          <a:fontRef idx="minor">
+            <a:schemeClr val="lt1"/>
+          </a:fontRef>
+        </p:style>
+        <p:txBody>
+          <a:bodyPr rtlCol="0" anchor="ctr"/>
+          <a:lstStyle/>
+          <a:p>
+            <a:pPr algn="ctr"/>
+            <a:r>
+              <a:rPr lang="en-US" sz="700" dirty="0">
+                <a:solidFill>
+                  <a:schemeClr val="tx1"/>
+                </a:solidFill>
+              </a:rPr>
+              <a:t>y[1]</a:t>
+            </a:r>
+          </a:p>
+        </p:txBody>
+      </p:sp>
+      <p:sp>
+        <p:nvSpPr>
+          <p:cNvPr id="26" name="Rectangle 25">
+            <a:extLst>
+              <a:ext uri="{FF2B5EF4-FFF2-40B4-BE49-F238E27FC236}">
+                <a16:creationId xmlns:a16="http://schemas.microsoft.com/office/drawing/2014/main" id="{42CE0387-79B8-1F0C-9A65-3B47CAE784FB}"/>
+              </a:ext>
+            </a:extLst>
+          </p:cNvPr>
+          <p:cNvSpPr/>
+          <p:nvPr/>
+        </p:nvSpPr>
+        <p:spPr>
+          <a:xfrm>
+            <a:off x="5088621" y="253607"/>
+            <a:ext cx="322151" cy="272753"/>
+          </a:xfrm>
+          <a:prstGeom prst="rect">
+            <a:avLst/>
+          </a:prstGeom>
+          <a:solidFill>
+            <a:srgbClr val="FDF8EE"/>
+          </a:solidFill>
+          <a:ln>
+            <a:solidFill>
+              <a:srgbClr val="EFC57B"/>
+            </a:solidFill>
+          </a:ln>
+        </p:spPr>
+        <p:style>
+          <a:lnRef idx="2">
+            <a:schemeClr val="accent1">
+              <a:shade val="15000"/>
+            </a:schemeClr>
+          </a:lnRef>
+          <a:fillRef idx="1">
+            <a:schemeClr val="accent1"/>
+          </a:fillRef>
+          <a:effectRef idx="0">
+            <a:schemeClr val="accent1"/>
+          </a:effectRef>
+          <a:fontRef idx="minor">
+            <a:schemeClr val="lt1"/>
+          </a:fontRef>
+        </p:style>
+        <p:txBody>
+          <a:bodyPr rtlCol="0" anchor="ctr"/>
+          <a:lstStyle/>
+          <a:p>
+            <a:pPr algn="ctr"/>
+            <a:r>
+              <a:rPr lang="en-US" sz="700" dirty="0">
+                <a:solidFill>
+                  <a:schemeClr val="tx1"/>
+                </a:solidFill>
+              </a:rPr>
+              <a:t>y[2]</a:t>
+            </a:r>
+          </a:p>
+        </p:txBody>
+      </p:sp>
+      <p:sp>
+        <p:nvSpPr>
+          <p:cNvPr id="27" name="Rectangle 26">
+            <a:extLst>
+              <a:ext uri="{FF2B5EF4-FFF2-40B4-BE49-F238E27FC236}">
+                <a16:creationId xmlns:a16="http://schemas.microsoft.com/office/drawing/2014/main" id="{89A93FD3-EDBB-6CBD-D89B-44FF4A1210A0}"/>
+              </a:ext>
+            </a:extLst>
+          </p:cNvPr>
+          <p:cNvSpPr/>
+          <p:nvPr/>
+        </p:nvSpPr>
+        <p:spPr>
+          <a:xfrm>
+            <a:off x="6055073" y="253606"/>
+            <a:ext cx="322151" cy="272753"/>
+          </a:xfrm>
+          <a:prstGeom prst="rect">
+            <a:avLst/>
+          </a:prstGeom>
+          <a:solidFill>
+            <a:srgbClr val="FAFDF0"/>
+          </a:solidFill>
+          <a:ln>
+            <a:solidFill>
+              <a:srgbClr val="DDF08B"/>
             </a:solidFill>
           </a:ln>
         </p:spPr>
@@ -20826,30 +21072,30 @@
       </p:sp>
       <p:sp>
         <p:nvSpPr>
-          <p:cNvPr id="22" name="Rectangle 21">
-            <a:extLst>
-              <a:ext uri="{FF2B5EF4-FFF2-40B4-BE49-F238E27FC236}">
-                <a16:creationId xmlns:a16="http://schemas.microsoft.com/office/drawing/2014/main" id="{92A1B641-6BD3-908F-C36B-91F22CB5B6E9}"/>
-              </a:ext>
-            </a:extLst>
-          </p:cNvPr>
-          <p:cNvSpPr/>
-          <p:nvPr/>
-        </p:nvSpPr>
-        <p:spPr>
-          <a:xfrm>
-            <a:off x="2511414" y="253611"/>
-            <a:ext cx="322151" cy="272753"/>
-          </a:xfrm>
-          <a:prstGeom prst="rect">
-            <a:avLst/>
-          </a:prstGeom>
-          <a:solidFill>
-            <a:srgbClr val="F2EFF6"/>
-          </a:solidFill>
-          <a:ln>
-            <a:solidFill>
-              <a:srgbClr val="360084"/>
+          <p:cNvPr id="28" name="Rectangle 27">
+            <a:extLst>
+              <a:ext uri="{FF2B5EF4-FFF2-40B4-BE49-F238E27FC236}">
+                <a16:creationId xmlns:a16="http://schemas.microsoft.com/office/drawing/2014/main" id="{BF16CA68-23F7-34E7-8B4E-3670216FE344}"/>
+              </a:ext>
+            </a:extLst>
+          </p:cNvPr>
+          <p:cNvSpPr/>
+          <p:nvPr/>
+        </p:nvSpPr>
+        <p:spPr>
+          <a:xfrm>
+            <a:off x="6377224" y="253605"/>
+            <a:ext cx="322151" cy="272753"/>
+          </a:xfrm>
+          <a:prstGeom prst="rect">
+            <a:avLst/>
+          </a:prstGeom>
+          <a:solidFill>
+            <a:srgbClr val="FAFDF0"/>
+          </a:solidFill>
+          <a:ln>
+            <a:solidFill>
+              <a:srgbClr val="DDF08B"/>
             </a:solidFill>
           </a:ln>
         </p:spPr>
@@ -20884,19 +21130,80 @@
       </p:sp>
       <p:sp>
         <p:nvSpPr>
-          <p:cNvPr id="23" name="Rectangle 22">
-            <a:extLst>
-              <a:ext uri="{FF2B5EF4-FFF2-40B4-BE49-F238E27FC236}">
-                <a16:creationId xmlns:a16="http://schemas.microsoft.com/office/drawing/2014/main" id="{8CAD7EA1-2665-3694-3031-33454E3821DA}"/>
-              </a:ext>
-            </a:extLst>
-          </p:cNvPr>
-          <p:cNvSpPr/>
-          <p:nvPr/>
-        </p:nvSpPr>
-        <p:spPr>
-          <a:xfrm>
-            <a:off x="5732920" y="253605"/>
+          <p:cNvPr id="29" name="Rectangle 28">
+            <a:extLst>
+              <a:ext uri="{FF2B5EF4-FFF2-40B4-BE49-F238E27FC236}">
+                <a16:creationId xmlns:a16="http://schemas.microsoft.com/office/drawing/2014/main" id="{96887129-7E8A-6E9C-7F30-91896F3E9C05}"/>
+              </a:ext>
+            </a:extLst>
+          </p:cNvPr>
+          <p:cNvSpPr/>
+          <p:nvPr/>
+        </p:nvSpPr>
+        <p:spPr>
+          <a:xfrm>
+            <a:off x="5410772" y="253607"/>
+            <a:ext cx="322151" cy="272753"/>
+          </a:xfrm>
+          <a:prstGeom prst="rect">
+            <a:avLst/>
+          </a:prstGeom>
+          <a:solidFill>
+            <a:srgbClr val="FDF8EE"/>
+          </a:solidFill>
+          <a:ln>
+            <a:solidFill>
+              <a:srgbClr val="EFC57B"/>
+            </a:solidFill>
+          </a:ln>
+        </p:spPr>
+        <p:style>
+          <a:lnRef idx="2">
+            <a:schemeClr val="accent1">
+              <a:shade val="15000"/>
+            </a:schemeClr>
+          </a:lnRef>
+          <a:fillRef idx="1">
+            <a:schemeClr val="accent1"/>
+          </a:fillRef>
+          <a:effectRef idx="0">
+            <a:schemeClr val="accent1"/>
+          </a:effectRef>
+          <a:fontRef idx="minor">
+            <a:schemeClr val="lt1"/>
+          </a:fontRef>
+        </p:style>
+        <p:txBody>
+          <a:bodyPr rtlCol="0" anchor="ctr"/>
+          <a:lstStyle/>
+          <a:p>
+            <a:pPr algn="ctr"/>
+            <a:r>
+              <a:rPr lang="en-US" sz="700" dirty="0">
+                <a:solidFill>
+                  <a:schemeClr val="tx1"/>
+                </a:solidFill>
+              </a:rPr>
+              <a:t>y[3]</a:t>
+            </a:r>
+          </a:p>
+        </p:txBody>
+      </p:sp>
+      <p:sp>
+        <p:nvSpPr>
+          <p:cNvPr id="30" name="Rectangle 29">
+            <a:extLst>
+              <a:ext uri="{FF2B5EF4-FFF2-40B4-BE49-F238E27FC236}">
+                <a16:creationId xmlns:a16="http://schemas.microsoft.com/office/drawing/2014/main" id="{DE6AD10A-44D6-DD6E-644B-017460711E87}"/>
+              </a:ext>
+            </a:extLst>
+          </p:cNvPr>
+          <p:cNvSpPr/>
+          <p:nvPr/>
+        </p:nvSpPr>
+        <p:spPr>
+          <a:xfrm>
+            <a:off x="3155716" y="253611"/>
             <a:ext cx="322151" cy="272753"/>
           </a:xfrm>
           <a:prstGeom prst="rect">
@@ -20942,19 +21249,19 @@
       </p:sp>
       <p:sp>
         <p:nvSpPr>
-          <p:cNvPr id="24" name="Rectangle 23">
-            <a:extLst>
-              <a:ext uri="{FF2B5EF4-FFF2-40B4-BE49-F238E27FC236}">
-                <a16:creationId xmlns:a16="http://schemas.microsoft.com/office/drawing/2014/main" id="{1AE8C708-30F2-C7FD-7833-3E0A4A89DA7C}"/>
-              </a:ext>
-            </a:extLst>
-          </p:cNvPr>
-          <p:cNvSpPr/>
-          <p:nvPr/>
-        </p:nvSpPr>
-        <p:spPr>
-          <a:xfrm>
-            <a:off x="6699375" y="253605"/>
+          <p:cNvPr id="31" name="Rectangle 30">
+            <a:extLst>
+              <a:ext uri="{FF2B5EF4-FFF2-40B4-BE49-F238E27FC236}">
+                <a16:creationId xmlns:a16="http://schemas.microsoft.com/office/drawing/2014/main" id="{6EF843CE-F97A-96C6-531A-57F857868D16}"/>
+              </a:ext>
+            </a:extLst>
+          </p:cNvPr>
+          <p:cNvSpPr/>
+          <p:nvPr/>
+        </p:nvSpPr>
+        <p:spPr>
+          <a:xfrm>
+            <a:off x="4122169" y="253609"/>
             <a:ext cx="322151" cy="272753"/>
           </a:xfrm>
           <a:prstGeom prst="rect">
@@ -21000,30 +21307,30 @@
       </p:sp>
       <p:sp>
         <p:nvSpPr>
-          <p:cNvPr id="25" name="Rectangle 24">
-            <a:extLst>
-              <a:ext uri="{FF2B5EF4-FFF2-40B4-BE49-F238E27FC236}">
-                <a16:creationId xmlns:a16="http://schemas.microsoft.com/office/drawing/2014/main" id="{B0BA7E38-442F-9767-1AD7-774A17E47ED6}"/>
-              </a:ext>
-            </a:extLst>
-          </p:cNvPr>
-          <p:cNvSpPr/>
-          <p:nvPr/>
-        </p:nvSpPr>
-        <p:spPr>
-          <a:xfrm>
-            <a:off x="4766470" y="253608"/>
-            <a:ext cx="322151" cy="272753"/>
-          </a:xfrm>
-          <a:prstGeom prst="rect">
-            <a:avLst/>
-          </a:prstGeom>
-          <a:solidFill>
-            <a:srgbClr val="FDF8EE"/>
-          </a:solidFill>
-          <a:ln>
-            <a:solidFill>
-              <a:srgbClr val="EFC57B"/>
+          <p:cNvPr id="32" name="Rectangle 31">
+            <a:extLst>
+              <a:ext uri="{FF2B5EF4-FFF2-40B4-BE49-F238E27FC236}">
+                <a16:creationId xmlns:a16="http://schemas.microsoft.com/office/drawing/2014/main" id="{C927F461-7AFB-7E17-067B-ABC29034FA29}"/>
+              </a:ext>
+            </a:extLst>
+          </p:cNvPr>
+          <p:cNvSpPr/>
+          <p:nvPr/>
+        </p:nvSpPr>
+        <p:spPr>
+          <a:xfrm>
+            <a:off x="3477867" y="253610"/>
+            <a:ext cx="322151" cy="272753"/>
+          </a:xfrm>
+          <a:prstGeom prst="rect">
+            <a:avLst/>
+          </a:prstGeom>
+          <a:solidFill>
+            <a:srgbClr val="FAFDF0"/>
+          </a:solidFill>
+          <a:ln>
+            <a:solidFill>
+              <a:srgbClr val="DDF08B"/>
             </a:solidFill>
           </a:ln>
         </p:spPr>
@@ -21058,30 +21365,30 @@
       </p:sp>
       <p:sp>
         <p:nvSpPr>
-          <p:cNvPr id="26" name="Rectangle 25">
-            <a:extLst>
-              <a:ext uri="{FF2B5EF4-FFF2-40B4-BE49-F238E27FC236}">
-                <a16:creationId xmlns:a16="http://schemas.microsoft.com/office/drawing/2014/main" id="{42CE0387-79B8-1F0C-9A65-3B47CAE784FB}"/>
-              </a:ext>
-            </a:extLst>
-          </p:cNvPr>
-          <p:cNvSpPr/>
-          <p:nvPr/>
-        </p:nvSpPr>
-        <p:spPr>
-          <a:xfrm>
-            <a:off x="5088621" y="253607"/>
-            <a:ext cx="322151" cy="272753"/>
-          </a:xfrm>
-          <a:prstGeom prst="rect">
-            <a:avLst/>
-          </a:prstGeom>
-          <a:solidFill>
-            <a:srgbClr val="FDF8EE"/>
-          </a:solidFill>
-          <a:ln>
-            <a:solidFill>
-              <a:srgbClr val="EFC57B"/>
+          <p:cNvPr id="33" name="Rectangle 32">
+            <a:extLst>
+              <a:ext uri="{FF2B5EF4-FFF2-40B4-BE49-F238E27FC236}">
+                <a16:creationId xmlns:a16="http://schemas.microsoft.com/office/drawing/2014/main" id="{463B9CE4-01E5-F66E-FCC5-C6E411EFDE1D}"/>
+              </a:ext>
+            </a:extLst>
+          </p:cNvPr>
+          <p:cNvSpPr/>
+          <p:nvPr/>
+        </p:nvSpPr>
+        <p:spPr>
+          <a:xfrm>
+            <a:off x="3800018" y="253609"/>
+            <a:ext cx="322151" cy="272753"/>
+          </a:xfrm>
+          <a:prstGeom prst="rect">
+            <a:avLst/>
+          </a:prstGeom>
+          <a:solidFill>
+            <a:srgbClr val="FAFDF0"/>
+          </a:solidFill>
+          <a:ln>
+            <a:solidFill>
+              <a:srgbClr val="DDF08B"/>
             </a:solidFill>
           </a:ln>
         </p:spPr>
@@ -21116,135 +21423,80 @@
       </p:sp>
       <p:sp>
         <p:nvSpPr>
-          <p:cNvPr id="27" name="Rectangle 26">
-            <a:extLst>
-              <a:ext uri="{FF2B5EF4-FFF2-40B4-BE49-F238E27FC236}">
-                <a16:creationId xmlns:a16="http://schemas.microsoft.com/office/drawing/2014/main" id="{89A93FD3-EDBB-6CBD-D89B-44FF4A1210A0}"/>
-              </a:ext>
-            </a:extLst>
-          </p:cNvPr>
-          <p:cNvSpPr/>
-          <p:nvPr/>
-        </p:nvSpPr>
-        <p:spPr>
-          <a:xfrm>
-            <a:off x="6055073" y="253606"/>
-            <a:ext cx="322151" cy="272753"/>
-          </a:xfrm>
-          <a:prstGeom prst="rect">
-            <a:avLst/>
-          </a:prstGeom>
-          <a:solidFill>
-            <a:srgbClr val="FAFDF0"/>
-          </a:solidFill>
-          <a:ln>
-            <a:solidFill>
-              <a:srgbClr val="DDF08B"/>
-            </a:solidFill>
-          </a:ln>
-        </p:spPr>
-        <p:style>
-          <a:lnRef idx="2">
-            <a:schemeClr val="accent1">
-              <a:shade val="15000"/>
-            </a:schemeClr>
-          </a:lnRef>
-          <a:fillRef idx="1">
-            <a:schemeClr val="accent1"/>
-          </a:fillRef>
-          <a:effectRef idx="0">
-            <a:schemeClr val="accent1"/>
-          </a:effectRef>
-          <a:fontRef idx="minor">
-            <a:schemeClr val="lt1"/>
-          </a:fontRef>
-        </p:style>
-        <p:txBody>
-          <a:bodyPr rtlCol="0" anchor="ctr"/>
-          <a:lstStyle/>
-          <a:p>
-            <a:pPr algn="ctr"/>
-            <a:endParaRPr lang="en-US" sz="800" dirty="0">
-              <a:solidFill>
-                <a:schemeClr val="tx1"/>
-              </a:solidFill>
-            </a:endParaRPr>
-          </a:p>
-        </p:txBody>
-      </p:sp>
-      <p:sp>
-        <p:nvSpPr>
-          <p:cNvPr id="28" name="Rectangle 27">
-            <a:extLst>
-              <a:ext uri="{FF2B5EF4-FFF2-40B4-BE49-F238E27FC236}">
-                <a16:creationId xmlns:a16="http://schemas.microsoft.com/office/drawing/2014/main" id="{BF16CA68-23F7-34E7-8B4E-3670216FE344}"/>
-              </a:ext>
-            </a:extLst>
-          </p:cNvPr>
-          <p:cNvSpPr/>
-          <p:nvPr/>
-        </p:nvSpPr>
-        <p:spPr>
-          <a:xfrm>
-            <a:off x="6377224" y="253605"/>
-            <a:ext cx="322151" cy="272753"/>
-          </a:xfrm>
-          <a:prstGeom prst="rect">
-            <a:avLst/>
-          </a:prstGeom>
-          <a:solidFill>
-            <a:srgbClr val="FAFDF0"/>
-          </a:solidFill>
-          <a:ln>
-            <a:solidFill>
-              <a:srgbClr val="DDF08B"/>
-            </a:solidFill>
-          </a:ln>
-        </p:spPr>
-        <p:style>
-          <a:lnRef idx="2">
-            <a:schemeClr val="accent1">
-              <a:shade val="15000"/>
-            </a:schemeClr>
-          </a:lnRef>
-          <a:fillRef idx="1">
-            <a:schemeClr val="accent1"/>
-          </a:fillRef>
-          <a:effectRef idx="0">
-            <a:schemeClr val="accent1"/>
-          </a:effectRef>
-          <a:fontRef idx="minor">
-            <a:schemeClr val="lt1"/>
-          </a:fontRef>
-        </p:style>
-        <p:txBody>
-          <a:bodyPr rtlCol="0" anchor="ctr"/>
-          <a:lstStyle/>
-          <a:p>
-            <a:pPr algn="ctr"/>
-            <a:endParaRPr lang="en-US" sz="800" dirty="0">
-              <a:solidFill>
-                <a:schemeClr val="tx1"/>
-              </a:solidFill>
-            </a:endParaRPr>
-          </a:p>
-        </p:txBody>
-      </p:sp>
-      <p:sp>
-        <p:nvSpPr>
-          <p:cNvPr id="29" name="Rectangle 28">
-            <a:extLst>
-              <a:ext uri="{FF2B5EF4-FFF2-40B4-BE49-F238E27FC236}">
-                <a16:creationId xmlns:a16="http://schemas.microsoft.com/office/drawing/2014/main" id="{96887129-7E8A-6E9C-7F30-91896F3E9C05}"/>
-              </a:ext>
-            </a:extLst>
-          </p:cNvPr>
-          <p:cNvSpPr/>
-          <p:nvPr/>
-        </p:nvSpPr>
-        <p:spPr>
-          <a:xfrm>
-            <a:off x="5410772" y="253607"/>
+          <p:cNvPr id="34" name="Rectangle 33">
+            <a:extLst>
+              <a:ext uri="{FF2B5EF4-FFF2-40B4-BE49-F238E27FC236}">
+                <a16:creationId xmlns:a16="http://schemas.microsoft.com/office/drawing/2014/main" id="{076E9E92-B3E9-67DB-F97B-5D3E4350E2C5}"/>
+              </a:ext>
+            </a:extLst>
+          </p:cNvPr>
+          <p:cNvSpPr/>
+          <p:nvPr/>
+        </p:nvSpPr>
+        <p:spPr>
+          <a:xfrm>
+            <a:off x="2833565" y="253611"/>
+            <a:ext cx="322151" cy="272753"/>
+          </a:xfrm>
+          <a:prstGeom prst="rect">
+            <a:avLst/>
+          </a:prstGeom>
+          <a:solidFill>
+            <a:srgbClr val="F2EFF6"/>
+          </a:solidFill>
+          <a:ln>
+            <a:solidFill>
+              <a:srgbClr val="360084"/>
+            </a:solidFill>
+          </a:ln>
+        </p:spPr>
+        <p:style>
+          <a:lnRef idx="2">
+            <a:schemeClr val="accent1">
+              <a:shade val="15000"/>
+            </a:schemeClr>
+          </a:lnRef>
+          <a:fillRef idx="1">
+            <a:schemeClr val="accent1"/>
+          </a:fillRef>
+          <a:effectRef idx="0">
+            <a:schemeClr val="accent1"/>
+          </a:effectRef>
+          <a:fontRef idx="minor">
+            <a:schemeClr val="lt1"/>
+          </a:fontRef>
+        </p:style>
+        <p:txBody>
+          <a:bodyPr rtlCol="0" anchor="ctr"/>
+          <a:lstStyle/>
+          <a:p>
+            <a:pPr algn="ctr"/>
+            <a:r>
+              <a:rPr lang="en-US" sz="700" dirty="0">
+                <a:solidFill>
+                  <a:schemeClr val="tx1"/>
+                </a:solidFill>
+              </a:rPr>
+              <a:t>x[3]</a:t>
+            </a:r>
+          </a:p>
+        </p:txBody>
+      </p:sp>
+      <p:sp>
+        <p:nvSpPr>
+          <p:cNvPr id="35" name="Rectangle 34">
+            <a:extLst>
+              <a:ext uri="{FF2B5EF4-FFF2-40B4-BE49-F238E27FC236}">
+                <a16:creationId xmlns:a16="http://schemas.microsoft.com/office/drawing/2014/main" id="{5264B164-BCCE-D1D2-5711-AFBDFBA0323E}"/>
+              </a:ext>
+            </a:extLst>
+          </p:cNvPr>
+          <p:cNvSpPr/>
+          <p:nvPr/>
+        </p:nvSpPr>
+        <p:spPr>
+          <a:xfrm>
+            <a:off x="4444319" y="253609"/>
             <a:ext cx="322151" cy="272753"/>
           </a:xfrm>
           <a:prstGeom prst="rect">
@@ -21280,261 +21532,32 @@
           <a:lstStyle/>
           <a:p>
             <a:pPr algn="ctr"/>
-            <a:endParaRPr lang="en-US" sz="800" dirty="0">
-              <a:solidFill>
-                <a:schemeClr val="tx1"/>
-              </a:solidFill>
-            </a:endParaRPr>
-          </a:p>
-        </p:txBody>
-      </p:sp>
-      <p:sp>
-        <p:nvSpPr>
-          <p:cNvPr id="30" name="Rectangle 29">
-            <a:extLst>
-              <a:ext uri="{FF2B5EF4-FFF2-40B4-BE49-F238E27FC236}">
-                <a16:creationId xmlns:a16="http://schemas.microsoft.com/office/drawing/2014/main" id="{DE6AD10A-44D6-DD6E-644B-017460711E87}"/>
-              </a:ext>
-            </a:extLst>
-          </p:cNvPr>
-          <p:cNvSpPr/>
-          <p:nvPr/>
-        </p:nvSpPr>
-        <p:spPr>
-          <a:xfrm>
-            <a:off x="3155716" y="253611"/>
-            <a:ext cx="322151" cy="272753"/>
-          </a:xfrm>
-          <a:prstGeom prst="rect">
-            <a:avLst/>
-          </a:prstGeom>
-          <a:solidFill>
-            <a:srgbClr val="FAFDF0"/>
-          </a:solidFill>
-          <a:ln>
-            <a:solidFill>
-              <a:srgbClr val="DDF08B"/>
-            </a:solidFill>
-          </a:ln>
-        </p:spPr>
-        <p:style>
-          <a:lnRef idx="2">
-            <a:schemeClr val="accent1">
-              <a:shade val="15000"/>
-            </a:schemeClr>
-          </a:lnRef>
-          <a:fillRef idx="1">
-            <a:schemeClr val="accent1"/>
-          </a:fillRef>
-          <a:effectRef idx="0">
-            <a:schemeClr val="accent1"/>
-          </a:effectRef>
-          <a:fontRef idx="minor">
-            <a:schemeClr val="lt1"/>
-          </a:fontRef>
-        </p:style>
-        <p:txBody>
-          <a:bodyPr rtlCol="0" anchor="ctr"/>
-          <a:lstStyle/>
-          <a:p>
-            <a:pPr algn="ctr"/>
-            <a:endParaRPr lang="en-US" sz="800" dirty="0">
-              <a:solidFill>
-                <a:schemeClr val="tx1"/>
-              </a:solidFill>
-            </a:endParaRPr>
-          </a:p>
-        </p:txBody>
-      </p:sp>
-      <p:sp>
-        <p:nvSpPr>
-          <p:cNvPr id="31" name="Rectangle 30">
-            <a:extLst>
-              <a:ext uri="{FF2B5EF4-FFF2-40B4-BE49-F238E27FC236}">
-                <a16:creationId xmlns:a16="http://schemas.microsoft.com/office/drawing/2014/main" id="{6EF843CE-F97A-96C6-531A-57F857868D16}"/>
-              </a:ext>
-            </a:extLst>
-          </p:cNvPr>
-          <p:cNvSpPr/>
-          <p:nvPr/>
-        </p:nvSpPr>
-        <p:spPr>
-          <a:xfrm>
-            <a:off x="4122169" y="253609"/>
-            <a:ext cx="322151" cy="272753"/>
-          </a:xfrm>
-          <a:prstGeom prst="rect">
-            <a:avLst/>
-          </a:prstGeom>
-          <a:solidFill>
-            <a:srgbClr val="FAFDF0"/>
-          </a:solidFill>
-          <a:ln>
-            <a:solidFill>
-              <a:srgbClr val="DDF08B"/>
-            </a:solidFill>
-          </a:ln>
-        </p:spPr>
-        <p:style>
-          <a:lnRef idx="2">
-            <a:schemeClr val="accent1">
-              <a:shade val="15000"/>
-            </a:schemeClr>
-          </a:lnRef>
-          <a:fillRef idx="1">
-            <a:schemeClr val="accent1"/>
-          </a:fillRef>
-          <a:effectRef idx="0">
-            <a:schemeClr val="accent1"/>
-          </a:effectRef>
-          <a:fontRef idx="minor">
-            <a:schemeClr val="lt1"/>
-          </a:fontRef>
-        </p:style>
-        <p:txBody>
-          <a:bodyPr rtlCol="0" anchor="ctr"/>
-          <a:lstStyle/>
-          <a:p>
-            <a:pPr algn="ctr"/>
-            <a:endParaRPr lang="en-US" sz="800" dirty="0">
-              <a:solidFill>
-                <a:schemeClr val="tx1"/>
-              </a:solidFill>
-            </a:endParaRPr>
-          </a:p>
-        </p:txBody>
-      </p:sp>
-      <p:sp>
-        <p:nvSpPr>
-          <p:cNvPr id="32" name="Rectangle 31">
-            <a:extLst>
-              <a:ext uri="{FF2B5EF4-FFF2-40B4-BE49-F238E27FC236}">
-                <a16:creationId xmlns:a16="http://schemas.microsoft.com/office/drawing/2014/main" id="{C927F461-7AFB-7E17-067B-ABC29034FA29}"/>
-              </a:ext>
-            </a:extLst>
-          </p:cNvPr>
-          <p:cNvSpPr/>
-          <p:nvPr/>
-        </p:nvSpPr>
-        <p:spPr>
-          <a:xfrm>
-            <a:off x="3477867" y="253610"/>
-            <a:ext cx="322151" cy="272753"/>
-          </a:xfrm>
-          <a:prstGeom prst="rect">
-            <a:avLst/>
-          </a:prstGeom>
-          <a:solidFill>
-            <a:srgbClr val="FAFDF0"/>
-          </a:solidFill>
-          <a:ln>
-            <a:solidFill>
-              <a:srgbClr val="DDF08B"/>
-            </a:solidFill>
-          </a:ln>
-        </p:spPr>
-        <p:style>
-          <a:lnRef idx="2">
-            <a:schemeClr val="accent1">
-              <a:shade val="15000"/>
-            </a:schemeClr>
-          </a:lnRef>
-          <a:fillRef idx="1">
-            <a:schemeClr val="accent1"/>
-          </a:fillRef>
-          <a:effectRef idx="0">
-            <a:schemeClr val="accent1"/>
-          </a:effectRef>
-          <a:fontRef idx="minor">
-            <a:schemeClr val="lt1"/>
-          </a:fontRef>
-        </p:style>
-        <p:txBody>
-          <a:bodyPr rtlCol="0" anchor="ctr"/>
-          <a:lstStyle/>
-          <a:p>
-            <a:pPr algn="ctr"/>
-            <a:endParaRPr lang="en-US" sz="800" dirty="0">
-              <a:solidFill>
-                <a:schemeClr val="tx1"/>
-              </a:solidFill>
-            </a:endParaRPr>
-          </a:p>
-        </p:txBody>
-      </p:sp>
-      <p:sp>
-        <p:nvSpPr>
-          <p:cNvPr id="33" name="Rectangle 32">
-            <a:extLst>
-              <a:ext uri="{FF2B5EF4-FFF2-40B4-BE49-F238E27FC236}">
-                <a16:creationId xmlns:a16="http://schemas.microsoft.com/office/drawing/2014/main" id="{463B9CE4-01E5-F66E-FCC5-C6E411EFDE1D}"/>
-              </a:ext>
-            </a:extLst>
-          </p:cNvPr>
-          <p:cNvSpPr/>
-          <p:nvPr/>
-        </p:nvSpPr>
-        <p:spPr>
-          <a:xfrm>
-            <a:off x="3800018" y="253609"/>
-            <a:ext cx="322151" cy="272753"/>
-          </a:xfrm>
-          <a:prstGeom prst="rect">
-            <a:avLst/>
-          </a:prstGeom>
-          <a:solidFill>
-            <a:srgbClr val="FAFDF0"/>
-          </a:solidFill>
-          <a:ln>
-            <a:solidFill>
-              <a:srgbClr val="DDF08B"/>
-            </a:solidFill>
-          </a:ln>
-        </p:spPr>
-        <p:style>
-          <a:lnRef idx="2">
-            <a:schemeClr val="accent1">
-              <a:shade val="15000"/>
-            </a:schemeClr>
-          </a:lnRef>
-          <a:fillRef idx="1">
-            <a:schemeClr val="accent1"/>
-          </a:fillRef>
-          <a:effectRef idx="0">
-            <a:schemeClr val="accent1"/>
-          </a:effectRef>
-          <a:fontRef idx="minor">
-            <a:schemeClr val="lt1"/>
-          </a:fontRef>
-        </p:style>
-        <p:txBody>
-          <a:bodyPr rtlCol="0" anchor="ctr"/>
-          <a:lstStyle/>
-          <a:p>
-            <a:pPr algn="ctr"/>
-            <a:endParaRPr lang="en-US" sz="800" dirty="0">
-              <a:solidFill>
-                <a:schemeClr val="tx1"/>
-              </a:solidFill>
-            </a:endParaRPr>
-          </a:p>
-        </p:txBody>
-      </p:sp>
-      <p:sp>
-        <p:nvSpPr>
-          <p:cNvPr id="34" name="Rectangle 33">
-            <a:extLst>
-              <a:ext uri="{FF2B5EF4-FFF2-40B4-BE49-F238E27FC236}">
-                <a16:creationId xmlns:a16="http://schemas.microsoft.com/office/drawing/2014/main" id="{076E9E92-B3E9-67DB-F97B-5D3E4350E2C5}"/>
-              </a:ext>
-            </a:extLst>
-          </p:cNvPr>
-          <p:cNvSpPr/>
-          <p:nvPr/>
-        </p:nvSpPr>
-        <p:spPr>
-          <a:xfrm>
-            <a:off x="2833565" y="253611"/>
+            <a:r>
+              <a:rPr lang="en-US" sz="700" dirty="0">
+                <a:solidFill>
+                  <a:schemeClr val="tx1"/>
+                </a:solidFill>
+              </a:rPr>
+              <a:t>y[0]</a:t>
+            </a:r>
+          </a:p>
+        </p:txBody>
+      </p:sp>
+      <p:sp>
+        <p:nvSpPr>
+          <p:cNvPr id="37" name="Rectangle 36">
+            <a:extLst>
+              <a:ext uri="{FF2B5EF4-FFF2-40B4-BE49-F238E27FC236}">
+                <a16:creationId xmlns:a16="http://schemas.microsoft.com/office/drawing/2014/main" id="{82891F91-6D93-9AC5-FBF4-78BEE02508BF}"/>
+              </a:ext>
+            </a:extLst>
+          </p:cNvPr>
+          <p:cNvSpPr/>
+          <p:nvPr/>
+        </p:nvSpPr>
+        <p:spPr>
+          <a:xfrm>
+            <a:off x="2508316" y="659294"/>
             <a:ext cx="322151" cy="272753"/>
           </a:xfrm>
           <a:prstGeom prst="rect">
@@ -21570,29 +21593,93 @@
           <a:lstStyle/>
           <a:p>
             <a:pPr algn="ctr"/>
-            <a:endParaRPr lang="en-US" sz="800" dirty="0">
-              <a:solidFill>
-                <a:schemeClr val="tx1"/>
-              </a:solidFill>
-            </a:endParaRPr>
-          </a:p>
-        </p:txBody>
-      </p:sp>
-      <p:sp>
-        <p:nvSpPr>
-          <p:cNvPr id="35" name="Rectangle 34">
-            <a:extLst>
-              <a:ext uri="{FF2B5EF4-FFF2-40B4-BE49-F238E27FC236}">
-                <a16:creationId xmlns:a16="http://schemas.microsoft.com/office/drawing/2014/main" id="{5264B164-BCCE-D1D2-5711-AFBDFBA0323E}"/>
-              </a:ext>
-            </a:extLst>
-          </p:cNvPr>
-          <p:cNvSpPr/>
-          <p:nvPr/>
-        </p:nvSpPr>
-        <p:spPr>
-          <a:xfrm>
-            <a:off x="4444319" y="253609"/>
+            <a:r>
+              <a:rPr lang="en-US" sz="700" dirty="0">
+                <a:solidFill>
+                  <a:schemeClr val="tx1"/>
+                </a:solidFill>
+              </a:rPr>
+              <a:t>x[1]</a:t>
+            </a:r>
+          </a:p>
+        </p:txBody>
+      </p:sp>
+      <p:sp>
+        <p:nvSpPr>
+          <p:cNvPr id="38" name="Rectangle 37">
+            <a:extLst>
+              <a:ext uri="{FF2B5EF4-FFF2-40B4-BE49-F238E27FC236}">
+                <a16:creationId xmlns:a16="http://schemas.microsoft.com/office/drawing/2014/main" id="{47FA9643-D368-F783-EB9C-C34059D88D83}"/>
+              </a:ext>
+            </a:extLst>
+          </p:cNvPr>
+          <p:cNvSpPr/>
+          <p:nvPr/>
+        </p:nvSpPr>
+        <p:spPr>
+          <a:xfrm>
+            <a:off x="2830467" y="659293"/>
+            <a:ext cx="322151" cy="272753"/>
+          </a:xfrm>
+          <a:prstGeom prst="rect">
+            <a:avLst/>
+          </a:prstGeom>
+          <a:solidFill>
+            <a:srgbClr val="F2EFF6"/>
+          </a:solidFill>
+          <a:ln>
+            <a:solidFill>
+              <a:srgbClr val="360084"/>
+            </a:solidFill>
+          </a:ln>
+        </p:spPr>
+        <p:style>
+          <a:lnRef idx="2">
+            <a:schemeClr val="accent1">
+              <a:shade val="15000"/>
+            </a:schemeClr>
+          </a:lnRef>
+          <a:fillRef idx="1">
+            <a:schemeClr val="accent1"/>
+          </a:fillRef>
+          <a:effectRef idx="0">
+            <a:schemeClr val="accent1"/>
+          </a:effectRef>
+          <a:fontRef idx="minor">
+            <a:schemeClr val="lt1"/>
+          </a:fontRef>
+        </p:style>
+        <p:txBody>
+          <a:bodyPr rtlCol="0" anchor="ctr"/>
+          <a:lstStyle/>
+          <a:p>
+            <a:pPr algn="ctr"/>
+            <a:r>
+              <a:rPr lang="en-US" sz="700" dirty="0">
+                <a:solidFill>
+                  <a:schemeClr val="tx1"/>
+                </a:solidFill>
+              </a:rPr>
+              <a:t>x[2]</a:t>
+            </a:r>
+          </a:p>
+        </p:txBody>
+      </p:sp>
+      <p:sp>
+        <p:nvSpPr>
+          <p:cNvPr id="40" name="Rectangle 39">
+            <a:extLst>
+              <a:ext uri="{FF2B5EF4-FFF2-40B4-BE49-F238E27FC236}">
+                <a16:creationId xmlns:a16="http://schemas.microsoft.com/office/drawing/2014/main" id="{44533F58-4FE4-1602-0066-4FCA111177CD}"/>
+              </a:ext>
+            </a:extLst>
+          </p:cNvPr>
+          <p:cNvSpPr/>
+          <p:nvPr/>
+        </p:nvSpPr>
+        <p:spPr>
+          <a:xfrm>
+            <a:off x="4436571" y="659293"/>
             <a:ext cx="322151" cy="272753"/>
           </a:xfrm>
           <a:prstGeom prst="rect">
@@ -21628,203 +21715,32 @@
           <a:lstStyle/>
           <a:p>
             <a:pPr algn="ctr"/>
-            <a:endParaRPr lang="en-US" sz="800" dirty="0">
-              <a:solidFill>
-                <a:schemeClr val="tx1"/>
-              </a:solidFill>
-            </a:endParaRPr>
-          </a:p>
-        </p:txBody>
-      </p:sp>
-      <p:sp>
-        <p:nvSpPr>
-          <p:cNvPr id="36" name="Rectangle 35">
-            <a:extLst>
-              <a:ext uri="{FF2B5EF4-FFF2-40B4-BE49-F238E27FC236}">
-                <a16:creationId xmlns:a16="http://schemas.microsoft.com/office/drawing/2014/main" id="{5CE6A78A-C55E-5FD0-A432-FA7067E4421F}"/>
-              </a:ext>
-            </a:extLst>
-          </p:cNvPr>
-          <p:cNvSpPr/>
-          <p:nvPr/>
-        </p:nvSpPr>
-        <p:spPr>
-          <a:xfrm>
-            <a:off x="1867112" y="1111009"/>
-            <a:ext cx="322151" cy="272753"/>
-          </a:xfrm>
-          <a:prstGeom prst="rect">
-            <a:avLst/>
-          </a:prstGeom>
-          <a:solidFill>
-            <a:srgbClr val="F2EFF6"/>
-          </a:solidFill>
-          <a:ln>
-            <a:solidFill>
-              <a:srgbClr val="360084"/>
-            </a:solidFill>
-          </a:ln>
-        </p:spPr>
-        <p:style>
-          <a:lnRef idx="2">
-            <a:schemeClr val="accent1">
-              <a:shade val="15000"/>
-            </a:schemeClr>
-          </a:lnRef>
-          <a:fillRef idx="1">
-            <a:schemeClr val="accent1"/>
-          </a:fillRef>
-          <a:effectRef idx="0">
-            <a:schemeClr val="accent1"/>
-          </a:effectRef>
-          <a:fontRef idx="minor">
-            <a:schemeClr val="lt1"/>
-          </a:fontRef>
-        </p:style>
-        <p:txBody>
-          <a:bodyPr rtlCol="0" anchor="ctr"/>
-          <a:lstStyle/>
-          <a:p>
-            <a:pPr algn="ctr"/>
-            <a:endParaRPr lang="en-US" sz="800" dirty="0">
-              <a:solidFill>
-                <a:schemeClr val="tx1"/>
-              </a:solidFill>
-            </a:endParaRPr>
-          </a:p>
-        </p:txBody>
-      </p:sp>
-      <p:sp>
-        <p:nvSpPr>
-          <p:cNvPr id="37" name="Rectangle 36">
-            <a:extLst>
-              <a:ext uri="{FF2B5EF4-FFF2-40B4-BE49-F238E27FC236}">
-                <a16:creationId xmlns:a16="http://schemas.microsoft.com/office/drawing/2014/main" id="{82891F91-6D93-9AC5-FBF4-78BEE02508BF}"/>
-              </a:ext>
-            </a:extLst>
-          </p:cNvPr>
-          <p:cNvSpPr/>
-          <p:nvPr/>
-        </p:nvSpPr>
-        <p:spPr>
-          <a:xfrm>
-            <a:off x="2189263" y="1111008"/>
-            <a:ext cx="322151" cy="272753"/>
-          </a:xfrm>
-          <a:prstGeom prst="rect">
-            <a:avLst/>
-          </a:prstGeom>
-          <a:solidFill>
-            <a:srgbClr val="F2EFF6"/>
-          </a:solidFill>
-          <a:ln>
-            <a:solidFill>
-              <a:srgbClr val="360084"/>
-            </a:solidFill>
-          </a:ln>
-        </p:spPr>
-        <p:style>
-          <a:lnRef idx="2">
-            <a:schemeClr val="accent1">
-              <a:shade val="15000"/>
-            </a:schemeClr>
-          </a:lnRef>
-          <a:fillRef idx="1">
-            <a:schemeClr val="accent1"/>
-          </a:fillRef>
-          <a:effectRef idx="0">
-            <a:schemeClr val="accent1"/>
-          </a:effectRef>
-          <a:fontRef idx="minor">
-            <a:schemeClr val="lt1"/>
-          </a:fontRef>
-        </p:style>
-        <p:txBody>
-          <a:bodyPr rtlCol="0" anchor="ctr"/>
-          <a:lstStyle/>
-          <a:p>
-            <a:pPr algn="ctr"/>
-            <a:endParaRPr lang="en-US" sz="800" dirty="0">
-              <a:solidFill>
-                <a:schemeClr val="tx1"/>
-              </a:solidFill>
-            </a:endParaRPr>
-          </a:p>
-        </p:txBody>
-      </p:sp>
-      <p:sp>
-        <p:nvSpPr>
-          <p:cNvPr id="38" name="Rectangle 37">
-            <a:extLst>
-              <a:ext uri="{FF2B5EF4-FFF2-40B4-BE49-F238E27FC236}">
-                <a16:creationId xmlns:a16="http://schemas.microsoft.com/office/drawing/2014/main" id="{47FA9643-D368-F783-EB9C-C34059D88D83}"/>
-              </a:ext>
-            </a:extLst>
-          </p:cNvPr>
-          <p:cNvSpPr/>
-          <p:nvPr/>
-        </p:nvSpPr>
-        <p:spPr>
-          <a:xfrm>
-            <a:off x="2511414" y="1111007"/>
-            <a:ext cx="322151" cy="272753"/>
-          </a:xfrm>
-          <a:prstGeom prst="rect">
-            <a:avLst/>
-          </a:prstGeom>
-          <a:solidFill>
-            <a:srgbClr val="F2EFF6"/>
-          </a:solidFill>
-          <a:ln>
-            <a:solidFill>
-              <a:srgbClr val="360084"/>
-            </a:solidFill>
-          </a:ln>
-        </p:spPr>
-        <p:style>
-          <a:lnRef idx="2">
-            <a:schemeClr val="accent1">
-              <a:shade val="15000"/>
-            </a:schemeClr>
-          </a:lnRef>
-          <a:fillRef idx="1">
-            <a:schemeClr val="accent1"/>
-          </a:fillRef>
-          <a:effectRef idx="0">
-            <a:schemeClr val="accent1"/>
-          </a:effectRef>
-          <a:fontRef idx="minor">
-            <a:schemeClr val="lt1"/>
-          </a:fontRef>
-        </p:style>
-        <p:txBody>
-          <a:bodyPr rtlCol="0" anchor="ctr"/>
-          <a:lstStyle/>
-          <a:p>
-            <a:pPr algn="ctr"/>
-            <a:endParaRPr lang="en-US" sz="800" dirty="0">
-              <a:solidFill>
-                <a:schemeClr val="tx1"/>
-              </a:solidFill>
-            </a:endParaRPr>
-          </a:p>
-        </p:txBody>
-      </p:sp>
-      <p:sp>
-        <p:nvSpPr>
-          <p:cNvPr id="40" name="Rectangle 39">
-            <a:extLst>
-              <a:ext uri="{FF2B5EF4-FFF2-40B4-BE49-F238E27FC236}">
-                <a16:creationId xmlns:a16="http://schemas.microsoft.com/office/drawing/2014/main" id="{44533F58-4FE4-1602-0066-4FCA111177CD}"/>
-              </a:ext>
-            </a:extLst>
-          </p:cNvPr>
-          <p:cNvSpPr/>
-          <p:nvPr/>
-        </p:nvSpPr>
-        <p:spPr>
-          <a:xfrm>
-            <a:off x="4122169" y="1111005"/>
+            <a:r>
+              <a:rPr lang="en-US" sz="700" dirty="0">
+                <a:solidFill>
+                  <a:schemeClr val="tx1"/>
+                </a:solidFill>
+              </a:rPr>
+              <a:t>y[2]</a:t>
+            </a:r>
+          </a:p>
+        </p:txBody>
+      </p:sp>
+      <p:sp>
+        <p:nvSpPr>
+          <p:cNvPr id="42" name="Rectangle 41">
+            <a:extLst>
+              <a:ext uri="{FF2B5EF4-FFF2-40B4-BE49-F238E27FC236}">
+                <a16:creationId xmlns:a16="http://schemas.microsoft.com/office/drawing/2014/main" id="{F615455A-A222-9EFA-EF1A-BF0B308A1D2B}"/>
+              </a:ext>
+            </a:extLst>
+          </p:cNvPr>
+          <p:cNvSpPr/>
+          <p:nvPr/>
+        </p:nvSpPr>
+        <p:spPr>
+          <a:xfrm>
+            <a:off x="4114420" y="659293"/>
             <a:ext cx="322151" cy="272753"/>
           </a:xfrm>
           <a:prstGeom prst="rect">
@@ -21860,29 +21776,32 @@
           <a:lstStyle/>
           <a:p>
             <a:pPr algn="ctr"/>
-            <a:endParaRPr lang="en-US" sz="800" dirty="0">
-              <a:solidFill>
-                <a:schemeClr val="tx1"/>
-              </a:solidFill>
-            </a:endParaRPr>
-          </a:p>
-        </p:txBody>
-      </p:sp>
-      <p:sp>
-        <p:nvSpPr>
-          <p:cNvPr id="41" name="Rectangle 40">
-            <a:extLst>
-              <a:ext uri="{FF2B5EF4-FFF2-40B4-BE49-F238E27FC236}">
-                <a16:creationId xmlns:a16="http://schemas.microsoft.com/office/drawing/2014/main" id="{37DF5E3A-6341-2497-2EE3-B4B92A55FED8}"/>
-              </a:ext>
-            </a:extLst>
-          </p:cNvPr>
-          <p:cNvSpPr/>
-          <p:nvPr/>
-        </p:nvSpPr>
-        <p:spPr>
-          <a:xfrm>
-            <a:off x="3477867" y="1111006"/>
+            <a:r>
+              <a:rPr lang="en-US" sz="700" dirty="0">
+                <a:solidFill>
+                  <a:schemeClr val="tx1"/>
+                </a:solidFill>
+              </a:rPr>
+              <a:t>y[1]</a:t>
+            </a:r>
+          </a:p>
+        </p:txBody>
+      </p:sp>
+      <p:sp>
+        <p:nvSpPr>
+          <p:cNvPr id="45" name="Rectangle 44">
+            <a:extLst>
+              <a:ext uri="{FF2B5EF4-FFF2-40B4-BE49-F238E27FC236}">
+                <a16:creationId xmlns:a16="http://schemas.microsoft.com/office/drawing/2014/main" id="{1E846ADE-ED93-27CE-0ED1-22E443B49A45}"/>
+              </a:ext>
+            </a:extLst>
+          </p:cNvPr>
+          <p:cNvSpPr/>
+          <p:nvPr/>
+        </p:nvSpPr>
+        <p:spPr>
+          <a:xfrm>
+            <a:off x="4758722" y="659293"/>
             <a:ext cx="322151" cy="272753"/>
           </a:xfrm>
           <a:prstGeom prst="rect">
@@ -21918,337 +21837,17 @@
           <a:lstStyle/>
           <a:p>
             <a:pPr algn="ctr"/>
-            <a:endParaRPr lang="en-US" sz="800" dirty="0">
-              <a:solidFill>
-                <a:schemeClr val="tx1"/>
-              </a:solidFill>
-            </a:endParaRPr>
-          </a:p>
-        </p:txBody>
-      </p:sp>
-      <p:sp>
-        <p:nvSpPr>
-          <p:cNvPr id="42" name="Rectangle 41">
-            <a:extLst>
-              <a:ext uri="{FF2B5EF4-FFF2-40B4-BE49-F238E27FC236}">
-                <a16:creationId xmlns:a16="http://schemas.microsoft.com/office/drawing/2014/main" id="{F615455A-A222-9EFA-EF1A-BF0B308A1D2B}"/>
-              </a:ext>
-            </a:extLst>
-          </p:cNvPr>
-          <p:cNvSpPr/>
-          <p:nvPr/>
-        </p:nvSpPr>
-        <p:spPr>
-          <a:xfrm>
-            <a:off x="3800018" y="1111005"/>
-            <a:ext cx="322151" cy="272753"/>
-          </a:xfrm>
-          <a:prstGeom prst="rect">
-            <a:avLst/>
-          </a:prstGeom>
-          <a:solidFill>
-            <a:srgbClr val="FDF8EE"/>
-          </a:solidFill>
-          <a:ln>
-            <a:solidFill>
-              <a:srgbClr val="EFC57B"/>
-            </a:solidFill>
-          </a:ln>
-        </p:spPr>
-        <p:style>
-          <a:lnRef idx="2">
-            <a:schemeClr val="accent1">
-              <a:shade val="15000"/>
-            </a:schemeClr>
-          </a:lnRef>
-          <a:fillRef idx="1">
-            <a:schemeClr val="accent1"/>
-          </a:fillRef>
-          <a:effectRef idx="0">
-            <a:schemeClr val="accent1"/>
-          </a:effectRef>
-          <a:fontRef idx="minor">
-            <a:schemeClr val="lt1"/>
-          </a:fontRef>
-        </p:style>
-        <p:txBody>
-          <a:bodyPr rtlCol="0" anchor="ctr"/>
-          <a:lstStyle/>
-          <a:p>
-            <a:pPr algn="ctr"/>
-            <a:endParaRPr lang="en-US" sz="800" dirty="0">
-              <a:solidFill>
-                <a:schemeClr val="tx1"/>
-              </a:solidFill>
-            </a:endParaRPr>
-          </a:p>
-        </p:txBody>
-      </p:sp>
-      <p:sp>
-        <p:nvSpPr>
-          <p:cNvPr id="43" name="Rectangle 42">
-            <a:extLst>
-              <a:ext uri="{FF2B5EF4-FFF2-40B4-BE49-F238E27FC236}">
-                <a16:creationId xmlns:a16="http://schemas.microsoft.com/office/drawing/2014/main" id="{5A790D2E-1FEC-5D7B-939F-3C0656685A11}"/>
-              </a:ext>
-            </a:extLst>
-          </p:cNvPr>
-          <p:cNvSpPr/>
-          <p:nvPr/>
-        </p:nvSpPr>
-        <p:spPr>
-          <a:xfrm>
-            <a:off x="2833565" y="1111007"/>
-            <a:ext cx="322151" cy="272753"/>
-          </a:xfrm>
-          <a:prstGeom prst="rect">
-            <a:avLst/>
-          </a:prstGeom>
-          <a:solidFill>
-            <a:srgbClr val="F2EFF6"/>
-          </a:solidFill>
-          <a:ln>
-            <a:solidFill>
-              <a:srgbClr val="360084"/>
-            </a:solidFill>
-          </a:ln>
-        </p:spPr>
-        <p:style>
-          <a:lnRef idx="2">
-            <a:schemeClr val="accent1">
-              <a:shade val="15000"/>
-            </a:schemeClr>
-          </a:lnRef>
-          <a:fillRef idx="1">
-            <a:schemeClr val="accent1"/>
-          </a:fillRef>
-          <a:effectRef idx="0">
-            <a:schemeClr val="accent1"/>
-          </a:effectRef>
-          <a:fontRef idx="minor">
-            <a:schemeClr val="lt1"/>
-          </a:fontRef>
-        </p:style>
-        <p:txBody>
-          <a:bodyPr rtlCol="0" anchor="ctr"/>
-          <a:lstStyle/>
-          <a:p>
-            <a:pPr algn="ctr"/>
-            <a:endParaRPr lang="en-US" sz="800" dirty="0">
-              <a:solidFill>
-                <a:schemeClr val="tx1"/>
-              </a:solidFill>
-            </a:endParaRPr>
-          </a:p>
-        </p:txBody>
-      </p:sp>
-      <p:sp>
-        <p:nvSpPr>
-          <p:cNvPr id="45" name="Rectangle 44">
-            <a:extLst>
-              <a:ext uri="{FF2B5EF4-FFF2-40B4-BE49-F238E27FC236}">
-                <a16:creationId xmlns:a16="http://schemas.microsoft.com/office/drawing/2014/main" id="{1E846ADE-ED93-27CE-0ED1-22E443B49A45}"/>
-              </a:ext>
-            </a:extLst>
-          </p:cNvPr>
-          <p:cNvSpPr/>
-          <p:nvPr/>
-        </p:nvSpPr>
-        <p:spPr>
-          <a:xfrm>
-            <a:off x="4444320" y="1111005"/>
-            <a:ext cx="322151" cy="272753"/>
-          </a:xfrm>
-          <a:prstGeom prst="rect">
-            <a:avLst/>
-          </a:prstGeom>
-          <a:solidFill>
-            <a:srgbClr val="FDF8EE"/>
-          </a:solidFill>
-          <a:ln>
-            <a:solidFill>
-              <a:srgbClr val="EFC57B"/>
-            </a:solidFill>
-          </a:ln>
-        </p:spPr>
-        <p:style>
-          <a:lnRef idx="2">
-            <a:schemeClr val="accent1">
-              <a:shade val="15000"/>
-            </a:schemeClr>
-          </a:lnRef>
-          <a:fillRef idx="1">
-            <a:schemeClr val="accent1"/>
-          </a:fillRef>
-          <a:effectRef idx="0">
-            <a:schemeClr val="accent1"/>
-          </a:effectRef>
-          <a:fontRef idx="minor">
-            <a:schemeClr val="lt1"/>
-          </a:fontRef>
-        </p:style>
-        <p:txBody>
-          <a:bodyPr rtlCol="0" anchor="ctr"/>
-          <a:lstStyle/>
-          <a:p>
-            <a:pPr algn="ctr"/>
-            <a:endParaRPr lang="en-US" sz="800" dirty="0">
-              <a:solidFill>
-                <a:schemeClr val="tx1"/>
-              </a:solidFill>
-            </a:endParaRPr>
-          </a:p>
-        </p:txBody>
-      </p:sp>
-      <p:sp>
-        <p:nvSpPr>
-          <p:cNvPr id="39" name="Rectangle 38">
-            <a:extLst>
-              <a:ext uri="{FF2B5EF4-FFF2-40B4-BE49-F238E27FC236}">
-                <a16:creationId xmlns:a16="http://schemas.microsoft.com/office/drawing/2014/main" id="{A111B3C1-D11C-EDDB-D6F6-0AF39CE8531F}"/>
-              </a:ext>
-            </a:extLst>
-          </p:cNvPr>
-          <p:cNvSpPr/>
-          <p:nvPr/>
-        </p:nvSpPr>
-        <p:spPr>
-          <a:xfrm>
-            <a:off x="3155716" y="1111007"/>
-            <a:ext cx="322151" cy="272753"/>
-          </a:xfrm>
-          <a:prstGeom prst="rect">
-            <a:avLst/>
-          </a:prstGeom>
-          <a:pattFill prst="wdUpDiag">
-            <a:fgClr>
-              <a:srgbClr val="360084"/>
-            </a:fgClr>
-            <a:bgClr>
-              <a:schemeClr val="bg1"/>
-            </a:bgClr>
-          </a:pattFill>
-          <a:ln>
-            <a:solidFill>
-              <a:srgbClr val="360084"/>
-            </a:solidFill>
-          </a:ln>
-        </p:spPr>
-        <p:style>
-          <a:lnRef idx="2">
-            <a:schemeClr val="accent1">
-              <a:shade val="15000"/>
-            </a:schemeClr>
-          </a:lnRef>
-          <a:fillRef idx="1">
-            <a:schemeClr val="accent1"/>
-          </a:fillRef>
-          <a:effectRef idx="0">
-            <a:schemeClr val="accent1"/>
-          </a:effectRef>
-          <a:fontRef idx="minor">
-            <a:schemeClr val="lt1"/>
-          </a:fontRef>
-        </p:style>
-        <p:txBody>
-          <a:bodyPr rtlCol="0" anchor="ctr"/>
-          <a:lstStyle/>
-          <a:p>
-            <a:pPr algn="ctr"/>
-            <a:endParaRPr lang="en-US" sz="800" dirty="0">
-              <a:solidFill>
-                <a:schemeClr val="tx1"/>
-              </a:solidFill>
-            </a:endParaRPr>
-          </a:p>
-        </p:txBody>
-      </p:sp>
-      <p:cxnSp>
-        <p:nvCxnSpPr>
-          <p:cNvPr id="47" name="Straight Arrow Connector 46">
-            <a:extLst>
-              <a:ext uri="{FF2B5EF4-FFF2-40B4-BE49-F238E27FC236}">
-                <a16:creationId xmlns:a16="http://schemas.microsoft.com/office/drawing/2014/main" id="{E009DCF6-720B-ADEC-C76E-7F57144EAFD6}"/>
-              </a:ext>
-            </a:extLst>
-          </p:cNvPr>
-          <p:cNvCxnSpPr/>
-          <p:nvPr/>
-        </p:nvCxnSpPr>
-        <p:spPr>
-          <a:xfrm>
-            <a:off x="2511414" y="526358"/>
-            <a:ext cx="0" cy="584647"/>
-          </a:xfrm>
-          <a:prstGeom prst="straightConnector1">
-            <a:avLst/>
-          </a:prstGeom>
-          <a:ln w="12700">
-            <a:solidFill>
-              <a:srgbClr val="360084"/>
-            </a:solidFill>
-            <a:tailEnd type="triangle"/>
-          </a:ln>
-        </p:spPr>
-        <p:style>
-          <a:lnRef idx="1">
-            <a:schemeClr val="accent1"/>
-          </a:lnRef>
-          <a:fillRef idx="0">
-            <a:schemeClr val="accent1"/>
-          </a:fillRef>
-          <a:effectRef idx="0">
-            <a:schemeClr val="accent1"/>
-          </a:effectRef>
-          <a:fontRef idx="minor">
-            <a:schemeClr val="tx1"/>
-          </a:fontRef>
-        </p:style>
-      </p:cxnSp>
-      <p:cxnSp>
-        <p:nvCxnSpPr>
-          <p:cNvPr id="48" name="Straight Arrow Connector 47">
-            <a:extLst>
-              <a:ext uri="{FF2B5EF4-FFF2-40B4-BE49-F238E27FC236}">
-                <a16:creationId xmlns:a16="http://schemas.microsoft.com/office/drawing/2014/main" id="{F493AC74-8D8B-60B2-1E78-3C008281F9B2}"/>
-              </a:ext>
-            </a:extLst>
-          </p:cNvPr>
-          <p:cNvCxnSpPr>
-            <a:cxnSpLocks/>
-          </p:cNvCxnSpPr>
-          <p:nvPr/>
-        </p:nvCxnSpPr>
-        <p:spPr>
-          <a:xfrm flipH="1">
-            <a:off x="4122169" y="526358"/>
-            <a:ext cx="966452" cy="584647"/>
-          </a:xfrm>
-          <a:prstGeom prst="straightConnector1">
-            <a:avLst/>
-          </a:prstGeom>
-          <a:ln w="12700">
-            <a:solidFill>
-              <a:srgbClr val="EFC57B"/>
-            </a:solidFill>
-            <a:tailEnd type="triangle"/>
-          </a:ln>
-        </p:spPr>
-        <p:style>
-          <a:lnRef idx="1">
-            <a:schemeClr val="accent1"/>
-          </a:lnRef>
-          <a:fillRef idx="0">
-            <a:schemeClr val="accent1"/>
-          </a:fillRef>
-          <a:effectRef idx="0">
-            <a:schemeClr val="accent1"/>
-          </a:effectRef>
-          <a:fontRef idx="minor">
-            <a:schemeClr val="tx1"/>
-          </a:fontRef>
-        </p:style>
-      </p:cxnSp>
+            <a:r>
+              <a:rPr lang="en-US" sz="700" dirty="0">
+                <a:solidFill>
+                  <a:schemeClr val="tx1"/>
+                </a:solidFill>
+              </a:rPr>
+              <a:t>y[3]</a:t>
+            </a:r>
+          </a:p>
+        </p:txBody>
+      </p:sp>
       <p:sp>
         <p:nvSpPr>
           <p:cNvPr id="50" name="TextBox 49">
@@ -22263,44 +21862,8 @@
         </p:nvSpPr>
         <p:spPr>
           <a:xfrm>
-            <a:off x="576903" y="1106759"/>
-            <a:ext cx="1180323" cy="307777"/>
-          </a:xfrm>
-          <a:prstGeom prst="rect">
-            <a:avLst/>
-          </a:prstGeom>
-          <a:noFill/>
-        </p:spPr>
-        <p:txBody>
-          <a:bodyPr wrap="none" rtlCol="0">
-            <a:spAutoFit/>
-          </a:bodyPr>
-          <a:lstStyle/>
-          <a:p>
-            <a:pPr algn="r"/>
-            <a:r>
-              <a:rPr lang="en-US" sz="1400" dirty="0"/>
-              <a:t>Packed buffer</a:t>
-            </a:r>
-          </a:p>
-        </p:txBody>
-      </p:sp>
-      <p:sp>
-        <p:nvSpPr>
-          <p:cNvPr id="51" name="TextBox 50">
-            <a:extLst>
-              <a:ext uri="{FF2B5EF4-FFF2-40B4-BE49-F238E27FC236}">
-                <a16:creationId xmlns:a16="http://schemas.microsoft.com/office/drawing/2014/main" id="{51BB6E5C-1742-8EC0-4CD9-294FD782CCEE}"/>
-              </a:ext>
-            </a:extLst>
-          </p:cNvPr>
-          <p:cNvSpPr txBox="1"/>
-          <p:nvPr/>
-        </p:nvSpPr>
-        <p:spPr>
-          <a:xfrm>
-            <a:off x="576902" y="249359"/>
-            <a:ext cx="1180324" cy="307777"/>
+            <a:off x="1061202" y="649760"/>
+            <a:ext cx="696023" cy="307777"/>
           </a:xfrm>
           <a:prstGeom prst="rect">
             <a:avLst/>
@@ -22316,155 +21879,131 @@
             <a:pPr algn="r"/>
             <a:r>
               <a:rPr lang="en-US" sz="1400" dirty="0"/>
-              <a:t>Array</a:t>
-            </a:r>
-          </a:p>
-        </p:txBody>
-      </p:sp>
-      <p:sp>
-        <p:nvSpPr>
-          <p:cNvPr id="52" name="Rectangle 51">
-            <a:extLst>
-              <a:ext uri="{FF2B5EF4-FFF2-40B4-BE49-F238E27FC236}">
-                <a16:creationId xmlns:a16="http://schemas.microsoft.com/office/drawing/2014/main" id="{D25E4042-2CCB-9195-F7CF-9321235B7426}"/>
-              </a:ext>
-            </a:extLst>
-          </p:cNvPr>
-          <p:cNvSpPr/>
-          <p:nvPr/>
-        </p:nvSpPr>
-        <p:spPr>
-          <a:xfrm>
-            <a:off x="5088619" y="1111001"/>
-            <a:ext cx="322151" cy="272753"/>
-          </a:xfrm>
-          <a:prstGeom prst="rect">
-            <a:avLst/>
-          </a:prstGeom>
-          <a:solidFill>
-            <a:srgbClr val="FAFDF0"/>
-          </a:solidFill>
-          <a:ln>
-            <a:solidFill>
-              <a:srgbClr val="DDF08B"/>
-            </a:solidFill>
-          </a:ln>
-        </p:spPr>
-        <p:style>
-          <a:lnRef idx="2">
-            <a:schemeClr val="accent1">
-              <a:shade val="15000"/>
-            </a:schemeClr>
-          </a:lnRef>
-          <a:fillRef idx="1">
-            <a:schemeClr val="accent1"/>
-          </a:fillRef>
-          <a:effectRef idx="0">
-            <a:schemeClr val="accent1"/>
-          </a:effectRef>
-          <a:fontRef idx="minor">
-            <a:schemeClr val="lt1"/>
-          </a:fontRef>
-        </p:style>
-        <p:txBody>
-          <a:bodyPr rtlCol="0" anchor="ctr"/>
-          <a:lstStyle/>
-          <a:p>
-            <a:pPr algn="ctr"/>
-            <a:endParaRPr lang="en-US" sz="800" dirty="0">
-              <a:solidFill>
-                <a:schemeClr val="tx1"/>
-              </a:solidFill>
-            </a:endParaRPr>
-          </a:p>
-        </p:txBody>
-      </p:sp>
-      <p:sp>
-        <p:nvSpPr>
-          <p:cNvPr id="53" name="Rectangle 52">
-            <a:extLst>
-              <a:ext uri="{FF2B5EF4-FFF2-40B4-BE49-F238E27FC236}">
-                <a16:creationId xmlns:a16="http://schemas.microsoft.com/office/drawing/2014/main" id="{D0D106E4-744C-C0CD-1CC0-EA4B8FB6A168}"/>
-              </a:ext>
-            </a:extLst>
-          </p:cNvPr>
-          <p:cNvSpPr/>
-          <p:nvPr/>
-        </p:nvSpPr>
-        <p:spPr>
-          <a:xfrm>
-            <a:off x="5410772" y="1111002"/>
-            <a:ext cx="322151" cy="272753"/>
-          </a:xfrm>
-          <a:prstGeom prst="rect">
-            <a:avLst/>
-          </a:prstGeom>
-          <a:solidFill>
-            <a:srgbClr val="FAFDF0"/>
-          </a:solidFill>
-          <a:ln>
-            <a:solidFill>
-              <a:srgbClr val="DDF08B"/>
-            </a:solidFill>
-          </a:ln>
-        </p:spPr>
-        <p:style>
-          <a:lnRef idx="2">
-            <a:schemeClr val="accent1">
-              <a:shade val="15000"/>
-            </a:schemeClr>
-          </a:lnRef>
-          <a:fillRef idx="1">
-            <a:schemeClr val="accent1"/>
-          </a:fillRef>
-          <a:effectRef idx="0">
-            <a:schemeClr val="accent1"/>
-          </a:effectRef>
-          <a:fontRef idx="minor">
-            <a:schemeClr val="lt1"/>
-          </a:fontRef>
-        </p:style>
-        <p:txBody>
-          <a:bodyPr rtlCol="0" anchor="ctr"/>
-          <a:lstStyle/>
-          <a:p>
-            <a:pPr algn="ctr"/>
-            <a:endParaRPr lang="en-US" sz="800" dirty="0">
-              <a:solidFill>
-                <a:schemeClr val="tx1"/>
-              </a:solidFill>
-            </a:endParaRPr>
-          </a:p>
-        </p:txBody>
-      </p:sp>
-      <p:sp>
-        <p:nvSpPr>
-          <p:cNvPr id="44" name="Rectangle 43">
-            <a:extLst>
-              <a:ext uri="{FF2B5EF4-FFF2-40B4-BE49-F238E27FC236}">
-                <a16:creationId xmlns:a16="http://schemas.microsoft.com/office/drawing/2014/main" id="{A6FAAB99-493F-1924-7F30-BAA03308AF34}"/>
-              </a:ext>
-            </a:extLst>
-          </p:cNvPr>
-          <p:cNvSpPr/>
-          <p:nvPr/>
-        </p:nvSpPr>
-        <p:spPr>
-          <a:xfrm>
-            <a:off x="4766471" y="1111005"/>
-            <a:ext cx="322151" cy="272753"/>
-          </a:xfrm>
-          <a:prstGeom prst="rect">
-            <a:avLst/>
-          </a:prstGeom>
-          <a:pattFill prst="wdUpDiag">
-            <a:fgClr>
+              <a:t>Packed</a:t>
+            </a:r>
+          </a:p>
+        </p:txBody>
+      </p:sp>
+      <p:sp>
+        <p:nvSpPr>
+          <p:cNvPr id="51" name="TextBox 50">
+            <a:extLst>
+              <a:ext uri="{FF2B5EF4-FFF2-40B4-BE49-F238E27FC236}">
+                <a16:creationId xmlns:a16="http://schemas.microsoft.com/office/drawing/2014/main" id="{51BB6E5C-1742-8EC0-4CD9-294FD782CCEE}"/>
+              </a:ext>
+            </a:extLst>
+          </p:cNvPr>
+          <p:cNvSpPr txBox="1"/>
+          <p:nvPr/>
+        </p:nvSpPr>
+        <p:spPr>
+          <a:xfrm>
+            <a:off x="900659" y="249359"/>
+            <a:ext cx="856567" cy="307777"/>
+          </a:xfrm>
+          <a:prstGeom prst="rect">
+            <a:avLst/>
+          </a:prstGeom>
+          <a:noFill/>
+        </p:spPr>
+        <p:txBody>
+          <a:bodyPr wrap="square" rtlCol="0">
+            <a:spAutoFit/>
+          </a:bodyPr>
+          <a:lstStyle/>
+          <a:p>
+            <a:pPr algn="r"/>
+            <a:r>
+              <a:rPr lang="en-US" sz="1400" dirty="0"/>
+              <a:t>Memory</a:t>
+            </a:r>
+          </a:p>
+        </p:txBody>
+      </p:sp>
+      <p:sp>
+        <p:nvSpPr>
+          <p:cNvPr id="3" name="Rectangle 2">
+            <a:extLst>
+              <a:ext uri="{FF2B5EF4-FFF2-40B4-BE49-F238E27FC236}">
+                <a16:creationId xmlns:a16="http://schemas.microsoft.com/office/drawing/2014/main" id="{8839767C-8CA2-5290-BB52-8EC3C544EBB0}"/>
+              </a:ext>
+            </a:extLst>
+          </p:cNvPr>
+          <p:cNvSpPr/>
+          <p:nvPr/>
+        </p:nvSpPr>
+        <p:spPr>
+          <a:xfrm>
+            <a:off x="5732922" y="253605"/>
+            <a:ext cx="322151" cy="272753"/>
+          </a:xfrm>
+          <a:prstGeom prst="rect">
+            <a:avLst/>
+          </a:prstGeom>
+          <a:solidFill>
+            <a:srgbClr val="FDF8EE"/>
+          </a:solidFill>
+          <a:ln>
+            <a:solidFill>
               <a:srgbClr val="EFC57B"/>
-            </a:fgClr>
-            <a:bgClr>
-              <a:schemeClr val="bg1"/>
-            </a:bgClr>
-          </a:pattFill>
+            </a:solidFill>
+          </a:ln>
+        </p:spPr>
+        <p:style>
+          <a:lnRef idx="2">
+            <a:schemeClr val="accent1">
+              <a:shade val="15000"/>
+            </a:schemeClr>
+          </a:lnRef>
+          <a:fillRef idx="1">
+            <a:schemeClr val="accent1"/>
+          </a:fillRef>
+          <a:effectRef idx="0">
+            <a:schemeClr val="accent1"/>
+          </a:effectRef>
+          <a:fontRef idx="minor">
+            <a:schemeClr val="lt1"/>
+          </a:fontRef>
+        </p:style>
+        <p:txBody>
+          <a:bodyPr rtlCol="0" anchor="ctr"/>
+          <a:lstStyle/>
+          <a:p>
+            <a:pPr algn="ctr"/>
+            <a:r>
+              <a:rPr lang="en-US" sz="700" dirty="0">
+                <a:solidFill>
+                  <a:schemeClr val="tx1"/>
+                </a:solidFill>
+              </a:rPr>
+              <a:t>y[4]</a:t>
+            </a:r>
+          </a:p>
+        </p:txBody>
+      </p:sp>
+      <p:sp>
+        <p:nvSpPr>
+          <p:cNvPr id="4" name="Rectangle 3">
+            <a:extLst>
+              <a:ext uri="{FF2B5EF4-FFF2-40B4-BE49-F238E27FC236}">
+                <a16:creationId xmlns:a16="http://schemas.microsoft.com/office/drawing/2014/main" id="{81B38D1C-6656-57F1-658E-72A38B9964C4}"/>
+              </a:ext>
+            </a:extLst>
+          </p:cNvPr>
+          <p:cNvSpPr/>
+          <p:nvPr/>
+        </p:nvSpPr>
+        <p:spPr>
+          <a:xfrm>
+            <a:off x="5080873" y="659291"/>
+            <a:ext cx="322151" cy="272753"/>
+          </a:xfrm>
+          <a:prstGeom prst="rect">
+            <a:avLst/>
+          </a:prstGeom>
+          <a:solidFill>
+            <a:srgbClr val="FDF8EE"/>
+          </a:solidFill>
           <a:ln>
             <a:solidFill>
               <a:srgbClr val="EFC57B"/>
@@ -22492,11 +22031,319 @@
           <a:lstStyle/>
           <a:p>
             <a:pPr algn="ctr"/>
-            <a:endParaRPr lang="en-US" sz="800" dirty="0">
-              <a:solidFill>
-                <a:schemeClr val="tx1"/>
-              </a:solidFill>
-            </a:endParaRPr>
+            <a:r>
+              <a:rPr lang="en-US" sz="700" dirty="0">
+                <a:solidFill>
+                  <a:schemeClr val="tx1"/>
+                </a:solidFill>
+              </a:rPr>
+              <a:t>y[4]</a:t>
+            </a:r>
+          </a:p>
+        </p:txBody>
+      </p:sp>
+      <p:sp>
+        <p:nvSpPr>
+          <p:cNvPr id="5" name="Rectangle 4">
+            <a:extLst>
+              <a:ext uri="{FF2B5EF4-FFF2-40B4-BE49-F238E27FC236}">
+                <a16:creationId xmlns:a16="http://schemas.microsoft.com/office/drawing/2014/main" id="{513E6787-8715-BA6B-1D5B-EFE1C0626FCA}"/>
+              </a:ext>
+            </a:extLst>
+          </p:cNvPr>
+          <p:cNvSpPr/>
+          <p:nvPr/>
+        </p:nvSpPr>
+        <p:spPr>
+          <a:xfrm>
+            <a:off x="1867112" y="659295"/>
+            <a:ext cx="322151" cy="272753"/>
+          </a:xfrm>
+          <a:prstGeom prst="rect">
+            <a:avLst/>
+          </a:prstGeom>
+          <a:solidFill>
+            <a:srgbClr val="F0FDF2"/>
+          </a:solidFill>
+          <a:ln>
+            <a:solidFill>
+              <a:srgbClr val="82E995"/>
+            </a:solidFill>
+          </a:ln>
+        </p:spPr>
+        <p:style>
+          <a:lnRef idx="2">
+            <a:schemeClr val="accent1">
+              <a:shade val="15000"/>
+            </a:schemeClr>
+          </a:lnRef>
+          <a:fillRef idx="1">
+            <a:schemeClr val="accent1"/>
+          </a:fillRef>
+          <a:effectRef idx="0">
+            <a:schemeClr val="accent1"/>
+          </a:effectRef>
+          <a:fontRef idx="minor">
+            <a:schemeClr val="lt1"/>
+          </a:fontRef>
+        </p:style>
+        <p:txBody>
+          <a:bodyPr rtlCol="0" anchor="ctr"/>
+          <a:lstStyle/>
+          <a:p>
+            <a:pPr algn="ctr"/>
+            <a:r>
+              <a:rPr lang="en-US" sz="700" dirty="0">
+                <a:solidFill>
+                  <a:schemeClr val="tx1"/>
+                </a:solidFill>
+              </a:rPr>
+              <a:t>4</a:t>
+            </a:r>
+          </a:p>
+        </p:txBody>
+      </p:sp>
+      <p:sp>
+        <p:nvSpPr>
+          <p:cNvPr id="7" name="Rectangle 6">
+            <a:extLst>
+              <a:ext uri="{FF2B5EF4-FFF2-40B4-BE49-F238E27FC236}">
+                <a16:creationId xmlns:a16="http://schemas.microsoft.com/office/drawing/2014/main" id="{6197113B-9DAA-FC1A-D9F0-357FCC8B6D74}"/>
+              </a:ext>
+            </a:extLst>
+          </p:cNvPr>
+          <p:cNvSpPr/>
+          <p:nvPr/>
+        </p:nvSpPr>
+        <p:spPr>
+          <a:xfrm>
+            <a:off x="3470118" y="659293"/>
+            <a:ext cx="322151" cy="272753"/>
+          </a:xfrm>
+          <a:prstGeom prst="rect">
+            <a:avLst/>
+          </a:prstGeom>
+          <a:solidFill>
+            <a:srgbClr val="F0FDF2"/>
+          </a:solidFill>
+          <a:ln>
+            <a:solidFill>
+              <a:srgbClr val="82E995"/>
+            </a:solidFill>
+          </a:ln>
+        </p:spPr>
+        <p:style>
+          <a:lnRef idx="2">
+            <a:schemeClr val="accent1">
+              <a:shade val="15000"/>
+            </a:schemeClr>
+          </a:lnRef>
+          <a:fillRef idx="1">
+            <a:schemeClr val="accent1"/>
+          </a:fillRef>
+          <a:effectRef idx="0">
+            <a:schemeClr val="accent1"/>
+          </a:effectRef>
+          <a:fontRef idx="minor">
+            <a:schemeClr val="lt1"/>
+          </a:fontRef>
+        </p:style>
+        <p:txBody>
+          <a:bodyPr rtlCol="0" anchor="ctr"/>
+          <a:lstStyle/>
+          <a:p>
+            <a:pPr algn="ctr"/>
+            <a:r>
+              <a:rPr lang="en-US" sz="700" dirty="0">
+                <a:solidFill>
+                  <a:schemeClr val="tx1"/>
+                </a:solidFill>
+              </a:rPr>
+              <a:t>5</a:t>
+            </a:r>
+          </a:p>
+        </p:txBody>
+      </p:sp>
+      <p:sp>
+        <p:nvSpPr>
+          <p:cNvPr id="36" name="Rectangle 35">
+            <a:extLst>
+              <a:ext uri="{FF2B5EF4-FFF2-40B4-BE49-F238E27FC236}">
+                <a16:creationId xmlns:a16="http://schemas.microsoft.com/office/drawing/2014/main" id="{5CE6A78A-C55E-5FD0-A432-FA7067E4421F}"/>
+              </a:ext>
+            </a:extLst>
+          </p:cNvPr>
+          <p:cNvSpPr/>
+          <p:nvPr/>
+        </p:nvSpPr>
+        <p:spPr>
+          <a:xfrm>
+            <a:off x="2186165" y="659295"/>
+            <a:ext cx="322151" cy="272753"/>
+          </a:xfrm>
+          <a:prstGeom prst="rect">
+            <a:avLst/>
+          </a:prstGeom>
+          <a:solidFill>
+            <a:srgbClr val="F2EFF6"/>
+          </a:solidFill>
+          <a:ln>
+            <a:solidFill>
+              <a:srgbClr val="360084"/>
+            </a:solidFill>
+          </a:ln>
+        </p:spPr>
+        <p:style>
+          <a:lnRef idx="2">
+            <a:schemeClr val="accent1">
+              <a:shade val="15000"/>
+            </a:schemeClr>
+          </a:lnRef>
+          <a:fillRef idx="1">
+            <a:schemeClr val="accent1"/>
+          </a:fillRef>
+          <a:effectRef idx="0">
+            <a:schemeClr val="accent1"/>
+          </a:effectRef>
+          <a:fontRef idx="minor">
+            <a:schemeClr val="lt1"/>
+          </a:fontRef>
+        </p:style>
+        <p:txBody>
+          <a:bodyPr rtlCol="0" anchor="ctr"/>
+          <a:lstStyle/>
+          <a:p>
+            <a:pPr algn="ctr"/>
+            <a:r>
+              <a:rPr lang="en-US" sz="700" dirty="0">
+                <a:solidFill>
+                  <a:schemeClr val="tx1"/>
+                </a:solidFill>
+              </a:rPr>
+              <a:t>x[0]</a:t>
+            </a:r>
+          </a:p>
+        </p:txBody>
+      </p:sp>
+      <p:sp>
+        <p:nvSpPr>
+          <p:cNvPr id="41" name="Rectangle 40">
+            <a:extLst>
+              <a:ext uri="{FF2B5EF4-FFF2-40B4-BE49-F238E27FC236}">
+                <a16:creationId xmlns:a16="http://schemas.microsoft.com/office/drawing/2014/main" id="{37DF5E3A-6341-2497-2EE3-B4B92A55FED8}"/>
+              </a:ext>
+            </a:extLst>
+          </p:cNvPr>
+          <p:cNvSpPr/>
+          <p:nvPr/>
+        </p:nvSpPr>
+        <p:spPr>
+          <a:xfrm>
+            <a:off x="3792269" y="659294"/>
+            <a:ext cx="322151" cy="272753"/>
+          </a:xfrm>
+          <a:prstGeom prst="rect">
+            <a:avLst/>
+          </a:prstGeom>
+          <a:solidFill>
+            <a:srgbClr val="FDF8EE"/>
+          </a:solidFill>
+          <a:ln>
+            <a:solidFill>
+              <a:srgbClr val="EFC57B"/>
+            </a:solidFill>
+          </a:ln>
+        </p:spPr>
+        <p:style>
+          <a:lnRef idx="2">
+            <a:schemeClr val="accent1">
+              <a:shade val="15000"/>
+            </a:schemeClr>
+          </a:lnRef>
+          <a:fillRef idx="1">
+            <a:schemeClr val="accent1"/>
+          </a:fillRef>
+          <a:effectRef idx="0">
+            <a:schemeClr val="accent1"/>
+          </a:effectRef>
+          <a:fontRef idx="minor">
+            <a:schemeClr val="lt1"/>
+          </a:fontRef>
+        </p:style>
+        <p:txBody>
+          <a:bodyPr rtlCol="0" anchor="ctr"/>
+          <a:lstStyle/>
+          <a:p>
+            <a:pPr algn="ctr"/>
+            <a:r>
+              <a:rPr lang="en-US" sz="700" dirty="0">
+                <a:solidFill>
+                  <a:schemeClr val="tx1"/>
+                </a:solidFill>
+              </a:rPr>
+              <a:t>y[0]</a:t>
+            </a:r>
+          </a:p>
+        </p:txBody>
+      </p:sp>
+      <p:sp>
+        <p:nvSpPr>
+          <p:cNvPr id="43" name="Rectangle 42">
+            <a:extLst>
+              <a:ext uri="{FF2B5EF4-FFF2-40B4-BE49-F238E27FC236}">
+                <a16:creationId xmlns:a16="http://schemas.microsoft.com/office/drawing/2014/main" id="{5A790D2E-1FEC-5D7B-939F-3C0656685A11}"/>
+              </a:ext>
+            </a:extLst>
+          </p:cNvPr>
+          <p:cNvSpPr/>
+          <p:nvPr/>
+        </p:nvSpPr>
+        <p:spPr>
+          <a:xfrm>
+            <a:off x="3152618" y="659293"/>
+            <a:ext cx="322151" cy="272753"/>
+          </a:xfrm>
+          <a:prstGeom prst="rect">
+            <a:avLst/>
+          </a:prstGeom>
+          <a:solidFill>
+            <a:srgbClr val="F2EFF6"/>
+          </a:solidFill>
+          <a:ln>
+            <a:solidFill>
+              <a:srgbClr val="360084"/>
+            </a:solidFill>
+          </a:ln>
+        </p:spPr>
+        <p:style>
+          <a:lnRef idx="2">
+            <a:schemeClr val="accent1">
+              <a:shade val="15000"/>
+            </a:schemeClr>
+          </a:lnRef>
+          <a:fillRef idx="1">
+            <a:schemeClr val="accent1"/>
+          </a:fillRef>
+          <a:effectRef idx="0">
+            <a:schemeClr val="accent1"/>
+          </a:effectRef>
+          <a:fontRef idx="minor">
+            <a:schemeClr val="lt1"/>
+          </a:fontRef>
+        </p:style>
+        <p:txBody>
+          <a:bodyPr rtlCol="0" anchor="ctr"/>
+          <a:lstStyle/>
+          <a:p>
+            <a:pPr algn="ctr"/>
+            <a:r>
+              <a:rPr lang="en-US" sz="700" dirty="0">
+                <a:solidFill>
+                  <a:schemeClr val="tx1"/>
+                </a:solidFill>
+              </a:rPr>
+              <a:t>x[3]</a:t>
+            </a:r>
           </a:p>
         </p:txBody>
       </p:sp>

</xml_diff>

<commit_message>
add intro section to non-blocking lesson
</commit_message>
<xml_diff>
--- a/files/communication_diagram.pptx
+++ b/files/communication_diagram.pptx
@@ -200,7 +200,7 @@
           <a:p>
             <a:fld id="{1DA394A1-87FE-BC40-B428-C4F79D5812EE}" type="datetimeFigureOut">
               <a:rPr lang="en-US" smtClean="0"/>
-              <a:t>6/5/23</a:t>
+              <a:t>6/9/23</a:t>
             </a:fld>
             <a:endParaRPr lang="en-US"/>
           </a:p>
@@ -785,7 +785,7 @@
           <a:p>
             <a:fld id="{5BD1349E-D158-4E40-990A-05F7F3787A3C}" type="datetimeFigureOut">
               <a:rPr lang="en-US" smtClean="0"/>
-              <a:t>6/5/23</a:t>
+              <a:t>6/9/23</a:t>
             </a:fld>
             <a:endParaRPr lang="en-US"/>
           </a:p>
@@ -985,7 +985,7 @@
           <a:p>
             <a:fld id="{5BD1349E-D158-4E40-990A-05F7F3787A3C}" type="datetimeFigureOut">
               <a:rPr lang="en-US" smtClean="0"/>
-              <a:t>6/5/23</a:t>
+              <a:t>6/9/23</a:t>
             </a:fld>
             <a:endParaRPr lang="en-US"/>
           </a:p>
@@ -1195,7 +1195,7 @@
           <a:p>
             <a:fld id="{5BD1349E-D158-4E40-990A-05F7F3787A3C}" type="datetimeFigureOut">
               <a:rPr lang="en-US" smtClean="0"/>
-              <a:t>6/5/23</a:t>
+              <a:t>6/9/23</a:t>
             </a:fld>
             <a:endParaRPr lang="en-US"/>
           </a:p>
@@ -1395,7 +1395,7 @@
           <a:p>
             <a:fld id="{5BD1349E-D158-4E40-990A-05F7F3787A3C}" type="datetimeFigureOut">
               <a:rPr lang="en-US" smtClean="0"/>
-              <a:t>6/5/23</a:t>
+              <a:t>6/9/23</a:t>
             </a:fld>
             <a:endParaRPr lang="en-US"/>
           </a:p>
@@ -1671,7 +1671,7 @@
           <a:p>
             <a:fld id="{5BD1349E-D158-4E40-990A-05F7F3787A3C}" type="datetimeFigureOut">
               <a:rPr lang="en-US" smtClean="0"/>
-              <a:t>6/5/23</a:t>
+              <a:t>6/9/23</a:t>
             </a:fld>
             <a:endParaRPr lang="en-US"/>
           </a:p>
@@ -1939,7 +1939,7 @@
           <a:p>
             <a:fld id="{5BD1349E-D158-4E40-990A-05F7F3787A3C}" type="datetimeFigureOut">
               <a:rPr lang="en-US" smtClean="0"/>
-              <a:t>6/5/23</a:t>
+              <a:t>6/9/23</a:t>
             </a:fld>
             <a:endParaRPr lang="en-US"/>
           </a:p>
@@ -2354,7 +2354,7 @@
           <a:p>
             <a:fld id="{5BD1349E-D158-4E40-990A-05F7F3787A3C}" type="datetimeFigureOut">
               <a:rPr lang="en-US" smtClean="0"/>
-              <a:t>6/5/23</a:t>
+              <a:t>6/9/23</a:t>
             </a:fld>
             <a:endParaRPr lang="en-US"/>
           </a:p>
@@ -2496,7 +2496,7 @@
           <a:p>
             <a:fld id="{5BD1349E-D158-4E40-990A-05F7F3787A3C}" type="datetimeFigureOut">
               <a:rPr lang="en-US" smtClean="0"/>
-              <a:t>6/5/23</a:t>
+              <a:t>6/9/23</a:t>
             </a:fld>
             <a:endParaRPr lang="en-US"/>
           </a:p>
@@ -2609,7 +2609,7 @@
           <a:p>
             <a:fld id="{5BD1349E-D158-4E40-990A-05F7F3787A3C}" type="datetimeFigureOut">
               <a:rPr lang="en-US" smtClean="0"/>
-              <a:t>6/5/23</a:t>
+              <a:t>6/9/23</a:t>
             </a:fld>
             <a:endParaRPr lang="en-US"/>
           </a:p>
@@ -2922,7 +2922,7 @@
           <a:p>
             <a:fld id="{5BD1349E-D158-4E40-990A-05F7F3787A3C}" type="datetimeFigureOut">
               <a:rPr lang="en-US" smtClean="0"/>
-              <a:t>6/5/23</a:t>
+              <a:t>6/9/23</a:t>
             </a:fld>
             <a:endParaRPr lang="en-US"/>
           </a:p>
@@ -3211,7 +3211,7 @@
           <a:p>
             <a:fld id="{5BD1349E-D158-4E40-990A-05F7F3787A3C}" type="datetimeFigureOut">
               <a:rPr lang="en-US" smtClean="0"/>
-              <a:t>6/5/23</a:t>
+              <a:t>6/9/23</a:t>
             </a:fld>
             <a:endParaRPr lang="en-US"/>
           </a:p>
@@ -3454,7 +3454,7 @@
           <a:p>
             <a:fld id="{5BD1349E-D158-4E40-990A-05F7F3787A3C}" type="datetimeFigureOut">
               <a:rPr lang="en-US" smtClean="0"/>
-              <a:t>6/5/23</a:t>
+              <a:t>6/9/23</a:t>
             </a:fld>
             <a:endParaRPr lang="en-US"/>
           </a:p>
@@ -5446,7 +5446,7 @@
                   <a:schemeClr val="tx1"/>
                 </a:solidFill>
               </a:rPr>
-              <a:t>Communication</a:t>
+              <a:t>Receiving</a:t>
             </a:r>
           </a:p>
         </p:txBody>
@@ -5519,7 +5519,7 @@
         </p:nvSpPr>
         <p:spPr>
           <a:xfrm>
-            <a:off x="7729303" y="4342884"/>
+            <a:off x="8639281" y="4343202"/>
             <a:ext cx="339115" cy="375781"/>
           </a:xfrm>
           <a:prstGeom prst="flowChartAlternateProcess">

</xml_diff>

<commit_message>
Deploying to gh-pages from @ Southampton-RSG-Training/dirac-intro-to-mpi@0b4117b137565aae3c8d1dbe89fd4947f2e5ee4c 🚀
</commit_message>
<xml_diff>
--- a/files/communication_diagram.pptx
+++ b/files/communication_diagram.pptx
@@ -200,7 +200,7 @@
           <a:p>
             <a:fld id="{1DA394A1-87FE-BC40-B428-C4F79D5812EE}" type="datetimeFigureOut">
               <a:rPr lang="en-US" smtClean="0"/>
-              <a:t>5/30/23</a:t>
+              <a:t>6/9/23</a:t>
             </a:fld>
             <a:endParaRPr lang="en-US"/>
           </a:p>
@@ -785,7 +785,7 @@
           <a:p>
             <a:fld id="{5BD1349E-D158-4E40-990A-05F7F3787A3C}" type="datetimeFigureOut">
               <a:rPr lang="en-US" smtClean="0"/>
-              <a:t>5/30/23</a:t>
+              <a:t>6/9/23</a:t>
             </a:fld>
             <a:endParaRPr lang="en-US"/>
           </a:p>
@@ -985,7 +985,7 @@
           <a:p>
             <a:fld id="{5BD1349E-D158-4E40-990A-05F7F3787A3C}" type="datetimeFigureOut">
               <a:rPr lang="en-US" smtClean="0"/>
-              <a:t>5/30/23</a:t>
+              <a:t>6/9/23</a:t>
             </a:fld>
             <a:endParaRPr lang="en-US"/>
           </a:p>
@@ -1195,7 +1195,7 @@
           <a:p>
             <a:fld id="{5BD1349E-D158-4E40-990A-05F7F3787A3C}" type="datetimeFigureOut">
               <a:rPr lang="en-US" smtClean="0"/>
-              <a:t>5/30/23</a:t>
+              <a:t>6/9/23</a:t>
             </a:fld>
             <a:endParaRPr lang="en-US"/>
           </a:p>
@@ -1395,7 +1395,7 @@
           <a:p>
             <a:fld id="{5BD1349E-D158-4E40-990A-05F7F3787A3C}" type="datetimeFigureOut">
               <a:rPr lang="en-US" smtClean="0"/>
-              <a:t>5/30/23</a:t>
+              <a:t>6/9/23</a:t>
             </a:fld>
             <a:endParaRPr lang="en-US"/>
           </a:p>
@@ -1671,7 +1671,7 @@
           <a:p>
             <a:fld id="{5BD1349E-D158-4E40-990A-05F7F3787A3C}" type="datetimeFigureOut">
               <a:rPr lang="en-US" smtClean="0"/>
-              <a:t>5/30/23</a:t>
+              <a:t>6/9/23</a:t>
             </a:fld>
             <a:endParaRPr lang="en-US"/>
           </a:p>
@@ -1939,7 +1939,7 @@
           <a:p>
             <a:fld id="{5BD1349E-D158-4E40-990A-05F7F3787A3C}" type="datetimeFigureOut">
               <a:rPr lang="en-US" smtClean="0"/>
-              <a:t>5/30/23</a:t>
+              <a:t>6/9/23</a:t>
             </a:fld>
             <a:endParaRPr lang="en-US"/>
           </a:p>
@@ -2354,7 +2354,7 @@
           <a:p>
             <a:fld id="{5BD1349E-D158-4E40-990A-05F7F3787A3C}" type="datetimeFigureOut">
               <a:rPr lang="en-US" smtClean="0"/>
-              <a:t>5/30/23</a:t>
+              <a:t>6/9/23</a:t>
             </a:fld>
             <a:endParaRPr lang="en-US"/>
           </a:p>
@@ -2496,7 +2496,7 @@
           <a:p>
             <a:fld id="{5BD1349E-D158-4E40-990A-05F7F3787A3C}" type="datetimeFigureOut">
               <a:rPr lang="en-US" smtClean="0"/>
-              <a:t>5/30/23</a:t>
+              <a:t>6/9/23</a:t>
             </a:fld>
             <a:endParaRPr lang="en-US"/>
           </a:p>
@@ -2609,7 +2609,7 @@
           <a:p>
             <a:fld id="{5BD1349E-D158-4E40-990A-05F7F3787A3C}" type="datetimeFigureOut">
               <a:rPr lang="en-US" smtClean="0"/>
-              <a:t>5/30/23</a:t>
+              <a:t>6/9/23</a:t>
             </a:fld>
             <a:endParaRPr lang="en-US"/>
           </a:p>
@@ -2922,7 +2922,7 @@
           <a:p>
             <a:fld id="{5BD1349E-D158-4E40-990A-05F7F3787A3C}" type="datetimeFigureOut">
               <a:rPr lang="en-US" smtClean="0"/>
-              <a:t>5/30/23</a:t>
+              <a:t>6/9/23</a:t>
             </a:fld>
             <a:endParaRPr lang="en-US"/>
           </a:p>
@@ -3211,7 +3211,7 @@
           <a:p>
             <a:fld id="{5BD1349E-D158-4E40-990A-05F7F3787A3C}" type="datetimeFigureOut">
               <a:rPr lang="en-US" smtClean="0"/>
-              <a:t>5/30/23</a:t>
+              <a:t>6/9/23</a:t>
             </a:fld>
             <a:endParaRPr lang="en-US"/>
           </a:p>
@@ -3454,7 +3454,7 @@
           <a:p>
             <a:fld id="{5BD1349E-D158-4E40-990A-05F7F3787A3C}" type="datetimeFigureOut">
               <a:rPr lang="en-US" smtClean="0"/>
-              <a:t>5/30/23</a:t>
+              <a:t>6/9/23</a:t>
             </a:fld>
             <a:endParaRPr lang="en-US"/>
           </a:p>
@@ -4985,6 +4985,673 @@
             <a:r>
               <a:rPr lang="en-US" dirty="0"/>
               <a:t>Blocking Communication</a:t>
+            </a:r>
+          </a:p>
+        </p:txBody>
+      </p:sp>
+      <p:sp>
+        <p:nvSpPr>
+          <p:cNvPr id="3" name="Alternative Process 2">
+            <a:extLst>
+              <a:ext uri="{FF2B5EF4-FFF2-40B4-BE49-F238E27FC236}">
+                <a16:creationId xmlns:a16="http://schemas.microsoft.com/office/drawing/2014/main" id="{A322C727-2B95-D0EF-E853-9F82D77657A2}"/>
+              </a:ext>
+            </a:extLst>
+          </p:cNvPr>
+          <p:cNvSpPr/>
+          <p:nvPr/>
+        </p:nvSpPr>
+        <p:spPr>
+          <a:xfrm>
+            <a:off x="6880411" y="3869457"/>
+            <a:ext cx="4736749" cy="375781"/>
+          </a:xfrm>
+          <a:prstGeom prst="flowChartAlternateProcess">
+            <a:avLst/>
+          </a:prstGeom>
+          <a:solidFill>
+            <a:srgbClr val="FAFDF0"/>
+          </a:solidFill>
+          <a:ln>
+            <a:solidFill>
+              <a:srgbClr val="DDF08B"/>
+            </a:solidFill>
+          </a:ln>
+        </p:spPr>
+        <p:style>
+          <a:lnRef idx="2">
+            <a:schemeClr val="accent1">
+              <a:shade val="15000"/>
+            </a:schemeClr>
+          </a:lnRef>
+          <a:fillRef idx="1">
+            <a:schemeClr val="accent1"/>
+          </a:fillRef>
+          <a:effectRef idx="0">
+            <a:schemeClr val="accent1"/>
+          </a:effectRef>
+          <a:fontRef idx="minor">
+            <a:schemeClr val="lt1"/>
+          </a:fontRef>
+        </p:style>
+        <p:txBody>
+          <a:bodyPr rtlCol="0" anchor="ctr"/>
+          <a:lstStyle/>
+          <a:p>
+            <a:pPr algn="ctr"/>
+            <a:endParaRPr lang="en-US"/>
+          </a:p>
+        </p:txBody>
+      </p:sp>
+      <p:sp>
+        <p:nvSpPr>
+          <p:cNvPr id="7" name="Alternative Process 6">
+            <a:extLst>
+              <a:ext uri="{FF2B5EF4-FFF2-40B4-BE49-F238E27FC236}">
+                <a16:creationId xmlns:a16="http://schemas.microsoft.com/office/drawing/2014/main" id="{7D9050CF-9505-5AF9-4639-4DAA36908FF4}"/>
+              </a:ext>
+            </a:extLst>
+          </p:cNvPr>
+          <p:cNvSpPr/>
+          <p:nvPr/>
+        </p:nvSpPr>
+        <p:spPr>
+          <a:xfrm>
+            <a:off x="6880411" y="4336750"/>
+            <a:ext cx="4123838" cy="375781"/>
+          </a:xfrm>
+          <a:prstGeom prst="flowChartAlternateProcess">
+            <a:avLst/>
+          </a:prstGeom>
+          <a:solidFill>
+            <a:srgbClr val="FAFDF0"/>
+          </a:solidFill>
+          <a:ln>
+            <a:solidFill>
+              <a:srgbClr val="DDF08B"/>
+            </a:solidFill>
+          </a:ln>
+        </p:spPr>
+        <p:style>
+          <a:lnRef idx="2">
+            <a:schemeClr val="accent1">
+              <a:shade val="15000"/>
+            </a:schemeClr>
+          </a:lnRef>
+          <a:fillRef idx="1">
+            <a:schemeClr val="accent1"/>
+          </a:fillRef>
+          <a:effectRef idx="0">
+            <a:schemeClr val="accent1"/>
+          </a:effectRef>
+          <a:fontRef idx="minor">
+            <a:schemeClr val="lt1"/>
+          </a:fontRef>
+        </p:style>
+        <p:txBody>
+          <a:bodyPr rtlCol="0" anchor="ctr"/>
+          <a:lstStyle/>
+          <a:p>
+            <a:pPr algn="ctr"/>
+            <a:endParaRPr lang="en-US"/>
+          </a:p>
+        </p:txBody>
+      </p:sp>
+      <p:sp>
+        <p:nvSpPr>
+          <p:cNvPr id="8" name="Alternative Process 7">
+            <a:extLst>
+              <a:ext uri="{FF2B5EF4-FFF2-40B4-BE49-F238E27FC236}">
+                <a16:creationId xmlns:a16="http://schemas.microsoft.com/office/drawing/2014/main" id="{CB1AF7D9-6B34-2B06-17ED-3D8B007620CB}"/>
+              </a:ext>
+            </a:extLst>
+          </p:cNvPr>
+          <p:cNvSpPr/>
+          <p:nvPr/>
+        </p:nvSpPr>
+        <p:spPr>
+          <a:xfrm>
+            <a:off x="8639281" y="3869457"/>
+            <a:ext cx="339115" cy="375781"/>
+          </a:xfrm>
+          <a:prstGeom prst="flowChartAlternateProcess">
+            <a:avLst/>
+          </a:prstGeom>
+          <a:solidFill>
+            <a:srgbClr val="F2EFF6"/>
+          </a:solidFill>
+          <a:ln>
+            <a:solidFill>
+              <a:srgbClr val="360084"/>
+            </a:solidFill>
+          </a:ln>
+        </p:spPr>
+        <p:style>
+          <a:lnRef idx="2">
+            <a:schemeClr val="accent1">
+              <a:shade val="15000"/>
+            </a:schemeClr>
+          </a:lnRef>
+          <a:fillRef idx="1">
+            <a:schemeClr val="accent1"/>
+          </a:fillRef>
+          <a:effectRef idx="0">
+            <a:schemeClr val="accent1"/>
+          </a:effectRef>
+          <a:fontRef idx="minor">
+            <a:schemeClr val="lt1"/>
+          </a:fontRef>
+        </p:style>
+        <p:txBody>
+          <a:bodyPr rtlCol="0" anchor="ctr"/>
+          <a:lstStyle/>
+          <a:p>
+            <a:pPr algn="ctr"/>
+            <a:endParaRPr lang="en-US"/>
+          </a:p>
+        </p:txBody>
+      </p:sp>
+      <p:sp>
+        <p:nvSpPr>
+          <p:cNvPr id="17" name="Alternative Process 16">
+            <a:extLst>
+              <a:ext uri="{FF2B5EF4-FFF2-40B4-BE49-F238E27FC236}">
+                <a16:creationId xmlns:a16="http://schemas.microsoft.com/office/drawing/2014/main" id="{621CBAAF-B394-F8CE-6CEF-5F02AB5DB896}"/>
+              </a:ext>
+            </a:extLst>
+          </p:cNvPr>
+          <p:cNvSpPr/>
+          <p:nvPr/>
+        </p:nvSpPr>
+        <p:spPr>
+          <a:xfrm>
+            <a:off x="10665134" y="4342884"/>
+            <a:ext cx="339115" cy="375781"/>
+          </a:xfrm>
+          <a:prstGeom prst="flowChartAlternateProcess">
+            <a:avLst/>
+          </a:prstGeom>
+          <a:solidFill>
+            <a:srgbClr val="F2EFF6"/>
+          </a:solidFill>
+          <a:ln>
+            <a:solidFill>
+              <a:srgbClr val="360084"/>
+            </a:solidFill>
+          </a:ln>
+        </p:spPr>
+        <p:style>
+          <a:lnRef idx="2">
+            <a:schemeClr val="accent1">
+              <a:shade val="15000"/>
+            </a:schemeClr>
+          </a:lnRef>
+          <a:fillRef idx="1">
+            <a:schemeClr val="accent1"/>
+          </a:fillRef>
+          <a:effectRef idx="0">
+            <a:schemeClr val="accent1"/>
+          </a:effectRef>
+          <a:fontRef idx="minor">
+            <a:schemeClr val="lt1"/>
+          </a:fontRef>
+        </p:style>
+        <p:txBody>
+          <a:bodyPr rtlCol="0" anchor="ctr"/>
+          <a:lstStyle/>
+          <a:p>
+            <a:pPr algn="ctr"/>
+            <a:endParaRPr lang="en-US"/>
+          </a:p>
+        </p:txBody>
+      </p:sp>
+      <p:sp>
+        <p:nvSpPr>
+          <p:cNvPr id="18" name="TextBox 17">
+            <a:extLst>
+              <a:ext uri="{FF2B5EF4-FFF2-40B4-BE49-F238E27FC236}">
+                <a16:creationId xmlns:a16="http://schemas.microsoft.com/office/drawing/2014/main" id="{0461C0C9-06AA-95D6-712D-F486B0CEA06E}"/>
+              </a:ext>
+            </a:extLst>
+          </p:cNvPr>
+          <p:cNvSpPr txBox="1"/>
+          <p:nvPr/>
+        </p:nvSpPr>
+        <p:spPr>
+          <a:xfrm>
+            <a:off x="6012159" y="3872680"/>
+            <a:ext cx="816249" cy="369332"/>
+          </a:xfrm>
+          <a:prstGeom prst="rect">
+            <a:avLst/>
+          </a:prstGeom>
+          <a:noFill/>
+        </p:spPr>
+        <p:txBody>
+          <a:bodyPr wrap="none" rtlCol="0">
+            <a:spAutoFit/>
+          </a:bodyPr>
+          <a:lstStyle/>
+          <a:p>
+            <a:r>
+              <a:rPr lang="en-US" dirty="0"/>
+              <a:t>Rank 0</a:t>
+            </a:r>
+          </a:p>
+        </p:txBody>
+      </p:sp>
+      <p:sp>
+        <p:nvSpPr>
+          <p:cNvPr id="24" name="TextBox 23">
+            <a:extLst>
+              <a:ext uri="{FF2B5EF4-FFF2-40B4-BE49-F238E27FC236}">
+                <a16:creationId xmlns:a16="http://schemas.microsoft.com/office/drawing/2014/main" id="{6AB8E812-8C85-7CAC-DDD9-A307C4CAADCA}"/>
+              </a:ext>
+            </a:extLst>
+          </p:cNvPr>
+          <p:cNvSpPr txBox="1"/>
+          <p:nvPr/>
+        </p:nvSpPr>
+        <p:spPr>
+          <a:xfrm>
+            <a:off x="6012159" y="4336750"/>
+            <a:ext cx="816249" cy="369332"/>
+          </a:xfrm>
+          <a:prstGeom prst="rect">
+            <a:avLst/>
+          </a:prstGeom>
+          <a:noFill/>
+        </p:spPr>
+        <p:txBody>
+          <a:bodyPr wrap="none" rtlCol="0">
+            <a:spAutoFit/>
+          </a:bodyPr>
+          <a:lstStyle/>
+          <a:p>
+            <a:r>
+              <a:rPr lang="en-US" dirty="0"/>
+              <a:t>Rank 1</a:t>
+            </a:r>
+          </a:p>
+        </p:txBody>
+      </p:sp>
+      <p:sp>
+        <p:nvSpPr>
+          <p:cNvPr id="26" name="Alternative Process 25">
+            <a:extLst>
+              <a:ext uri="{FF2B5EF4-FFF2-40B4-BE49-F238E27FC236}">
+                <a16:creationId xmlns:a16="http://schemas.microsoft.com/office/drawing/2014/main" id="{E523B841-528C-169C-9F67-C5B7CEDEC504}"/>
+              </a:ext>
+            </a:extLst>
+          </p:cNvPr>
+          <p:cNvSpPr/>
+          <p:nvPr/>
+        </p:nvSpPr>
+        <p:spPr>
+          <a:xfrm>
+            <a:off x="11278045" y="3866231"/>
+            <a:ext cx="339115" cy="375781"/>
+          </a:xfrm>
+          <a:prstGeom prst="flowChartAlternateProcess">
+            <a:avLst/>
+          </a:prstGeom>
+          <a:solidFill>
+            <a:srgbClr val="F2EFF6"/>
+          </a:solidFill>
+          <a:ln>
+            <a:solidFill>
+              <a:srgbClr val="360084"/>
+            </a:solidFill>
+          </a:ln>
+        </p:spPr>
+        <p:style>
+          <a:lnRef idx="2">
+            <a:schemeClr val="accent1">
+              <a:shade val="15000"/>
+            </a:schemeClr>
+          </a:lnRef>
+          <a:fillRef idx="1">
+            <a:schemeClr val="accent1"/>
+          </a:fillRef>
+          <a:effectRef idx="0">
+            <a:schemeClr val="accent1"/>
+          </a:effectRef>
+          <a:fontRef idx="minor">
+            <a:schemeClr val="lt1"/>
+          </a:fontRef>
+        </p:style>
+        <p:txBody>
+          <a:bodyPr rtlCol="0" anchor="ctr"/>
+          <a:lstStyle/>
+          <a:p>
+            <a:pPr algn="ctr"/>
+            <a:endParaRPr lang="en-US"/>
+          </a:p>
+        </p:txBody>
+      </p:sp>
+      <p:sp>
+        <p:nvSpPr>
+          <p:cNvPr id="29" name="Alternative Process 28">
+            <a:extLst>
+              <a:ext uri="{FF2B5EF4-FFF2-40B4-BE49-F238E27FC236}">
+                <a16:creationId xmlns:a16="http://schemas.microsoft.com/office/drawing/2014/main" id="{75AB3373-5212-4CA4-7291-A6AACDE57DDC}"/>
+              </a:ext>
+            </a:extLst>
+          </p:cNvPr>
+          <p:cNvSpPr/>
+          <p:nvPr/>
+        </p:nvSpPr>
+        <p:spPr>
+          <a:xfrm>
+            <a:off x="7335401" y="4902157"/>
+            <a:ext cx="1249095" cy="375781"/>
+          </a:xfrm>
+          <a:prstGeom prst="flowChartAlternateProcess">
+            <a:avLst/>
+          </a:prstGeom>
+          <a:solidFill>
+            <a:srgbClr val="FAFDF0"/>
+          </a:solidFill>
+          <a:ln>
+            <a:solidFill>
+              <a:srgbClr val="DDF08B"/>
+            </a:solidFill>
+          </a:ln>
+        </p:spPr>
+        <p:style>
+          <a:lnRef idx="2">
+            <a:schemeClr val="accent1">
+              <a:shade val="15000"/>
+            </a:schemeClr>
+          </a:lnRef>
+          <a:fillRef idx="1">
+            <a:schemeClr val="accent1"/>
+          </a:fillRef>
+          <a:effectRef idx="0">
+            <a:schemeClr val="accent1"/>
+          </a:effectRef>
+          <a:fontRef idx="minor">
+            <a:schemeClr val="lt1"/>
+          </a:fontRef>
+        </p:style>
+        <p:txBody>
+          <a:bodyPr rtlCol="0" anchor="ctr"/>
+          <a:lstStyle/>
+          <a:p>
+            <a:pPr algn="ctr"/>
+            <a:r>
+              <a:rPr lang="en-US" sz="1100" dirty="0">
+                <a:solidFill>
+                  <a:schemeClr val="tx1"/>
+                </a:solidFill>
+              </a:rPr>
+              <a:t>Calculations</a:t>
+            </a:r>
+          </a:p>
+        </p:txBody>
+      </p:sp>
+      <p:sp>
+        <p:nvSpPr>
+          <p:cNvPr id="30" name="Alternative Process 29">
+            <a:extLst>
+              <a:ext uri="{FF2B5EF4-FFF2-40B4-BE49-F238E27FC236}">
+                <a16:creationId xmlns:a16="http://schemas.microsoft.com/office/drawing/2014/main" id="{3580CF7A-A51F-A7F7-6CBE-C0F70897C841}"/>
+              </a:ext>
+            </a:extLst>
+          </p:cNvPr>
+          <p:cNvSpPr/>
+          <p:nvPr/>
+        </p:nvSpPr>
+        <p:spPr>
+          <a:xfrm>
+            <a:off x="8639281" y="4902156"/>
+            <a:ext cx="1249095" cy="375781"/>
+          </a:xfrm>
+          <a:prstGeom prst="flowChartAlternateProcess">
+            <a:avLst/>
+          </a:prstGeom>
+          <a:solidFill>
+            <a:srgbClr val="F2EFF6"/>
+          </a:solidFill>
+          <a:ln>
+            <a:solidFill>
+              <a:srgbClr val="360084"/>
+            </a:solidFill>
+          </a:ln>
+        </p:spPr>
+        <p:style>
+          <a:lnRef idx="2">
+            <a:schemeClr val="accent1">
+              <a:shade val="15000"/>
+            </a:schemeClr>
+          </a:lnRef>
+          <a:fillRef idx="1">
+            <a:schemeClr val="accent1"/>
+          </a:fillRef>
+          <a:effectRef idx="0">
+            <a:schemeClr val="accent1"/>
+          </a:effectRef>
+          <a:fontRef idx="minor">
+            <a:schemeClr val="lt1"/>
+          </a:fontRef>
+        </p:style>
+        <p:txBody>
+          <a:bodyPr rtlCol="0" anchor="ctr"/>
+          <a:lstStyle/>
+          <a:p>
+            <a:pPr algn="ctr"/>
+            <a:r>
+              <a:rPr lang="en-US" sz="1100" dirty="0">
+                <a:solidFill>
+                  <a:schemeClr val="tx1"/>
+                </a:solidFill>
+              </a:rPr>
+              <a:t>Receiving</a:t>
+            </a:r>
+          </a:p>
+        </p:txBody>
+      </p:sp>
+      <p:sp>
+        <p:nvSpPr>
+          <p:cNvPr id="36" name="Alternative Process 35">
+            <a:extLst>
+              <a:ext uri="{FF2B5EF4-FFF2-40B4-BE49-F238E27FC236}">
+                <a16:creationId xmlns:a16="http://schemas.microsoft.com/office/drawing/2014/main" id="{88D1DBFD-304F-B881-E438-90F32C3AED51}"/>
+              </a:ext>
+            </a:extLst>
+          </p:cNvPr>
+          <p:cNvSpPr/>
+          <p:nvPr/>
+        </p:nvSpPr>
+        <p:spPr>
+          <a:xfrm>
+            <a:off x="7959948" y="4339976"/>
+            <a:ext cx="1018448" cy="375781"/>
+          </a:xfrm>
+          <a:prstGeom prst="flowChartAlternateProcess">
+            <a:avLst/>
+          </a:prstGeom>
+          <a:solidFill>
+            <a:srgbClr val="FDF8EE"/>
+          </a:solidFill>
+          <a:ln>
+            <a:solidFill>
+              <a:srgbClr val="EFC57B"/>
+            </a:solidFill>
+          </a:ln>
+        </p:spPr>
+        <p:style>
+          <a:lnRef idx="2">
+            <a:schemeClr val="accent1">
+              <a:shade val="15000"/>
+            </a:schemeClr>
+          </a:lnRef>
+          <a:fillRef idx="1">
+            <a:schemeClr val="accent1"/>
+          </a:fillRef>
+          <a:effectRef idx="0">
+            <a:schemeClr val="accent1"/>
+          </a:effectRef>
+          <a:fontRef idx="minor">
+            <a:schemeClr val="lt1"/>
+          </a:fontRef>
+        </p:style>
+        <p:txBody>
+          <a:bodyPr rtlCol="0" anchor="ctr"/>
+          <a:lstStyle/>
+          <a:p>
+            <a:pPr algn="ctr"/>
+            <a:endParaRPr lang="en-US"/>
+          </a:p>
+        </p:txBody>
+      </p:sp>
+      <p:sp>
+        <p:nvSpPr>
+          <p:cNvPr id="25" name="Alternative Process 24">
+            <a:extLst>
+              <a:ext uri="{FF2B5EF4-FFF2-40B4-BE49-F238E27FC236}">
+                <a16:creationId xmlns:a16="http://schemas.microsoft.com/office/drawing/2014/main" id="{78187536-A481-90B5-12AB-FF03C844E92A}"/>
+              </a:ext>
+            </a:extLst>
+          </p:cNvPr>
+          <p:cNvSpPr/>
+          <p:nvPr/>
+        </p:nvSpPr>
+        <p:spPr>
+          <a:xfrm>
+            <a:off x="8639281" y="4343202"/>
+            <a:ext cx="339115" cy="375781"/>
+          </a:xfrm>
+          <a:prstGeom prst="flowChartAlternateProcess">
+            <a:avLst/>
+          </a:prstGeom>
+          <a:solidFill>
+            <a:srgbClr val="F2EFF6"/>
+          </a:solidFill>
+          <a:ln>
+            <a:solidFill>
+              <a:srgbClr val="360084"/>
+            </a:solidFill>
+          </a:ln>
+        </p:spPr>
+        <p:style>
+          <a:lnRef idx="2">
+            <a:schemeClr val="accent1">
+              <a:shade val="15000"/>
+            </a:schemeClr>
+          </a:lnRef>
+          <a:fillRef idx="1">
+            <a:schemeClr val="accent1"/>
+          </a:fillRef>
+          <a:effectRef idx="0">
+            <a:schemeClr val="accent1"/>
+          </a:effectRef>
+          <a:fontRef idx="minor">
+            <a:schemeClr val="lt1"/>
+          </a:fontRef>
+        </p:style>
+        <p:txBody>
+          <a:bodyPr rtlCol="0" anchor="ctr"/>
+          <a:lstStyle/>
+          <a:p>
+            <a:pPr algn="ctr"/>
+            <a:endParaRPr lang="en-US"/>
+          </a:p>
+        </p:txBody>
+      </p:sp>
+      <p:sp>
+        <p:nvSpPr>
+          <p:cNvPr id="37" name="Alternative Process 36">
+            <a:extLst>
+              <a:ext uri="{FF2B5EF4-FFF2-40B4-BE49-F238E27FC236}">
+                <a16:creationId xmlns:a16="http://schemas.microsoft.com/office/drawing/2014/main" id="{7E837ADA-1B4D-CBD7-EEBE-8F0321F25A34}"/>
+              </a:ext>
+            </a:extLst>
+          </p:cNvPr>
+          <p:cNvSpPr/>
+          <p:nvPr/>
+        </p:nvSpPr>
+        <p:spPr>
+          <a:xfrm>
+            <a:off x="9964460" y="4902155"/>
+            <a:ext cx="1249095" cy="375781"/>
+          </a:xfrm>
+          <a:prstGeom prst="flowChartAlternateProcess">
+            <a:avLst/>
+          </a:prstGeom>
+          <a:solidFill>
+            <a:srgbClr val="FDF8EE"/>
+          </a:solidFill>
+          <a:ln>
+            <a:solidFill>
+              <a:srgbClr val="EFC57B"/>
+            </a:solidFill>
+          </a:ln>
+        </p:spPr>
+        <p:style>
+          <a:lnRef idx="2">
+            <a:schemeClr val="accent1">
+              <a:shade val="15000"/>
+            </a:schemeClr>
+          </a:lnRef>
+          <a:fillRef idx="1">
+            <a:schemeClr val="accent1"/>
+          </a:fillRef>
+          <a:effectRef idx="0">
+            <a:schemeClr val="accent1"/>
+          </a:effectRef>
+          <a:fontRef idx="minor">
+            <a:schemeClr val="lt1"/>
+          </a:fontRef>
+        </p:style>
+        <p:txBody>
+          <a:bodyPr rtlCol="0" anchor="ctr"/>
+          <a:lstStyle/>
+          <a:p>
+            <a:pPr algn="ctr"/>
+            <a:r>
+              <a:rPr lang="en-US" sz="1100" dirty="0">
+                <a:solidFill>
+                  <a:schemeClr val="tx1"/>
+                </a:solidFill>
+              </a:rPr>
+              <a:t>Waiting</a:t>
+            </a:r>
+          </a:p>
+        </p:txBody>
+      </p:sp>
+      <p:sp>
+        <p:nvSpPr>
+          <p:cNvPr id="39" name="TextBox 38">
+            <a:extLst>
+              <a:ext uri="{FF2B5EF4-FFF2-40B4-BE49-F238E27FC236}">
+                <a16:creationId xmlns:a16="http://schemas.microsoft.com/office/drawing/2014/main" id="{063B7CD4-1253-D450-693D-551695C32084}"/>
+              </a:ext>
+            </a:extLst>
+          </p:cNvPr>
+          <p:cNvSpPr txBox="1"/>
+          <p:nvPr/>
+        </p:nvSpPr>
+        <p:spPr>
+          <a:xfrm>
+            <a:off x="6880410" y="3320907"/>
+            <a:ext cx="4736749" cy="369332"/>
+          </a:xfrm>
+          <a:prstGeom prst="rect">
+            <a:avLst/>
+          </a:prstGeom>
+          <a:noFill/>
+        </p:spPr>
+        <p:txBody>
+          <a:bodyPr wrap="square" rtlCol="0">
+            <a:spAutoFit/>
+          </a:bodyPr>
+          <a:lstStyle/>
+          <a:p>
+            <a:pPr algn="ctr"/>
+            <a:r>
+              <a:rPr lang="en-US" dirty="0"/>
+              <a:t>Non-blocking with Data Dependency</a:t>
             </a:r>
           </a:p>
         </p:txBody>
@@ -22347,6 +23014,425 @@
           </a:p>
         </p:txBody>
       </p:sp>
+      <p:sp>
+        <p:nvSpPr>
+          <p:cNvPr id="6" name="Rectangle 5">
+            <a:extLst>
+              <a:ext uri="{FF2B5EF4-FFF2-40B4-BE49-F238E27FC236}">
+                <a16:creationId xmlns:a16="http://schemas.microsoft.com/office/drawing/2014/main" id="{E5D20810-DF72-9536-F383-28BA0055A3ED}"/>
+              </a:ext>
+            </a:extLst>
+          </p:cNvPr>
+          <p:cNvSpPr/>
+          <p:nvPr/>
+        </p:nvSpPr>
+        <p:spPr>
+          <a:xfrm>
+            <a:off x="2238361" y="1950812"/>
+            <a:ext cx="490011" cy="490884"/>
+          </a:xfrm>
+          <a:prstGeom prst="rect">
+            <a:avLst/>
+          </a:prstGeom>
+          <a:solidFill>
+            <a:srgbClr val="FAFDF0"/>
+          </a:solidFill>
+          <a:ln>
+            <a:solidFill>
+              <a:srgbClr val="DDF08B"/>
+            </a:solidFill>
+          </a:ln>
+        </p:spPr>
+        <p:style>
+          <a:lnRef idx="2">
+            <a:schemeClr val="accent1">
+              <a:shade val="15000"/>
+            </a:schemeClr>
+          </a:lnRef>
+          <a:fillRef idx="1">
+            <a:schemeClr val="accent1"/>
+          </a:fillRef>
+          <a:effectRef idx="0">
+            <a:schemeClr val="accent1"/>
+          </a:effectRef>
+          <a:fontRef idx="minor">
+            <a:schemeClr val="lt1"/>
+          </a:fontRef>
+        </p:style>
+        <p:txBody>
+          <a:bodyPr rtlCol="0" anchor="ctr"/>
+          <a:lstStyle/>
+          <a:p>
+            <a:pPr algn="ctr"/>
+            <a:r>
+              <a:rPr lang="en-US" sz="800" dirty="0">
+                <a:solidFill>
+                  <a:schemeClr val="tx1"/>
+                </a:solidFill>
+              </a:rPr>
+              <a:t>Rank</a:t>
+            </a:r>
+          </a:p>
+          <a:p>
+            <a:pPr algn="ctr"/>
+            <a:r>
+              <a:rPr lang="en-US" sz="800" dirty="0">
+                <a:solidFill>
+                  <a:schemeClr val="tx1"/>
+                </a:solidFill>
+              </a:rPr>
+              <a:t>0</a:t>
+            </a:r>
+          </a:p>
+        </p:txBody>
+      </p:sp>
+      <p:sp>
+        <p:nvSpPr>
+          <p:cNvPr id="9" name="Rectangle 8">
+            <a:extLst>
+              <a:ext uri="{FF2B5EF4-FFF2-40B4-BE49-F238E27FC236}">
+                <a16:creationId xmlns:a16="http://schemas.microsoft.com/office/drawing/2014/main" id="{DA0E279E-7456-AD7B-0455-087833D77581}"/>
+              </a:ext>
+            </a:extLst>
+          </p:cNvPr>
+          <p:cNvSpPr/>
+          <p:nvPr/>
+        </p:nvSpPr>
+        <p:spPr>
+          <a:xfrm>
+            <a:off x="3141182" y="1950812"/>
+            <a:ext cx="490011" cy="490884"/>
+          </a:xfrm>
+          <a:prstGeom prst="rect">
+            <a:avLst/>
+          </a:prstGeom>
+          <a:solidFill>
+            <a:srgbClr val="FAFDF0"/>
+          </a:solidFill>
+          <a:ln>
+            <a:solidFill>
+              <a:srgbClr val="DDF08B"/>
+            </a:solidFill>
+          </a:ln>
+        </p:spPr>
+        <p:style>
+          <a:lnRef idx="2">
+            <a:schemeClr val="accent1">
+              <a:shade val="15000"/>
+            </a:schemeClr>
+          </a:lnRef>
+          <a:fillRef idx="1">
+            <a:schemeClr val="accent1"/>
+          </a:fillRef>
+          <a:effectRef idx="0">
+            <a:schemeClr val="accent1"/>
+          </a:effectRef>
+          <a:fontRef idx="minor">
+            <a:schemeClr val="lt1"/>
+          </a:fontRef>
+        </p:style>
+        <p:txBody>
+          <a:bodyPr rtlCol="0" anchor="ctr"/>
+          <a:lstStyle/>
+          <a:p>
+            <a:pPr algn="ctr"/>
+            <a:r>
+              <a:rPr lang="en-US" sz="800" dirty="0">
+                <a:solidFill>
+                  <a:schemeClr val="tx1"/>
+                </a:solidFill>
+              </a:rPr>
+              <a:t>Rank</a:t>
+            </a:r>
+          </a:p>
+          <a:p>
+            <a:pPr algn="ctr"/>
+            <a:r>
+              <a:rPr lang="en-US" sz="800" dirty="0">
+                <a:solidFill>
+                  <a:schemeClr val="tx1"/>
+                </a:solidFill>
+              </a:rPr>
+              <a:t>1</a:t>
+            </a:r>
+          </a:p>
+        </p:txBody>
+      </p:sp>
+      <p:sp>
+        <p:nvSpPr>
+          <p:cNvPr id="10" name="Rectangle 9">
+            <a:extLst>
+              <a:ext uri="{FF2B5EF4-FFF2-40B4-BE49-F238E27FC236}">
+                <a16:creationId xmlns:a16="http://schemas.microsoft.com/office/drawing/2014/main" id="{F6A30FB5-3549-63EE-9062-A4F69C629663}"/>
+              </a:ext>
+            </a:extLst>
+          </p:cNvPr>
+          <p:cNvSpPr/>
+          <p:nvPr/>
+        </p:nvSpPr>
+        <p:spPr>
+          <a:xfrm>
+            <a:off x="4044003" y="1950812"/>
+            <a:ext cx="490011" cy="490884"/>
+          </a:xfrm>
+          <a:prstGeom prst="rect">
+            <a:avLst/>
+          </a:prstGeom>
+          <a:solidFill>
+            <a:srgbClr val="FAFDF0"/>
+          </a:solidFill>
+          <a:ln>
+            <a:solidFill>
+              <a:srgbClr val="DDF08B"/>
+            </a:solidFill>
+          </a:ln>
+        </p:spPr>
+        <p:style>
+          <a:lnRef idx="2">
+            <a:schemeClr val="accent1">
+              <a:shade val="15000"/>
+            </a:schemeClr>
+          </a:lnRef>
+          <a:fillRef idx="1">
+            <a:schemeClr val="accent1"/>
+          </a:fillRef>
+          <a:effectRef idx="0">
+            <a:schemeClr val="accent1"/>
+          </a:effectRef>
+          <a:fontRef idx="minor">
+            <a:schemeClr val="lt1"/>
+          </a:fontRef>
+        </p:style>
+        <p:txBody>
+          <a:bodyPr rtlCol="0" anchor="ctr"/>
+          <a:lstStyle/>
+          <a:p>
+            <a:pPr algn="ctr"/>
+            <a:r>
+              <a:rPr lang="en-US" sz="800" dirty="0">
+                <a:solidFill>
+                  <a:schemeClr val="tx1"/>
+                </a:solidFill>
+              </a:rPr>
+              <a:t>Rank</a:t>
+            </a:r>
+          </a:p>
+          <a:p>
+            <a:pPr algn="ctr"/>
+            <a:r>
+              <a:rPr lang="en-US" sz="800" dirty="0">
+                <a:solidFill>
+                  <a:schemeClr val="tx1"/>
+                </a:solidFill>
+              </a:rPr>
+              <a:t>2</a:t>
+            </a:r>
+          </a:p>
+        </p:txBody>
+      </p:sp>
+      <p:cxnSp>
+        <p:nvCxnSpPr>
+          <p:cNvPr id="12" name="Straight Arrow Connector 11">
+            <a:extLst>
+              <a:ext uri="{FF2B5EF4-FFF2-40B4-BE49-F238E27FC236}">
+                <a16:creationId xmlns:a16="http://schemas.microsoft.com/office/drawing/2014/main" id="{45C1B572-86A6-39CD-08C7-ED63F210C836}"/>
+              </a:ext>
+            </a:extLst>
+          </p:cNvPr>
+          <p:cNvCxnSpPr>
+            <a:stCxn id="6" idx="3"/>
+            <a:endCxn id="9" idx="1"/>
+          </p:cNvCxnSpPr>
+          <p:nvPr/>
+        </p:nvCxnSpPr>
+        <p:spPr>
+          <a:xfrm>
+            <a:off x="2728372" y="2196254"/>
+            <a:ext cx="412810" cy="0"/>
+          </a:xfrm>
+          <a:prstGeom prst="straightConnector1">
+            <a:avLst/>
+          </a:prstGeom>
+          <a:ln w="12700">
+            <a:headEnd type="triangle"/>
+            <a:tailEnd type="triangle"/>
+          </a:ln>
+        </p:spPr>
+        <p:style>
+          <a:lnRef idx="1">
+            <a:schemeClr val="dk1"/>
+          </a:lnRef>
+          <a:fillRef idx="0">
+            <a:schemeClr val="dk1"/>
+          </a:fillRef>
+          <a:effectRef idx="0">
+            <a:schemeClr val="dk1"/>
+          </a:effectRef>
+          <a:fontRef idx="minor">
+            <a:schemeClr val="tx1"/>
+          </a:fontRef>
+        </p:style>
+      </p:cxnSp>
+      <p:cxnSp>
+        <p:nvCxnSpPr>
+          <p:cNvPr id="13" name="Straight Arrow Connector 12">
+            <a:extLst>
+              <a:ext uri="{FF2B5EF4-FFF2-40B4-BE49-F238E27FC236}">
+                <a16:creationId xmlns:a16="http://schemas.microsoft.com/office/drawing/2014/main" id="{B9CF6AB7-DBA3-078F-4BC4-26128EC51C3E}"/>
+              </a:ext>
+            </a:extLst>
+          </p:cNvPr>
+          <p:cNvCxnSpPr/>
+          <p:nvPr/>
+        </p:nvCxnSpPr>
+        <p:spPr>
+          <a:xfrm>
+            <a:off x="3638942" y="2187239"/>
+            <a:ext cx="412810" cy="0"/>
+          </a:xfrm>
+          <a:prstGeom prst="straightConnector1">
+            <a:avLst/>
+          </a:prstGeom>
+          <a:ln w="12700">
+            <a:headEnd type="triangle"/>
+            <a:tailEnd type="triangle"/>
+          </a:ln>
+        </p:spPr>
+        <p:style>
+          <a:lnRef idx="1">
+            <a:schemeClr val="dk1"/>
+          </a:lnRef>
+          <a:fillRef idx="0">
+            <a:schemeClr val="dk1"/>
+          </a:fillRef>
+          <a:effectRef idx="0">
+            <a:schemeClr val="dk1"/>
+          </a:effectRef>
+          <a:fontRef idx="minor">
+            <a:schemeClr val="tx1"/>
+          </a:fontRef>
+        </p:style>
+      </p:cxnSp>
+      <p:cxnSp>
+        <p:nvCxnSpPr>
+          <p:cNvPr id="17" name="Elbow Connector 16">
+            <a:extLst>
+              <a:ext uri="{FF2B5EF4-FFF2-40B4-BE49-F238E27FC236}">
+                <a16:creationId xmlns:a16="http://schemas.microsoft.com/office/drawing/2014/main" id="{9398B8BB-47E8-7BD2-2E6C-D08B8869C3C7}"/>
+              </a:ext>
+            </a:extLst>
+          </p:cNvPr>
+          <p:cNvCxnSpPr>
+            <a:cxnSpLocks/>
+            <a:stCxn id="10" idx="3"/>
+          </p:cNvCxnSpPr>
+          <p:nvPr/>
+        </p:nvCxnSpPr>
+        <p:spPr>
+          <a:xfrm>
+            <a:off x="4534014" y="2196254"/>
+            <a:ext cx="270293" cy="339352"/>
+          </a:xfrm>
+          <a:prstGeom prst="bentConnector2">
+            <a:avLst/>
+          </a:prstGeom>
+          <a:ln w="12700">
+            <a:headEnd type="triangle"/>
+          </a:ln>
+        </p:spPr>
+        <p:style>
+          <a:lnRef idx="1">
+            <a:schemeClr val="dk1"/>
+          </a:lnRef>
+          <a:fillRef idx="0">
+            <a:schemeClr val="dk1"/>
+          </a:fillRef>
+          <a:effectRef idx="0">
+            <a:schemeClr val="dk1"/>
+          </a:effectRef>
+          <a:fontRef idx="minor">
+            <a:schemeClr val="tx1"/>
+          </a:fontRef>
+        </p:style>
+      </p:cxnSp>
+      <p:cxnSp>
+        <p:nvCxnSpPr>
+          <p:cNvPr id="39" name="Straight Connector 38">
+            <a:extLst>
+              <a:ext uri="{FF2B5EF4-FFF2-40B4-BE49-F238E27FC236}">
+                <a16:creationId xmlns:a16="http://schemas.microsoft.com/office/drawing/2014/main" id="{286F4BB3-3E99-EBBD-8924-AA25BE7B52AB}"/>
+              </a:ext>
+            </a:extLst>
+          </p:cNvPr>
+          <p:cNvCxnSpPr/>
+          <p:nvPr/>
+        </p:nvCxnSpPr>
+        <p:spPr>
+          <a:xfrm>
+            <a:off x="1968068" y="2535606"/>
+            <a:ext cx="2836239" cy="0"/>
+          </a:xfrm>
+          <a:prstGeom prst="line">
+            <a:avLst/>
+          </a:prstGeom>
+          <a:ln w="12700"/>
+        </p:spPr>
+        <p:style>
+          <a:lnRef idx="1">
+            <a:schemeClr val="dk1"/>
+          </a:lnRef>
+          <a:fillRef idx="0">
+            <a:schemeClr val="dk1"/>
+          </a:fillRef>
+          <a:effectRef idx="0">
+            <a:schemeClr val="dk1"/>
+          </a:effectRef>
+          <a:fontRef idx="minor">
+            <a:schemeClr val="tx1"/>
+          </a:fontRef>
+        </p:style>
+      </p:cxnSp>
+      <p:cxnSp>
+        <p:nvCxnSpPr>
+          <p:cNvPr id="47" name="Elbow Connector 46">
+            <a:extLst>
+              <a:ext uri="{FF2B5EF4-FFF2-40B4-BE49-F238E27FC236}">
+                <a16:creationId xmlns:a16="http://schemas.microsoft.com/office/drawing/2014/main" id="{1C9FD76F-5386-0F02-7F3B-69D40329AF64}"/>
+              </a:ext>
+            </a:extLst>
+          </p:cNvPr>
+          <p:cNvCxnSpPr>
+            <a:cxnSpLocks/>
+          </p:cNvCxnSpPr>
+          <p:nvPr/>
+        </p:nvCxnSpPr>
+        <p:spPr>
+          <a:xfrm flipH="1">
+            <a:off x="1975148" y="2196254"/>
+            <a:ext cx="270293" cy="339352"/>
+          </a:xfrm>
+          <a:prstGeom prst="bentConnector2">
+            <a:avLst/>
+          </a:prstGeom>
+          <a:ln w="12700">
+            <a:headEnd type="triangle"/>
+          </a:ln>
+        </p:spPr>
+        <p:style>
+          <a:lnRef idx="1">
+            <a:schemeClr val="dk1"/>
+          </a:lnRef>
+          <a:fillRef idx="0">
+            <a:schemeClr val="dk1"/>
+          </a:fillRef>
+          <a:effectRef idx="0">
+            <a:schemeClr val="dk1"/>
+          </a:effectRef>
+          <a:fontRef idx="minor">
+            <a:schemeClr val="tx1"/>
+          </a:fontRef>
+        </p:style>
+      </p:cxnSp>
     </p:spTree>
     <p:extLst>
       <p:ext uri="{BB962C8B-B14F-4D97-AF65-F5344CB8AC3E}">

</xml_diff>

<commit_message>
Deploying to gh-pages from @ Southampton-RSG-Training/dirac-intro-to-mpi@ada5269befc19ab41c81b9d9a23a68d133824520 🚀
</commit_message>
<xml_diff>
--- a/files/communication_diagram.pptx
+++ b/files/communication_diagram.pptx
@@ -5,13 +5,14 @@
     <p:sldMasterId id="2147483648" r:id="rId1"/>
   </p:sldMasterIdLst>
   <p:notesMasterIdLst>
-    <p:notesMasterId r:id="rId6"/>
+    <p:notesMasterId r:id="rId7"/>
   </p:notesMasterIdLst>
   <p:sldIdLst>
     <p:sldId id="256" r:id="rId2"/>
     <p:sldId id="257" r:id="rId3"/>
     <p:sldId id="258" r:id="rId4"/>
     <p:sldId id="259" r:id="rId5"/>
+    <p:sldId id="260" r:id="rId6"/>
   </p:sldIdLst>
   <p:sldSz cx="12192000" cy="6858000"/>
   <p:notesSz cx="6858000" cy="9144000"/>
@@ -200,7 +201,7 @@
           <a:p>
             <a:fld id="{1DA394A1-87FE-BC40-B428-C4F79D5812EE}" type="datetimeFigureOut">
               <a:rPr lang="en-US" smtClean="0"/>
-              <a:t>6/9/23</a:t>
+              <a:t>7/18/23</a:t>
             </a:fld>
             <a:endParaRPr lang="en-US"/>
           </a:p>
@@ -785,7 +786,7 @@
           <a:p>
             <a:fld id="{5BD1349E-D158-4E40-990A-05F7F3787A3C}" type="datetimeFigureOut">
               <a:rPr lang="en-US" smtClean="0"/>
-              <a:t>6/9/23</a:t>
+              <a:t>7/18/23</a:t>
             </a:fld>
             <a:endParaRPr lang="en-US"/>
           </a:p>
@@ -985,7 +986,7 @@
           <a:p>
             <a:fld id="{5BD1349E-D158-4E40-990A-05F7F3787A3C}" type="datetimeFigureOut">
               <a:rPr lang="en-US" smtClean="0"/>
-              <a:t>6/9/23</a:t>
+              <a:t>7/18/23</a:t>
             </a:fld>
             <a:endParaRPr lang="en-US"/>
           </a:p>
@@ -1195,7 +1196,7 @@
           <a:p>
             <a:fld id="{5BD1349E-D158-4E40-990A-05F7F3787A3C}" type="datetimeFigureOut">
               <a:rPr lang="en-US" smtClean="0"/>
-              <a:t>6/9/23</a:t>
+              <a:t>7/18/23</a:t>
             </a:fld>
             <a:endParaRPr lang="en-US"/>
           </a:p>
@@ -1395,7 +1396,7 @@
           <a:p>
             <a:fld id="{5BD1349E-D158-4E40-990A-05F7F3787A3C}" type="datetimeFigureOut">
               <a:rPr lang="en-US" smtClean="0"/>
-              <a:t>6/9/23</a:t>
+              <a:t>7/18/23</a:t>
             </a:fld>
             <a:endParaRPr lang="en-US"/>
           </a:p>
@@ -1671,7 +1672,7 @@
           <a:p>
             <a:fld id="{5BD1349E-D158-4E40-990A-05F7F3787A3C}" type="datetimeFigureOut">
               <a:rPr lang="en-US" smtClean="0"/>
-              <a:t>6/9/23</a:t>
+              <a:t>7/18/23</a:t>
             </a:fld>
             <a:endParaRPr lang="en-US"/>
           </a:p>
@@ -1939,7 +1940,7 @@
           <a:p>
             <a:fld id="{5BD1349E-D158-4E40-990A-05F7F3787A3C}" type="datetimeFigureOut">
               <a:rPr lang="en-US" smtClean="0"/>
-              <a:t>6/9/23</a:t>
+              <a:t>7/18/23</a:t>
             </a:fld>
             <a:endParaRPr lang="en-US"/>
           </a:p>
@@ -2354,7 +2355,7 @@
           <a:p>
             <a:fld id="{5BD1349E-D158-4E40-990A-05F7F3787A3C}" type="datetimeFigureOut">
               <a:rPr lang="en-US" smtClean="0"/>
-              <a:t>6/9/23</a:t>
+              <a:t>7/18/23</a:t>
             </a:fld>
             <a:endParaRPr lang="en-US"/>
           </a:p>
@@ -2496,7 +2497,7 @@
           <a:p>
             <a:fld id="{5BD1349E-D158-4E40-990A-05F7F3787A3C}" type="datetimeFigureOut">
               <a:rPr lang="en-US" smtClean="0"/>
-              <a:t>6/9/23</a:t>
+              <a:t>7/18/23</a:t>
             </a:fld>
             <a:endParaRPr lang="en-US"/>
           </a:p>
@@ -2609,7 +2610,7 @@
           <a:p>
             <a:fld id="{5BD1349E-D158-4E40-990A-05F7F3787A3C}" type="datetimeFigureOut">
               <a:rPr lang="en-US" smtClean="0"/>
-              <a:t>6/9/23</a:t>
+              <a:t>7/18/23</a:t>
             </a:fld>
             <a:endParaRPr lang="en-US"/>
           </a:p>
@@ -2922,7 +2923,7 @@
           <a:p>
             <a:fld id="{5BD1349E-D158-4E40-990A-05F7F3787A3C}" type="datetimeFigureOut">
               <a:rPr lang="en-US" smtClean="0"/>
-              <a:t>6/9/23</a:t>
+              <a:t>7/18/23</a:t>
             </a:fld>
             <a:endParaRPr lang="en-US"/>
           </a:p>
@@ -3211,7 +3212,7 @@
           <a:p>
             <a:fld id="{5BD1349E-D158-4E40-990A-05F7F3787A3C}" type="datetimeFigureOut">
               <a:rPr lang="en-US" smtClean="0"/>
-              <a:t>6/9/23</a:t>
+              <a:t>7/18/23</a:t>
             </a:fld>
             <a:endParaRPr lang="en-US"/>
           </a:p>
@@ -3454,7 +3455,7 @@
           <a:p>
             <a:fld id="{5BD1349E-D158-4E40-990A-05F7F3787A3C}" type="datetimeFigureOut">
               <a:rPr lang="en-US" smtClean="0"/>
-              <a:t>6/9/23</a:t>
+              <a:t>7/18/23</a:t>
             </a:fld>
             <a:endParaRPr lang="en-US"/>
           </a:p>
@@ -23437,6 +23438,765 @@
     <p:extLst>
       <p:ext uri="{BB962C8B-B14F-4D97-AF65-F5344CB8AC3E}">
         <p14:creationId xmlns:p14="http://schemas.microsoft.com/office/powerpoint/2010/main" val="2905784832"/>
+      </p:ext>
+    </p:extLst>
+  </p:cSld>
+  <p:clrMapOvr>
+    <a:masterClrMapping/>
+  </p:clrMapOvr>
+</p:sld>
+</file>
+
+<file path=ppt/slides/slide5.xml><?xml version="1.0" encoding="utf-8"?>
+<p:sld xmlns:a="http://schemas.openxmlformats.org/drawingml/2006/main" xmlns:r="http://schemas.openxmlformats.org/officeDocument/2006/relationships" xmlns:p="http://schemas.openxmlformats.org/presentationml/2006/main">
+  <p:cSld>
+    <p:spTree>
+      <p:nvGrpSpPr>
+        <p:cNvPr id="1" name=""/>
+        <p:cNvGrpSpPr/>
+        <p:nvPr/>
+      </p:nvGrpSpPr>
+      <p:grpSpPr>
+        <a:xfrm>
+          <a:off x="0" y="0"/>
+          <a:ext cx="0" cy="0"/>
+          <a:chOff x="0" y="0"/>
+          <a:chExt cx="0" cy="0"/>
+        </a:xfrm>
+      </p:grpSpPr>
+      <p:sp>
+        <p:nvSpPr>
+          <p:cNvPr id="48" name="Rectangle 47">
+            <a:extLst>
+              <a:ext uri="{FF2B5EF4-FFF2-40B4-BE49-F238E27FC236}">
+                <a16:creationId xmlns:a16="http://schemas.microsoft.com/office/drawing/2014/main" id="{1875138C-411D-09C9-B4EF-658582612DD5}"/>
+              </a:ext>
+            </a:extLst>
+          </p:cNvPr>
+          <p:cNvSpPr/>
+          <p:nvPr/>
+        </p:nvSpPr>
+        <p:spPr>
+          <a:xfrm>
+            <a:off x="2246302" y="685242"/>
+            <a:ext cx="281734" cy="1206394"/>
+          </a:xfrm>
+          <a:prstGeom prst="rect">
+            <a:avLst/>
+          </a:prstGeom>
+          <a:solidFill>
+            <a:srgbClr val="15AD2E"/>
+          </a:solidFill>
+        </p:spPr>
+        <p:style>
+          <a:lnRef idx="2">
+            <a:schemeClr val="accent1">
+              <a:shade val="15000"/>
+            </a:schemeClr>
+          </a:lnRef>
+          <a:fillRef idx="1">
+            <a:schemeClr val="accent1"/>
+          </a:fillRef>
+          <a:effectRef idx="0">
+            <a:schemeClr val="accent1"/>
+          </a:effectRef>
+          <a:fontRef idx="minor">
+            <a:schemeClr val="lt1"/>
+          </a:fontRef>
+        </p:style>
+        <p:txBody>
+          <a:bodyPr rtlCol="0" anchor="ctr"/>
+          <a:lstStyle/>
+          <a:p>
+            <a:pPr algn="ctr"/>
+            <a:endParaRPr lang="en-US" dirty="0"/>
+          </a:p>
+        </p:txBody>
+      </p:sp>
+      <p:sp>
+        <p:nvSpPr>
+          <p:cNvPr id="49" name="Rectangle 48">
+            <a:extLst>
+              <a:ext uri="{FF2B5EF4-FFF2-40B4-BE49-F238E27FC236}">
+                <a16:creationId xmlns:a16="http://schemas.microsoft.com/office/drawing/2014/main" id="{D1027101-0CA7-5506-C8FC-388DFFCE4873}"/>
+              </a:ext>
+            </a:extLst>
+          </p:cNvPr>
+          <p:cNvSpPr/>
+          <p:nvPr/>
+        </p:nvSpPr>
+        <p:spPr>
+          <a:xfrm>
+            <a:off x="3373239" y="685242"/>
+            <a:ext cx="281734" cy="1206394"/>
+          </a:xfrm>
+          <a:prstGeom prst="rect">
+            <a:avLst/>
+          </a:prstGeom>
+        </p:spPr>
+        <p:style>
+          <a:lnRef idx="2">
+            <a:schemeClr val="accent1">
+              <a:shade val="15000"/>
+            </a:schemeClr>
+          </a:lnRef>
+          <a:fillRef idx="1">
+            <a:schemeClr val="accent1"/>
+          </a:fillRef>
+          <a:effectRef idx="0">
+            <a:schemeClr val="accent1"/>
+          </a:effectRef>
+          <a:fontRef idx="minor">
+            <a:schemeClr val="lt1"/>
+          </a:fontRef>
+        </p:style>
+        <p:txBody>
+          <a:bodyPr rtlCol="0" anchor="ctr"/>
+          <a:lstStyle/>
+          <a:p>
+            <a:pPr algn="ctr"/>
+            <a:endParaRPr lang="en-US" dirty="0"/>
+          </a:p>
+        </p:txBody>
+      </p:sp>
+      <p:sp>
+        <p:nvSpPr>
+          <p:cNvPr id="50" name="Rectangle 49">
+            <a:extLst>
+              <a:ext uri="{FF2B5EF4-FFF2-40B4-BE49-F238E27FC236}">
+                <a16:creationId xmlns:a16="http://schemas.microsoft.com/office/drawing/2014/main" id="{F34F4026-7E40-CAAA-0DF0-2E3A8AAF8B2B}"/>
+              </a:ext>
+            </a:extLst>
+          </p:cNvPr>
+          <p:cNvSpPr/>
+          <p:nvPr/>
+        </p:nvSpPr>
+        <p:spPr>
+          <a:xfrm>
+            <a:off x="2528036" y="685242"/>
+            <a:ext cx="281734" cy="1206394"/>
+          </a:xfrm>
+          <a:prstGeom prst="rect">
+            <a:avLst/>
+          </a:prstGeom>
+          <a:solidFill>
+            <a:srgbClr val="4472C5">
+              <a:alpha val="70000"/>
+            </a:srgbClr>
+          </a:solidFill>
+        </p:spPr>
+        <p:style>
+          <a:lnRef idx="2">
+            <a:schemeClr val="accent1">
+              <a:shade val="15000"/>
+            </a:schemeClr>
+          </a:lnRef>
+          <a:fillRef idx="1">
+            <a:schemeClr val="accent1"/>
+          </a:fillRef>
+          <a:effectRef idx="0">
+            <a:schemeClr val="accent1"/>
+          </a:effectRef>
+          <a:fontRef idx="minor">
+            <a:schemeClr val="lt1"/>
+          </a:fontRef>
+        </p:style>
+        <p:txBody>
+          <a:bodyPr rtlCol="0" anchor="ctr"/>
+          <a:lstStyle/>
+          <a:p>
+            <a:pPr algn="ctr"/>
+            <a:endParaRPr lang="en-US" dirty="0"/>
+          </a:p>
+        </p:txBody>
+      </p:sp>
+      <p:sp>
+        <p:nvSpPr>
+          <p:cNvPr id="51" name="Rectangle 50">
+            <a:extLst>
+              <a:ext uri="{FF2B5EF4-FFF2-40B4-BE49-F238E27FC236}">
+                <a16:creationId xmlns:a16="http://schemas.microsoft.com/office/drawing/2014/main" id="{7C070088-B36C-376C-3C64-72BE7F07D71E}"/>
+              </a:ext>
+            </a:extLst>
+          </p:cNvPr>
+          <p:cNvSpPr/>
+          <p:nvPr/>
+        </p:nvSpPr>
+        <p:spPr>
+          <a:xfrm>
+            <a:off x="1964568" y="685242"/>
+            <a:ext cx="281734" cy="1206394"/>
+          </a:xfrm>
+          <a:prstGeom prst="rect">
+            <a:avLst/>
+          </a:prstGeom>
+          <a:solidFill>
+            <a:srgbClr val="15AD2E"/>
+          </a:solidFill>
+        </p:spPr>
+        <p:style>
+          <a:lnRef idx="2">
+            <a:schemeClr val="accent1">
+              <a:shade val="15000"/>
+            </a:schemeClr>
+          </a:lnRef>
+          <a:fillRef idx="1">
+            <a:schemeClr val="accent1"/>
+          </a:fillRef>
+          <a:effectRef idx="0">
+            <a:schemeClr val="accent1"/>
+          </a:effectRef>
+          <a:fontRef idx="minor">
+            <a:schemeClr val="lt1"/>
+          </a:fontRef>
+        </p:style>
+        <p:txBody>
+          <a:bodyPr rtlCol="0" anchor="ctr"/>
+          <a:lstStyle/>
+          <a:p>
+            <a:pPr algn="ctr"/>
+            <a:endParaRPr lang="en-US" dirty="0"/>
+          </a:p>
+        </p:txBody>
+      </p:sp>
+      <p:sp>
+        <p:nvSpPr>
+          <p:cNvPr id="52" name="Rectangle 51">
+            <a:extLst>
+              <a:ext uri="{FF2B5EF4-FFF2-40B4-BE49-F238E27FC236}">
+                <a16:creationId xmlns:a16="http://schemas.microsoft.com/office/drawing/2014/main" id="{BDEBB670-6CCB-E02E-75E6-8EB8EF826BC0}"/>
+              </a:ext>
+            </a:extLst>
+          </p:cNvPr>
+          <p:cNvSpPr/>
+          <p:nvPr/>
+        </p:nvSpPr>
+        <p:spPr>
+          <a:xfrm>
+            <a:off x="1682834" y="685242"/>
+            <a:ext cx="281734" cy="1206394"/>
+          </a:xfrm>
+          <a:prstGeom prst="rect">
+            <a:avLst/>
+          </a:prstGeom>
+          <a:solidFill>
+            <a:srgbClr val="15AD2E"/>
+          </a:solidFill>
+        </p:spPr>
+        <p:style>
+          <a:lnRef idx="2">
+            <a:schemeClr val="accent1">
+              <a:shade val="15000"/>
+            </a:schemeClr>
+          </a:lnRef>
+          <a:fillRef idx="1">
+            <a:schemeClr val="accent1"/>
+          </a:fillRef>
+          <a:effectRef idx="0">
+            <a:schemeClr val="accent1"/>
+          </a:effectRef>
+          <a:fontRef idx="minor">
+            <a:schemeClr val="lt1"/>
+          </a:fontRef>
+        </p:style>
+        <p:txBody>
+          <a:bodyPr rtlCol="0" anchor="ctr"/>
+          <a:lstStyle/>
+          <a:p>
+            <a:pPr algn="ctr"/>
+            <a:endParaRPr lang="en-US" dirty="0"/>
+          </a:p>
+        </p:txBody>
+      </p:sp>
+      <p:sp>
+        <p:nvSpPr>
+          <p:cNvPr id="53" name="Rectangle 52">
+            <a:extLst>
+              <a:ext uri="{FF2B5EF4-FFF2-40B4-BE49-F238E27FC236}">
+                <a16:creationId xmlns:a16="http://schemas.microsoft.com/office/drawing/2014/main" id="{B45BC851-2DFD-78AF-C864-0C84F660727E}"/>
+              </a:ext>
+            </a:extLst>
+          </p:cNvPr>
+          <p:cNvSpPr/>
+          <p:nvPr/>
+        </p:nvSpPr>
+        <p:spPr>
+          <a:xfrm>
+            <a:off x="1408102" y="685242"/>
+            <a:ext cx="281734" cy="1206394"/>
+          </a:xfrm>
+          <a:prstGeom prst="rect">
+            <a:avLst/>
+          </a:prstGeom>
+          <a:solidFill>
+            <a:srgbClr val="15AD2E"/>
+          </a:solidFill>
+        </p:spPr>
+        <p:style>
+          <a:lnRef idx="2">
+            <a:schemeClr val="accent1">
+              <a:shade val="15000"/>
+            </a:schemeClr>
+          </a:lnRef>
+          <a:fillRef idx="1">
+            <a:schemeClr val="accent1"/>
+          </a:fillRef>
+          <a:effectRef idx="0">
+            <a:schemeClr val="accent1"/>
+          </a:effectRef>
+          <a:fontRef idx="minor">
+            <a:schemeClr val="lt1"/>
+          </a:fontRef>
+        </p:style>
+        <p:txBody>
+          <a:bodyPr rtlCol="0" anchor="ctr"/>
+          <a:lstStyle/>
+          <a:p>
+            <a:pPr algn="ctr"/>
+            <a:endParaRPr lang="en-US" dirty="0"/>
+          </a:p>
+        </p:txBody>
+      </p:sp>
+      <p:sp>
+        <p:nvSpPr>
+          <p:cNvPr id="54" name="Rectangle 53">
+            <a:extLst>
+              <a:ext uri="{FF2B5EF4-FFF2-40B4-BE49-F238E27FC236}">
+                <a16:creationId xmlns:a16="http://schemas.microsoft.com/office/drawing/2014/main" id="{8F0BF0B7-E0FA-7A58-42DF-7235E711ED99}"/>
+              </a:ext>
+            </a:extLst>
+          </p:cNvPr>
+          <p:cNvSpPr/>
+          <p:nvPr/>
+        </p:nvSpPr>
+        <p:spPr>
+          <a:xfrm>
+            <a:off x="1147374" y="685242"/>
+            <a:ext cx="281734" cy="1206394"/>
+          </a:xfrm>
+          <a:prstGeom prst="rect">
+            <a:avLst/>
+          </a:prstGeom>
+          <a:solidFill>
+            <a:srgbClr val="15AD2E"/>
+          </a:solidFill>
+        </p:spPr>
+        <p:style>
+          <a:lnRef idx="2">
+            <a:schemeClr val="accent1">
+              <a:shade val="15000"/>
+            </a:schemeClr>
+          </a:lnRef>
+          <a:fillRef idx="1">
+            <a:schemeClr val="accent1"/>
+          </a:fillRef>
+          <a:effectRef idx="0">
+            <a:schemeClr val="accent1"/>
+          </a:effectRef>
+          <a:fontRef idx="minor">
+            <a:schemeClr val="lt1"/>
+          </a:fontRef>
+        </p:style>
+        <p:txBody>
+          <a:bodyPr rtlCol="0" anchor="ctr"/>
+          <a:lstStyle/>
+          <a:p>
+            <a:pPr algn="ctr"/>
+            <a:endParaRPr lang="en-US" dirty="0"/>
+          </a:p>
+        </p:txBody>
+      </p:sp>
+      <p:sp>
+        <p:nvSpPr>
+          <p:cNvPr id="55" name="Rectangle 54">
+            <a:extLst>
+              <a:ext uri="{FF2B5EF4-FFF2-40B4-BE49-F238E27FC236}">
+                <a16:creationId xmlns:a16="http://schemas.microsoft.com/office/drawing/2014/main" id="{8856C046-92ED-C6B0-6D0C-690E080EA961}"/>
+              </a:ext>
+            </a:extLst>
+          </p:cNvPr>
+          <p:cNvSpPr/>
+          <p:nvPr/>
+        </p:nvSpPr>
+        <p:spPr>
+          <a:xfrm>
+            <a:off x="3091504" y="685242"/>
+            <a:ext cx="281734" cy="1206394"/>
+          </a:xfrm>
+          <a:prstGeom prst="rect">
+            <a:avLst/>
+          </a:prstGeom>
+          <a:solidFill>
+            <a:srgbClr val="15AD2E">
+              <a:alpha val="70000"/>
+            </a:srgbClr>
+          </a:solidFill>
+        </p:spPr>
+        <p:style>
+          <a:lnRef idx="2">
+            <a:schemeClr val="accent1">
+              <a:shade val="15000"/>
+            </a:schemeClr>
+          </a:lnRef>
+          <a:fillRef idx="1">
+            <a:schemeClr val="accent1"/>
+          </a:fillRef>
+          <a:effectRef idx="0">
+            <a:schemeClr val="accent1"/>
+          </a:effectRef>
+          <a:fontRef idx="minor">
+            <a:schemeClr val="lt1"/>
+          </a:fontRef>
+        </p:style>
+        <p:txBody>
+          <a:bodyPr rtlCol="0" anchor="ctr"/>
+          <a:lstStyle/>
+          <a:p>
+            <a:pPr algn="ctr"/>
+            <a:endParaRPr lang="en-US" dirty="0"/>
+          </a:p>
+        </p:txBody>
+      </p:sp>
+      <p:sp>
+        <p:nvSpPr>
+          <p:cNvPr id="56" name="Rectangle 55">
+            <a:extLst>
+              <a:ext uri="{FF2B5EF4-FFF2-40B4-BE49-F238E27FC236}">
+                <a16:creationId xmlns:a16="http://schemas.microsoft.com/office/drawing/2014/main" id="{5159C8E3-E51A-3F8A-C98C-26B77D4E6F3C}"/>
+              </a:ext>
+            </a:extLst>
+          </p:cNvPr>
+          <p:cNvSpPr/>
+          <p:nvPr/>
+        </p:nvSpPr>
+        <p:spPr>
+          <a:xfrm>
+            <a:off x="3654973" y="685242"/>
+            <a:ext cx="281734" cy="1206394"/>
+          </a:xfrm>
+          <a:prstGeom prst="rect">
+            <a:avLst/>
+          </a:prstGeom>
+        </p:spPr>
+        <p:style>
+          <a:lnRef idx="2">
+            <a:schemeClr val="accent1">
+              <a:shade val="15000"/>
+            </a:schemeClr>
+          </a:lnRef>
+          <a:fillRef idx="1">
+            <a:schemeClr val="accent1"/>
+          </a:fillRef>
+          <a:effectRef idx="0">
+            <a:schemeClr val="accent1"/>
+          </a:effectRef>
+          <a:fontRef idx="minor">
+            <a:schemeClr val="lt1"/>
+          </a:fontRef>
+        </p:style>
+        <p:txBody>
+          <a:bodyPr rtlCol="0" anchor="ctr"/>
+          <a:lstStyle/>
+          <a:p>
+            <a:pPr algn="ctr"/>
+            <a:endParaRPr lang="en-US" dirty="0"/>
+          </a:p>
+        </p:txBody>
+      </p:sp>
+      <p:sp>
+        <p:nvSpPr>
+          <p:cNvPr id="57" name="Rectangle 56">
+            <a:extLst>
+              <a:ext uri="{FF2B5EF4-FFF2-40B4-BE49-F238E27FC236}">
+                <a16:creationId xmlns:a16="http://schemas.microsoft.com/office/drawing/2014/main" id="{F03FFD48-939E-EBB3-1F99-2E6E6DFB04D3}"/>
+              </a:ext>
+            </a:extLst>
+          </p:cNvPr>
+          <p:cNvSpPr/>
+          <p:nvPr/>
+        </p:nvSpPr>
+        <p:spPr>
+          <a:xfrm>
+            <a:off x="3936707" y="685242"/>
+            <a:ext cx="281734" cy="1206394"/>
+          </a:xfrm>
+          <a:prstGeom prst="rect">
+            <a:avLst/>
+          </a:prstGeom>
+        </p:spPr>
+        <p:style>
+          <a:lnRef idx="2">
+            <a:schemeClr val="accent1">
+              <a:shade val="15000"/>
+            </a:schemeClr>
+          </a:lnRef>
+          <a:fillRef idx="1">
+            <a:schemeClr val="accent1"/>
+          </a:fillRef>
+          <a:effectRef idx="0">
+            <a:schemeClr val="accent1"/>
+          </a:effectRef>
+          <a:fontRef idx="minor">
+            <a:schemeClr val="lt1"/>
+          </a:fontRef>
+        </p:style>
+        <p:txBody>
+          <a:bodyPr rtlCol="0" anchor="ctr"/>
+          <a:lstStyle/>
+          <a:p>
+            <a:pPr algn="ctr"/>
+            <a:endParaRPr lang="en-US" dirty="0"/>
+          </a:p>
+        </p:txBody>
+      </p:sp>
+      <p:sp>
+        <p:nvSpPr>
+          <p:cNvPr id="58" name="Rectangle 57">
+            <a:extLst>
+              <a:ext uri="{FF2B5EF4-FFF2-40B4-BE49-F238E27FC236}">
+                <a16:creationId xmlns:a16="http://schemas.microsoft.com/office/drawing/2014/main" id="{D5010B99-1B46-5782-8078-01707DBB48FB}"/>
+              </a:ext>
+            </a:extLst>
+          </p:cNvPr>
+          <p:cNvSpPr/>
+          <p:nvPr/>
+        </p:nvSpPr>
+        <p:spPr>
+          <a:xfrm>
+            <a:off x="4218441" y="685242"/>
+            <a:ext cx="281734" cy="1206394"/>
+          </a:xfrm>
+          <a:prstGeom prst="rect">
+            <a:avLst/>
+          </a:prstGeom>
+        </p:spPr>
+        <p:style>
+          <a:lnRef idx="2">
+            <a:schemeClr val="accent1">
+              <a:shade val="15000"/>
+            </a:schemeClr>
+          </a:lnRef>
+          <a:fillRef idx="1">
+            <a:schemeClr val="accent1"/>
+          </a:fillRef>
+          <a:effectRef idx="0">
+            <a:schemeClr val="accent1"/>
+          </a:effectRef>
+          <a:fontRef idx="minor">
+            <a:schemeClr val="lt1"/>
+          </a:fontRef>
+        </p:style>
+        <p:txBody>
+          <a:bodyPr rtlCol="0" anchor="ctr"/>
+          <a:lstStyle/>
+          <a:p>
+            <a:pPr algn="ctr"/>
+            <a:endParaRPr lang="en-US" dirty="0"/>
+          </a:p>
+        </p:txBody>
+      </p:sp>
+      <p:sp>
+        <p:nvSpPr>
+          <p:cNvPr id="59" name="Rectangle 58">
+            <a:extLst>
+              <a:ext uri="{FF2B5EF4-FFF2-40B4-BE49-F238E27FC236}">
+                <a16:creationId xmlns:a16="http://schemas.microsoft.com/office/drawing/2014/main" id="{006911A1-918A-47FC-B879-DEF9CDDEA095}"/>
+              </a:ext>
+            </a:extLst>
+          </p:cNvPr>
+          <p:cNvSpPr/>
+          <p:nvPr/>
+        </p:nvSpPr>
+        <p:spPr>
+          <a:xfrm>
+            <a:off x="4500175" y="685242"/>
+            <a:ext cx="281734" cy="1206394"/>
+          </a:xfrm>
+          <a:prstGeom prst="rect">
+            <a:avLst/>
+          </a:prstGeom>
+        </p:spPr>
+        <p:style>
+          <a:lnRef idx="2">
+            <a:schemeClr val="accent1">
+              <a:shade val="15000"/>
+            </a:schemeClr>
+          </a:lnRef>
+          <a:fillRef idx="1">
+            <a:schemeClr val="accent1"/>
+          </a:fillRef>
+          <a:effectRef idx="0">
+            <a:schemeClr val="accent1"/>
+          </a:effectRef>
+          <a:fontRef idx="minor">
+            <a:schemeClr val="lt1"/>
+          </a:fontRef>
+        </p:style>
+        <p:txBody>
+          <a:bodyPr rtlCol="0" anchor="ctr"/>
+          <a:lstStyle/>
+          <a:p>
+            <a:pPr algn="ctr"/>
+            <a:endParaRPr lang="en-US" dirty="0"/>
+          </a:p>
+        </p:txBody>
+      </p:sp>
+      <p:sp>
+        <p:nvSpPr>
+          <p:cNvPr id="62" name="TextBox 61">
+            <a:extLst>
+              <a:ext uri="{FF2B5EF4-FFF2-40B4-BE49-F238E27FC236}">
+                <a16:creationId xmlns:a16="http://schemas.microsoft.com/office/drawing/2014/main" id="{24BFDA6F-BA52-EA27-5E30-CEB44F9A4868}"/>
+              </a:ext>
+            </a:extLst>
+          </p:cNvPr>
+          <p:cNvSpPr txBox="1"/>
+          <p:nvPr/>
+        </p:nvSpPr>
+        <p:spPr>
+          <a:xfrm>
+            <a:off x="1147374" y="315017"/>
+            <a:ext cx="1669398" cy="369332"/>
+          </a:xfrm>
+          <a:prstGeom prst="rect">
+            <a:avLst/>
+          </a:prstGeom>
+          <a:noFill/>
+        </p:spPr>
+        <p:txBody>
+          <a:bodyPr wrap="square" rtlCol="0">
+            <a:spAutoFit/>
+          </a:bodyPr>
+          <a:lstStyle/>
+          <a:p>
+            <a:pPr algn="ctr"/>
+            <a:r>
+              <a:rPr lang="en-US" dirty="0"/>
+              <a:t>Rank 0</a:t>
+            </a:r>
+          </a:p>
+        </p:txBody>
+      </p:sp>
+      <p:sp>
+        <p:nvSpPr>
+          <p:cNvPr id="63" name="TextBox 62">
+            <a:extLst>
+              <a:ext uri="{FF2B5EF4-FFF2-40B4-BE49-F238E27FC236}">
+                <a16:creationId xmlns:a16="http://schemas.microsoft.com/office/drawing/2014/main" id="{181B330C-0981-C08C-D865-C705F7F31B61}"/>
+              </a:ext>
+            </a:extLst>
+          </p:cNvPr>
+          <p:cNvSpPr txBox="1"/>
+          <p:nvPr/>
+        </p:nvSpPr>
+        <p:spPr>
+          <a:xfrm>
+            <a:off x="3091503" y="315017"/>
+            <a:ext cx="1683403" cy="369332"/>
+          </a:xfrm>
+          <a:prstGeom prst="rect">
+            <a:avLst/>
+          </a:prstGeom>
+          <a:noFill/>
+        </p:spPr>
+        <p:txBody>
+          <a:bodyPr wrap="square" rtlCol="0">
+            <a:spAutoFit/>
+          </a:bodyPr>
+          <a:lstStyle/>
+          <a:p>
+            <a:pPr algn="ctr"/>
+            <a:r>
+              <a:rPr lang="en-US" dirty="0"/>
+              <a:t>Rank 1</a:t>
+            </a:r>
+          </a:p>
+        </p:txBody>
+      </p:sp>
+      <p:cxnSp>
+        <p:nvCxnSpPr>
+          <p:cNvPr id="65" name="Straight Arrow Connector 64">
+            <a:extLst>
+              <a:ext uri="{FF2B5EF4-FFF2-40B4-BE49-F238E27FC236}">
+                <a16:creationId xmlns:a16="http://schemas.microsoft.com/office/drawing/2014/main" id="{B16078BB-F36B-90B8-077C-F90A85C61AA3}"/>
+              </a:ext>
+            </a:extLst>
+          </p:cNvPr>
+          <p:cNvCxnSpPr/>
+          <p:nvPr/>
+        </p:nvCxnSpPr>
+        <p:spPr>
+          <a:xfrm flipH="1">
+            <a:off x="2648857" y="904119"/>
+            <a:ext cx="846667" cy="0"/>
+          </a:xfrm>
+          <a:prstGeom prst="straightConnector1">
+            <a:avLst/>
+          </a:prstGeom>
+          <a:ln w="19050">
+            <a:tailEnd type="triangle"/>
+          </a:ln>
+        </p:spPr>
+        <p:style>
+          <a:lnRef idx="1">
+            <a:schemeClr val="dk1"/>
+          </a:lnRef>
+          <a:fillRef idx="0">
+            <a:schemeClr val="dk1"/>
+          </a:fillRef>
+          <a:effectRef idx="0">
+            <a:schemeClr val="dk1"/>
+          </a:effectRef>
+          <a:fontRef idx="minor">
+            <a:schemeClr val="tx1"/>
+          </a:fontRef>
+        </p:style>
+      </p:cxnSp>
+      <p:cxnSp>
+        <p:nvCxnSpPr>
+          <p:cNvPr id="66" name="Straight Arrow Connector 65">
+            <a:extLst>
+              <a:ext uri="{FF2B5EF4-FFF2-40B4-BE49-F238E27FC236}">
+                <a16:creationId xmlns:a16="http://schemas.microsoft.com/office/drawing/2014/main" id="{7387A86F-3736-2455-C33A-E7FFEE629E43}"/>
+              </a:ext>
+            </a:extLst>
+          </p:cNvPr>
+          <p:cNvCxnSpPr>
+            <a:cxnSpLocks/>
+          </p:cNvCxnSpPr>
+          <p:nvPr/>
+        </p:nvCxnSpPr>
+        <p:spPr>
+          <a:xfrm>
+            <a:off x="2386436" y="1640719"/>
+            <a:ext cx="846667" cy="0"/>
+          </a:xfrm>
+          <a:prstGeom prst="straightConnector1">
+            <a:avLst/>
+          </a:prstGeom>
+          <a:ln w="19050">
+            <a:tailEnd type="triangle"/>
+          </a:ln>
+        </p:spPr>
+        <p:style>
+          <a:lnRef idx="1">
+            <a:schemeClr val="dk1"/>
+          </a:lnRef>
+          <a:fillRef idx="0">
+            <a:schemeClr val="dk1"/>
+          </a:fillRef>
+          <a:effectRef idx="0">
+            <a:schemeClr val="dk1"/>
+          </a:effectRef>
+          <a:fontRef idx="minor">
+            <a:schemeClr val="tx1"/>
+          </a:fontRef>
+        </p:style>
+      </p:cxnSp>
+    </p:spTree>
+    <p:extLst>
+      <p:ext uri="{BB962C8B-B14F-4D97-AF65-F5344CB8AC3E}">
+        <p14:creationId xmlns:p14="http://schemas.microsoft.com/office/powerpoint/2010/main" val="3206631681"/>
       </p:ext>
     </p:extLst>
   </p:cSld>

</xml_diff>

<commit_message>
Deploying to gh-pages from @ Southampton-RSG-Training/dirac-intro-to-mpi@0c790904fda434022666a5e5ff00b52a75646043 🚀
</commit_message>
<xml_diff>
--- a/files/communication_diagram.pptx
+++ b/files/communication_diagram.pptx
@@ -5,14 +5,13 @@
     <p:sldMasterId id="2147483648" r:id="rId1"/>
   </p:sldMasterIdLst>
   <p:notesMasterIdLst>
-    <p:notesMasterId r:id="rId7"/>
+    <p:notesMasterId r:id="rId6"/>
   </p:notesMasterIdLst>
   <p:sldIdLst>
     <p:sldId id="256" r:id="rId2"/>
     <p:sldId id="257" r:id="rId3"/>
     <p:sldId id="258" r:id="rId4"/>
     <p:sldId id="259" r:id="rId5"/>
-    <p:sldId id="260" r:id="rId6"/>
   </p:sldIdLst>
   <p:sldSz cx="12192000" cy="6858000"/>
   <p:notesSz cx="6858000" cy="9144000"/>
@@ -201,7 +200,7 @@
           <a:p>
             <a:fld id="{1DA394A1-87FE-BC40-B428-C4F79D5812EE}" type="datetimeFigureOut">
               <a:rPr lang="en-US" smtClean="0"/>
-              <a:t>7/18/23</a:t>
+              <a:t>6/9/23</a:t>
             </a:fld>
             <a:endParaRPr lang="en-US"/>
           </a:p>
@@ -786,7 +785,7 @@
           <a:p>
             <a:fld id="{5BD1349E-D158-4E40-990A-05F7F3787A3C}" type="datetimeFigureOut">
               <a:rPr lang="en-US" smtClean="0"/>
-              <a:t>7/18/23</a:t>
+              <a:t>6/9/23</a:t>
             </a:fld>
             <a:endParaRPr lang="en-US"/>
           </a:p>
@@ -986,7 +985,7 @@
           <a:p>
             <a:fld id="{5BD1349E-D158-4E40-990A-05F7F3787A3C}" type="datetimeFigureOut">
               <a:rPr lang="en-US" smtClean="0"/>
-              <a:t>7/18/23</a:t>
+              <a:t>6/9/23</a:t>
             </a:fld>
             <a:endParaRPr lang="en-US"/>
           </a:p>
@@ -1196,7 +1195,7 @@
           <a:p>
             <a:fld id="{5BD1349E-D158-4E40-990A-05F7F3787A3C}" type="datetimeFigureOut">
               <a:rPr lang="en-US" smtClean="0"/>
-              <a:t>7/18/23</a:t>
+              <a:t>6/9/23</a:t>
             </a:fld>
             <a:endParaRPr lang="en-US"/>
           </a:p>
@@ -1396,7 +1395,7 @@
           <a:p>
             <a:fld id="{5BD1349E-D158-4E40-990A-05F7F3787A3C}" type="datetimeFigureOut">
               <a:rPr lang="en-US" smtClean="0"/>
-              <a:t>7/18/23</a:t>
+              <a:t>6/9/23</a:t>
             </a:fld>
             <a:endParaRPr lang="en-US"/>
           </a:p>
@@ -1672,7 +1671,7 @@
           <a:p>
             <a:fld id="{5BD1349E-D158-4E40-990A-05F7F3787A3C}" type="datetimeFigureOut">
               <a:rPr lang="en-US" smtClean="0"/>
-              <a:t>7/18/23</a:t>
+              <a:t>6/9/23</a:t>
             </a:fld>
             <a:endParaRPr lang="en-US"/>
           </a:p>
@@ -1940,7 +1939,7 @@
           <a:p>
             <a:fld id="{5BD1349E-D158-4E40-990A-05F7F3787A3C}" type="datetimeFigureOut">
               <a:rPr lang="en-US" smtClean="0"/>
-              <a:t>7/18/23</a:t>
+              <a:t>6/9/23</a:t>
             </a:fld>
             <a:endParaRPr lang="en-US"/>
           </a:p>
@@ -2355,7 +2354,7 @@
           <a:p>
             <a:fld id="{5BD1349E-D158-4E40-990A-05F7F3787A3C}" type="datetimeFigureOut">
               <a:rPr lang="en-US" smtClean="0"/>
-              <a:t>7/18/23</a:t>
+              <a:t>6/9/23</a:t>
             </a:fld>
             <a:endParaRPr lang="en-US"/>
           </a:p>
@@ -2497,7 +2496,7 @@
           <a:p>
             <a:fld id="{5BD1349E-D158-4E40-990A-05F7F3787A3C}" type="datetimeFigureOut">
               <a:rPr lang="en-US" smtClean="0"/>
-              <a:t>7/18/23</a:t>
+              <a:t>6/9/23</a:t>
             </a:fld>
             <a:endParaRPr lang="en-US"/>
           </a:p>
@@ -2610,7 +2609,7 @@
           <a:p>
             <a:fld id="{5BD1349E-D158-4E40-990A-05F7F3787A3C}" type="datetimeFigureOut">
               <a:rPr lang="en-US" smtClean="0"/>
-              <a:t>7/18/23</a:t>
+              <a:t>6/9/23</a:t>
             </a:fld>
             <a:endParaRPr lang="en-US"/>
           </a:p>
@@ -2923,7 +2922,7 @@
           <a:p>
             <a:fld id="{5BD1349E-D158-4E40-990A-05F7F3787A3C}" type="datetimeFigureOut">
               <a:rPr lang="en-US" smtClean="0"/>
-              <a:t>7/18/23</a:t>
+              <a:t>6/9/23</a:t>
             </a:fld>
             <a:endParaRPr lang="en-US"/>
           </a:p>
@@ -3212,7 +3211,7 @@
           <a:p>
             <a:fld id="{5BD1349E-D158-4E40-990A-05F7F3787A3C}" type="datetimeFigureOut">
               <a:rPr lang="en-US" smtClean="0"/>
-              <a:t>7/18/23</a:t>
+              <a:t>6/9/23</a:t>
             </a:fld>
             <a:endParaRPr lang="en-US"/>
           </a:p>
@@ -3455,7 +3454,7 @@
           <a:p>
             <a:fld id="{5BD1349E-D158-4E40-990A-05F7F3787A3C}" type="datetimeFigureOut">
               <a:rPr lang="en-US" smtClean="0"/>
-              <a:t>7/18/23</a:t>
+              <a:t>6/9/23</a:t>
             </a:fld>
             <a:endParaRPr lang="en-US"/>
           </a:p>
@@ -23438,765 +23437,6 @@
     <p:extLst>
       <p:ext uri="{BB962C8B-B14F-4D97-AF65-F5344CB8AC3E}">
         <p14:creationId xmlns:p14="http://schemas.microsoft.com/office/powerpoint/2010/main" val="2905784832"/>
-      </p:ext>
-    </p:extLst>
-  </p:cSld>
-  <p:clrMapOvr>
-    <a:masterClrMapping/>
-  </p:clrMapOvr>
-</p:sld>
-</file>
-
-<file path=ppt/slides/slide5.xml><?xml version="1.0" encoding="utf-8"?>
-<p:sld xmlns:a="http://schemas.openxmlformats.org/drawingml/2006/main" xmlns:r="http://schemas.openxmlformats.org/officeDocument/2006/relationships" xmlns:p="http://schemas.openxmlformats.org/presentationml/2006/main">
-  <p:cSld>
-    <p:spTree>
-      <p:nvGrpSpPr>
-        <p:cNvPr id="1" name=""/>
-        <p:cNvGrpSpPr/>
-        <p:nvPr/>
-      </p:nvGrpSpPr>
-      <p:grpSpPr>
-        <a:xfrm>
-          <a:off x="0" y="0"/>
-          <a:ext cx="0" cy="0"/>
-          <a:chOff x="0" y="0"/>
-          <a:chExt cx="0" cy="0"/>
-        </a:xfrm>
-      </p:grpSpPr>
-      <p:sp>
-        <p:nvSpPr>
-          <p:cNvPr id="48" name="Rectangle 47">
-            <a:extLst>
-              <a:ext uri="{FF2B5EF4-FFF2-40B4-BE49-F238E27FC236}">
-                <a16:creationId xmlns:a16="http://schemas.microsoft.com/office/drawing/2014/main" id="{1875138C-411D-09C9-B4EF-658582612DD5}"/>
-              </a:ext>
-            </a:extLst>
-          </p:cNvPr>
-          <p:cNvSpPr/>
-          <p:nvPr/>
-        </p:nvSpPr>
-        <p:spPr>
-          <a:xfrm>
-            <a:off x="2246302" y="685242"/>
-            <a:ext cx="281734" cy="1206394"/>
-          </a:xfrm>
-          <a:prstGeom prst="rect">
-            <a:avLst/>
-          </a:prstGeom>
-          <a:solidFill>
-            <a:srgbClr val="15AD2E"/>
-          </a:solidFill>
-        </p:spPr>
-        <p:style>
-          <a:lnRef idx="2">
-            <a:schemeClr val="accent1">
-              <a:shade val="15000"/>
-            </a:schemeClr>
-          </a:lnRef>
-          <a:fillRef idx="1">
-            <a:schemeClr val="accent1"/>
-          </a:fillRef>
-          <a:effectRef idx="0">
-            <a:schemeClr val="accent1"/>
-          </a:effectRef>
-          <a:fontRef idx="minor">
-            <a:schemeClr val="lt1"/>
-          </a:fontRef>
-        </p:style>
-        <p:txBody>
-          <a:bodyPr rtlCol="0" anchor="ctr"/>
-          <a:lstStyle/>
-          <a:p>
-            <a:pPr algn="ctr"/>
-            <a:endParaRPr lang="en-US" dirty="0"/>
-          </a:p>
-        </p:txBody>
-      </p:sp>
-      <p:sp>
-        <p:nvSpPr>
-          <p:cNvPr id="49" name="Rectangle 48">
-            <a:extLst>
-              <a:ext uri="{FF2B5EF4-FFF2-40B4-BE49-F238E27FC236}">
-                <a16:creationId xmlns:a16="http://schemas.microsoft.com/office/drawing/2014/main" id="{D1027101-0CA7-5506-C8FC-388DFFCE4873}"/>
-              </a:ext>
-            </a:extLst>
-          </p:cNvPr>
-          <p:cNvSpPr/>
-          <p:nvPr/>
-        </p:nvSpPr>
-        <p:spPr>
-          <a:xfrm>
-            <a:off x="3373239" y="685242"/>
-            <a:ext cx="281734" cy="1206394"/>
-          </a:xfrm>
-          <a:prstGeom prst="rect">
-            <a:avLst/>
-          </a:prstGeom>
-        </p:spPr>
-        <p:style>
-          <a:lnRef idx="2">
-            <a:schemeClr val="accent1">
-              <a:shade val="15000"/>
-            </a:schemeClr>
-          </a:lnRef>
-          <a:fillRef idx="1">
-            <a:schemeClr val="accent1"/>
-          </a:fillRef>
-          <a:effectRef idx="0">
-            <a:schemeClr val="accent1"/>
-          </a:effectRef>
-          <a:fontRef idx="minor">
-            <a:schemeClr val="lt1"/>
-          </a:fontRef>
-        </p:style>
-        <p:txBody>
-          <a:bodyPr rtlCol="0" anchor="ctr"/>
-          <a:lstStyle/>
-          <a:p>
-            <a:pPr algn="ctr"/>
-            <a:endParaRPr lang="en-US" dirty="0"/>
-          </a:p>
-        </p:txBody>
-      </p:sp>
-      <p:sp>
-        <p:nvSpPr>
-          <p:cNvPr id="50" name="Rectangle 49">
-            <a:extLst>
-              <a:ext uri="{FF2B5EF4-FFF2-40B4-BE49-F238E27FC236}">
-                <a16:creationId xmlns:a16="http://schemas.microsoft.com/office/drawing/2014/main" id="{F34F4026-7E40-CAAA-0DF0-2E3A8AAF8B2B}"/>
-              </a:ext>
-            </a:extLst>
-          </p:cNvPr>
-          <p:cNvSpPr/>
-          <p:nvPr/>
-        </p:nvSpPr>
-        <p:spPr>
-          <a:xfrm>
-            <a:off x="2528036" y="685242"/>
-            <a:ext cx="281734" cy="1206394"/>
-          </a:xfrm>
-          <a:prstGeom prst="rect">
-            <a:avLst/>
-          </a:prstGeom>
-          <a:solidFill>
-            <a:srgbClr val="4472C5">
-              <a:alpha val="70000"/>
-            </a:srgbClr>
-          </a:solidFill>
-        </p:spPr>
-        <p:style>
-          <a:lnRef idx="2">
-            <a:schemeClr val="accent1">
-              <a:shade val="15000"/>
-            </a:schemeClr>
-          </a:lnRef>
-          <a:fillRef idx="1">
-            <a:schemeClr val="accent1"/>
-          </a:fillRef>
-          <a:effectRef idx="0">
-            <a:schemeClr val="accent1"/>
-          </a:effectRef>
-          <a:fontRef idx="minor">
-            <a:schemeClr val="lt1"/>
-          </a:fontRef>
-        </p:style>
-        <p:txBody>
-          <a:bodyPr rtlCol="0" anchor="ctr"/>
-          <a:lstStyle/>
-          <a:p>
-            <a:pPr algn="ctr"/>
-            <a:endParaRPr lang="en-US" dirty="0"/>
-          </a:p>
-        </p:txBody>
-      </p:sp>
-      <p:sp>
-        <p:nvSpPr>
-          <p:cNvPr id="51" name="Rectangle 50">
-            <a:extLst>
-              <a:ext uri="{FF2B5EF4-FFF2-40B4-BE49-F238E27FC236}">
-                <a16:creationId xmlns:a16="http://schemas.microsoft.com/office/drawing/2014/main" id="{7C070088-B36C-376C-3C64-72BE7F07D71E}"/>
-              </a:ext>
-            </a:extLst>
-          </p:cNvPr>
-          <p:cNvSpPr/>
-          <p:nvPr/>
-        </p:nvSpPr>
-        <p:spPr>
-          <a:xfrm>
-            <a:off x="1964568" y="685242"/>
-            <a:ext cx="281734" cy="1206394"/>
-          </a:xfrm>
-          <a:prstGeom prst="rect">
-            <a:avLst/>
-          </a:prstGeom>
-          <a:solidFill>
-            <a:srgbClr val="15AD2E"/>
-          </a:solidFill>
-        </p:spPr>
-        <p:style>
-          <a:lnRef idx="2">
-            <a:schemeClr val="accent1">
-              <a:shade val="15000"/>
-            </a:schemeClr>
-          </a:lnRef>
-          <a:fillRef idx="1">
-            <a:schemeClr val="accent1"/>
-          </a:fillRef>
-          <a:effectRef idx="0">
-            <a:schemeClr val="accent1"/>
-          </a:effectRef>
-          <a:fontRef idx="minor">
-            <a:schemeClr val="lt1"/>
-          </a:fontRef>
-        </p:style>
-        <p:txBody>
-          <a:bodyPr rtlCol="0" anchor="ctr"/>
-          <a:lstStyle/>
-          <a:p>
-            <a:pPr algn="ctr"/>
-            <a:endParaRPr lang="en-US" dirty="0"/>
-          </a:p>
-        </p:txBody>
-      </p:sp>
-      <p:sp>
-        <p:nvSpPr>
-          <p:cNvPr id="52" name="Rectangle 51">
-            <a:extLst>
-              <a:ext uri="{FF2B5EF4-FFF2-40B4-BE49-F238E27FC236}">
-                <a16:creationId xmlns:a16="http://schemas.microsoft.com/office/drawing/2014/main" id="{BDEBB670-6CCB-E02E-75E6-8EB8EF826BC0}"/>
-              </a:ext>
-            </a:extLst>
-          </p:cNvPr>
-          <p:cNvSpPr/>
-          <p:nvPr/>
-        </p:nvSpPr>
-        <p:spPr>
-          <a:xfrm>
-            <a:off x="1682834" y="685242"/>
-            <a:ext cx="281734" cy="1206394"/>
-          </a:xfrm>
-          <a:prstGeom prst="rect">
-            <a:avLst/>
-          </a:prstGeom>
-          <a:solidFill>
-            <a:srgbClr val="15AD2E"/>
-          </a:solidFill>
-        </p:spPr>
-        <p:style>
-          <a:lnRef idx="2">
-            <a:schemeClr val="accent1">
-              <a:shade val="15000"/>
-            </a:schemeClr>
-          </a:lnRef>
-          <a:fillRef idx="1">
-            <a:schemeClr val="accent1"/>
-          </a:fillRef>
-          <a:effectRef idx="0">
-            <a:schemeClr val="accent1"/>
-          </a:effectRef>
-          <a:fontRef idx="minor">
-            <a:schemeClr val="lt1"/>
-          </a:fontRef>
-        </p:style>
-        <p:txBody>
-          <a:bodyPr rtlCol="0" anchor="ctr"/>
-          <a:lstStyle/>
-          <a:p>
-            <a:pPr algn="ctr"/>
-            <a:endParaRPr lang="en-US" dirty="0"/>
-          </a:p>
-        </p:txBody>
-      </p:sp>
-      <p:sp>
-        <p:nvSpPr>
-          <p:cNvPr id="53" name="Rectangle 52">
-            <a:extLst>
-              <a:ext uri="{FF2B5EF4-FFF2-40B4-BE49-F238E27FC236}">
-                <a16:creationId xmlns:a16="http://schemas.microsoft.com/office/drawing/2014/main" id="{B45BC851-2DFD-78AF-C864-0C84F660727E}"/>
-              </a:ext>
-            </a:extLst>
-          </p:cNvPr>
-          <p:cNvSpPr/>
-          <p:nvPr/>
-        </p:nvSpPr>
-        <p:spPr>
-          <a:xfrm>
-            <a:off x="1408102" y="685242"/>
-            <a:ext cx="281734" cy="1206394"/>
-          </a:xfrm>
-          <a:prstGeom prst="rect">
-            <a:avLst/>
-          </a:prstGeom>
-          <a:solidFill>
-            <a:srgbClr val="15AD2E"/>
-          </a:solidFill>
-        </p:spPr>
-        <p:style>
-          <a:lnRef idx="2">
-            <a:schemeClr val="accent1">
-              <a:shade val="15000"/>
-            </a:schemeClr>
-          </a:lnRef>
-          <a:fillRef idx="1">
-            <a:schemeClr val="accent1"/>
-          </a:fillRef>
-          <a:effectRef idx="0">
-            <a:schemeClr val="accent1"/>
-          </a:effectRef>
-          <a:fontRef idx="minor">
-            <a:schemeClr val="lt1"/>
-          </a:fontRef>
-        </p:style>
-        <p:txBody>
-          <a:bodyPr rtlCol="0" anchor="ctr"/>
-          <a:lstStyle/>
-          <a:p>
-            <a:pPr algn="ctr"/>
-            <a:endParaRPr lang="en-US" dirty="0"/>
-          </a:p>
-        </p:txBody>
-      </p:sp>
-      <p:sp>
-        <p:nvSpPr>
-          <p:cNvPr id="54" name="Rectangle 53">
-            <a:extLst>
-              <a:ext uri="{FF2B5EF4-FFF2-40B4-BE49-F238E27FC236}">
-                <a16:creationId xmlns:a16="http://schemas.microsoft.com/office/drawing/2014/main" id="{8F0BF0B7-E0FA-7A58-42DF-7235E711ED99}"/>
-              </a:ext>
-            </a:extLst>
-          </p:cNvPr>
-          <p:cNvSpPr/>
-          <p:nvPr/>
-        </p:nvSpPr>
-        <p:spPr>
-          <a:xfrm>
-            <a:off x="1147374" y="685242"/>
-            <a:ext cx="281734" cy="1206394"/>
-          </a:xfrm>
-          <a:prstGeom prst="rect">
-            <a:avLst/>
-          </a:prstGeom>
-          <a:solidFill>
-            <a:srgbClr val="15AD2E"/>
-          </a:solidFill>
-        </p:spPr>
-        <p:style>
-          <a:lnRef idx="2">
-            <a:schemeClr val="accent1">
-              <a:shade val="15000"/>
-            </a:schemeClr>
-          </a:lnRef>
-          <a:fillRef idx="1">
-            <a:schemeClr val="accent1"/>
-          </a:fillRef>
-          <a:effectRef idx="0">
-            <a:schemeClr val="accent1"/>
-          </a:effectRef>
-          <a:fontRef idx="minor">
-            <a:schemeClr val="lt1"/>
-          </a:fontRef>
-        </p:style>
-        <p:txBody>
-          <a:bodyPr rtlCol="0" anchor="ctr"/>
-          <a:lstStyle/>
-          <a:p>
-            <a:pPr algn="ctr"/>
-            <a:endParaRPr lang="en-US" dirty="0"/>
-          </a:p>
-        </p:txBody>
-      </p:sp>
-      <p:sp>
-        <p:nvSpPr>
-          <p:cNvPr id="55" name="Rectangle 54">
-            <a:extLst>
-              <a:ext uri="{FF2B5EF4-FFF2-40B4-BE49-F238E27FC236}">
-                <a16:creationId xmlns:a16="http://schemas.microsoft.com/office/drawing/2014/main" id="{8856C046-92ED-C6B0-6D0C-690E080EA961}"/>
-              </a:ext>
-            </a:extLst>
-          </p:cNvPr>
-          <p:cNvSpPr/>
-          <p:nvPr/>
-        </p:nvSpPr>
-        <p:spPr>
-          <a:xfrm>
-            <a:off x="3091504" y="685242"/>
-            <a:ext cx="281734" cy="1206394"/>
-          </a:xfrm>
-          <a:prstGeom prst="rect">
-            <a:avLst/>
-          </a:prstGeom>
-          <a:solidFill>
-            <a:srgbClr val="15AD2E">
-              <a:alpha val="70000"/>
-            </a:srgbClr>
-          </a:solidFill>
-        </p:spPr>
-        <p:style>
-          <a:lnRef idx="2">
-            <a:schemeClr val="accent1">
-              <a:shade val="15000"/>
-            </a:schemeClr>
-          </a:lnRef>
-          <a:fillRef idx="1">
-            <a:schemeClr val="accent1"/>
-          </a:fillRef>
-          <a:effectRef idx="0">
-            <a:schemeClr val="accent1"/>
-          </a:effectRef>
-          <a:fontRef idx="minor">
-            <a:schemeClr val="lt1"/>
-          </a:fontRef>
-        </p:style>
-        <p:txBody>
-          <a:bodyPr rtlCol="0" anchor="ctr"/>
-          <a:lstStyle/>
-          <a:p>
-            <a:pPr algn="ctr"/>
-            <a:endParaRPr lang="en-US" dirty="0"/>
-          </a:p>
-        </p:txBody>
-      </p:sp>
-      <p:sp>
-        <p:nvSpPr>
-          <p:cNvPr id="56" name="Rectangle 55">
-            <a:extLst>
-              <a:ext uri="{FF2B5EF4-FFF2-40B4-BE49-F238E27FC236}">
-                <a16:creationId xmlns:a16="http://schemas.microsoft.com/office/drawing/2014/main" id="{5159C8E3-E51A-3F8A-C98C-26B77D4E6F3C}"/>
-              </a:ext>
-            </a:extLst>
-          </p:cNvPr>
-          <p:cNvSpPr/>
-          <p:nvPr/>
-        </p:nvSpPr>
-        <p:spPr>
-          <a:xfrm>
-            <a:off x="3654973" y="685242"/>
-            <a:ext cx="281734" cy="1206394"/>
-          </a:xfrm>
-          <a:prstGeom prst="rect">
-            <a:avLst/>
-          </a:prstGeom>
-        </p:spPr>
-        <p:style>
-          <a:lnRef idx="2">
-            <a:schemeClr val="accent1">
-              <a:shade val="15000"/>
-            </a:schemeClr>
-          </a:lnRef>
-          <a:fillRef idx="1">
-            <a:schemeClr val="accent1"/>
-          </a:fillRef>
-          <a:effectRef idx="0">
-            <a:schemeClr val="accent1"/>
-          </a:effectRef>
-          <a:fontRef idx="minor">
-            <a:schemeClr val="lt1"/>
-          </a:fontRef>
-        </p:style>
-        <p:txBody>
-          <a:bodyPr rtlCol="0" anchor="ctr"/>
-          <a:lstStyle/>
-          <a:p>
-            <a:pPr algn="ctr"/>
-            <a:endParaRPr lang="en-US" dirty="0"/>
-          </a:p>
-        </p:txBody>
-      </p:sp>
-      <p:sp>
-        <p:nvSpPr>
-          <p:cNvPr id="57" name="Rectangle 56">
-            <a:extLst>
-              <a:ext uri="{FF2B5EF4-FFF2-40B4-BE49-F238E27FC236}">
-                <a16:creationId xmlns:a16="http://schemas.microsoft.com/office/drawing/2014/main" id="{F03FFD48-939E-EBB3-1F99-2E6E6DFB04D3}"/>
-              </a:ext>
-            </a:extLst>
-          </p:cNvPr>
-          <p:cNvSpPr/>
-          <p:nvPr/>
-        </p:nvSpPr>
-        <p:spPr>
-          <a:xfrm>
-            <a:off x="3936707" y="685242"/>
-            <a:ext cx="281734" cy="1206394"/>
-          </a:xfrm>
-          <a:prstGeom prst="rect">
-            <a:avLst/>
-          </a:prstGeom>
-        </p:spPr>
-        <p:style>
-          <a:lnRef idx="2">
-            <a:schemeClr val="accent1">
-              <a:shade val="15000"/>
-            </a:schemeClr>
-          </a:lnRef>
-          <a:fillRef idx="1">
-            <a:schemeClr val="accent1"/>
-          </a:fillRef>
-          <a:effectRef idx="0">
-            <a:schemeClr val="accent1"/>
-          </a:effectRef>
-          <a:fontRef idx="minor">
-            <a:schemeClr val="lt1"/>
-          </a:fontRef>
-        </p:style>
-        <p:txBody>
-          <a:bodyPr rtlCol="0" anchor="ctr"/>
-          <a:lstStyle/>
-          <a:p>
-            <a:pPr algn="ctr"/>
-            <a:endParaRPr lang="en-US" dirty="0"/>
-          </a:p>
-        </p:txBody>
-      </p:sp>
-      <p:sp>
-        <p:nvSpPr>
-          <p:cNvPr id="58" name="Rectangle 57">
-            <a:extLst>
-              <a:ext uri="{FF2B5EF4-FFF2-40B4-BE49-F238E27FC236}">
-                <a16:creationId xmlns:a16="http://schemas.microsoft.com/office/drawing/2014/main" id="{D5010B99-1B46-5782-8078-01707DBB48FB}"/>
-              </a:ext>
-            </a:extLst>
-          </p:cNvPr>
-          <p:cNvSpPr/>
-          <p:nvPr/>
-        </p:nvSpPr>
-        <p:spPr>
-          <a:xfrm>
-            <a:off x="4218441" y="685242"/>
-            <a:ext cx="281734" cy="1206394"/>
-          </a:xfrm>
-          <a:prstGeom prst="rect">
-            <a:avLst/>
-          </a:prstGeom>
-        </p:spPr>
-        <p:style>
-          <a:lnRef idx="2">
-            <a:schemeClr val="accent1">
-              <a:shade val="15000"/>
-            </a:schemeClr>
-          </a:lnRef>
-          <a:fillRef idx="1">
-            <a:schemeClr val="accent1"/>
-          </a:fillRef>
-          <a:effectRef idx="0">
-            <a:schemeClr val="accent1"/>
-          </a:effectRef>
-          <a:fontRef idx="minor">
-            <a:schemeClr val="lt1"/>
-          </a:fontRef>
-        </p:style>
-        <p:txBody>
-          <a:bodyPr rtlCol="0" anchor="ctr"/>
-          <a:lstStyle/>
-          <a:p>
-            <a:pPr algn="ctr"/>
-            <a:endParaRPr lang="en-US" dirty="0"/>
-          </a:p>
-        </p:txBody>
-      </p:sp>
-      <p:sp>
-        <p:nvSpPr>
-          <p:cNvPr id="59" name="Rectangle 58">
-            <a:extLst>
-              <a:ext uri="{FF2B5EF4-FFF2-40B4-BE49-F238E27FC236}">
-                <a16:creationId xmlns:a16="http://schemas.microsoft.com/office/drawing/2014/main" id="{006911A1-918A-47FC-B879-DEF9CDDEA095}"/>
-              </a:ext>
-            </a:extLst>
-          </p:cNvPr>
-          <p:cNvSpPr/>
-          <p:nvPr/>
-        </p:nvSpPr>
-        <p:spPr>
-          <a:xfrm>
-            <a:off x="4500175" y="685242"/>
-            <a:ext cx="281734" cy="1206394"/>
-          </a:xfrm>
-          <a:prstGeom prst="rect">
-            <a:avLst/>
-          </a:prstGeom>
-        </p:spPr>
-        <p:style>
-          <a:lnRef idx="2">
-            <a:schemeClr val="accent1">
-              <a:shade val="15000"/>
-            </a:schemeClr>
-          </a:lnRef>
-          <a:fillRef idx="1">
-            <a:schemeClr val="accent1"/>
-          </a:fillRef>
-          <a:effectRef idx="0">
-            <a:schemeClr val="accent1"/>
-          </a:effectRef>
-          <a:fontRef idx="minor">
-            <a:schemeClr val="lt1"/>
-          </a:fontRef>
-        </p:style>
-        <p:txBody>
-          <a:bodyPr rtlCol="0" anchor="ctr"/>
-          <a:lstStyle/>
-          <a:p>
-            <a:pPr algn="ctr"/>
-            <a:endParaRPr lang="en-US" dirty="0"/>
-          </a:p>
-        </p:txBody>
-      </p:sp>
-      <p:sp>
-        <p:nvSpPr>
-          <p:cNvPr id="62" name="TextBox 61">
-            <a:extLst>
-              <a:ext uri="{FF2B5EF4-FFF2-40B4-BE49-F238E27FC236}">
-                <a16:creationId xmlns:a16="http://schemas.microsoft.com/office/drawing/2014/main" id="{24BFDA6F-BA52-EA27-5E30-CEB44F9A4868}"/>
-              </a:ext>
-            </a:extLst>
-          </p:cNvPr>
-          <p:cNvSpPr txBox="1"/>
-          <p:nvPr/>
-        </p:nvSpPr>
-        <p:spPr>
-          <a:xfrm>
-            <a:off x="1147374" y="315017"/>
-            <a:ext cx="1669398" cy="369332"/>
-          </a:xfrm>
-          <a:prstGeom prst="rect">
-            <a:avLst/>
-          </a:prstGeom>
-          <a:noFill/>
-        </p:spPr>
-        <p:txBody>
-          <a:bodyPr wrap="square" rtlCol="0">
-            <a:spAutoFit/>
-          </a:bodyPr>
-          <a:lstStyle/>
-          <a:p>
-            <a:pPr algn="ctr"/>
-            <a:r>
-              <a:rPr lang="en-US" dirty="0"/>
-              <a:t>Rank 0</a:t>
-            </a:r>
-          </a:p>
-        </p:txBody>
-      </p:sp>
-      <p:sp>
-        <p:nvSpPr>
-          <p:cNvPr id="63" name="TextBox 62">
-            <a:extLst>
-              <a:ext uri="{FF2B5EF4-FFF2-40B4-BE49-F238E27FC236}">
-                <a16:creationId xmlns:a16="http://schemas.microsoft.com/office/drawing/2014/main" id="{181B330C-0981-C08C-D865-C705F7F31B61}"/>
-              </a:ext>
-            </a:extLst>
-          </p:cNvPr>
-          <p:cNvSpPr txBox="1"/>
-          <p:nvPr/>
-        </p:nvSpPr>
-        <p:spPr>
-          <a:xfrm>
-            <a:off x="3091503" y="315017"/>
-            <a:ext cx="1683403" cy="369332"/>
-          </a:xfrm>
-          <a:prstGeom prst="rect">
-            <a:avLst/>
-          </a:prstGeom>
-          <a:noFill/>
-        </p:spPr>
-        <p:txBody>
-          <a:bodyPr wrap="square" rtlCol="0">
-            <a:spAutoFit/>
-          </a:bodyPr>
-          <a:lstStyle/>
-          <a:p>
-            <a:pPr algn="ctr"/>
-            <a:r>
-              <a:rPr lang="en-US" dirty="0"/>
-              <a:t>Rank 1</a:t>
-            </a:r>
-          </a:p>
-        </p:txBody>
-      </p:sp>
-      <p:cxnSp>
-        <p:nvCxnSpPr>
-          <p:cNvPr id="65" name="Straight Arrow Connector 64">
-            <a:extLst>
-              <a:ext uri="{FF2B5EF4-FFF2-40B4-BE49-F238E27FC236}">
-                <a16:creationId xmlns:a16="http://schemas.microsoft.com/office/drawing/2014/main" id="{B16078BB-F36B-90B8-077C-F90A85C61AA3}"/>
-              </a:ext>
-            </a:extLst>
-          </p:cNvPr>
-          <p:cNvCxnSpPr/>
-          <p:nvPr/>
-        </p:nvCxnSpPr>
-        <p:spPr>
-          <a:xfrm flipH="1">
-            <a:off x="2648857" y="904119"/>
-            <a:ext cx="846667" cy="0"/>
-          </a:xfrm>
-          <a:prstGeom prst="straightConnector1">
-            <a:avLst/>
-          </a:prstGeom>
-          <a:ln w="19050">
-            <a:tailEnd type="triangle"/>
-          </a:ln>
-        </p:spPr>
-        <p:style>
-          <a:lnRef idx="1">
-            <a:schemeClr val="dk1"/>
-          </a:lnRef>
-          <a:fillRef idx="0">
-            <a:schemeClr val="dk1"/>
-          </a:fillRef>
-          <a:effectRef idx="0">
-            <a:schemeClr val="dk1"/>
-          </a:effectRef>
-          <a:fontRef idx="minor">
-            <a:schemeClr val="tx1"/>
-          </a:fontRef>
-        </p:style>
-      </p:cxnSp>
-      <p:cxnSp>
-        <p:nvCxnSpPr>
-          <p:cNvPr id="66" name="Straight Arrow Connector 65">
-            <a:extLst>
-              <a:ext uri="{FF2B5EF4-FFF2-40B4-BE49-F238E27FC236}">
-                <a16:creationId xmlns:a16="http://schemas.microsoft.com/office/drawing/2014/main" id="{7387A86F-3736-2455-C33A-E7FFEE629E43}"/>
-              </a:ext>
-            </a:extLst>
-          </p:cNvPr>
-          <p:cNvCxnSpPr>
-            <a:cxnSpLocks/>
-          </p:cNvCxnSpPr>
-          <p:nvPr/>
-        </p:nvCxnSpPr>
-        <p:spPr>
-          <a:xfrm>
-            <a:off x="2386436" y="1640719"/>
-            <a:ext cx="846667" cy="0"/>
-          </a:xfrm>
-          <a:prstGeom prst="straightConnector1">
-            <a:avLst/>
-          </a:prstGeom>
-          <a:ln w="19050">
-            <a:tailEnd type="triangle"/>
-          </a:ln>
-        </p:spPr>
-        <p:style>
-          <a:lnRef idx="1">
-            <a:schemeClr val="dk1"/>
-          </a:lnRef>
-          <a:fillRef idx="0">
-            <a:schemeClr val="dk1"/>
-          </a:fillRef>
-          <a:effectRef idx="0">
-            <a:schemeClr val="dk1"/>
-          </a:effectRef>
-          <a:fontRef idx="minor">
-            <a:schemeClr val="tx1"/>
-          </a:fontRef>
-        </p:style>
-      </p:cxnSp>
-    </p:spTree>
-    <p:extLst>
-      <p:ext uri="{BB962C8B-B14F-4D97-AF65-F5344CB8AC3E}">
-        <p14:creationId xmlns:p14="http://schemas.microsoft.com/office/powerpoint/2010/main" val="3206631681"/>
       </p:ext>
     </p:extLst>
   </p:cSld>

</xml_diff>

<commit_message>
Progression on communication episodes (#22)
</commit_message>
<xml_diff>
--- a/files/communication_diagram.pptx
+++ b/files/communication_diagram.pptx
@@ -5,13 +5,14 @@
     <p:sldMasterId id="2147483648" r:id="rId1"/>
   </p:sldMasterIdLst>
   <p:notesMasterIdLst>
-    <p:notesMasterId r:id="rId6"/>
+    <p:notesMasterId r:id="rId7"/>
   </p:notesMasterIdLst>
   <p:sldIdLst>
     <p:sldId id="256" r:id="rId2"/>
     <p:sldId id="257" r:id="rId3"/>
     <p:sldId id="258" r:id="rId4"/>
     <p:sldId id="259" r:id="rId5"/>
+    <p:sldId id="260" r:id="rId6"/>
   </p:sldIdLst>
   <p:sldSz cx="12192000" cy="6858000"/>
   <p:notesSz cx="6858000" cy="9144000"/>
@@ -200,7 +201,7 @@
           <a:p>
             <a:fld id="{1DA394A1-87FE-BC40-B428-C4F79D5812EE}" type="datetimeFigureOut">
               <a:rPr lang="en-US" smtClean="0"/>
-              <a:t>6/9/23</a:t>
+              <a:t>7/18/23</a:t>
             </a:fld>
             <a:endParaRPr lang="en-US"/>
           </a:p>
@@ -785,7 +786,7 @@
           <a:p>
             <a:fld id="{5BD1349E-D158-4E40-990A-05F7F3787A3C}" type="datetimeFigureOut">
               <a:rPr lang="en-US" smtClean="0"/>
-              <a:t>6/9/23</a:t>
+              <a:t>7/18/23</a:t>
             </a:fld>
             <a:endParaRPr lang="en-US"/>
           </a:p>
@@ -985,7 +986,7 @@
           <a:p>
             <a:fld id="{5BD1349E-D158-4E40-990A-05F7F3787A3C}" type="datetimeFigureOut">
               <a:rPr lang="en-US" smtClean="0"/>
-              <a:t>6/9/23</a:t>
+              <a:t>7/18/23</a:t>
             </a:fld>
             <a:endParaRPr lang="en-US"/>
           </a:p>
@@ -1195,7 +1196,7 @@
           <a:p>
             <a:fld id="{5BD1349E-D158-4E40-990A-05F7F3787A3C}" type="datetimeFigureOut">
               <a:rPr lang="en-US" smtClean="0"/>
-              <a:t>6/9/23</a:t>
+              <a:t>7/18/23</a:t>
             </a:fld>
             <a:endParaRPr lang="en-US"/>
           </a:p>
@@ -1395,7 +1396,7 @@
           <a:p>
             <a:fld id="{5BD1349E-D158-4E40-990A-05F7F3787A3C}" type="datetimeFigureOut">
               <a:rPr lang="en-US" smtClean="0"/>
-              <a:t>6/9/23</a:t>
+              <a:t>7/18/23</a:t>
             </a:fld>
             <a:endParaRPr lang="en-US"/>
           </a:p>
@@ -1671,7 +1672,7 @@
           <a:p>
             <a:fld id="{5BD1349E-D158-4E40-990A-05F7F3787A3C}" type="datetimeFigureOut">
               <a:rPr lang="en-US" smtClean="0"/>
-              <a:t>6/9/23</a:t>
+              <a:t>7/18/23</a:t>
             </a:fld>
             <a:endParaRPr lang="en-US"/>
           </a:p>
@@ -1939,7 +1940,7 @@
           <a:p>
             <a:fld id="{5BD1349E-D158-4E40-990A-05F7F3787A3C}" type="datetimeFigureOut">
               <a:rPr lang="en-US" smtClean="0"/>
-              <a:t>6/9/23</a:t>
+              <a:t>7/18/23</a:t>
             </a:fld>
             <a:endParaRPr lang="en-US"/>
           </a:p>
@@ -2354,7 +2355,7 @@
           <a:p>
             <a:fld id="{5BD1349E-D158-4E40-990A-05F7F3787A3C}" type="datetimeFigureOut">
               <a:rPr lang="en-US" smtClean="0"/>
-              <a:t>6/9/23</a:t>
+              <a:t>7/18/23</a:t>
             </a:fld>
             <a:endParaRPr lang="en-US"/>
           </a:p>
@@ -2496,7 +2497,7 @@
           <a:p>
             <a:fld id="{5BD1349E-D158-4E40-990A-05F7F3787A3C}" type="datetimeFigureOut">
               <a:rPr lang="en-US" smtClean="0"/>
-              <a:t>6/9/23</a:t>
+              <a:t>7/18/23</a:t>
             </a:fld>
             <a:endParaRPr lang="en-US"/>
           </a:p>
@@ -2609,7 +2610,7 @@
           <a:p>
             <a:fld id="{5BD1349E-D158-4E40-990A-05F7F3787A3C}" type="datetimeFigureOut">
               <a:rPr lang="en-US" smtClean="0"/>
-              <a:t>6/9/23</a:t>
+              <a:t>7/18/23</a:t>
             </a:fld>
             <a:endParaRPr lang="en-US"/>
           </a:p>
@@ -2922,7 +2923,7 @@
           <a:p>
             <a:fld id="{5BD1349E-D158-4E40-990A-05F7F3787A3C}" type="datetimeFigureOut">
               <a:rPr lang="en-US" smtClean="0"/>
-              <a:t>6/9/23</a:t>
+              <a:t>7/18/23</a:t>
             </a:fld>
             <a:endParaRPr lang="en-US"/>
           </a:p>
@@ -3211,7 +3212,7 @@
           <a:p>
             <a:fld id="{5BD1349E-D158-4E40-990A-05F7F3787A3C}" type="datetimeFigureOut">
               <a:rPr lang="en-US" smtClean="0"/>
-              <a:t>6/9/23</a:t>
+              <a:t>7/18/23</a:t>
             </a:fld>
             <a:endParaRPr lang="en-US"/>
           </a:p>
@@ -3454,7 +3455,7 @@
           <a:p>
             <a:fld id="{5BD1349E-D158-4E40-990A-05F7F3787A3C}" type="datetimeFigureOut">
               <a:rPr lang="en-US" smtClean="0"/>
-              <a:t>6/9/23</a:t>
+              <a:t>7/18/23</a:t>
             </a:fld>
             <a:endParaRPr lang="en-US"/>
           </a:p>
@@ -23437,6 +23438,765 @@
     <p:extLst>
       <p:ext uri="{BB962C8B-B14F-4D97-AF65-F5344CB8AC3E}">
         <p14:creationId xmlns:p14="http://schemas.microsoft.com/office/powerpoint/2010/main" val="2905784832"/>
+      </p:ext>
+    </p:extLst>
+  </p:cSld>
+  <p:clrMapOvr>
+    <a:masterClrMapping/>
+  </p:clrMapOvr>
+</p:sld>
+</file>
+
+<file path=ppt/slides/slide5.xml><?xml version="1.0" encoding="utf-8"?>
+<p:sld xmlns:a="http://schemas.openxmlformats.org/drawingml/2006/main" xmlns:r="http://schemas.openxmlformats.org/officeDocument/2006/relationships" xmlns:p="http://schemas.openxmlformats.org/presentationml/2006/main">
+  <p:cSld>
+    <p:spTree>
+      <p:nvGrpSpPr>
+        <p:cNvPr id="1" name=""/>
+        <p:cNvGrpSpPr/>
+        <p:nvPr/>
+      </p:nvGrpSpPr>
+      <p:grpSpPr>
+        <a:xfrm>
+          <a:off x="0" y="0"/>
+          <a:ext cx="0" cy="0"/>
+          <a:chOff x="0" y="0"/>
+          <a:chExt cx="0" cy="0"/>
+        </a:xfrm>
+      </p:grpSpPr>
+      <p:sp>
+        <p:nvSpPr>
+          <p:cNvPr id="48" name="Rectangle 47">
+            <a:extLst>
+              <a:ext uri="{FF2B5EF4-FFF2-40B4-BE49-F238E27FC236}">
+                <a16:creationId xmlns:a16="http://schemas.microsoft.com/office/drawing/2014/main" id="{1875138C-411D-09C9-B4EF-658582612DD5}"/>
+              </a:ext>
+            </a:extLst>
+          </p:cNvPr>
+          <p:cNvSpPr/>
+          <p:nvPr/>
+        </p:nvSpPr>
+        <p:spPr>
+          <a:xfrm>
+            <a:off x="2246302" y="685242"/>
+            <a:ext cx="281734" cy="1206394"/>
+          </a:xfrm>
+          <a:prstGeom prst="rect">
+            <a:avLst/>
+          </a:prstGeom>
+          <a:solidFill>
+            <a:srgbClr val="15AD2E"/>
+          </a:solidFill>
+        </p:spPr>
+        <p:style>
+          <a:lnRef idx="2">
+            <a:schemeClr val="accent1">
+              <a:shade val="15000"/>
+            </a:schemeClr>
+          </a:lnRef>
+          <a:fillRef idx="1">
+            <a:schemeClr val="accent1"/>
+          </a:fillRef>
+          <a:effectRef idx="0">
+            <a:schemeClr val="accent1"/>
+          </a:effectRef>
+          <a:fontRef idx="minor">
+            <a:schemeClr val="lt1"/>
+          </a:fontRef>
+        </p:style>
+        <p:txBody>
+          <a:bodyPr rtlCol="0" anchor="ctr"/>
+          <a:lstStyle/>
+          <a:p>
+            <a:pPr algn="ctr"/>
+            <a:endParaRPr lang="en-US" dirty="0"/>
+          </a:p>
+        </p:txBody>
+      </p:sp>
+      <p:sp>
+        <p:nvSpPr>
+          <p:cNvPr id="49" name="Rectangle 48">
+            <a:extLst>
+              <a:ext uri="{FF2B5EF4-FFF2-40B4-BE49-F238E27FC236}">
+                <a16:creationId xmlns:a16="http://schemas.microsoft.com/office/drawing/2014/main" id="{D1027101-0CA7-5506-C8FC-388DFFCE4873}"/>
+              </a:ext>
+            </a:extLst>
+          </p:cNvPr>
+          <p:cNvSpPr/>
+          <p:nvPr/>
+        </p:nvSpPr>
+        <p:spPr>
+          <a:xfrm>
+            <a:off x="3373239" y="685242"/>
+            <a:ext cx="281734" cy="1206394"/>
+          </a:xfrm>
+          <a:prstGeom prst="rect">
+            <a:avLst/>
+          </a:prstGeom>
+        </p:spPr>
+        <p:style>
+          <a:lnRef idx="2">
+            <a:schemeClr val="accent1">
+              <a:shade val="15000"/>
+            </a:schemeClr>
+          </a:lnRef>
+          <a:fillRef idx="1">
+            <a:schemeClr val="accent1"/>
+          </a:fillRef>
+          <a:effectRef idx="0">
+            <a:schemeClr val="accent1"/>
+          </a:effectRef>
+          <a:fontRef idx="minor">
+            <a:schemeClr val="lt1"/>
+          </a:fontRef>
+        </p:style>
+        <p:txBody>
+          <a:bodyPr rtlCol="0" anchor="ctr"/>
+          <a:lstStyle/>
+          <a:p>
+            <a:pPr algn="ctr"/>
+            <a:endParaRPr lang="en-US" dirty="0"/>
+          </a:p>
+        </p:txBody>
+      </p:sp>
+      <p:sp>
+        <p:nvSpPr>
+          <p:cNvPr id="50" name="Rectangle 49">
+            <a:extLst>
+              <a:ext uri="{FF2B5EF4-FFF2-40B4-BE49-F238E27FC236}">
+                <a16:creationId xmlns:a16="http://schemas.microsoft.com/office/drawing/2014/main" id="{F34F4026-7E40-CAAA-0DF0-2E3A8AAF8B2B}"/>
+              </a:ext>
+            </a:extLst>
+          </p:cNvPr>
+          <p:cNvSpPr/>
+          <p:nvPr/>
+        </p:nvSpPr>
+        <p:spPr>
+          <a:xfrm>
+            <a:off x="2528036" y="685242"/>
+            <a:ext cx="281734" cy="1206394"/>
+          </a:xfrm>
+          <a:prstGeom prst="rect">
+            <a:avLst/>
+          </a:prstGeom>
+          <a:solidFill>
+            <a:srgbClr val="4472C5">
+              <a:alpha val="70000"/>
+            </a:srgbClr>
+          </a:solidFill>
+        </p:spPr>
+        <p:style>
+          <a:lnRef idx="2">
+            <a:schemeClr val="accent1">
+              <a:shade val="15000"/>
+            </a:schemeClr>
+          </a:lnRef>
+          <a:fillRef idx="1">
+            <a:schemeClr val="accent1"/>
+          </a:fillRef>
+          <a:effectRef idx="0">
+            <a:schemeClr val="accent1"/>
+          </a:effectRef>
+          <a:fontRef idx="minor">
+            <a:schemeClr val="lt1"/>
+          </a:fontRef>
+        </p:style>
+        <p:txBody>
+          <a:bodyPr rtlCol="0" anchor="ctr"/>
+          <a:lstStyle/>
+          <a:p>
+            <a:pPr algn="ctr"/>
+            <a:endParaRPr lang="en-US" dirty="0"/>
+          </a:p>
+        </p:txBody>
+      </p:sp>
+      <p:sp>
+        <p:nvSpPr>
+          <p:cNvPr id="51" name="Rectangle 50">
+            <a:extLst>
+              <a:ext uri="{FF2B5EF4-FFF2-40B4-BE49-F238E27FC236}">
+                <a16:creationId xmlns:a16="http://schemas.microsoft.com/office/drawing/2014/main" id="{7C070088-B36C-376C-3C64-72BE7F07D71E}"/>
+              </a:ext>
+            </a:extLst>
+          </p:cNvPr>
+          <p:cNvSpPr/>
+          <p:nvPr/>
+        </p:nvSpPr>
+        <p:spPr>
+          <a:xfrm>
+            <a:off x="1964568" y="685242"/>
+            <a:ext cx="281734" cy="1206394"/>
+          </a:xfrm>
+          <a:prstGeom prst="rect">
+            <a:avLst/>
+          </a:prstGeom>
+          <a:solidFill>
+            <a:srgbClr val="15AD2E"/>
+          </a:solidFill>
+        </p:spPr>
+        <p:style>
+          <a:lnRef idx="2">
+            <a:schemeClr val="accent1">
+              <a:shade val="15000"/>
+            </a:schemeClr>
+          </a:lnRef>
+          <a:fillRef idx="1">
+            <a:schemeClr val="accent1"/>
+          </a:fillRef>
+          <a:effectRef idx="0">
+            <a:schemeClr val="accent1"/>
+          </a:effectRef>
+          <a:fontRef idx="minor">
+            <a:schemeClr val="lt1"/>
+          </a:fontRef>
+        </p:style>
+        <p:txBody>
+          <a:bodyPr rtlCol="0" anchor="ctr"/>
+          <a:lstStyle/>
+          <a:p>
+            <a:pPr algn="ctr"/>
+            <a:endParaRPr lang="en-US" dirty="0"/>
+          </a:p>
+        </p:txBody>
+      </p:sp>
+      <p:sp>
+        <p:nvSpPr>
+          <p:cNvPr id="52" name="Rectangle 51">
+            <a:extLst>
+              <a:ext uri="{FF2B5EF4-FFF2-40B4-BE49-F238E27FC236}">
+                <a16:creationId xmlns:a16="http://schemas.microsoft.com/office/drawing/2014/main" id="{BDEBB670-6CCB-E02E-75E6-8EB8EF826BC0}"/>
+              </a:ext>
+            </a:extLst>
+          </p:cNvPr>
+          <p:cNvSpPr/>
+          <p:nvPr/>
+        </p:nvSpPr>
+        <p:spPr>
+          <a:xfrm>
+            <a:off x="1682834" y="685242"/>
+            <a:ext cx="281734" cy="1206394"/>
+          </a:xfrm>
+          <a:prstGeom prst="rect">
+            <a:avLst/>
+          </a:prstGeom>
+          <a:solidFill>
+            <a:srgbClr val="15AD2E"/>
+          </a:solidFill>
+        </p:spPr>
+        <p:style>
+          <a:lnRef idx="2">
+            <a:schemeClr val="accent1">
+              <a:shade val="15000"/>
+            </a:schemeClr>
+          </a:lnRef>
+          <a:fillRef idx="1">
+            <a:schemeClr val="accent1"/>
+          </a:fillRef>
+          <a:effectRef idx="0">
+            <a:schemeClr val="accent1"/>
+          </a:effectRef>
+          <a:fontRef idx="minor">
+            <a:schemeClr val="lt1"/>
+          </a:fontRef>
+        </p:style>
+        <p:txBody>
+          <a:bodyPr rtlCol="0" anchor="ctr"/>
+          <a:lstStyle/>
+          <a:p>
+            <a:pPr algn="ctr"/>
+            <a:endParaRPr lang="en-US" dirty="0"/>
+          </a:p>
+        </p:txBody>
+      </p:sp>
+      <p:sp>
+        <p:nvSpPr>
+          <p:cNvPr id="53" name="Rectangle 52">
+            <a:extLst>
+              <a:ext uri="{FF2B5EF4-FFF2-40B4-BE49-F238E27FC236}">
+                <a16:creationId xmlns:a16="http://schemas.microsoft.com/office/drawing/2014/main" id="{B45BC851-2DFD-78AF-C864-0C84F660727E}"/>
+              </a:ext>
+            </a:extLst>
+          </p:cNvPr>
+          <p:cNvSpPr/>
+          <p:nvPr/>
+        </p:nvSpPr>
+        <p:spPr>
+          <a:xfrm>
+            <a:off x="1408102" y="685242"/>
+            <a:ext cx="281734" cy="1206394"/>
+          </a:xfrm>
+          <a:prstGeom prst="rect">
+            <a:avLst/>
+          </a:prstGeom>
+          <a:solidFill>
+            <a:srgbClr val="15AD2E"/>
+          </a:solidFill>
+        </p:spPr>
+        <p:style>
+          <a:lnRef idx="2">
+            <a:schemeClr val="accent1">
+              <a:shade val="15000"/>
+            </a:schemeClr>
+          </a:lnRef>
+          <a:fillRef idx="1">
+            <a:schemeClr val="accent1"/>
+          </a:fillRef>
+          <a:effectRef idx="0">
+            <a:schemeClr val="accent1"/>
+          </a:effectRef>
+          <a:fontRef idx="minor">
+            <a:schemeClr val="lt1"/>
+          </a:fontRef>
+        </p:style>
+        <p:txBody>
+          <a:bodyPr rtlCol="0" anchor="ctr"/>
+          <a:lstStyle/>
+          <a:p>
+            <a:pPr algn="ctr"/>
+            <a:endParaRPr lang="en-US" dirty="0"/>
+          </a:p>
+        </p:txBody>
+      </p:sp>
+      <p:sp>
+        <p:nvSpPr>
+          <p:cNvPr id="54" name="Rectangle 53">
+            <a:extLst>
+              <a:ext uri="{FF2B5EF4-FFF2-40B4-BE49-F238E27FC236}">
+                <a16:creationId xmlns:a16="http://schemas.microsoft.com/office/drawing/2014/main" id="{8F0BF0B7-E0FA-7A58-42DF-7235E711ED99}"/>
+              </a:ext>
+            </a:extLst>
+          </p:cNvPr>
+          <p:cNvSpPr/>
+          <p:nvPr/>
+        </p:nvSpPr>
+        <p:spPr>
+          <a:xfrm>
+            <a:off x="1147374" y="685242"/>
+            <a:ext cx="281734" cy="1206394"/>
+          </a:xfrm>
+          <a:prstGeom prst="rect">
+            <a:avLst/>
+          </a:prstGeom>
+          <a:solidFill>
+            <a:srgbClr val="15AD2E"/>
+          </a:solidFill>
+        </p:spPr>
+        <p:style>
+          <a:lnRef idx="2">
+            <a:schemeClr val="accent1">
+              <a:shade val="15000"/>
+            </a:schemeClr>
+          </a:lnRef>
+          <a:fillRef idx="1">
+            <a:schemeClr val="accent1"/>
+          </a:fillRef>
+          <a:effectRef idx="0">
+            <a:schemeClr val="accent1"/>
+          </a:effectRef>
+          <a:fontRef idx="minor">
+            <a:schemeClr val="lt1"/>
+          </a:fontRef>
+        </p:style>
+        <p:txBody>
+          <a:bodyPr rtlCol="0" anchor="ctr"/>
+          <a:lstStyle/>
+          <a:p>
+            <a:pPr algn="ctr"/>
+            <a:endParaRPr lang="en-US" dirty="0"/>
+          </a:p>
+        </p:txBody>
+      </p:sp>
+      <p:sp>
+        <p:nvSpPr>
+          <p:cNvPr id="55" name="Rectangle 54">
+            <a:extLst>
+              <a:ext uri="{FF2B5EF4-FFF2-40B4-BE49-F238E27FC236}">
+                <a16:creationId xmlns:a16="http://schemas.microsoft.com/office/drawing/2014/main" id="{8856C046-92ED-C6B0-6D0C-690E080EA961}"/>
+              </a:ext>
+            </a:extLst>
+          </p:cNvPr>
+          <p:cNvSpPr/>
+          <p:nvPr/>
+        </p:nvSpPr>
+        <p:spPr>
+          <a:xfrm>
+            <a:off x="3091504" y="685242"/>
+            <a:ext cx="281734" cy="1206394"/>
+          </a:xfrm>
+          <a:prstGeom prst="rect">
+            <a:avLst/>
+          </a:prstGeom>
+          <a:solidFill>
+            <a:srgbClr val="15AD2E">
+              <a:alpha val="70000"/>
+            </a:srgbClr>
+          </a:solidFill>
+        </p:spPr>
+        <p:style>
+          <a:lnRef idx="2">
+            <a:schemeClr val="accent1">
+              <a:shade val="15000"/>
+            </a:schemeClr>
+          </a:lnRef>
+          <a:fillRef idx="1">
+            <a:schemeClr val="accent1"/>
+          </a:fillRef>
+          <a:effectRef idx="0">
+            <a:schemeClr val="accent1"/>
+          </a:effectRef>
+          <a:fontRef idx="minor">
+            <a:schemeClr val="lt1"/>
+          </a:fontRef>
+        </p:style>
+        <p:txBody>
+          <a:bodyPr rtlCol="0" anchor="ctr"/>
+          <a:lstStyle/>
+          <a:p>
+            <a:pPr algn="ctr"/>
+            <a:endParaRPr lang="en-US" dirty="0"/>
+          </a:p>
+        </p:txBody>
+      </p:sp>
+      <p:sp>
+        <p:nvSpPr>
+          <p:cNvPr id="56" name="Rectangle 55">
+            <a:extLst>
+              <a:ext uri="{FF2B5EF4-FFF2-40B4-BE49-F238E27FC236}">
+                <a16:creationId xmlns:a16="http://schemas.microsoft.com/office/drawing/2014/main" id="{5159C8E3-E51A-3F8A-C98C-26B77D4E6F3C}"/>
+              </a:ext>
+            </a:extLst>
+          </p:cNvPr>
+          <p:cNvSpPr/>
+          <p:nvPr/>
+        </p:nvSpPr>
+        <p:spPr>
+          <a:xfrm>
+            <a:off x="3654973" y="685242"/>
+            <a:ext cx="281734" cy="1206394"/>
+          </a:xfrm>
+          <a:prstGeom prst="rect">
+            <a:avLst/>
+          </a:prstGeom>
+        </p:spPr>
+        <p:style>
+          <a:lnRef idx="2">
+            <a:schemeClr val="accent1">
+              <a:shade val="15000"/>
+            </a:schemeClr>
+          </a:lnRef>
+          <a:fillRef idx="1">
+            <a:schemeClr val="accent1"/>
+          </a:fillRef>
+          <a:effectRef idx="0">
+            <a:schemeClr val="accent1"/>
+          </a:effectRef>
+          <a:fontRef idx="minor">
+            <a:schemeClr val="lt1"/>
+          </a:fontRef>
+        </p:style>
+        <p:txBody>
+          <a:bodyPr rtlCol="0" anchor="ctr"/>
+          <a:lstStyle/>
+          <a:p>
+            <a:pPr algn="ctr"/>
+            <a:endParaRPr lang="en-US" dirty="0"/>
+          </a:p>
+        </p:txBody>
+      </p:sp>
+      <p:sp>
+        <p:nvSpPr>
+          <p:cNvPr id="57" name="Rectangle 56">
+            <a:extLst>
+              <a:ext uri="{FF2B5EF4-FFF2-40B4-BE49-F238E27FC236}">
+                <a16:creationId xmlns:a16="http://schemas.microsoft.com/office/drawing/2014/main" id="{F03FFD48-939E-EBB3-1F99-2E6E6DFB04D3}"/>
+              </a:ext>
+            </a:extLst>
+          </p:cNvPr>
+          <p:cNvSpPr/>
+          <p:nvPr/>
+        </p:nvSpPr>
+        <p:spPr>
+          <a:xfrm>
+            <a:off x="3936707" y="685242"/>
+            <a:ext cx="281734" cy="1206394"/>
+          </a:xfrm>
+          <a:prstGeom prst="rect">
+            <a:avLst/>
+          </a:prstGeom>
+        </p:spPr>
+        <p:style>
+          <a:lnRef idx="2">
+            <a:schemeClr val="accent1">
+              <a:shade val="15000"/>
+            </a:schemeClr>
+          </a:lnRef>
+          <a:fillRef idx="1">
+            <a:schemeClr val="accent1"/>
+          </a:fillRef>
+          <a:effectRef idx="0">
+            <a:schemeClr val="accent1"/>
+          </a:effectRef>
+          <a:fontRef idx="minor">
+            <a:schemeClr val="lt1"/>
+          </a:fontRef>
+        </p:style>
+        <p:txBody>
+          <a:bodyPr rtlCol="0" anchor="ctr"/>
+          <a:lstStyle/>
+          <a:p>
+            <a:pPr algn="ctr"/>
+            <a:endParaRPr lang="en-US" dirty="0"/>
+          </a:p>
+        </p:txBody>
+      </p:sp>
+      <p:sp>
+        <p:nvSpPr>
+          <p:cNvPr id="58" name="Rectangle 57">
+            <a:extLst>
+              <a:ext uri="{FF2B5EF4-FFF2-40B4-BE49-F238E27FC236}">
+                <a16:creationId xmlns:a16="http://schemas.microsoft.com/office/drawing/2014/main" id="{D5010B99-1B46-5782-8078-01707DBB48FB}"/>
+              </a:ext>
+            </a:extLst>
+          </p:cNvPr>
+          <p:cNvSpPr/>
+          <p:nvPr/>
+        </p:nvSpPr>
+        <p:spPr>
+          <a:xfrm>
+            <a:off x="4218441" y="685242"/>
+            <a:ext cx="281734" cy="1206394"/>
+          </a:xfrm>
+          <a:prstGeom prst="rect">
+            <a:avLst/>
+          </a:prstGeom>
+        </p:spPr>
+        <p:style>
+          <a:lnRef idx="2">
+            <a:schemeClr val="accent1">
+              <a:shade val="15000"/>
+            </a:schemeClr>
+          </a:lnRef>
+          <a:fillRef idx="1">
+            <a:schemeClr val="accent1"/>
+          </a:fillRef>
+          <a:effectRef idx="0">
+            <a:schemeClr val="accent1"/>
+          </a:effectRef>
+          <a:fontRef idx="minor">
+            <a:schemeClr val="lt1"/>
+          </a:fontRef>
+        </p:style>
+        <p:txBody>
+          <a:bodyPr rtlCol="0" anchor="ctr"/>
+          <a:lstStyle/>
+          <a:p>
+            <a:pPr algn="ctr"/>
+            <a:endParaRPr lang="en-US" dirty="0"/>
+          </a:p>
+        </p:txBody>
+      </p:sp>
+      <p:sp>
+        <p:nvSpPr>
+          <p:cNvPr id="59" name="Rectangle 58">
+            <a:extLst>
+              <a:ext uri="{FF2B5EF4-FFF2-40B4-BE49-F238E27FC236}">
+                <a16:creationId xmlns:a16="http://schemas.microsoft.com/office/drawing/2014/main" id="{006911A1-918A-47FC-B879-DEF9CDDEA095}"/>
+              </a:ext>
+            </a:extLst>
+          </p:cNvPr>
+          <p:cNvSpPr/>
+          <p:nvPr/>
+        </p:nvSpPr>
+        <p:spPr>
+          <a:xfrm>
+            <a:off x="4500175" y="685242"/>
+            <a:ext cx="281734" cy="1206394"/>
+          </a:xfrm>
+          <a:prstGeom prst="rect">
+            <a:avLst/>
+          </a:prstGeom>
+        </p:spPr>
+        <p:style>
+          <a:lnRef idx="2">
+            <a:schemeClr val="accent1">
+              <a:shade val="15000"/>
+            </a:schemeClr>
+          </a:lnRef>
+          <a:fillRef idx="1">
+            <a:schemeClr val="accent1"/>
+          </a:fillRef>
+          <a:effectRef idx="0">
+            <a:schemeClr val="accent1"/>
+          </a:effectRef>
+          <a:fontRef idx="minor">
+            <a:schemeClr val="lt1"/>
+          </a:fontRef>
+        </p:style>
+        <p:txBody>
+          <a:bodyPr rtlCol="0" anchor="ctr"/>
+          <a:lstStyle/>
+          <a:p>
+            <a:pPr algn="ctr"/>
+            <a:endParaRPr lang="en-US" dirty="0"/>
+          </a:p>
+        </p:txBody>
+      </p:sp>
+      <p:sp>
+        <p:nvSpPr>
+          <p:cNvPr id="62" name="TextBox 61">
+            <a:extLst>
+              <a:ext uri="{FF2B5EF4-FFF2-40B4-BE49-F238E27FC236}">
+                <a16:creationId xmlns:a16="http://schemas.microsoft.com/office/drawing/2014/main" id="{24BFDA6F-BA52-EA27-5E30-CEB44F9A4868}"/>
+              </a:ext>
+            </a:extLst>
+          </p:cNvPr>
+          <p:cNvSpPr txBox="1"/>
+          <p:nvPr/>
+        </p:nvSpPr>
+        <p:spPr>
+          <a:xfrm>
+            <a:off x="1147374" y="315017"/>
+            <a:ext cx="1669398" cy="369332"/>
+          </a:xfrm>
+          <a:prstGeom prst="rect">
+            <a:avLst/>
+          </a:prstGeom>
+          <a:noFill/>
+        </p:spPr>
+        <p:txBody>
+          <a:bodyPr wrap="square" rtlCol="0">
+            <a:spAutoFit/>
+          </a:bodyPr>
+          <a:lstStyle/>
+          <a:p>
+            <a:pPr algn="ctr"/>
+            <a:r>
+              <a:rPr lang="en-US" dirty="0"/>
+              <a:t>Rank 0</a:t>
+            </a:r>
+          </a:p>
+        </p:txBody>
+      </p:sp>
+      <p:sp>
+        <p:nvSpPr>
+          <p:cNvPr id="63" name="TextBox 62">
+            <a:extLst>
+              <a:ext uri="{FF2B5EF4-FFF2-40B4-BE49-F238E27FC236}">
+                <a16:creationId xmlns:a16="http://schemas.microsoft.com/office/drawing/2014/main" id="{181B330C-0981-C08C-D865-C705F7F31B61}"/>
+              </a:ext>
+            </a:extLst>
+          </p:cNvPr>
+          <p:cNvSpPr txBox="1"/>
+          <p:nvPr/>
+        </p:nvSpPr>
+        <p:spPr>
+          <a:xfrm>
+            <a:off x="3091503" y="315017"/>
+            <a:ext cx="1683403" cy="369332"/>
+          </a:xfrm>
+          <a:prstGeom prst="rect">
+            <a:avLst/>
+          </a:prstGeom>
+          <a:noFill/>
+        </p:spPr>
+        <p:txBody>
+          <a:bodyPr wrap="square" rtlCol="0">
+            <a:spAutoFit/>
+          </a:bodyPr>
+          <a:lstStyle/>
+          <a:p>
+            <a:pPr algn="ctr"/>
+            <a:r>
+              <a:rPr lang="en-US" dirty="0"/>
+              <a:t>Rank 1</a:t>
+            </a:r>
+          </a:p>
+        </p:txBody>
+      </p:sp>
+      <p:cxnSp>
+        <p:nvCxnSpPr>
+          <p:cNvPr id="65" name="Straight Arrow Connector 64">
+            <a:extLst>
+              <a:ext uri="{FF2B5EF4-FFF2-40B4-BE49-F238E27FC236}">
+                <a16:creationId xmlns:a16="http://schemas.microsoft.com/office/drawing/2014/main" id="{B16078BB-F36B-90B8-077C-F90A85C61AA3}"/>
+              </a:ext>
+            </a:extLst>
+          </p:cNvPr>
+          <p:cNvCxnSpPr/>
+          <p:nvPr/>
+        </p:nvCxnSpPr>
+        <p:spPr>
+          <a:xfrm flipH="1">
+            <a:off x="2648857" y="904119"/>
+            <a:ext cx="846667" cy="0"/>
+          </a:xfrm>
+          <a:prstGeom prst="straightConnector1">
+            <a:avLst/>
+          </a:prstGeom>
+          <a:ln w="19050">
+            <a:tailEnd type="triangle"/>
+          </a:ln>
+        </p:spPr>
+        <p:style>
+          <a:lnRef idx="1">
+            <a:schemeClr val="dk1"/>
+          </a:lnRef>
+          <a:fillRef idx="0">
+            <a:schemeClr val="dk1"/>
+          </a:fillRef>
+          <a:effectRef idx="0">
+            <a:schemeClr val="dk1"/>
+          </a:effectRef>
+          <a:fontRef idx="minor">
+            <a:schemeClr val="tx1"/>
+          </a:fontRef>
+        </p:style>
+      </p:cxnSp>
+      <p:cxnSp>
+        <p:nvCxnSpPr>
+          <p:cNvPr id="66" name="Straight Arrow Connector 65">
+            <a:extLst>
+              <a:ext uri="{FF2B5EF4-FFF2-40B4-BE49-F238E27FC236}">
+                <a16:creationId xmlns:a16="http://schemas.microsoft.com/office/drawing/2014/main" id="{7387A86F-3736-2455-C33A-E7FFEE629E43}"/>
+              </a:ext>
+            </a:extLst>
+          </p:cNvPr>
+          <p:cNvCxnSpPr>
+            <a:cxnSpLocks/>
+          </p:cNvCxnSpPr>
+          <p:nvPr/>
+        </p:nvCxnSpPr>
+        <p:spPr>
+          <a:xfrm>
+            <a:off x="2386436" y="1640719"/>
+            <a:ext cx="846667" cy="0"/>
+          </a:xfrm>
+          <a:prstGeom prst="straightConnector1">
+            <a:avLst/>
+          </a:prstGeom>
+          <a:ln w="19050">
+            <a:tailEnd type="triangle"/>
+          </a:ln>
+        </p:spPr>
+        <p:style>
+          <a:lnRef idx="1">
+            <a:schemeClr val="dk1"/>
+          </a:lnRef>
+          <a:fillRef idx="0">
+            <a:schemeClr val="dk1"/>
+          </a:fillRef>
+          <a:effectRef idx="0">
+            <a:schemeClr val="dk1"/>
+          </a:effectRef>
+          <a:fontRef idx="minor">
+            <a:schemeClr val="tx1"/>
+          </a:fontRef>
+        </p:style>
+      </p:cxnSp>
+    </p:spTree>
+    <p:extLst>
+      <p:ext uri="{BB962C8B-B14F-4D97-AF65-F5344CB8AC3E}">
+        <p14:creationId xmlns:p14="http://schemas.microsoft.com/office/powerpoint/2010/main" val="3206631681"/>
       </p:ext>
     </p:extLst>
   </p:cSld>

</xml_diff>

<commit_message>
Deploying to gh-pages from @ Southampton-RSG-Training/dirac-intro-to-mpi@560e71f5edd98619607302792c74259938efe7a2 🚀
</commit_message>
<xml_diff>
--- a/files/communication_diagram.pptx
+++ b/files/communication_diagram.pptx
@@ -5,13 +5,14 @@
     <p:sldMasterId id="2147483648" r:id="rId1"/>
   </p:sldMasterIdLst>
   <p:notesMasterIdLst>
-    <p:notesMasterId r:id="rId6"/>
+    <p:notesMasterId r:id="rId7"/>
   </p:notesMasterIdLst>
   <p:sldIdLst>
     <p:sldId id="256" r:id="rId2"/>
     <p:sldId id="257" r:id="rId3"/>
     <p:sldId id="258" r:id="rId4"/>
     <p:sldId id="259" r:id="rId5"/>
+    <p:sldId id="260" r:id="rId6"/>
   </p:sldIdLst>
   <p:sldSz cx="12192000" cy="6858000"/>
   <p:notesSz cx="6858000" cy="9144000"/>
@@ -200,7 +201,7 @@
           <a:p>
             <a:fld id="{1DA394A1-87FE-BC40-B428-C4F79D5812EE}" type="datetimeFigureOut">
               <a:rPr lang="en-US" smtClean="0"/>
-              <a:t>6/9/23</a:t>
+              <a:t>7/18/23</a:t>
             </a:fld>
             <a:endParaRPr lang="en-US"/>
           </a:p>
@@ -785,7 +786,7 @@
           <a:p>
             <a:fld id="{5BD1349E-D158-4E40-990A-05F7F3787A3C}" type="datetimeFigureOut">
               <a:rPr lang="en-US" smtClean="0"/>
-              <a:t>6/9/23</a:t>
+              <a:t>7/18/23</a:t>
             </a:fld>
             <a:endParaRPr lang="en-US"/>
           </a:p>
@@ -985,7 +986,7 @@
           <a:p>
             <a:fld id="{5BD1349E-D158-4E40-990A-05F7F3787A3C}" type="datetimeFigureOut">
               <a:rPr lang="en-US" smtClean="0"/>
-              <a:t>6/9/23</a:t>
+              <a:t>7/18/23</a:t>
             </a:fld>
             <a:endParaRPr lang="en-US"/>
           </a:p>
@@ -1195,7 +1196,7 @@
           <a:p>
             <a:fld id="{5BD1349E-D158-4E40-990A-05F7F3787A3C}" type="datetimeFigureOut">
               <a:rPr lang="en-US" smtClean="0"/>
-              <a:t>6/9/23</a:t>
+              <a:t>7/18/23</a:t>
             </a:fld>
             <a:endParaRPr lang="en-US"/>
           </a:p>
@@ -1395,7 +1396,7 @@
           <a:p>
             <a:fld id="{5BD1349E-D158-4E40-990A-05F7F3787A3C}" type="datetimeFigureOut">
               <a:rPr lang="en-US" smtClean="0"/>
-              <a:t>6/9/23</a:t>
+              <a:t>7/18/23</a:t>
             </a:fld>
             <a:endParaRPr lang="en-US"/>
           </a:p>
@@ -1671,7 +1672,7 @@
           <a:p>
             <a:fld id="{5BD1349E-D158-4E40-990A-05F7F3787A3C}" type="datetimeFigureOut">
               <a:rPr lang="en-US" smtClean="0"/>
-              <a:t>6/9/23</a:t>
+              <a:t>7/18/23</a:t>
             </a:fld>
             <a:endParaRPr lang="en-US"/>
           </a:p>
@@ -1939,7 +1940,7 @@
           <a:p>
             <a:fld id="{5BD1349E-D158-4E40-990A-05F7F3787A3C}" type="datetimeFigureOut">
               <a:rPr lang="en-US" smtClean="0"/>
-              <a:t>6/9/23</a:t>
+              <a:t>7/18/23</a:t>
             </a:fld>
             <a:endParaRPr lang="en-US"/>
           </a:p>
@@ -2354,7 +2355,7 @@
           <a:p>
             <a:fld id="{5BD1349E-D158-4E40-990A-05F7F3787A3C}" type="datetimeFigureOut">
               <a:rPr lang="en-US" smtClean="0"/>
-              <a:t>6/9/23</a:t>
+              <a:t>7/18/23</a:t>
             </a:fld>
             <a:endParaRPr lang="en-US"/>
           </a:p>
@@ -2496,7 +2497,7 @@
           <a:p>
             <a:fld id="{5BD1349E-D158-4E40-990A-05F7F3787A3C}" type="datetimeFigureOut">
               <a:rPr lang="en-US" smtClean="0"/>
-              <a:t>6/9/23</a:t>
+              <a:t>7/18/23</a:t>
             </a:fld>
             <a:endParaRPr lang="en-US"/>
           </a:p>
@@ -2609,7 +2610,7 @@
           <a:p>
             <a:fld id="{5BD1349E-D158-4E40-990A-05F7F3787A3C}" type="datetimeFigureOut">
               <a:rPr lang="en-US" smtClean="0"/>
-              <a:t>6/9/23</a:t>
+              <a:t>7/18/23</a:t>
             </a:fld>
             <a:endParaRPr lang="en-US"/>
           </a:p>
@@ -2922,7 +2923,7 @@
           <a:p>
             <a:fld id="{5BD1349E-D158-4E40-990A-05F7F3787A3C}" type="datetimeFigureOut">
               <a:rPr lang="en-US" smtClean="0"/>
-              <a:t>6/9/23</a:t>
+              <a:t>7/18/23</a:t>
             </a:fld>
             <a:endParaRPr lang="en-US"/>
           </a:p>
@@ -3211,7 +3212,7 @@
           <a:p>
             <a:fld id="{5BD1349E-D158-4E40-990A-05F7F3787A3C}" type="datetimeFigureOut">
               <a:rPr lang="en-US" smtClean="0"/>
-              <a:t>6/9/23</a:t>
+              <a:t>7/18/23</a:t>
             </a:fld>
             <a:endParaRPr lang="en-US"/>
           </a:p>
@@ -3454,7 +3455,7 @@
           <a:p>
             <a:fld id="{5BD1349E-D158-4E40-990A-05F7F3787A3C}" type="datetimeFigureOut">
               <a:rPr lang="en-US" smtClean="0"/>
-              <a:t>6/9/23</a:t>
+              <a:t>7/18/23</a:t>
             </a:fld>
             <a:endParaRPr lang="en-US"/>
           </a:p>
@@ -23437,6 +23438,765 @@
     <p:extLst>
       <p:ext uri="{BB962C8B-B14F-4D97-AF65-F5344CB8AC3E}">
         <p14:creationId xmlns:p14="http://schemas.microsoft.com/office/powerpoint/2010/main" val="2905784832"/>
+      </p:ext>
+    </p:extLst>
+  </p:cSld>
+  <p:clrMapOvr>
+    <a:masterClrMapping/>
+  </p:clrMapOvr>
+</p:sld>
+</file>
+
+<file path=ppt/slides/slide5.xml><?xml version="1.0" encoding="utf-8"?>
+<p:sld xmlns:a="http://schemas.openxmlformats.org/drawingml/2006/main" xmlns:r="http://schemas.openxmlformats.org/officeDocument/2006/relationships" xmlns:p="http://schemas.openxmlformats.org/presentationml/2006/main">
+  <p:cSld>
+    <p:spTree>
+      <p:nvGrpSpPr>
+        <p:cNvPr id="1" name=""/>
+        <p:cNvGrpSpPr/>
+        <p:nvPr/>
+      </p:nvGrpSpPr>
+      <p:grpSpPr>
+        <a:xfrm>
+          <a:off x="0" y="0"/>
+          <a:ext cx="0" cy="0"/>
+          <a:chOff x="0" y="0"/>
+          <a:chExt cx="0" cy="0"/>
+        </a:xfrm>
+      </p:grpSpPr>
+      <p:sp>
+        <p:nvSpPr>
+          <p:cNvPr id="48" name="Rectangle 47">
+            <a:extLst>
+              <a:ext uri="{FF2B5EF4-FFF2-40B4-BE49-F238E27FC236}">
+                <a16:creationId xmlns:a16="http://schemas.microsoft.com/office/drawing/2014/main" id="{1875138C-411D-09C9-B4EF-658582612DD5}"/>
+              </a:ext>
+            </a:extLst>
+          </p:cNvPr>
+          <p:cNvSpPr/>
+          <p:nvPr/>
+        </p:nvSpPr>
+        <p:spPr>
+          <a:xfrm>
+            <a:off x="2246302" y="685242"/>
+            <a:ext cx="281734" cy="1206394"/>
+          </a:xfrm>
+          <a:prstGeom prst="rect">
+            <a:avLst/>
+          </a:prstGeom>
+          <a:solidFill>
+            <a:srgbClr val="15AD2E"/>
+          </a:solidFill>
+        </p:spPr>
+        <p:style>
+          <a:lnRef idx="2">
+            <a:schemeClr val="accent1">
+              <a:shade val="15000"/>
+            </a:schemeClr>
+          </a:lnRef>
+          <a:fillRef idx="1">
+            <a:schemeClr val="accent1"/>
+          </a:fillRef>
+          <a:effectRef idx="0">
+            <a:schemeClr val="accent1"/>
+          </a:effectRef>
+          <a:fontRef idx="minor">
+            <a:schemeClr val="lt1"/>
+          </a:fontRef>
+        </p:style>
+        <p:txBody>
+          <a:bodyPr rtlCol="0" anchor="ctr"/>
+          <a:lstStyle/>
+          <a:p>
+            <a:pPr algn="ctr"/>
+            <a:endParaRPr lang="en-US" dirty="0"/>
+          </a:p>
+        </p:txBody>
+      </p:sp>
+      <p:sp>
+        <p:nvSpPr>
+          <p:cNvPr id="49" name="Rectangle 48">
+            <a:extLst>
+              <a:ext uri="{FF2B5EF4-FFF2-40B4-BE49-F238E27FC236}">
+                <a16:creationId xmlns:a16="http://schemas.microsoft.com/office/drawing/2014/main" id="{D1027101-0CA7-5506-C8FC-388DFFCE4873}"/>
+              </a:ext>
+            </a:extLst>
+          </p:cNvPr>
+          <p:cNvSpPr/>
+          <p:nvPr/>
+        </p:nvSpPr>
+        <p:spPr>
+          <a:xfrm>
+            <a:off x="3373239" y="685242"/>
+            <a:ext cx="281734" cy="1206394"/>
+          </a:xfrm>
+          <a:prstGeom prst="rect">
+            <a:avLst/>
+          </a:prstGeom>
+        </p:spPr>
+        <p:style>
+          <a:lnRef idx="2">
+            <a:schemeClr val="accent1">
+              <a:shade val="15000"/>
+            </a:schemeClr>
+          </a:lnRef>
+          <a:fillRef idx="1">
+            <a:schemeClr val="accent1"/>
+          </a:fillRef>
+          <a:effectRef idx="0">
+            <a:schemeClr val="accent1"/>
+          </a:effectRef>
+          <a:fontRef idx="minor">
+            <a:schemeClr val="lt1"/>
+          </a:fontRef>
+        </p:style>
+        <p:txBody>
+          <a:bodyPr rtlCol="0" anchor="ctr"/>
+          <a:lstStyle/>
+          <a:p>
+            <a:pPr algn="ctr"/>
+            <a:endParaRPr lang="en-US" dirty="0"/>
+          </a:p>
+        </p:txBody>
+      </p:sp>
+      <p:sp>
+        <p:nvSpPr>
+          <p:cNvPr id="50" name="Rectangle 49">
+            <a:extLst>
+              <a:ext uri="{FF2B5EF4-FFF2-40B4-BE49-F238E27FC236}">
+                <a16:creationId xmlns:a16="http://schemas.microsoft.com/office/drawing/2014/main" id="{F34F4026-7E40-CAAA-0DF0-2E3A8AAF8B2B}"/>
+              </a:ext>
+            </a:extLst>
+          </p:cNvPr>
+          <p:cNvSpPr/>
+          <p:nvPr/>
+        </p:nvSpPr>
+        <p:spPr>
+          <a:xfrm>
+            <a:off x="2528036" y="685242"/>
+            <a:ext cx="281734" cy="1206394"/>
+          </a:xfrm>
+          <a:prstGeom prst="rect">
+            <a:avLst/>
+          </a:prstGeom>
+          <a:solidFill>
+            <a:srgbClr val="4472C5">
+              <a:alpha val="70000"/>
+            </a:srgbClr>
+          </a:solidFill>
+        </p:spPr>
+        <p:style>
+          <a:lnRef idx="2">
+            <a:schemeClr val="accent1">
+              <a:shade val="15000"/>
+            </a:schemeClr>
+          </a:lnRef>
+          <a:fillRef idx="1">
+            <a:schemeClr val="accent1"/>
+          </a:fillRef>
+          <a:effectRef idx="0">
+            <a:schemeClr val="accent1"/>
+          </a:effectRef>
+          <a:fontRef idx="minor">
+            <a:schemeClr val="lt1"/>
+          </a:fontRef>
+        </p:style>
+        <p:txBody>
+          <a:bodyPr rtlCol="0" anchor="ctr"/>
+          <a:lstStyle/>
+          <a:p>
+            <a:pPr algn="ctr"/>
+            <a:endParaRPr lang="en-US" dirty="0"/>
+          </a:p>
+        </p:txBody>
+      </p:sp>
+      <p:sp>
+        <p:nvSpPr>
+          <p:cNvPr id="51" name="Rectangle 50">
+            <a:extLst>
+              <a:ext uri="{FF2B5EF4-FFF2-40B4-BE49-F238E27FC236}">
+                <a16:creationId xmlns:a16="http://schemas.microsoft.com/office/drawing/2014/main" id="{7C070088-B36C-376C-3C64-72BE7F07D71E}"/>
+              </a:ext>
+            </a:extLst>
+          </p:cNvPr>
+          <p:cNvSpPr/>
+          <p:nvPr/>
+        </p:nvSpPr>
+        <p:spPr>
+          <a:xfrm>
+            <a:off x="1964568" y="685242"/>
+            <a:ext cx="281734" cy="1206394"/>
+          </a:xfrm>
+          <a:prstGeom prst="rect">
+            <a:avLst/>
+          </a:prstGeom>
+          <a:solidFill>
+            <a:srgbClr val="15AD2E"/>
+          </a:solidFill>
+        </p:spPr>
+        <p:style>
+          <a:lnRef idx="2">
+            <a:schemeClr val="accent1">
+              <a:shade val="15000"/>
+            </a:schemeClr>
+          </a:lnRef>
+          <a:fillRef idx="1">
+            <a:schemeClr val="accent1"/>
+          </a:fillRef>
+          <a:effectRef idx="0">
+            <a:schemeClr val="accent1"/>
+          </a:effectRef>
+          <a:fontRef idx="minor">
+            <a:schemeClr val="lt1"/>
+          </a:fontRef>
+        </p:style>
+        <p:txBody>
+          <a:bodyPr rtlCol="0" anchor="ctr"/>
+          <a:lstStyle/>
+          <a:p>
+            <a:pPr algn="ctr"/>
+            <a:endParaRPr lang="en-US" dirty="0"/>
+          </a:p>
+        </p:txBody>
+      </p:sp>
+      <p:sp>
+        <p:nvSpPr>
+          <p:cNvPr id="52" name="Rectangle 51">
+            <a:extLst>
+              <a:ext uri="{FF2B5EF4-FFF2-40B4-BE49-F238E27FC236}">
+                <a16:creationId xmlns:a16="http://schemas.microsoft.com/office/drawing/2014/main" id="{BDEBB670-6CCB-E02E-75E6-8EB8EF826BC0}"/>
+              </a:ext>
+            </a:extLst>
+          </p:cNvPr>
+          <p:cNvSpPr/>
+          <p:nvPr/>
+        </p:nvSpPr>
+        <p:spPr>
+          <a:xfrm>
+            <a:off x="1682834" y="685242"/>
+            <a:ext cx="281734" cy="1206394"/>
+          </a:xfrm>
+          <a:prstGeom prst="rect">
+            <a:avLst/>
+          </a:prstGeom>
+          <a:solidFill>
+            <a:srgbClr val="15AD2E"/>
+          </a:solidFill>
+        </p:spPr>
+        <p:style>
+          <a:lnRef idx="2">
+            <a:schemeClr val="accent1">
+              <a:shade val="15000"/>
+            </a:schemeClr>
+          </a:lnRef>
+          <a:fillRef idx="1">
+            <a:schemeClr val="accent1"/>
+          </a:fillRef>
+          <a:effectRef idx="0">
+            <a:schemeClr val="accent1"/>
+          </a:effectRef>
+          <a:fontRef idx="minor">
+            <a:schemeClr val="lt1"/>
+          </a:fontRef>
+        </p:style>
+        <p:txBody>
+          <a:bodyPr rtlCol="0" anchor="ctr"/>
+          <a:lstStyle/>
+          <a:p>
+            <a:pPr algn="ctr"/>
+            <a:endParaRPr lang="en-US" dirty="0"/>
+          </a:p>
+        </p:txBody>
+      </p:sp>
+      <p:sp>
+        <p:nvSpPr>
+          <p:cNvPr id="53" name="Rectangle 52">
+            <a:extLst>
+              <a:ext uri="{FF2B5EF4-FFF2-40B4-BE49-F238E27FC236}">
+                <a16:creationId xmlns:a16="http://schemas.microsoft.com/office/drawing/2014/main" id="{B45BC851-2DFD-78AF-C864-0C84F660727E}"/>
+              </a:ext>
+            </a:extLst>
+          </p:cNvPr>
+          <p:cNvSpPr/>
+          <p:nvPr/>
+        </p:nvSpPr>
+        <p:spPr>
+          <a:xfrm>
+            <a:off x="1408102" y="685242"/>
+            <a:ext cx="281734" cy="1206394"/>
+          </a:xfrm>
+          <a:prstGeom prst="rect">
+            <a:avLst/>
+          </a:prstGeom>
+          <a:solidFill>
+            <a:srgbClr val="15AD2E"/>
+          </a:solidFill>
+        </p:spPr>
+        <p:style>
+          <a:lnRef idx="2">
+            <a:schemeClr val="accent1">
+              <a:shade val="15000"/>
+            </a:schemeClr>
+          </a:lnRef>
+          <a:fillRef idx="1">
+            <a:schemeClr val="accent1"/>
+          </a:fillRef>
+          <a:effectRef idx="0">
+            <a:schemeClr val="accent1"/>
+          </a:effectRef>
+          <a:fontRef idx="minor">
+            <a:schemeClr val="lt1"/>
+          </a:fontRef>
+        </p:style>
+        <p:txBody>
+          <a:bodyPr rtlCol="0" anchor="ctr"/>
+          <a:lstStyle/>
+          <a:p>
+            <a:pPr algn="ctr"/>
+            <a:endParaRPr lang="en-US" dirty="0"/>
+          </a:p>
+        </p:txBody>
+      </p:sp>
+      <p:sp>
+        <p:nvSpPr>
+          <p:cNvPr id="54" name="Rectangle 53">
+            <a:extLst>
+              <a:ext uri="{FF2B5EF4-FFF2-40B4-BE49-F238E27FC236}">
+                <a16:creationId xmlns:a16="http://schemas.microsoft.com/office/drawing/2014/main" id="{8F0BF0B7-E0FA-7A58-42DF-7235E711ED99}"/>
+              </a:ext>
+            </a:extLst>
+          </p:cNvPr>
+          <p:cNvSpPr/>
+          <p:nvPr/>
+        </p:nvSpPr>
+        <p:spPr>
+          <a:xfrm>
+            <a:off x="1147374" y="685242"/>
+            <a:ext cx="281734" cy="1206394"/>
+          </a:xfrm>
+          <a:prstGeom prst="rect">
+            <a:avLst/>
+          </a:prstGeom>
+          <a:solidFill>
+            <a:srgbClr val="15AD2E"/>
+          </a:solidFill>
+        </p:spPr>
+        <p:style>
+          <a:lnRef idx="2">
+            <a:schemeClr val="accent1">
+              <a:shade val="15000"/>
+            </a:schemeClr>
+          </a:lnRef>
+          <a:fillRef idx="1">
+            <a:schemeClr val="accent1"/>
+          </a:fillRef>
+          <a:effectRef idx="0">
+            <a:schemeClr val="accent1"/>
+          </a:effectRef>
+          <a:fontRef idx="minor">
+            <a:schemeClr val="lt1"/>
+          </a:fontRef>
+        </p:style>
+        <p:txBody>
+          <a:bodyPr rtlCol="0" anchor="ctr"/>
+          <a:lstStyle/>
+          <a:p>
+            <a:pPr algn="ctr"/>
+            <a:endParaRPr lang="en-US" dirty="0"/>
+          </a:p>
+        </p:txBody>
+      </p:sp>
+      <p:sp>
+        <p:nvSpPr>
+          <p:cNvPr id="55" name="Rectangle 54">
+            <a:extLst>
+              <a:ext uri="{FF2B5EF4-FFF2-40B4-BE49-F238E27FC236}">
+                <a16:creationId xmlns:a16="http://schemas.microsoft.com/office/drawing/2014/main" id="{8856C046-92ED-C6B0-6D0C-690E080EA961}"/>
+              </a:ext>
+            </a:extLst>
+          </p:cNvPr>
+          <p:cNvSpPr/>
+          <p:nvPr/>
+        </p:nvSpPr>
+        <p:spPr>
+          <a:xfrm>
+            <a:off x="3091504" y="685242"/>
+            <a:ext cx="281734" cy="1206394"/>
+          </a:xfrm>
+          <a:prstGeom prst="rect">
+            <a:avLst/>
+          </a:prstGeom>
+          <a:solidFill>
+            <a:srgbClr val="15AD2E">
+              <a:alpha val="70000"/>
+            </a:srgbClr>
+          </a:solidFill>
+        </p:spPr>
+        <p:style>
+          <a:lnRef idx="2">
+            <a:schemeClr val="accent1">
+              <a:shade val="15000"/>
+            </a:schemeClr>
+          </a:lnRef>
+          <a:fillRef idx="1">
+            <a:schemeClr val="accent1"/>
+          </a:fillRef>
+          <a:effectRef idx="0">
+            <a:schemeClr val="accent1"/>
+          </a:effectRef>
+          <a:fontRef idx="minor">
+            <a:schemeClr val="lt1"/>
+          </a:fontRef>
+        </p:style>
+        <p:txBody>
+          <a:bodyPr rtlCol="0" anchor="ctr"/>
+          <a:lstStyle/>
+          <a:p>
+            <a:pPr algn="ctr"/>
+            <a:endParaRPr lang="en-US" dirty="0"/>
+          </a:p>
+        </p:txBody>
+      </p:sp>
+      <p:sp>
+        <p:nvSpPr>
+          <p:cNvPr id="56" name="Rectangle 55">
+            <a:extLst>
+              <a:ext uri="{FF2B5EF4-FFF2-40B4-BE49-F238E27FC236}">
+                <a16:creationId xmlns:a16="http://schemas.microsoft.com/office/drawing/2014/main" id="{5159C8E3-E51A-3F8A-C98C-26B77D4E6F3C}"/>
+              </a:ext>
+            </a:extLst>
+          </p:cNvPr>
+          <p:cNvSpPr/>
+          <p:nvPr/>
+        </p:nvSpPr>
+        <p:spPr>
+          <a:xfrm>
+            <a:off x="3654973" y="685242"/>
+            <a:ext cx="281734" cy="1206394"/>
+          </a:xfrm>
+          <a:prstGeom prst="rect">
+            <a:avLst/>
+          </a:prstGeom>
+        </p:spPr>
+        <p:style>
+          <a:lnRef idx="2">
+            <a:schemeClr val="accent1">
+              <a:shade val="15000"/>
+            </a:schemeClr>
+          </a:lnRef>
+          <a:fillRef idx="1">
+            <a:schemeClr val="accent1"/>
+          </a:fillRef>
+          <a:effectRef idx="0">
+            <a:schemeClr val="accent1"/>
+          </a:effectRef>
+          <a:fontRef idx="minor">
+            <a:schemeClr val="lt1"/>
+          </a:fontRef>
+        </p:style>
+        <p:txBody>
+          <a:bodyPr rtlCol="0" anchor="ctr"/>
+          <a:lstStyle/>
+          <a:p>
+            <a:pPr algn="ctr"/>
+            <a:endParaRPr lang="en-US" dirty="0"/>
+          </a:p>
+        </p:txBody>
+      </p:sp>
+      <p:sp>
+        <p:nvSpPr>
+          <p:cNvPr id="57" name="Rectangle 56">
+            <a:extLst>
+              <a:ext uri="{FF2B5EF4-FFF2-40B4-BE49-F238E27FC236}">
+                <a16:creationId xmlns:a16="http://schemas.microsoft.com/office/drawing/2014/main" id="{F03FFD48-939E-EBB3-1F99-2E6E6DFB04D3}"/>
+              </a:ext>
+            </a:extLst>
+          </p:cNvPr>
+          <p:cNvSpPr/>
+          <p:nvPr/>
+        </p:nvSpPr>
+        <p:spPr>
+          <a:xfrm>
+            <a:off x="3936707" y="685242"/>
+            <a:ext cx="281734" cy="1206394"/>
+          </a:xfrm>
+          <a:prstGeom prst="rect">
+            <a:avLst/>
+          </a:prstGeom>
+        </p:spPr>
+        <p:style>
+          <a:lnRef idx="2">
+            <a:schemeClr val="accent1">
+              <a:shade val="15000"/>
+            </a:schemeClr>
+          </a:lnRef>
+          <a:fillRef idx="1">
+            <a:schemeClr val="accent1"/>
+          </a:fillRef>
+          <a:effectRef idx="0">
+            <a:schemeClr val="accent1"/>
+          </a:effectRef>
+          <a:fontRef idx="minor">
+            <a:schemeClr val="lt1"/>
+          </a:fontRef>
+        </p:style>
+        <p:txBody>
+          <a:bodyPr rtlCol="0" anchor="ctr"/>
+          <a:lstStyle/>
+          <a:p>
+            <a:pPr algn="ctr"/>
+            <a:endParaRPr lang="en-US" dirty="0"/>
+          </a:p>
+        </p:txBody>
+      </p:sp>
+      <p:sp>
+        <p:nvSpPr>
+          <p:cNvPr id="58" name="Rectangle 57">
+            <a:extLst>
+              <a:ext uri="{FF2B5EF4-FFF2-40B4-BE49-F238E27FC236}">
+                <a16:creationId xmlns:a16="http://schemas.microsoft.com/office/drawing/2014/main" id="{D5010B99-1B46-5782-8078-01707DBB48FB}"/>
+              </a:ext>
+            </a:extLst>
+          </p:cNvPr>
+          <p:cNvSpPr/>
+          <p:nvPr/>
+        </p:nvSpPr>
+        <p:spPr>
+          <a:xfrm>
+            <a:off x="4218441" y="685242"/>
+            <a:ext cx="281734" cy="1206394"/>
+          </a:xfrm>
+          <a:prstGeom prst="rect">
+            <a:avLst/>
+          </a:prstGeom>
+        </p:spPr>
+        <p:style>
+          <a:lnRef idx="2">
+            <a:schemeClr val="accent1">
+              <a:shade val="15000"/>
+            </a:schemeClr>
+          </a:lnRef>
+          <a:fillRef idx="1">
+            <a:schemeClr val="accent1"/>
+          </a:fillRef>
+          <a:effectRef idx="0">
+            <a:schemeClr val="accent1"/>
+          </a:effectRef>
+          <a:fontRef idx="minor">
+            <a:schemeClr val="lt1"/>
+          </a:fontRef>
+        </p:style>
+        <p:txBody>
+          <a:bodyPr rtlCol="0" anchor="ctr"/>
+          <a:lstStyle/>
+          <a:p>
+            <a:pPr algn="ctr"/>
+            <a:endParaRPr lang="en-US" dirty="0"/>
+          </a:p>
+        </p:txBody>
+      </p:sp>
+      <p:sp>
+        <p:nvSpPr>
+          <p:cNvPr id="59" name="Rectangle 58">
+            <a:extLst>
+              <a:ext uri="{FF2B5EF4-FFF2-40B4-BE49-F238E27FC236}">
+                <a16:creationId xmlns:a16="http://schemas.microsoft.com/office/drawing/2014/main" id="{006911A1-918A-47FC-B879-DEF9CDDEA095}"/>
+              </a:ext>
+            </a:extLst>
+          </p:cNvPr>
+          <p:cNvSpPr/>
+          <p:nvPr/>
+        </p:nvSpPr>
+        <p:spPr>
+          <a:xfrm>
+            <a:off x="4500175" y="685242"/>
+            <a:ext cx="281734" cy="1206394"/>
+          </a:xfrm>
+          <a:prstGeom prst="rect">
+            <a:avLst/>
+          </a:prstGeom>
+        </p:spPr>
+        <p:style>
+          <a:lnRef idx="2">
+            <a:schemeClr val="accent1">
+              <a:shade val="15000"/>
+            </a:schemeClr>
+          </a:lnRef>
+          <a:fillRef idx="1">
+            <a:schemeClr val="accent1"/>
+          </a:fillRef>
+          <a:effectRef idx="0">
+            <a:schemeClr val="accent1"/>
+          </a:effectRef>
+          <a:fontRef idx="minor">
+            <a:schemeClr val="lt1"/>
+          </a:fontRef>
+        </p:style>
+        <p:txBody>
+          <a:bodyPr rtlCol="0" anchor="ctr"/>
+          <a:lstStyle/>
+          <a:p>
+            <a:pPr algn="ctr"/>
+            <a:endParaRPr lang="en-US" dirty="0"/>
+          </a:p>
+        </p:txBody>
+      </p:sp>
+      <p:sp>
+        <p:nvSpPr>
+          <p:cNvPr id="62" name="TextBox 61">
+            <a:extLst>
+              <a:ext uri="{FF2B5EF4-FFF2-40B4-BE49-F238E27FC236}">
+                <a16:creationId xmlns:a16="http://schemas.microsoft.com/office/drawing/2014/main" id="{24BFDA6F-BA52-EA27-5E30-CEB44F9A4868}"/>
+              </a:ext>
+            </a:extLst>
+          </p:cNvPr>
+          <p:cNvSpPr txBox="1"/>
+          <p:nvPr/>
+        </p:nvSpPr>
+        <p:spPr>
+          <a:xfrm>
+            <a:off x="1147374" y="315017"/>
+            <a:ext cx="1669398" cy="369332"/>
+          </a:xfrm>
+          <a:prstGeom prst="rect">
+            <a:avLst/>
+          </a:prstGeom>
+          <a:noFill/>
+        </p:spPr>
+        <p:txBody>
+          <a:bodyPr wrap="square" rtlCol="0">
+            <a:spAutoFit/>
+          </a:bodyPr>
+          <a:lstStyle/>
+          <a:p>
+            <a:pPr algn="ctr"/>
+            <a:r>
+              <a:rPr lang="en-US" dirty="0"/>
+              <a:t>Rank 0</a:t>
+            </a:r>
+          </a:p>
+        </p:txBody>
+      </p:sp>
+      <p:sp>
+        <p:nvSpPr>
+          <p:cNvPr id="63" name="TextBox 62">
+            <a:extLst>
+              <a:ext uri="{FF2B5EF4-FFF2-40B4-BE49-F238E27FC236}">
+                <a16:creationId xmlns:a16="http://schemas.microsoft.com/office/drawing/2014/main" id="{181B330C-0981-C08C-D865-C705F7F31B61}"/>
+              </a:ext>
+            </a:extLst>
+          </p:cNvPr>
+          <p:cNvSpPr txBox="1"/>
+          <p:nvPr/>
+        </p:nvSpPr>
+        <p:spPr>
+          <a:xfrm>
+            <a:off x="3091503" y="315017"/>
+            <a:ext cx="1683403" cy="369332"/>
+          </a:xfrm>
+          <a:prstGeom prst="rect">
+            <a:avLst/>
+          </a:prstGeom>
+          <a:noFill/>
+        </p:spPr>
+        <p:txBody>
+          <a:bodyPr wrap="square" rtlCol="0">
+            <a:spAutoFit/>
+          </a:bodyPr>
+          <a:lstStyle/>
+          <a:p>
+            <a:pPr algn="ctr"/>
+            <a:r>
+              <a:rPr lang="en-US" dirty="0"/>
+              <a:t>Rank 1</a:t>
+            </a:r>
+          </a:p>
+        </p:txBody>
+      </p:sp>
+      <p:cxnSp>
+        <p:nvCxnSpPr>
+          <p:cNvPr id="65" name="Straight Arrow Connector 64">
+            <a:extLst>
+              <a:ext uri="{FF2B5EF4-FFF2-40B4-BE49-F238E27FC236}">
+                <a16:creationId xmlns:a16="http://schemas.microsoft.com/office/drawing/2014/main" id="{B16078BB-F36B-90B8-077C-F90A85C61AA3}"/>
+              </a:ext>
+            </a:extLst>
+          </p:cNvPr>
+          <p:cNvCxnSpPr/>
+          <p:nvPr/>
+        </p:nvCxnSpPr>
+        <p:spPr>
+          <a:xfrm flipH="1">
+            <a:off x="2648857" y="904119"/>
+            <a:ext cx="846667" cy="0"/>
+          </a:xfrm>
+          <a:prstGeom prst="straightConnector1">
+            <a:avLst/>
+          </a:prstGeom>
+          <a:ln w="19050">
+            <a:tailEnd type="triangle"/>
+          </a:ln>
+        </p:spPr>
+        <p:style>
+          <a:lnRef idx="1">
+            <a:schemeClr val="dk1"/>
+          </a:lnRef>
+          <a:fillRef idx="0">
+            <a:schemeClr val="dk1"/>
+          </a:fillRef>
+          <a:effectRef idx="0">
+            <a:schemeClr val="dk1"/>
+          </a:effectRef>
+          <a:fontRef idx="minor">
+            <a:schemeClr val="tx1"/>
+          </a:fontRef>
+        </p:style>
+      </p:cxnSp>
+      <p:cxnSp>
+        <p:nvCxnSpPr>
+          <p:cNvPr id="66" name="Straight Arrow Connector 65">
+            <a:extLst>
+              <a:ext uri="{FF2B5EF4-FFF2-40B4-BE49-F238E27FC236}">
+                <a16:creationId xmlns:a16="http://schemas.microsoft.com/office/drawing/2014/main" id="{7387A86F-3736-2455-C33A-E7FFEE629E43}"/>
+              </a:ext>
+            </a:extLst>
+          </p:cNvPr>
+          <p:cNvCxnSpPr>
+            <a:cxnSpLocks/>
+          </p:cNvCxnSpPr>
+          <p:nvPr/>
+        </p:nvCxnSpPr>
+        <p:spPr>
+          <a:xfrm>
+            <a:off x="2386436" y="1640719"/>
+            <a:ext cx="846667" cy="0"/>
+          </a:xfrm>
+          <a:prstGeom prst="straightConnector1">
+            <a:avLst/>
+          </a:prstGeom>
+          <a:ln w="19050">
+            <a:tailEnd type="triangle"/>
+          </a:ln>
+        </p:spPr>
+        <p:style>
+          <a:lnRef idx="1">
+            <a:schemeClr val="dk1"/>
+          </a:lnRef>
+          <a:fillRef idx="0">
+            <a:schemeClr val="dk1"/>
+          </a:fillRef>
+          <a:effectRef idx="0">
+            <a:schemeClr val="dk1"/>
+          </a:effectRef>
+          <a:fontRef idx="minor">
+            <a:schemeClr val="tx1"/>
+          </a:fontRef>
+        </p:style>
+      </p:cxnSp>
+    </p:spTree>
+    <p:extLst>
+      <p:ext uri="{BB962C8B-B14F-4D97-AF65-F5344CB8AC3E}">
+        <p14:creationId xmlns:p14="http://schemas.microsoft.com/office/powerpoint/2010/main" val="3206631681"/>
       </p:ext>
     </p:extLst>
   </p:cSld>

</xml_diff>